<commit_message>
Updated Powerpoint slide to slide 4
</commit_message>
<xml_diff>
--- a/Technical Documentation/projectpresentation.pptx
+++ b/Technical Documentation/projectpresentation.pptx
@@ -2,12 +2,14 @@
 <file path=ppt/presentation.xml><?xml version="1.0" encoding="utf-8"?>
 <p:presentation xmlns:a="http://schemas.openxmlformats.org/drawingml/2006/main" xmlns:r="http://schemas.openxmlformats.org/officeDocument/2006/relationships" xmlns:p="http://schemas.openxmlformats.org/presentationml/2006/main" autoCompressPictures="0">
   <p:sldMasterIdLst>
-    <p:sldMasterId id="2147483669" r:id="rId1"/>
+    <p:sldMasterId id="2147483705" r:id="rId1"/>
   </p:sldMasterIdLst>
   <p:sldIdLst>
     <p:sldId id="256" r:id="rId2"/>
     <p:sldId id="257" r:id="rId3"/>
     <p:sldId id="258" r:id="rId4"/>
+    <p:sldId id="259" r:id="rId5"/>
+    <p:sldId id="260" r:id="rId6"/>
   </p:sldIdLst>
   <p:sldSz cx="12192000" cy="6858000"/>
   <p:notesSz cx="6858000" cy="9144000"/>
@@ -106,6 +108,11 @@
       </a:defRPr>
     </a:lvl9pPr>
   </p:defaultTextStyle>
+  <p:extLst>
+    <p:ext uri="{EFAFB233-063F-42B5-8137-9DF3F51BA10A}">
+      <p15:sldGuideLst xmlns:p15="http://schemas.microsoft.com/office/powerpoint/2012/main"/>
+    </p:ext>
+  </p:extLst>
 </p:presentation>
 </file>
 
@@ -194,9 +201,8 @@
                 <a:schemeClr val="tx2"/>
               </a:gs>
               <a:gs pos="100000">
-                <a:schemeClr val="bg2">
-                  <a:lumMod val="60000"/>
-                  <a:lumOff val="40000"/>
+                <a:schemeClr val="tx2">
+                  <a:lumMod val="50000"/>
                 </a:schemeClr>
               </a:gs>
             </a:gsLst>
@@ -4453,7 +4459,7 @@
     </p:spTree>
     <p:extLst>
       <p:ext uri="{BB962C8B-B14F-4D97-AF65-F5344CB8AC3E}">
-        <p14:creationId xmlns:p14="http://schemas.microsoft.com/office/powerpoint/2010/main" val="3112072308"/>
+        <p14:creationId xmlns:p14="http://schemas.microsoft.com/office/powerpoint/2010/main" val="3416990901"/>
       </p:ext>
     </p:extLst>
   </p:cSld>
@@ -4710,7 +4716,7 @@
     </p:spTree>
     <p:extLst>
       <p:ext uri="{BB962C8B-B14F-4D97-AF65-F5344CB8AC3E}">
-        <p14:creationId xmlns:p14="http://schemas.microsoft.com/office/powerpoint/2010/main" val="3057782317"/>
+        <p14:creationId xmlns:p14="http://schemas.microsoft.com/office/powerpoint/2010/main" val="4158479712"/>
       </p:ext>
     </p:extLst>
   </p:cSld>
@@ -4906,7 +4912,7 @@
     </p:spTree>
     <p:extLst>
       <p:ext uri="{BB962C8B-B14F-4D97-AF65-F5344CB8AC3E}">
-        <p14:creationId xmlns:p14="http://schemas.microsoft.com/office/powerpoint/2010/main" val="2575261957"/>
+        <p14:creationId xmlns:p14="http://schemas.microsoft.com/office/powerpoint/2010/main" val="2474725612"/>
       </p:ext>
     </p:extLst>
   </p:cSld>
@@ -5407,7 +5413,7 @@
     </p:spTree>
     <p:extLst>
       <p:ext uri="{BB962C8B-B14F-4D97-AF65-F5344CB8AC3E}">
-        <p14:creationId xmlns:p14="http://schemas.microsoft.com/office/powerpoint/2010/main" val="744274242"/>
+        <p14:creationId xmlns:p14="http://schemas.microsoft.com/office/powerpoint/2010/main" val="3636197459"/>
       </p:ext>
     </p:extLst>
   </p:cSld>
@@ -5603,7 +5609,7 @@
     </p:spTree>
     <p:extLst>
       <p:ext uri="{BB962C8B-B14F-4D97-AF65-F5344CB8AC3E}">
-        <p14:creationId xmlns:p14="http://schemas.microsoft.com/office/powerpoint/2010/main" val="3901117897"/>
+        <p14:creationId xmlns:p14="http://schemas.microsoft.com/office/powerpoint/2010/main" val="3851313868"/>
       </p:ext>
     </p:extLst>
   </p:cSld>
@@ -6149,7 +6155,7 @@
     </p:spTree>
     <p:extLst>
       <p:ext uri="{BB962C8B-B14F-4D97-AF65-F5344CB8AC3E}">
-        <p14:creationId xmlns:p14="http://schemas.microsoft.com/office/powerpoint/2010/main" val="2228601043"/>
+        <p14:creationId xmlns:p14="http://schemas.microsoft.com/office/powerpoint/2010/main" val="1322841805"/>
       </p:ext>
     </p:extLst>
   </p:cSld>
@@ -6869,7 +6875,7 @@
     </p:spTree>
     <p:extLst>
       <p:ext uri="{BB962C8B-B14F-4D97-AF65-F5344CB8AC3E}">
-        <p14:creationId xmlns:p14="http://schemas.microsoft.com/office/powerpoint/2010/main" val="857567832"/>
+        <p14:creationId xmlns:p14="http://schemas.microsoft.com/office/powerpoint/2010/main" val="1686048746"/>
       </p:ext>
     </p:extLst>
   </p:cSld>
@@ -7039,7 +7045,7 @@
     </p:spTree>
     <p:extLst>
       <p:ext uri="{BB962C8B-B14F-4D97-AF65-F5344CB8AC3E}">
-        <p14:creationId xmlns:p14="http://schemas.microsoft.com/office/powerpoint/2010/main" val="1373575881"/>
+        <p14:creationId xmlns:p14="http://schemas.microsoft.com/office/powerpoint/2010/main" val="4081599993"/>
       </p:ext>
     </p:extLst>
   </p:cSld>
@@ -7219,7 +7225,7 @@
     </p:spTree>
     <p:extLst>
       <p:ext uri="{BB962C8B-B14F-4D97-AF65-F5344CB8AC3E}">
-        <p14:creationId xmlns:p14="http://schemas.microsoft.com/office/powerpoint/2010/main" val="2234793939"/>
+        <p14:creationId xmlns:p14="http://schemas.microsoft.com/office/powerpoint/2010/main" val="482172589"/>
       </p:ext>
     </p:extLst>
   </p:cSld>
@@ -7389,7 +7395,7 @@
     </p:spTree>
     <p:extLst>
       <p:ext uri="{BB962C8B-B14F-4D97-AF65-F5344CB8AC3E}">
-        <p14:creationId xmlns:p14="http://schemas.microsoft.com/office/powerpoint/2010/main" val="3308458457"/>
+        <p14:creationId xmlns:p14="http://schemas.microsoft.com/office/powerpoint/2010/main" val="963955592"/>
       </p:ext>
     </p:extLst>
   </p:cSld>
@@ -7639,7 +7645,7 @@
     </p:spTree>
     <p:extLst>
       <p:ext uri="{BB962C8B-B14F-4D97-AF65-F5344CB8AC3E}">
-        <p14:creationId xmlns:p14="http://schemas.microsoft.com/office/powerpoint/2010/main" val="603350311"/>
+        <p14:creationId xmlns:p14="http://schemas.microsoft.com/office/powerpoint/2010/main" val="1672309722"/>
       </p:ext>
     </p:extLst>
   </p:cSld>
@@ -7871,7 +7877,7 @@
     </p:spTree>
     <p:extLst>
       <p:ext uri="{BB962C8B-B14F-4D97-AF65-F5344CB8AC3E}">
-        <p14:creationId xmlns:p14="http://schemas.microsoft.com/office/powerpoint/2010/main" val="2031790886"/>
+        <p14:creationId xmlns:p14="http://schemas.microsoft.com/office/powerpoint/2010/main" val="382657854"/>
       </p:ext>
     </p:extLst>
   </p:cSld>
@@ -8252,7 +8258,7 @@
     </p:spTree>
     <p:extLst>
       <p:ext uri="{BB962C8B-B14F-4D97-AF65-F5344CB8AC3E}">
-        <p14:creationId xmlns:p14="http://schemas.microsoft.com/office/powerpoint/2010/main" val="2416200508"/>
+        <p14:creationId xmlns:p14="http://schemas.microsoft.com/office/powerpoint/2010/main" val="2901704192"/>
       </p:ext>
     </p:extLst>
   </p:cSld>
@@ -8370,7 +8376,7 @@
     </p:spTree>
     <p:extLst>
       <p:ext uri="{BB962C8B-B14F-4D97-AF65-F5344CB8AC3E}">
-        <p14:creationId xmlns:p14="http://schemas.microsoft.com/office/powerpoint/2010/main" val="875942036"/>
+        <p14:creationId xmlns:p14="http://schemas.microsoft.com/office/powerpoint/2010/main" val="330246277"/>
       </p:ext>
     </p:extLst>
   </p:cSld>
@@ -8465,7 +8471,7 @@
     </p:spTree>
     <p:extLst>
       <p:ext uri="{BB962C8B-B14F-4D97-AF65-F5344CB8AC3E}">
-        <p14:creationId xmlns:p14="http://schemas.microsoft.com/office/powerpoint/2010/main" val="3582931043"/>
+        <p14:creationId xmlns:p14="http://schemas.microsoft.com/office/powerpoint/2010/main" val="2356959634"/>
       </p:ext>
     </p:extLst>
   </p:cSld>
@@ -8714,7 +8720,7 @@
     </p:spTree>
     <p:extLst>
       <p:ext uri="{BB962C8B-B14F-4D97-AF65-F5344CB8AC3E}">
-        <p14:creationId xmlns:p14="http://schemas.microsoft.com/office/powerpoint/2010/main" val="706709378"/>
+        <p14:creationId xmlns:p14="http://schemas.microsoft.com/office/powerpoint/2010/main" val="1782940997"/>
       </p:ext>
     </p:extLst>
   </p:cSld>
@@ -8994,7 +9000,7 @@
     </p:spTree>
     <p:extLst>
       <p:ext uri="{BB962C8B-B14F-4D97-AF65-F5344CB8AC3E}">
-        <p14:creationId xmlns:p14="http://schemas.microsoft.com/office/powerpoint/2010/main" val="62148999"/>
+        <p14:creationId xmlns:p14="http://schemas.microsoft.com/office/powerpoint/2010/main" val="4253809757"/>
       </p:ext>
     </p:extLst>
   </p:cSld>
@@ -9088,6 +9094,20 @@
             <a:chOff x="-14288" y="0"/>
             <a:chExt cx="12053888" cy="6858001"/>
           </a:xfrm>
+          <a:gradFill flip="none" rotWithShape="1">
+            <a:gsLst>
+              <a:gs pos="0">
+                <a:schemeClr val="tx2"/>
+              </a:gs>
+              <a:gs pos="100000">
+                <a:schemeClr val="tx2">
+                  <a:lumMod val="50000"/>
+                </a:schemeClr>
+              </a:gs>
+            </a:gsLst>
+            <a:lin ang="5400000" scaled="0"/>
+            <a:tileRect/>
+          </a:gradFill>
         </p:grpSpPr>
         <p:grpSp>
           <p:nvGrpSpPr>
@@ -9102,21 +9122,7 @@
               <a:chOff x="-14288" y="0"/>
               <a:chExt cx="1220788" cy="6858001"/>
             </a:xfrm>
-            <a:gradFill flip="none" rotWithShape="1">
-              <a:gsLst>
-                <a:gs pos="0">
-                  <a:schemeClr val="tx2"/>
-                </a:gs>
-                <a:gs pos="100000">
-                  <a:schemeClr val="bg2">
-                    <a:lumMod val="60000"/>
-                    <a:lumOff val="40000"/>
-                  </a:schemeClr>
-                </a:gs>
-              </a:gsLst>
-              <a:lin ang="5400000" scaled="0"/>
-              <a:tileRect/>
-            </a:gradFill>
+            <a:grpFill/>
           </p:grpSpPr>
           <p:sp>
             <p:nvSpPr>
@@ -11105,24 +11111,7 @@
               <a:chOff x="11364912" y="0"/>
               <a:chExt cx="674688" cy="6848476"/>
             </a:xfrm>
-            <a:gradFill flip="none" rotWithShape="1">
-              <a:gsLst>
-                <a:gs pos="0">
-                  <a:schemeClr val="tx2">
-                    <a:alpha val="80000"/>
-                  </a:schemeClr>
-                </a:gs>
-                <a:gs pos="100000">
-                  <a:schemeClr val="bg2">
-                    <a:lumMod val="60000"/>
-                    <a:lumOff val="40000"/>
-                    <a:alpha val="60000"/>
-                  </a:schemeClr>
-                </a:gs>
-              </a:gsLst>
-              <a:lin ang="5400000" scaled="0"/>
-              <a:tileRect/>
-            </a:gradFill>
+            <a:grpFill/>
           </p:grpSpPr>
           <p:sp>
             <p:nvSpPr>
@@ -12116,29 +12105,29 @@
     </p:spTree>
     <p:extLst>
       <p:ext uri="{BB962C8B-B14F-4D97-AF65-F5344CB8AC3E}">
-        <p14:creationId xmlns:p14="http://schemas.microsoft.com/office/powerpoint/2010/main" val="3793843386"/>
+        <p14:creationId xmlns:p14="http://schemas.microsoft.com/office/powerpoint/2010/main" val="2522184818"/>
       </p:ext>
     </p:extLst>
   </p:cSld>
   <p:clrMap bg1="dk1" tx1="lt1" bg2="dk2" tx2="lt2" accent1="accent1" accent2="accent2" accent3="accent3" accent4="accent4" accent5="accent5" accent6="accent6" hlink="hlink" folHlink="folHlink"/>
   <p:sldLayoutIdLst>
-    <p:sldLayoutId id="2147483670" r:id="rId1"/>
-    <p:sldLayoutId id="2147483671" r:id="rId2"/>
-    <p:sldLayoutId id="2147483672" r:id="rId3"/>
-    <p:sldLayoutId id="2147483673" r:id="rId4"/>
-    <p:sldLayoutId id="2147483674" r:id="rId5"/>
-    <p:sldLayoutId id="2147483675" r:id="rId6"/>
-    <p:sldLayoutId id="2147483676" r:id="rId7"/>
-    <p:sldLayoutId id="2147483677" r:id="rId8"/>
-    <p:sldLayoutId id="2147483678" r:id="rId9"/>
-    <p:sldLayoutId id="2147483679" r:id="rId10"/>
-    <p:sldLayoutId id="2147483680" r:id="rId11"/>
-    <p:sldLayoutId id="2147483681" r:id="rId12"/>
-    <p:sldLayoutId id="2147483682" r:id="rId13"/>
-    <p:sldLayoutId id="2147483683" r:id="rId14"/>
-    <p:sldLayoutId id="2147483684" r:id="rId15"/>
-    <p:sldLayoutId id="2147483685" r:id="rId16"/>
-    <p:sldLayoutId id="2147483686" r:id="rId17"/>
+    <p:sldLayoutId id="2147483706" r:id="rId1"/>
+    <p:sldLayoutId id="2147483707" r:id="rId2"/>
+    <p:sldLayoutId id="2147483708" r:id="rId3"/>
+    <p:sldLayoutId id="2147483709" r:id="rId4"/>
+    <p:sldLayoutId id="2147483710" r:id="rId5"/>
+    <p:sldLayoutId id="2147483711" r:id="rId6"/>
+    <p:sldLayoutId id="2147483712" r:id="rId7"/>
+    <p:sldLayoutId id="2147483713" r:id="rId8"/>
+    <p:sldLayoutId id="2147483714" r:id="rId9"/>
+    <p:sldLayoutId id="2147483715" r:id="rId10"/>
+    <p:sldLayoutId id="2147483716" r:id="rId11"/>
+    <p:sldLayoutId id="2147483717" r:id="rId12"/>
+    <p:sldLayoutId id="2147483718" r:id="rId13"/>
+    <p:sldLayoutId id="2147483719" r:id="rId14"/>
+    <p:sldLayoutId id="2147483720" r:id="rId15"/>
+    <p:sldLayoutId id="2147483721" r:id="rId16"/>
+    <p:sldLayoutId id="2147483722" r:id="rId17"/>
   </p:sldLayoutIdLst>
   <p:txStyles>
     <p:titleStyle>
@@ -12154,13 +12143,6 @@
           <a:solidFill>
             <a:schemeClr val="tx1"/>
           </a:solidFill>
-          <a:effectLst>
-            <a:outerShdw blurRad="177800" dist="38100" dir="2700000" algn="tl">
-              <a:srgbClr val="000000">
-                <a:alpha val="24000"/>
-              </a:srgbClr>
-            </a:outerShdw>
-          </a:effectLst>
           <a:latin typeface="+mj-lt"/>
           <a:ea typeface="+mj-ea"/>
           <a:cs typeface="+mj-cs"/>
@@ -12182,13 +12164,6 @@
           <a:solidFill>
             <a:schemeClr val="tx1"/>
           </a:solidFill>
-          <a:effectLst>
-            <a:outerShdw blurRad="152400" dist="38100" dir="2700000" algn="tl">
-              <a:srgbClr val="000000">
-                <a:alpha val="36000"/>
-              </a:srgbClr>
-            </a:outerShdw>
-          </a:effectLst>
           <a:latin typeface="+mn-lt"/>
           <a:ea typeface="+mn-ea"/>
           <a:cs typeface="+mn-cs"/>
@@ -12208,13 +12183,6 @@
           <a:solidFill>
             <a:schemeClr val="tx1"/>
           </a:solidFill>
-          <a:effectLst>
-            <a:outerShdw blurRad="152400" dist="38100" dir="2700000" algn="tl">
-              <a:srgbClr val="000000">
-                <a:alpha val="36000"/>
-              </a:srgbClr>
-            </a:outerShdw>
-          </a:effectLst>
           <a:latin typeface="+mn-lt"/>
           <a:ea typeface="+mn-ea"/>
           <a:cs typeface="+mn-cs"/>
@@ -12234,13 +12202,6 @@
           <a:solidFill>
             <a:schemeClr val="tx1"/>
           </a:solidFill>
-          <a:effectLst>
-            <a:outerShdw blurRad="152400" dist="38100" dir="2700000" algn="tl">
-              <a:srgbClr val="000000">
-                <a:alpha val="36000"/>
-              </a:srgbClr>
-            </a:outerShdw>
-          </a:effectLst>
           <a:latin typeface="+mn-lt"/>
           <a:ea typeface="+mn-ea"/>
           <a:cs typeface="+mn-cs"/>
@@ -12260,13 +12221,6 @@
           <a:solidFill>
             <a:schemeClr val="tx1"/>
           </a:solidFill>
-          <a:effectLst>
-            <a:outerShdw blurRad="152400" dist="38100" dir="2700000" algn="tl">
-              <a:srgbClr val="000000">
-                <a:alpha val="36000"/>
-              </a:srgbClr>
-            </a:outerShdw>
-          </a:effectLst>
           <a:latin typeface="+mn-lt"/>
           <a:ea typeface="+mn-ea"/>
           <a:cs typeface="+mn-cs"/>
@@ -12286,13 +12240,6 @@
           <a:solidFill>
             <a:schemeClr val="tx1"/>
           </a:solidFill>
-          <a:effectLst>
-            <a:outerShdw blurRad="152400" dist="38100" dir="2700000" algn="tl">
-              <a:srgbClr val="000000">
-                <a:alpha val="36000"/>
-              </a:srgbClr>
-            </a:outerShdw>
-          </a:effectLst>
           <a:latin typeface="+mn-lt"/>
           <a:ea typeface="+mn-ea"/>
           <a:cs typeface="+mn-cs"/>
@@ -12648,8 +12595,12 @@
           <a:lstStyle/>
           <a:p>
             <a:r>
+              <a:rPr lang="en-US" i="1" dirty="0" smtClean="0"/>
+              <a:t>IN PARTIAL FULFILMENT OF THE REQUIREMENTS FOR PASSING CS425 – SOFTWARE ENGINEERING, MAHARISHI UNIVERSITY OF MANAGEMENT</a:t>
+            </a:r>
+            <a:r>
               <a:rPr lang="en-US" dirty="0" smtClean="0"/>
-              <a:t>IN PARTIAL FULFILMENT OF THE REQUIREMENTS FOR PASSING CS425 – SOFTWARE ENGINEERING, MAHARISHI UNIVERSITY OF MANAGEMENT.</a:t>
+              <a:t>.</a:t>
             </a:r>
           </a:p>
           <a:p>
@@ -12742,11 +12693,74 @@
             <p:ph idx="1"/>
           </p:nvPr>
         </p:nvSpPr>
-        <p:spPr/>
+        <p:spPr>
+          <a:xfrm>
+            <a:off x="1141413" y="1936666"/>
+            <a:ext cx="9905999" cy="3541714"/>
+          </a:xfrm>
+        </p:spPr>
         <p:txBody>
-          <a:bodyPr/>
+          <a:bodyPr>
+            <a:normAutofit lnSpcReduction="10000"/>
+          </a:bodyPr>
           <a:lstStyle/>
           <a:p>
+            <a:r>
+              <a:rPr lang="en-US" dirty="0" smtClean="0">
+                <a:effectLst/>
+              </a:rPr>
+              <a:t>A business management/appointment scheduling system</a:t>
+            </a:r>
+          </a:p>
+          <a:p>
+            <a:r>
+              <a:rPr lang="en-US" dirty="0">
+                <a:effectLst/>
+              </a:rPr>
+              <a:t>Helps </a:t>
+            </a:r>
+            <a:r>
+              <a:rPr lang="en-US" dirty="0" smtClean="0">
+                <a:effectLst/>
+              </a:rPr>
+              <a:t>customers of a salon </a:t>
+            </a:r>
+            <a:r>
+              <a:rPr lang="en-US" dirty="0">
+                <a:effectLst/>
+              </a:rPr>
+              <a:t>make reservations, keeps track of their priorities and enables them to make reviews on the service they received</a:t>
+            </a:r>
+            <a:r>
+              <a:rPr lang="en-US" dirty="0" smtClean="0">
+                <a:effectLst/>
+              </a:rPr>
+              <a:t>.</a:t>
+            </a:r>
+          </a:p>
+          <a:p>
+            <a:r>
+              <a:rPr lang="en-US" dirty="0" smtClean="0">
+                <a:effectLst/>
+              </a:rPr>
+              <a:t>Helps the administrator register new hairstylists and assign seat numbers to them.</a:t>
+            </a:r>
+          </a:p>
+          <a:p>
+            <a:r>
+              <a:rPr lang="en-US" dirty="0" smtClean="0">
+                <a:effectLst/>
+              </a:rPr>
+              <a:t>Assigns hairstylists to customers who have made reservations.</a:t>
+            </a:r>
+          </a:p>
+          <a:p>
+            <a:r>
+              <a:rPr lang="en-US" dirty="0" smtClean="0">
+                <a:effectLst/>
+              </a:rPr>
+              <a:t>Helps the administrator view summarized business performance information.</a:t>
+            </a:r>
             <a:endParaRPr lang="en-US" dirty="0"/>
           </a:p>
         </p:txBody>
@@ -12798,34 +12812,54 @@
             <p:ph type="title"/>
           </p:nvPr>
         </p:nvSpPr>
-        <p:spPr/>
+        <p:spPr>
+          <a:xfrm>
+            <a:off x="3164531" y="0"/>
+            <a:ext cx="5522269" cy="770021"/>
+          </a:xfrm>
+        </p:spPr>
         <p:txBody>
           <a:bodyPr/>
           <a:lstStyle/>
           <a:p>
-            <a:endParaRPr lang="en-US"/>
+            <a:pPr algn="ctr"/>
+            <a:r>
+              <a:rPr lang="en-US" dirty="0" smtClean="0"/>
+              <a:t>What are the use cases?</a:t>
+            </a:r>
+            <a:endParaRPr lang="en-US" dirty="0"/>
           </a:p>
         </p:txBody>
       </p:sp>
-      <p:sp>
-        <p:nvSpPr>
-          <p:cNvPr id="3" name="Content Placeholder 2"/>
-          <p:cNvSpPr>
-            <a:spLocks noGrp="1"/>
-          </p:cNvSpPr>
+      <p:pic>
+        <p:nvPicPr>
+          <p:cNvPr id="4" name="Content Placeholder 3"/>
+          <p:cNvPicPr>
+            <a:picLocks noGrp="1" noChangeAspect="1"/>
+          </p:cNvPicPr>
           <p:nvPr>
             <p:ph idx="1"/>
           </p:nvPr>
-        </p:nvSpPr>
-        <p:spPr/>
-        <p:txBody>
-          <a:bodyPr/>
-          <a:lstStyle/>
-          <a:p>
-            <a:endParaRPr lang="en-US"/>
-          </a:p>
-        </p:txBody>
-      </p:sp>
+        </p:nvPicPr>
+        <p:blipFill>
+          <a:blip r:embed="rId2">
+            <a:extLst>
+              <a:ext uri="{28A0092B-C50C-407E-A947-70E740481C1C}">
+                <a14:useLocalDpi xmlns:a14="http://schemas.microsoft.com/office/drawing/2010/main" val="0"/>
+              </a:ext>
+            </a:extLst>
+          </a:blip>
+          <a:stretch>
+            <a:fillRect/>
+          </a:stretch>
+        </p:blipFill>
+        <p:spPr>
+          <a:xfrm>
+            <a:off x="1714613" y="770021"/>
+            <a:ext cx="8807115" cy="5643700"/>
+          </a:xfrm>
+        </p:spPr>
+      </p:pic>
     </p:spTree>
     <p:extLst>
       <p:ext uri="{BB962C8B-B14F-4D97-AF65-F5344CB8AC3E}">
@@ -12846,6 +12880,265 @@
 </p:sld>
 </file>
 
+<file path=ppt/slides/slide4.xml><?xml version="1.0" encoding="utf-8"?>
+<p:sld xmlns:a="http://schemas.openxmlformats.org/drawingml/2006/main" xmlns:r="http://schemas.openxmlformats.org/officeDocument/2006/relationships" xmlns:p="http://schemas.openxmlformats.org/presentationml/2006/main">
+  <p:cSld>
+    <p:spTree>
+      <p:nvGrpSpPr>
+        <p:cNvPr id="1" name=""/>
+        <p:cNvGrpSpPr/>
+        <p:nvPr/>
+      </p:nvGrpSpPr>
+      <p:grpSpPr>
+        <a:xfrm>
+          <a:off x="0" y="0"/>
+          <a:ext cx="0" cy="0"/>
+          <a:chOff x="0" y="0"/>
+          <a:chExt cx="0" cy="0"/>
+        </a:xfrm>
+      </p:grpSpPr>
+      <p:sp>
+        <p:nvSpPr>
+          <p:cNvPr id="2" name="Title 1"/>
+          <p:cNvSpPr>
+            <a:spLocks noGrp="1"/>
+          </p:cNvSpPr>
+          <p:nvPr>
+            <p:ph type="title"/>
+          </p:nvPr>
+        </p:nvSpPr>
+        <p:spPr>
+          <a:xfrm>
+            <a:off x="3711365" y="0"/>
+            <a:ext cx="4766092" cy="673768"/>
+          </a:xfrm>
+        </p:spPr>
+        <p:txBody>
+          <a:bodyPr/>
+          <a:lstStyle/>
+          <a:p>
+            <a:r>
+              <a:rPr lang="en-US" dirty="0" smtClean="0"/>
+              <a:t>How will it be built?</a:t>
+            </a:r>
+            <a:endParaRPr lang="en-US" dirty="0"/>
+          </a:p>
+        </p:txBody>
+      </p:sp>
+      <p:sp>
+        <p:nvSpPr>
+          <p:cNvPr id="3" name="Content Placeholder 2"/>
+          <p:cNvSpPr>
+            <a:spLocks noGrp="1"/>
+          </p:cNvSpPr>
+          <p:nvPr>
+            <p:ph idx="1"/>
+          </p:nvPr>
+        </p:nvSpPr>
+        <p:spPr>
+          <a:xfrm>
+            <a:off x="1297823" y="673768"/>
+            <a:ext cx="9905999" cy="5474787"/>
+          </a:xfrm>
+        </p:spPr>
+        <p:txBody>
+          <a:bodyPr>
+            <a:normAutofit/>
+          </a:bodyPr>
+          <a:lstStyle/>
+          <a:p>
+            <a:r>
+              <a:rPr lang="en-US" dirty="0" smtClean="0"/>
+              <a:t>Web Application</a:t>
+            </a:r>
+          </a:p>
+          <a:p>
+            <a:pPr lvl="1">
+              <a:buFont typeface="Wingdings" panose="05000000000000000000" pitchFamily="2" charset="2"/>
+              <a:buChar char="ü"/>
+            </a:pPr>
+            <a:r>
+              <a:rPr lang="en-US" dirty="0" smtClean="0"/>
+              <a:t>Accessible via web browsers</a:t>
+            </a:r>
+          </a:p>
+          <a:p>
+            <a:r>
+              <a:rPr lang="en-US" dirty="0" smtClean="0"/>
+              <a:t>Enterprise Architecture</a:t>
+            </a:r>
+          </a:p>
+          <a:p>
+            <a:pPr lvl="1">
+              <a:buFont typeface="Wingdings" panose="05000000000000000000" pitchFamily="2" charset="2"/>
+              <a:buChar char="ü"/>
+            </a:pPr>
+            <a:r>
+              <a:rPr lang="en-US" dirty="0" smtClean="0"/>
+              <a:t>Will support multiple users at the same time</a:t>
+            </a:r>
+          </a:p>
+          <a:p>
+            <a:r>
+              <a:rPr lang="en-US" dirty="0" smtClean="0"/>
+              <a:t>Client-Server Architecture</a:t>
+            </a:r>
+          </a:p>
+          <a:p>
+            <a:pPr lvl="1">
+              <a:buFont typeface="Wingdings" panose="05000000000000000000" pitchFamily="2" charset="2"/>
+              <a:buChar char="ü"/>
+            </a:pPr>
+            <a:r>
+              <a:rPr lang="en-US" dirty="0" smtClean="0"/>
+              <a:t>Which holds for all web applications. The client browsers make requests and the server send responses.</a:t>
+            </a:r>
+          </a:p>
+          <a:p>
+            <a:r>
+              <a:rPr lang="en-US" dirty="0" smtClean="0"/>
+              <a:t>ORM for persistence</a:t>
+            </a:r>
+          </a:p>
+          <a:p>
+            <a:pPr lvl="1">
+              <a:buFont typeface="Wingdings" panose="05000000000000000000" pitchFamily="2" charset="2"/>
+              <a:buChar char="ü"/>
+            </a:pPr>
+            <a:r>
+              <a:rPr lang="en-US" dirty="0" smtClean="0"/>
+              <a:t>A simple </a:t>
+            </a:r>
+            <a:r>
+              <a:rPr lang="en-US" dirty="0"/>
+              <a:t>way to map Entities to our </a:t>
+            </a:r>
+            <a:r>
+              <a:rPr lang="en-US" dirty="0" smtClean="0"/>
+              <a:t>Database</a:t>
+            </a:r>
+          </a:p>
+          <a:p>
+            <a:pPr lvl="1">
+              <a:buFont typeface="Wingdings" panose="05000000000000000000" pitchFamily="2" charset="2"/>
+              <a:buChar char="ü"/>
+            </a:pPr>
+            <a:r>
+              <a:rPr lang="en-US" dirty="0" smtClean="0"/>
+              <a:t> Provides amazing strategies to </a:t>
+            </a:r>
+            <a:r>
+              <a:rPr lang="en-US" dirty="0"/>
+              <a:t>optimize our design for improved performance of our database </a:t>
+            </a:r>
+            <a:r>
+              <a:rPr lang="en-US" dirty="0" smtClean="0"/>
+              <a:t>operations.</a:t>
+            </a:r>
+            <a:endParaRPr lang="en-US" dirty="0"/>
+          </a:p>
+        </p:txBody>
+      </p:sp>
+    </p:spTree>
+    <p:extLst>
+      <p:ext uri="{BB962C8B-B14F-4D97-AF65-F5344CB8AC3E}">
+        <p14:creationId xmlns:p14="http://schemas.microsoft.com/office/powerpoint/2010/main" val="996939833"/>
+      </p:ext>
+    </p:extLst>
+  </p:cSld>
+  <p:clrMapOvr>
+    <a:masterClrMapping/>
+  </p:clrMapOvr>
+</p:sld>
+</file>
+
+<file path=ppt/slides/slide5.xml><?xml version="1.0" encoding="utf-8"?>
+<p:sld xmlns:a="http://schemas.openxmlformats.org/drawingml/2006/main" xmlns:r="http://schemas.openxmlformats.org/officeDocument/2006/relationships" xmlns:p="http://schemas.openxmlformats.org/presentationml/2006/main">
+  <p:cSld>
+    <p:spTree>
+      <p:nvGrpSpPr>
+        <p:cNvPr id="1" name=""/>
+        <p:cNvGrpSpPr/>
+        <p:nvPr/>
+      </p:nvGrpSpPr>
+      <p:grpSpPr>
+        <a:xfrm>
+          <a:off x="0" y="0"/>
+          <a:ext cx="0" cy="0"/>
+          <a:chOff x="0" y="0"/>
+          <a:chExt cx="0" cy="0"/>
+        </a:xfrm>
+      </p:grpSpPr>
+      <p:sp>
+        <p:nvSpPr>
+          <p:cNvPr id="2" name="Title 1"/>
+          <p:cNvSpPr>
+            <a:spLocks noGrp="1"/>
+          </p:cNvSpPr>
+          <p:nvPr>
+            <p:ph type="title"/>
+          </p:nvPr>
+        </p:nvSpPr>
+        <p:spPr>
+          <a:xfrm>
+            <a:off x="3886409" y="0"/>
+            <a:ext cx="4633745" cy="632766"/>
+          </a:xfrm>
+        </p:spPr>
+        <p:txBody>
+          <a:bodyPr/>
+          <a:lstStyle/>
+          <a:p>
+            <a:r>
+              <a:rPr lang="en-US" dirty="0" smtClean="0"/>
+              <a:t>System architecture</a:t>
+            </a:r>
+            <a:endParaRPr lang="en-US" dirty="0"/>
+          </a:p>
+        </p:txBody>
+      </p:sp>
+      <p:pic>
+        <p:nvPicPr>
+          <p:cNvPr id="4" name="Content Placeholder 3"/>
+          <p:cNvPicPr>
+            <a:picLocks noGrp="1" noChangeAspect="1"/>
+          </p:cNvPicPr>
+          <p:nvPr>
+            <p:ph idx="1"/>
+          </p:nvPr>
+        </p:nvPicPr>
+        <p:blipFill>
+          <a:blip r:embed="rId2">
+            <a:extLst>
+              <a:ext uri="{28A0092B-C50C-407E-A947-70E740481C1C}">
+                <a14:useLocalDpi xmlns:a14="http://schemas.microsoft.com/office/drawing/2010/main" val="0"/>
+              </a:ext>
+            </a:extLst>
+          </a:blip>
+          <a:stretch>
+            <a:fillRect/>
+          </a:stretch>
+        </p:blipFill>
+        <p:spPr>
+          <a:xfrm>
+            <a:off x="3717966" y="632766"/>
+            <a:ext cx="4633745" cy="5920220"/>
+          </a:xfrm>
+        </p:spPr>
+      </p:pic>
+    </p:spTree>
+    <p:extLst>
+      <p:ext uri="{BB962C8B-B14F-4D97-AF65-F5344CB8AC3E}">
+        <p14:creationId xmlns:p14="http://schemas.microsoft.com/office/powerpoint/2010/main" val="1443751151"/>
+      </p:ext>
+    </p:extLst>
+  </p:cSld>
+  <p:clrMapOvr>
+    <a:masterClrMapping/>
+  </p:clrMapOvr>
+</p:sld>
+</file>
+
 <file path=ppt/theme/theme1.xml><?xml version="1.0" encoding="utf-8"?>
 <a:theme xmlns:a="http://schemas.openxmlformats.org/drawingml/2006/main" name="Circuit">
   <a:themeElements>
@@ -12857,34 +13150,34 @@
         <a:sysClr val="window" lastClr="FFFFFF"/>
       </a:lt1>
       <a:dk2>
-        <a:srgbClr val="2B5F27"/>
+        <a:srgbClr val="252C36"/>
       </a:dk2>
       <a:lt2>
-        <a:srgbClr val="D8FC68"/>
+        <a:srgbClr val="7C96A3"/>
       </a:lt2>
       <a:accent1>
-        <a:srgbClr val="DDC855"/>
+        <a:srgbClr val="4FD093"/>
       </a:accent1>
       <a:accent2>
-        <a:srgbClr val="FCA03D"/>
+        <a:srgbClr val="54BCDF"/>
       </a:accent2>
       <a:accent3>
-        <a:srgbClr val="E36439"/>
+        <a:srgbClr val="A262D0"/>
       </a:accent3>
       <a:accent4>
-        <a:srgbClr val="C2935B"/>
+        <a:srgbClr val="D7537B"/>
       </a:accent4>
       <a:accent5>
-        <a:srgbClr val="88C25C"/>
+        <a:srgbClr val="E78045"/>
       </a:accent5>
       <a:accent6>
-        <a:srgbClr val="BFCC86"/>
+        <a:srgbClr val="84C350"/>
       </a:accent6>
       <a:hlink>
-        <a:srgbClr val="FFCE23"/>
+        <a:srgbClr val="22FFFF"/>
       </a:hlink>
       <a:folHlink>
-        <a:srgbClr val="FDEB86"/>
+        <a:srgbClr val="9BF3FD"/>
       </a:folHlink>
     </a:clrScheme>
     <a:fontScheme name="Circuit">
@@ -13049,9 +13342,9 @@
             <a:gs pos="0">
               <a:schemeClr val="phClr">
                 <a:tint val="98000"/>
-                <a:hueMod val="88000"/>
+                <a:hueMod val="94000"/>
                 <a:satMod val="148000"/>
-                <a:lumMod val="150000"/>
+                <a:lumMod val="140000"/>
               </a:schemeClr>
             </a:gs>
             <a:gs pos="100000">
@@ -13059,7 +13352,7 @@
                 <a:shade val="92000"/>
                 <a:hueMod val="104000"/>
                 <a:satMod val="140000"/>
-                <a:lumMod val="68000"/>
+                <a:lumMod val="48000"/>
               </a:schemeClr>
             </a:gs>
           </a:gsLst>
@@ -13069,16 +13362,16 @@
           <a:blip xmlns:r="http://schemas.openxmlformats.org/officeDocument/2006/relationships" r:embed="rId1">
             <a:duotone>
               <a:schemeClr val="phClr">
-                <a:shade val="88000"/>
+                <a:shade val="48000"/>
                 <a:hueMod val="106000"/>
                 <a:satMod val="140000"/>
-                <a:lumMod val="54000"/>
+                <a:lumMod val="42000"/>
               </a:schemeClr>
               <a:schemeClr val="phClr">
                 <a:tint val="98000"/>
-                <a:hueMod val="82000"/>
-                <a:satMod val="150000"/>
-                <a:lumMod val="160000"/>
+                <a:hueMod val="92000"/>
+                <a:satMod val="220000"/>
+                <a:lumMod val="90000"/>
               </a:schemeClr>
             </a:duotone>
           </a:blip>
@@ -13091,7 +13384,7 @@
   <a:extraClrSchemeLst/>
   <a:extLst>
     <a:ext uri="{05A4C25C-085E-4340-85A3-A5531E510DB2}">
-      <thm15:themeFamily xmlns:thm15="http://schemas.microsoft.com/office/thememl/2012/main" name="Circuit" id="{0AC2F7E7-15F5-431C-B2A2-456FE929F56C}" vid="{97ECCC31-8429-4523-BE8D-8F09B7A4D46D}"/>
+      <thm15:themeFamily xmlns:thm15="http://schemas.microsoft.com/office/thememl/2012/main" name="Circuit" id="{0AC2F7E7-15F5-431C-B2A2-456FE929F56C}" vid="{142578CA-DEC9-49C3-80AF-C113973CC9A9}"/>
     </a:ext>
   </a:extLst>
 </a:theme>

</xml_diff>

<commit_message>
Updated Powerpoint slide to slide 7
</commit_message>
<xml_diff>
--- a/Technical Documentation/projectpresentation.pptx
+++ b/Technical Documentation/projectpresentation.pptx
@@ -9,7 +9,8 @@
     <p:sldId id="257" r:id="rId3"/>
     <p:sldId id="258" r:id="rId4"/>
     <p:sldId id="259" r:id="rId5"/>
-    <p:sldId id="260" r:id="rId6"/>
+    <p:sldId id="263" r:id="rId6"/>
+    <p:sldId id="261" r:id="rId7"/>
   </p:sldIdLst>
   <p:sldSz cx="12192000" cy="6858000"/>
   <p:notesSz cx="6858000" cy="9144000"/>
@@ -173,7 +174,7 @@
           <a:noFill/>
           <a:extLst>
             <a:ext uri="{909E8E84-426E-40dd-AFC4-6F175D3DCCD1}">
-              <a14:hiddenFill xmlns:a14="http://schemas.microsoft.com/office/drawing/2010/main" xmlns="">
+              <a14:hiddenFill xmlns="" xmlns:a14="http://schemas.microsoft.com/office/drawing/2010/main">
                 <a:solidFill>
                   <a:srgbClr val="FFFFFF"/>
                 </a:solidFill>
@@ -232,7 +233,7 @@
             </a:ln>
             <a:extLst>
               <a:ext uri="{91240B29-F687-4f45-9708-019B960494DF}">
-                <a14:hiddenLine xmlns:a14="http://schemas.microsoft.com/office/drawing/2010/main" xmlns="" w="9525">
+                <a14:hiddenLine xmlns="" xmlns:a14="http://schemas.microsoft.com/office/drawing/2010/main" w="9525">
                   <a:solidFill>
                     <a:srgbClr val="000000"/>
                   </a:solidFill>
@@ -322,7 +323,7 @@
             </a:ln>
             <a:extLst>
               <a:ext uri="{91240B29-F687-4f45-9708-019B960494DF}">
-                <a14:hiddenLine xmlns:a14="http://schemas.microsoft.com/office/drawing/2010/main" xmlns="" w="9525">
+                <a14:hiddenLine xmlns="" xmlns:a14="http://schemas.microsoft.com/office/drawing/2010/main" w="9525">
                   <a:solidFill>
                     <a:srgbClr val="000000"/>
                   </a:solidFill>
@@ -412,7 +413,7 @@
             </a:ln>
             <a:extLst>
               <a:ext uri="{91240B29-F687-4f45-9708-019B960494DF}">
-                <a14:hiddenLine xmlns:a14="http://schemas.microsoft.com/office/drawing/2010/main" xmlns="" w="9525">
+                <a14:hiddenLine xmlns="" xmlns:a14="http://schemas.microsoft.com/office/drawing/2010/main" w="9525">
                   <a:solidFill>
                     <a:srgbClr val="000000"/>
                   </a:solidFill>
@@ -446,7 +447,7 @@
             </a:ln>
             <a:extLst>
               <a:ext uri="{91240B29-F687-4f45-9708-019B960494DF}">
-                <a14:hiddenLine xmlns:a14="http://schemas.microsoft.com/office/drawing/2010/main" xmlns="" w="9525">
+                <a14:hiddenLine xmlns="" xmlns:a14="http://schemas.microsoft.com/office/drawing/2010/main" w="9525">
                   <a:solidFill>
                     <a:srgbClr val="000000"/>
                   </a:solidFill>
@@ -536,7 +537,7 @@
             </a:ln>
             <a:extLst>
               <a:ext uri="{91240B29-F687-4f45-9708-019B960494DF}">
-                <a14:hiddenLine xmlns:a14="http://schemas.microsoft.com/office/drawing/2010/main" xmlns="" w="9525">
+                <a14:hiddenLine xmlns="" xmlns:a14="http://schemas.microsoft.com/office/drawing/2010/main" w="9525">
                   <a:solidFill>
                     <a:srgbClr val="000000"/>
                   </a:solidFill>
@@ -598,7 +599,7 @@
             </a:ln>
             <a:extLst>
               <a:ext uri="{91240B29-F687-4f45-9708-019B960494DF}">
-                <a14:hiddenLine xmlns:a14="http://schemas.microsoft.com/office/drawing/2010/main" xmlns="" w="9525">
+                <a14:hiddenLine xmlns="" xmlns:a14="http://schemas.microsoft.com/office/drawing/2010/main" w="9525">
                   <a:solidFill>
                     <a:srgbClr val="000000"/>
                   </a:solidFill>
@@ -660,7 +661,7 @@
             </a:ln>
             <a:extLst>
               <a:ext uri="{91240B29-F687-4f45-9708-019B960494DF}">
-                <a14:hiddenLine xmlns:a14="http://schemas.microsoft.com/office/drawing/2010/main" xmlns="" w="9525">
+                <a14:hiddenLine xmlns="" xmlns:a14="http://schemas.microsoft.com/office/drawing/2010/main" w="9525">
                   <a:solidFill>
                     <a:srgbClr val="000000"/>
                   </a:solidFill>
@@ -750,7 +751,7 @@
             </a:ln>
             <a:extLst>
               <a:ext uri="{91240B29-F687-4f45-9708-019B960494DF}">
-                <a14:hiddenLine xmlns:a14="http://schemas.microsoft.com/office/drawing/2010/main" xmlns="" w="9525">
+                <a14:hiddenLine xmlns="" xmlns:a14="http://schemas.microsoft.com/office/drawing/2010/main" w="9525">
                   <a:solidFill>
                     <a:srgbClr val="000000"/>
                   </a:solidFill>
@@ -812,7 +813,7 @@
             </a:ln>
             <a:extLst>
               <a:ext uri="{91240B29-F687-4f45-9708-019B960494DF}">
-                <a14:hiddenLine xmlns:a14="http://schemas.microsoft.com/office/drawing/2010/main" xmlns="" w="9525">
+                <a14:hiddenLine xmlns="" xmlns:a14="http://schemas.microsoft.com/office/drawing/2010/main" w="9525">
                   <a:solidFill>
                     <a:srgbClr val="000000"/>
                   </a:solidFill>
@@ -874,7 +875,7 @@
             </a:ln>
             <a:extLst>
               <a:ext uri="{91240B29-F687-4f45-9708-019B960494DF}">
-                <a14:hiddenLine xmlns:a14="http://schemas.microsoft.com/office/drawing/2010/main" xmlns="" w="9525">
+                <a14:hiddenLine xmlns="" xmlns:a14="http://schemas.microsoft.com/office/drawing/2010/main" w="9525">
                   <a:solidFill>
                     <a:srgbClr val="000000"/>
                   </a:solidFill>
@@ -964,7 +965,7 @@
             </a:ln>
             <a:extLst>
               <a:ext uri="{91240B29-F687-4f45-9708-019B960494DF}">
-                <a14:hiddenLine xmlns:a14="http://schemas.microsoft.com/office/drawing/2010/main" xmlns="" w="9525">
+                <a14:hiddenLine xmlns="" xmlns:a14="http://schemas.microsoft.com/office/drawing/2010/main" w="9525">
                   <a:solidFill>
                     <a:srgbClr val="000000"/>
                   </a:solidFill>
@@ -1054,7 +1055,7 @@
             </a:ln>
             <a:extLst>
               <a:ext uri="{91240B29-F687-4f45-9708-019B960494DF}">
-                <a14:hiddenLine xmlns:a14="http://schemas.microsoft.com/office/drawing/2010/main" xmlns="" w="9525">
+                <a14:hiddenLine xmlns="" xmlns:a14="http://schemas.microsoft.com/office/drawing/2010/main" w="9525">
                   <a:solidFill>
                     <a:srgbClr val="000000"/>
                   </a:solidFill>
@@ -1116,7 +1117,7 @@
             </a:ln>
             <a:extLst>
               <a:ext uri="{91240B29-F687-4f45-9708-019B960494DF}">
-                <a14:hiddenLine xmlns:a14="http://schemas.microsoft.com/office/drawing/2010/main" xmlns="" w="9525">
+                <a14:hiddenLine xmlns="" xmlns:a14="http://schemas.microsoft.com/office/drawing/2010/main" w="9525">
                   <a:solidFill>
                     <a:srgbClr val="000000"/>
                   </a:solidFill>
@@ -1226,7 +1227,7 @@
             </a:ln>
             <a:extLst>
               <a:ext uri="{91240B29-F687-4f45-9708-019B960494DF}">
-                <a14:hiddenLine xmlns:a14="http://schemas.microsoft.com/office/drawing/2010/main" xmlns="" w="9525">
+                <a14:hiddenLine xmlns="" xmlns:a14="http://schemas.microsoft.com/office/drawing/2010/main" w="9525">
                   <a:solidFill>
                     <a:srgbClr val="000000"/>
                   </a:solidFill>
@@ -1288,7 +1289,7 @@
             </a:ln>
             <a:extLst>
               <a:ext uri="{91240B29-F687-4f45-9708-019B960494DF}">
-                <a14:hiddenLine xmlns:a14="http://schemas.microsoft.com/office/drawing/2010/main" xmlns="" w="9525">
+                <a14:hiddenLine xmlns="" xmlns:a14="http://schemas.microsoft.com/office/drawing/2010/main" w="9525">
                   <a:solidFill>
                     <a:srgbClr val="000000"/>
                   </a:solidFill>
@@ -1378,7 +1379,7 @@
             </a:ln>
             <a:extLst>
               <a:ext uri="{91240B29-F687-4f45-9708-019B960494DF}">
-                <a14:hiddenLine xmlns:a14="http://schemas.microsoft.com/office/drawing/2010/main" xmlns="" w="9525">
+                <a14:hiddenLine xmlns="" xmlns:a14="http://schemas.microsoft.com/office/drawing/2010/main" w="9525">
                   <a:solidFill>
                     <a:srgbClr val="000000"/>
                   </a:solidFill>
@@ -1468,7 +1469,7 @@
             </a:ln>
             <a:extLst>
               <a:ext uri="{91240B29-F687-4f45-9708-019B960494DF}">
-                <a14:hiddenLine xmlns:a14="http://schemas.microsoft.com/office/drawing/2010/main" xmlns="" w="9525">
+                <a14:hiddenLine xmlns="" xmlns:a14="http://schemas.microsoft.com/office/drawing/2010/main" w="9525">
                   <a:solidFill>
                     <a:srgbClr val="000000"/>
                   </a:solidFill>
@@ -1530,7 +1531,7 @@
             </a:ln>
             <a:extLst>
               <a:ext uri="{91240B29-F687-4f45-9708-019B960494DF}">
-                <a14:hiddenLine xmlns:a14="http://schemas.microsoft.com/office/drawing/2010/main" xmlns="" w="9525">
+                <a14:hiddenLine xmlns="" xmlns:a14="http://schemas.microsoft.com/office/drawing/2010/main" w="9525">
                   <a:solidFill>
                     <a:srgbClr val="000000"/>
                   </a:solidFill>
@@ -1620,7 +1621,7 @@
             </a:ln>
             <a:extLst>
               <a:ext uri="{91240B29-F687-4f45-9708-019B960494DF}">
-                <a14:hiddenLine xmlns:a14="http://schemas.microsoft.com/office/drawing/2010/main" xmlns="" w="9525">
+                <a14:hiddenLine xmlns="" xmlns:a14="http://schemas.microsoft.com/office/drawing/2010/main" w="9525">
                   <a:solidFill>
                     <a:srgbClr val="000000"/>
                   </a:solidFill>
@@ -1710,7 +1711,7 @@
             </a:ln>
             <a:extLst>
               <a:ext uri="{91240B29-F687-4f45-9708-019B960494DF}">
-                <a14:hiddenLine xmlns:a14="http://schemas.microsoft.com/office/drawing/2010/main" xmlns="" w="9525">
+                <a14:hiddenLine xmlns="" xmlns:a14="http://schemas.microsoft.com/office/drawing/2010/main" w="9525">
                   <a:solidFill>
                     <a:srgbClr val="000000"/>
                   </a:solidFill>
@@ -1766,7 +1767,7 @@
             </a:ln>
             <a:extLst>
               <a:ext uri="{91240B29-F687-4f45-9708-019B960494DF}">
-                <a14:hiddenLine xmlns:a14="http://schemas.microsoft.com/office/drawing/2010/main" xmlns="" w="9525">
+                <a14:hiddenLine xmlns="" xmlns:a14="http://schemas.microsoft.com/office/drawing/2010/main" w="9525">
                   <a:solidFill>
                     <a:srgbClr val="000000"/>
                   </a:solidFill>
@@ -1856,7 +1857,7 @@
             </a:ln>
             <a:extLst>
               <a:ext uri="{91240B29-F687-4f45-9708-019B960494DF}">
-                <a14:hiddenLine xmlns:a14="http://schemas.microsoft.com/office/drawing/2010/main" xmlns="" w="9525">
+                <a14:hiddenLine xmlns="" xmlns:a14="http://schemas.microsoft.com/office/drawing/2010/main" w="9525">
                   <a:solidFill>
                     <a:srgbClr val="000000"/>
                   </a:solidFill>
@@ -1912,7 +1913,7 @@
             </a:ln>
             <a:extLst>
               <a:ext uri="{91240B29-F687-4f45-9708-019B960494DF}">
-                <a14:hiddenLine xmlns:a14="http://schemas.microsoft.com/office/drawing/2010/main" xmlns="" w="9525">
+                <a14:hiddenLine xmlns="" xmlns:a14="http://schemas.microsoft.com/office/drawing/2010/main" w="9525">
                   <a:solidFill>
                     <a:srgbClr val="000000"/>
                   </a:solidFill>
@@ -2002,7 +2003,7 @@
             </a:ln>
             <a:extLst>
               <a:ext uri="{91240B29-F687-4f45-9708-019B960494DF}">
-                <a14:hiddenLine xmlns:a14="http://schemas.microsoft.com/office/drawing/2010/main" xmlns="" w="9525">
+                <a14:hiddenLine xmlns="" xmlns:a14="http://schemas.microsoft.com/office/drawing/2010/main" w="9525">
                   <a:solidFill>
                     <a:srgbClr val="000000"/>
                   </a:solidFill>
@@ -2070,7 +2071,7 @@
             </a:ln>
             <a:extLst>
               <a:ext uri="{91240B29-F687-4f45-9708-019B960494DF}">
-                <a14:hiddenLine xmlns:a14="http://schemas.microsoft.com/office/drawing/2010/main" xmlns="" w="9525">
+                <a14:hiddenLine xmlns="" xmlns:a14="http://schemas.microsoft.com/office/drawing/2010/main" w="9525">
                   <a:solidFill>
                     <a:srgbClr val="000000"/>
                   </a:solidFill>
@@ -2160,7 +2161,7 @@
             </a:ln>
             <a:extLst>
               <a:ext uri="{91240B29-F687-4f45-9708-019B960494DF}">
-                <a14:hiddenLine xmlns:a14="http://schemas.microsoft.com/office/drawing/2010/main" xmlns="" w="9525">
+                <a14:hiddenLine xmlns="" xmlns:a14="http://schemas.microsoft.com/office/drawing/2010/main" w="9525">
                   <a:solidFill>
                     <a:srgbClr val="000000"/>
                   </a:solidFill>
@@ -2228,7 +2229,7 @@
             </a:ln>
             <a:extLst>
               <a:ext uri="{91240B29-F687-4f45-9708-019B960494DF}">
-                <a14:hiddenLine xmlns:a14="http://schemas.microsoft.com/office/drawing/2010/main" xmlns="" w="9525">
+                <a14:hiddenLine xmlns="" xmlns:a14="http://schemas.microsoft.com/office/drawing/2010/main" w="9525">
                   <a:solidFill>
                     <a:srgbClr val="000000"/>
                   </a:solidFill>
@@ -2318,7 +2319,7 @@
             </a:ln>
             <a:extLst>
               <a:ext uri="{91240B29-F687-4f45-9708-019B960494DF}">
-                <a14:hiddenLine xmlns:a14="http://schemas.microsoft.com/office/drawing/2010/main" xmlns="" w="9525">
+                <a14:hiddenLine xmlns="" xmlns:a14="http://schemas.microsoft.com/office/drawing/2010/main" w="9525">
                   <a:solidFill>
                     <a:srgbClr val="000000"/>
                   </a:solidFill>
@@ -2352,7 +2353,7 @@
             </a:ln>
             <a:extLst>
               <a:ext uri="{91240B29-F687-4f45-9708-019B960494DF}">
-                <a14:hiddenLine xmlns:a14="http://schemas.microsoft.com/office/drawing/2010/main" xmlns="" w="9525">
+                <a14:hiddenLine xmlns="" xmlns:a14="http://schemas.microsoft.com/office/drawing/2010/main" w="9525">
                   <a:solidFill>
                     <a:srgbClr val="000000"/>
                   </a:solidFill>
@@ -2442,7 +2443,7 @@
             </a:ln>
             <a:extLst>
               <a:ext uri="{91240B29-F687-4f45-9708-019B960494DF}">
-                <a14:hiddenLine xmlns:a14="http://schemas.microsoft.com/office/drawing/2010/main" xmlns="" w="9525">
+                <a14:hiddenLine xmlns="" xmlns:a14="http://schemas.microsoft.com/office/drawing/2010/main" w="9525">
                   <a:solidFill>
                     <a:srgbClr val="000000"/>
                   </a:solidFill>
@@ -2504,7 +2505,7 @@
             </a:ln>
             <a:extLst>
               <a:ext uri="{91240B29-F687-4f45-9708-019B960494DF}">
-                <a14:hiddenLine xmlns:a14="http://schemas.microsoft.com/office/drawing/2010/main" xmlns="" w="9525">
+                <a14:hiddenLine xmlns="" xmlns:a14="http://schemas.microsoft.com/office/drawing/2010/main" w="9525">
                   <a:solidFill>
                     <a:srgbClr val="000000"/>
                   </a:solidFill>
@@ -2566,7 +2567,7 @@
             </a:ln>
             <a:extLst>
               <a:ext uri="{91240B29-F687-4f45-9708-019B960494DF}">
-                <a14:hiddenLine xmlns:a14="http://schemas.microsoft.com/office/drawing/2010/main" xmlns="" w="9525">
+                <a14:hiddenLine xmlns="" xmlns:a14="http://schemas.microsoft.com/office/drawing/2010/main" w="9525">
                   <a:solidFill>
                     <a:srgbClr val="000000"/>
                   </a:solidFill>
@@ -2656,7 +2657,7 @@
             </a:ln>
             <a:extLst>
               <a:ext uri="{91240B29-F687-4f45-9708-019B960494DF}">
-                <a14:hiddenLine xmlns:a14="http://schemas.microsoft.com/office/drawing/2010/main" xmlns="" w="9525">
+                <a14:hiddenLine xmlns="" xmlns:a14="http://schemas.microsoft.com/office/drawing/2010/main" w="9525">
                   <a:solidFill>
                     <a:srgbClr val="000000"/>
                   </a:solidFill>
@@ -2724,7 +2725,7 @@
             </a:ln>
             <a:extLst>
               <a:ext uri="{91240B29-F687-4f45-9708-019B960494DF}">
-                <a14:hiddenLine xmlns:a14="http://schemas.microsoft.com/office/drawing/2010/main" xmlns="" w="9525">
+                <a14:hiddenLine xmlns="" xmlns:a14="http://schemas.microsoft.com/office/drawing/2010/main" w="9525">
                   <a:solidFill>
                     <a:srgbClr val="000000"/>
                   </a:solidFill>
@@ -2786,7 +2787,7 @@
             </a:ln>
             <a:extLst>
               <a:ext uri="{91240B29-F687-4f45-9708-019B960494DF}">
-                <a14:hiddenLine xmlns:a14="http://schemas.microsoft.com/office/drawing/2010/main" xmlns="" w="9525">
+                <a14:hiddenLine xmlns="" xmlns:a14="http://schemas.microsoft.com/office/drawing/2010/main" w="9525">
                   <a:solidFill>
                     <a:srgbClr val="000000"/>
                   </a:solidFill>
@@ -2876,7 +2877,7 @@
             </a:ln>
             <a:extLst>
               <a:ext uri="{91240B29-F687-4f45-9708-019B960494DF}">
-                <a14:hiddenLine xmlns:a14="http://schemas.microsoft.com/office/drawing/2010/main" xmlns="" w="9525">
+                <a14:hiddenLine xmlns="" xmlns:a14="http://schemas.microsoft.com/office/drawing/2010/main" w="9525">
                   <a:solidFill>
                     <a:srgbClr val="000000"/>
                   </a:solidFill>
@@ -2938,7 +2939,7 @@
             </a:ln>
             <a:extLst>
               <a:ext uri="{91240B29-F687-4f45-9708-019B960494DF}">
-                <a14:hiddenLine xmlns:a14="http://schemas.microsoft.com/office/drawing/2010/main" xmlns="" w="9525">
+                <a14:hiddenLine xmlns="" xmlns:a14="http://schemas.microsoft.com/office/drawing/2010/main" w="9525">
                   <a:solidFill>
                     <a:srgbClr val="000000"/>
                   </a:solidFill>
@@ -3028,7 +3029,7 @@
             </a:ln>
             <a:extLst>
               <a:ext uri="{91240B29-F687-4f45-9708-019B960494DF}">
-                <a14:hiddenLine xmlns:a14="http://schemas.microsoft.com/office/drawing/2010/main" xmlns="" w="9525">
+                <a14:hiddenLine xmlns="" xmlns:a14="http://schemas.microsoft.com/office/drawing/2010/main" w="9525">
                   <a:solidFill>
                     <a:srgbClr val="000000"/>
                   </a:solidFill>
@@ -3090,7 +3091,7 @@
             </a:ln>
             <a:extLst>
               <a:ext uri="{91240B29-F687-4f45-9708-019B960494DF}">
-                <a14:hiddenLine xmlns:a14="http://schemas.microsoft.com/office/drawing/2010/main" xmlns="" w="9525">
+                <a14:hiddenLine xmlns="" xmlns:a14="http://schemas.microsoft.com/office/drawing/2010/main" w="9525">
                   <a:solidFill>
                     <a:srgbClr val="000000"/>
                   </a:solidFill>
@@ -3180,7 +3181,7 @@
             </a:ln>
             <a:extLst>
               <a:ext uri="{91240B29-F687-4f45-9708-019B960494DF}">
-                <a14:hiddenLine xmlns:a14="http://schemas.microsoft.com/office/drawing/2010/main" xmlns="" w="9525">
+                <a14:hiddenLine xmlns="" xmlns:a14="http://schemas.microsoft.com/office/drawing/2010/main" w="9525">
                   <a:solidFill>
                     <a:srgbClr val="000000"/>
                   </a:solidFill>
@@ -3214,7 +3215,7 @@
             </a:ln>
             <a:extLst>
               <a:ext uri="{91240B29-F687-4f45-9708-019B960494DF}">
-                <a14:hiddenLine xmlns:a14="http://schemas.microsoft.com/office/drawing/2010/main" xmlns="" w="9525">
+                <a14:hiddenLine xmlns="" xmlns:a14="http://schemas.microsoft.com/office/drawing/2010/main" w="9525">
                   <a:solidFill>
                     <a:srgbClr val="000000"/>
                   </a:solidFill>
@@ -3279,7 +3280,7 @@
             </a:ln>
             <a:extLst>
               <a:ext uri="{91240B29-F687-4f45-9708-019B960494DF}">
-                <a14:hiddenLine xmlns:a14="http://schemas.microsoft.com/office/drawing/2010/main" xmlns="" w="9525">
+                <a14:hiddenLine xmlns="" xmlns:a14="http://schemas.microsoft.com/office/drawing/2010/main" w="9525">
                   <a:solidFill>
                     <a:srgbClr val="000000"/>
                   </a:solidFill>
@@ -3369,7 +3370,7 @@
             </a:ln>
             <a:extLst>
               <a:ext uri="{91240B29-F687-4f45-9708-019B960494DF}">
-                <a14:hiddenLine xmlns:a14="http://schemas.microsoft.com/office/drawing/2010/main" xmlns="" w="9525">
+                <a14:hiddenLine xmlns="" xmlns:a14="http://schemas.microsoft.com/office/drawing/2010/main" w="9525">
                   <a:solidFill>
                     <a:srgbClr val="000000"/>
                   </a:solidFill>
@@ -3431,7 +3432,7 @@
             </a:ln>
             <a:extLst>
               <a:ext uri="{91240B29-F687-4f45-9708-019B960494DF}">
-                <a14:hiddenLine xmlns:a14="http://schemas.microsoft.com/office/drawing/2010/main" xmlns="" w="9525">
+                <a14:hiddenLine xmlns="" xmlns:a14="http://schemas.microsoft.com/office/drawing/2010/main" w="9525">
                   <a:solidFill>
                     <a:srgbClr val="000000"/>
                   </a:solidFill>
@@ -3521,7 +3522,7 @@
             </a:ln>
             <a:extLst>
               <a:ext uri="{91240B29-F687-4f45-9708-019B960494DF}">
-                <a14:hiddenLine xmlns:a14="http://schemas.microsoft.com/office/drawing/2010/main" xmlns="" w="9525">
+                <a14:hiddenLine xmlns="" xmlns:a14="http://schemas.microsoft.com/office/drawing/2010/main" w="9525">
                   <a:solidFill>
                     <a:srgbClr val="000000"/>
                   </a:solidFill>
@@ -3611,7 +3612,7 @@
             </a:ln>
             <a:extLst>
               <a:ext uri="{91240B29-F687-4f45-9708-019B960494DF}">
-                <a14:hiddenLine xmlns:a14="http://schemas.microsoft.com/office/drawing/2010/main" xmlns="" w="9525">
+                <a14:hiddenLine xmlns="" xmlns:a14="http://schemas.microsoft.com/office/drawing/2010/main" w="9525">
                   <a:solidFill>
                     <a:srgbClr val="000000"/>
                   </a:solidFill>
@@ -3676,7 +3677,7 @@
             </a:ln>
             <a:extLst>
               <a:ext uri="{91240B29-F687-4f45-9708-019B960494DF}">
-                <a14:hiddenLine xmlns:a14="http://schemas.microsoft.com/office/drawing/2010/main" xmlns="" w="9525">
+                <a14:hiddenLine xmlns="" xmlns:a14="http://schemas.microsoft.com/office/drawing/2010/main" w="9525">
                   <a:solidFill>
                     <a:srgbClr val="000000"/>
                   </a:solidFill>
@@ -3738,7 +3739,7 @@
             </a:ln>
             <a:extLst>
               <a:ext uri="{91240B29-F687-4f45-9708-019B960494DF}">
-                <a14:hiddenLine xmlns:a14="http://schemas.microsoft.com/office/drawing/2010/main" xmlns="" w="9525">
+                <a14:hiddenLine xmlns="" xmlns:a14="http://schemas.microsoft.com/office/drawing/2010/main" w="9525">
                   <a:solidFill>
                     <a:srgbClr val="000000"/>
                   </a:solidFill>
@@ -3828,7 +3829,7 @@
             </a:ln>
             <a:extLst>
               <a:ext uri="{91240B29-F687-4f45-9708-019B960494DF}">
-                <a14:hiddenLine xmlns:a14="http://schemas.microsoft.com/office/drawing/2010/main" xmlns="" w="9525">
+                <a14:hiddenLine xmlns="" xmlns:a14="http://schemas.microsoft.com/office/drawing/2010/main" w="9525">
                   <a:solidFill>
                     <a:srgbClr val="000000"/>
                   </a:solidFill>
@@ -3918,7 +3919,7 @@
             </a:ln>
             <a:extLst>
               <a:ext uri="{91240B29-F687-4f45-9708-019B960494DF}">
-                <a14:hiddenLine xmlns:a14="http://schemas.microsoft.com/office/drawing/2010/main" xmlns="" w="9525">
+                <a14:hiddenLine xmlns="" xmlns:a14="http://schemas.microsoft.com/office/drawing/2010/main" w="9525">
                   <a:solidFill>
                     <a:srgbClr val="000000"/>
                   </a:solidFill>
@@ -3980,7 +3981,7 @@
             </a:ln>
             <a:extLst>
               <a:ext uri="{91240B29-F687-4f45-9708-019B960494DF}">
-                <a14:hiddenLine xmlns:a14="http://schemas.microsoft.com/office/drawing/2010/main" xmlns="" w="9525">
+                <a14:hiddenLine xmlns="" xmlns:a14="http://schemas.microsoft.com/office/drawing/2010/main" w="9525">
                   <a:solidFill>
                     <a:srgbClr val="000000"/>
                   </a:solidFill>
@@ -4100,7 +4101,7 @@
             </a:ln>
             <a:extLst>
               <a:ext uri="{91240B29-F687-4f45-9708-019B960494DF}">
-                <a14:hiddenLine xmlns:a14="http://schemas.microsoft.com/office/drawing/2010/main" xmlns="" w="9525">
+                <a14:hiddenLine xmlns="" xmlns:a14="http://schemas.microsoft.com/office/drawing/2010/main" w="9525">
                   <a:solidFill>
                     <a:srgbClr val="000000"/>
                   </a:solidFill>
@@ -4168,7 +4169,7 @@
             </a:ln>
             <a:extLst>
               <a:ext uri="{91240B29-F687-4f45-9708-019B960494DF}">
-                <a14:hiddenLine xmlns:a14="http://schemas.microsoft.com/office/drawing/2010/main" xmlns="" w="9525">
+                <a14:hiddenLine xmlns="" xmlns:a14="http://schemas.microsoft.com/office/drawing/2010/main" w="9525">
                   <a:solidFill>
                     <a:srgbClr val="000000"/>
                   </a:solidFill>
@@ -4258,7 +4259,7 @@
             </a:ln>
             <a:extLst>
               <a:ext uri="{91240B29-F687-4f45-9708-019B960494DF}">
-                <a14:hiddenLine xmlns:a14="http://schemas.microsoft.com/office/drawing/2010/main" xmlns="" w="9525">
+                <a14:hiddenLine xmlns="" xmlns:a14="http://schemas.microsoft.com/office/drawing/2010/main" w="9525">
                   <a:solidFill>
                     <a:srgbClr val="000000"/>
                   </a:solidFill>
@@ -9072,7 +9073,7 @@
           <a:noFill/>
           <a:extLst>
             <a:ext uri="{909E8E84-426E-40dd-AFC4-6F175D3DCCD1}">
-              <a14:hiddenFill xmlns:a14="http://schemas.microsoft.com/office/drawing/2010/main" xmlns="">
+              <a14:hiddenFill xmlns="" xmlns:a14="http://schemas.microsoft.com/office/drawing/2010/main">
                 <a:solidFill>
                   <a:srgbClr val="FFFFFF"/>
                 </a:solidFill>
@@ -9146,7 +9147,7 @@
               </a:ln>
               <a:extLst>
                 <a:ext uri="{91240B29-F687-4f45-9708-019B960494DF}">
-                  <a14:hiddenLine xmlns:a14="http://schemas.microsoft.com/office/drawing/2010/main" xmlns="" w="9525">
+                  <a14:hiddenLine xmlns="" xmlns:a14="http://schemas.microsoft.com/office/drawing/2010/main" w="9525">
                     <a:solidFill>
                       <a:srgbClr val="000000"/>
                     </a:solidFill>
@@ -9236,7 +9237,7 @@
               </a:ln>
               <a:extLst>
                 <a:ext uri="{91240B29-F687-4f45-9708-019B960494DF}">
-                  <a14:hiddenLine xmlns:a14="http://schemas.microsoft.com/office/drawing/2010/main" xmlns="" w="9525">
+                  <a14:hiddenLine xmlns="" xmlns:a14="http://schemas.microsoft.com/office/drawing/2010/main" w="9525">
                     <a:solidFill>
                       <a:srgbClr val="000000"/>
                     </a:solidFill>
@@ -9326,7 +9327,7 @@
               </a:ln>
               <a:extLst>
                 <a:ext uri="{91240B29-F687-4f45-9708-019B960494DF}">
-                  <a14:hiddenLine xmlns:a14="http://schemas.microsoft.com/office/drawing/2010/main" xmlns="" w="9525">
+                  <a14:hiddenLine xmlns="" xmlns:a14="http://schemas.microsoft.com/office/drawing/2010/main" w="9525">
                     <a:solidFill>
                       <a:srgbClr val="000000"/>
                     </a:solidFill>
@@ -9388,7 +9389,7 @@
               </a:ln>
               <a:extLst>
                 <a:ext uri="{91240B29-F687-4f45-9708-019B960494DF}">
-                  <a14:hiddenLine xmlns:a14="http://schemas.microsoft.com/office/drawing/2010/main" xmlns="" w="9525">
+                  <a14:hiddenLine xmlns="" xmlns:a14="http://schemas.microsoft.com/office/drawing/2010/main" w="9525">
                     <a:solidFill>
                       <a:srgbClr val="000000"/>
                     </a:solidFill>
@@ -9478,7 +9479,7 @@
               </a:ln>
               <a:extLst>
                 <a:ext uri="{91240B29-F687-4f45-9708-019B960494DF}">
-                  <a14:hiddenLine xmlns:a14="http://schemas.microsoft.com/office/drawing/2010/main" xmlns="" w="9525">
+                  <a14:hiddenLine xmlns="" xmlns:a14="http://schemas.microsoft.com/office/drawing/2010/main" w="9525">
                     <a:solidFill>
                       <a:srgbClr val="000000"/>
                     </a:solidFill>
@@ -9540,7 +9541,7 @@
               </a:ln>
               <a:extLst>
                 <a:ext uri="{91240B29-F687-4f45-9708-019B960494DF}">
-                  <a14:hiddenLine xmlns:a14="http://schemas.microsoft.com/office/drawing/2010/main" xmlns="" w="9525">
+                  <a14:hiddenLine xmlns="" xmlns:a14="http://schemas.microsoft.com/office/drawing/2010/main" w="9525">
                     <a:solidFill>
                       <a:srgbClr val="000000"/>
                     </a:solidFill>
@@ -9602,7 +9603,7 @@
               </a:ln>
               <a:extLst>
                 <a:ext uri="{91240B29-F687-4f45-9708-019B960494DF}">
-                  <a14:hiddenLine xmlns:a14="http://schemas.microsoft.com/office/drawing/2010/main" xmlns="" w="9525">
+                  <a14:hiddenLine xmlns="" xmlns:a14="http://schemas.microsoft.com/office/drawing/2010/main" w="9525">
                     <a:solidFill>
                       <a:srgbClr val="000000"/>
                     </a:solidFill>
@@ -9692,7 +9693,7 @@
               </a:ln>
               <a:extLst>
                 <a:ext uri="{91240B29-F687-4f45-9708-019B960494DF}">
-                  <a14:hiddenLine xmlns:a14="http://schemas.microsoft.com/office/drawing/2010/main" xmlns="" w="9525">
+                  <a14:hiddenLine xmlns="" xmlns:a14="http://schemas.microsoft.com/office/drawing/2010/main" w="9525">
                     <a:solidFill>
                       <a:srgbClr val="000000"/>
                     </a:solidFill>
@@ -9782,7 +9783,7 @@
               </a:ln>
               <a:extLst>
                 <a:ext uri="{91240B29-F687-4f45-9708-019B960494DF}">
-                  <a14:hiddenLine xmlns:a14="http://schemas.microsoft.com/office/drawing/2010/main" xmlns="" w="9525">
+                  <a14:hiddenLine xmlns="" xmlns:a14="http://schemas.microsoft.com/office/drawing/2010/main" w="9525">
                     <a:solidFill>
                       <a:srgbClr val="000000"/>
                     </a:solidFill>
@@ -9844,7 +9845,7 @@
               </a:ln>
               <a:extLst>
                 <a:ext uri="{91240B29-F687-4f45-9708-019B960494DF}">
-                  <a14:hiddenLine xmlns:a14="http://schemas.microsoft.com/office/drawing/2010/main" xmlns="" w="9525">
+                  <a14:hiddenLine xmlns="" xmlns:a14="http://schemas.microsoft.com/office/drawing/2010/main" w="9525">
                     <a:solidFill>
                       <a:srgbClr val="000000"/>
                     </a:solidFill>
@@ -9954,7 +9955,7 @@
               </a:ln>
               <a:extLst>
                 <a:ext uri="{91240B29-F687-4f45-9708-019B960494DF}">
-                  <a14:hiddenLine xmlns:a14="http://schemas.microsoft.com/office/drawing/2010/main" xmlns="" w="9525">
+                  <a14:hiddenLine xmlns="" xmlns:a14="http://schemas.microsoft.com/office/drawing/2010/main" w="9525">
                     <a:solidFill>
                       <a:srgbClr val="000000"/>
                     </a:solidFill>
@@ -10038,7 +10039,7 @@
               </a:ln>
               <a:extLst>
                 <a:ext uri="{91240B29-F687-4f45-9708-019B960494DF}">
-                  <a14:hiddenLine xmlns:a14="http://schemas.microsoft.com/office/drawing/2010/main" xmlns="" w="9525">
+                  <a14:hiddenLine xmlns="" xmlns:a14="http://schemas.microsoft.com/office/drawing/2010/main" w="9525">
                     <a:solidFill>
                       <a:srgbClr val="000000"/>
                     </a:solidFill>
@@ -10100,7 +10101,7 @@
               </a:ln>
               <a:extLst>
                 <a:ext uri="{91240B29-F687-4f45-9708-019B960494DF}">
-                  <a14:hiddenLine xmlns:a14="http://schemas.microsoft.com/office/drawing/2010/main" xmlns="" w="9525">
+                  <a14:hiddenLine xmlns="" xmlns:a14="http://schemas.microsoft.com/office/drawing/2010/main" w="9525">
                     <a:solidFill>
                       <a:srgbClr val="000000"/>
                     </a:solidFill>
@@ -10162,7 +10163,7 @@
               </a:ln>
               <a:extLst>
                 <a:ext uri="{91240B29-F687-4f45-9708-019B960494DF}">
-                  <a14:hiddenLine xmlns:a14="http://schemas.microsoft.com/office/drawing/2010/main" xmlns="" w="9525">
+                  <a14:hiddenLine xmlns="" xmlns:a14="http://schemas.microsoft.com/office/drawing/2010/main" w="9525">
                     <a:solidFill>
                       <a:srgbClr val="000000"/>
                     </a:solidFill>
@@ -10252,7 +10253,7 @@
               </a:ln>
               <a:extLst>
                 <a:ext uri="{91240B29-F687-4f45-9708-019B960494DF}">
-                  <a14:hiddenLine xmlns:a14="http://schemas.microsoft.com/office/drawing/2010/main" xmlns="" w="9525">
+                  <a14:hiddenLine xmlns="" xmlns:a14="http://schemas.microsoft.com/office/drawing/2010/main" w="9525">
                     <a:solidFill>
                       <a:srgbClr val="000000"/>
                     </a:solidFill>
@@ -10286,7 +10287,7 @@
               </a:ln>
               <a:extLst>
                 <a:ext uri="{91240B29-F687-4f45-9708-019B960494DF}">
-                  <a14:hiddenLine xmlns:a14="http://schemas.microsoft.com/office/drawing/2010/main" xmlns="" w="9525">
+                  <a14:hiddenLine xmlns="" xmlns:a14="http://schemas.microsoft.com/office/drawing/2010/main" w="9525">
                     <a:solidFill>
                       <a:srgbClr val="000000"/>
                     </a:solidFill>
@@ -10351,7 +10352,7 @@
               </a:ln>
               <a:extLst>
                 <a:ext uri="{91240B29-F687-4f45-9708-019B960494DF}">
-                  <a14:hiddenLine xmlns:a14="http://schemas.microsoft.com/office/drawing/2010/main" xmlns="" w="9525">
+                  <a14:hiddenLine xmlns="" xmlns:a14="http://schemas.microsoft.com/office/drawing/2010/main" w="9525">
                     <a:solidFill>
                       <a:srgbClr val="000000"/>
                     </a:solidFill>
@@ -10441,7 +10442,7 @@
               </a:ln>
               <a:extLst>
                 <a:ext uri="{91240B29-F687-4f45-9708-019B960494DF}">
-                  <a14:hiddenLine xmlns:a14="http://schemas.microsoft.com/office/drawing/2010/main" xmlns="" w="9525">
+                  <a14:hiddenLine xmlns="" xmlns:a14="http://schemas.microsoft.com/office/drawing/2010/main" w="9525">
                     <a:solidFill>
                       <a:srgbClr val="000000"/>
                     </a:solidFill>
@@ -10503,7 +10504,7 @@
               </a:ln>
               <a:extLst>
                 <a:ext uri="{91240B29-F687-4f45-9708-019B960494DF}">
-                  <a14:hiddenLine xmlns:a14="http://schemas.microsoft.com/office/drawing/2010/main" xmlns="" w="9525">
+                  <a14:hiddenLine xmlns="" xmlns:a14="http://schemas.microsoft.com/office/drawing/2010/main" w="9525">
                     <a:solidFill>
                       <a:srgbClr val="000000"/>
                     </a:solidFill>
@@ -10593,7 +10594,7 @@
               </a:ln>
               <a:extLst>
                 <a:ext uri="{91240B29-F687-4f45-9708-019B960494DF}">
-                  <a14:hiddenLine xmlns:a14="http://schemas.microsoft.com/office/drawing/2010/main" xmlns="" w="9525">
+                  <a14:hiddenLine xmlns="" xmlns:a14="http://schemas.microsoft.com/office/drawing/2010/main" w="9525">
                     <a:solidFill>
                       <a:srgbClr val="000000"/>
                     </a:solidFill>
@@ -10658,7 +10659,7 @@
               </a:ln>
               <a:extLst>
                 <a:ext uri="{91240B29-F687-4f45-9708-019B960494DF}">
-                  <a14:hiddenLine xmlns:a14="http://schemas.microsoft.com/office/drawing/2010/main" xmlns="" w="9525">
+                  <a14:hiddenLine xmlns="" xmlns:a14="http://schemas.microsoft.com/office/drawing/2010/main" w="9525">
                     <a:solidFill>
                       <a:srgbClr val="000000"/>
                     </a:solidFill>
@@ -10720,7 +10721,7 @@
               </a:ln>
               <a:extLst>
                 <a:ext uri="{91240B29-F687-4f45-9708-019B960494DF}">
-                  <a14:hiddenLine xmlns:a14="http://schemas.microsoft.com/office/drawing/2010/main" xmlns="" w="9525">
+                  <a14:hiddenLine xmlns="" xmlns:a14="http://schemas.microsoft.com/office/drawing/2010/main" w="9525">
                     <a:solidFill>
                       <a:srgbClr val="000000"/>
                     </a:solidFill>
@@ -10810,7 +10811,7 @@
               </a:ln>
               <a:extLst>
                 <a:ext uri="{91240B29-F687-4f45-9708-019B960494DF}">
-                  <a14:hiddenLine xmlns:a14="http://schemas.microsoft.com/office/drawing/2010/main" xmlns="" w="9525">
+                  <a14:hiddenLine xmlns="" xmlns:a14="http://schemas.microsoft.com/office/drawing/2010/main" w="9525">
                     <a:solidFill>
                       <a:srgbClr val="000000"/>
                     </a:solidFill>
@@ -10900,7 +10901,7 @@
               </a:ln>
               <a:extLst>
                 <a:ext uri="{91240B29-F687-4f45-9708-019B960494DF}">
-                  <a14:hiddenLine xmlns:a14="http://schemas.microsoft.com/office/drawing/2010/main" xmlns="" w="9525">
+                  <a14:hiddenLine xmlns="" xmlns:a14="http://schemas.microsoft.com/office/drawing/2010/main" w="9525">
                     <a:solidFill>
                       <a:srgbClr val="000000"/>
                     </a:solidFill>
@@ -10965,7 +10966,7 @@
               </a:ln>
               <a:extLst>
                 <a:ext uri="{91240B29-F687-4f45-9708-019B960494DF}">
-                  <a14:hiddenLine xmlns:a14="http://schemas.microsoft.com/office/drawing/2010/main" xmlns="" w="9525">
+                  <a14:hiddenLine xmlns="" xmlns:a14="http://schemas.microsoft.com/office/drawing/2010/main" w="9525">
                     <a:solidFill>
                       <a:srgbClr val="000000"/>
                     </a:solidFill>
@@ -11085,7 +11086,7 @@
               </a:ln>
               <a:extLst>
                 <a:ext uri="{91240B29-F687-4f45-9708-019B960494DF}">
-                  <a14:hiddenLine xmlns:a14="http://schemas.microsoft.com/office/drawing/2010/main" xmlns="" w="9525">
+                  <a14:hiddenLine xmlns="" xmlns:a14="http://schemas.microsoft.com/office/drawing/2010/main" w="9525">
                     <a:solidFill>
                       <a:srgbClr val="000000"/>
                     </a:solidFill>
@@ -11166,7 +11167,7 @@
               </a:ln>
               <a:extLst>
                 <a:ext uri="{91240B29-F687-4f45-9708-019B960494DF}">
-                  <a14:hiddenLine xmlns:a14="http://schemas.microsoft.com/office/drawing/2010/main" xmlns="" w="9525">
+                  <a14:hiddenLine xmlns="" xmlns:a14="http://schemas.microsoft.com/office/drawing/2010/main" w="9525">
                     <a:solidFill>
                       <a:srgbClr val="000000"/>
                     </a:solidFill>
@@ -11281,7 +11282,7 @@
               </a:ln>
               <a:extLst>
                 <a:ext uri="{91240B29-F687-4f45-9708-019B960494DF}">
-                  <a14:hiddenLine xmlns:a14="http://schemas.microsoft.com/office/drawing/2010/main" xmlns="" w="9525">
+                  <a14:hiddenLine xmlns="" xmlns:a14="http://schemas.microsoft.com/office/drawing/2010/main" w="9525">
                     <a:solidFill>
                       <a:srgbClr val="000000"/>
                     </a:solidFill>
@@ -11371,7 +11372,7 @@
               </a:ln>
               <a:extLst>
                 <a:ext uri="{91240B29-F687-4f45-9708-019B960494DF}">
-                  <a14:hiddenLine xmlns:a14="http://schemas.microsoft.com/office/drawing/2010/main" xmlns="" w="9525">
+                  <a14:hiddenLine xmlns="" xmlns:a14="http://schemas.microsoft.com/office/drawing/2010/main" w="9525">
                     <a:solidFill>
                       <a:srgbClr val="000000"/>
                     </a:solidFill>
@@ -11436,7 +11437,7 @@
               </a:ln>
               <a:extLst>
                 <a:ext uri="{91240B29-F687-4f45-9708-019B960494DF}">
-                  <a14:hiddenLine xmlns:a14="http://schemas.microsoft.com/office/drawing/2010/main" xmlns="" w="9525">
+                  <a14:hiddenLine xmlns="" xmlns:a14="http://schemas.microsoft.com/office/drawing/2010/main" w="9525">
                     <a:solidFill>
                       <a:srgbClr val="000000"/>
                     </a:solidFill>
@@ -11526,7 +11527,7 @@
               </a:ln>
               <a:extLst>
                 <a:ext uri="{91240B29-F687-4f45-9708-019B960494DF}">
-                  <a14:hiddenLine xmlns:a14="http://schemas.microsoft.com/office/drawing/2010/main" xmlns="" w="9525">
+                  <a14:hiddenLine xmlns="" xmlns:a14="http://schemas.microsoft.com/office/drawing/2010/main" w="9525">
                     <a:solidFill>
                       <a:srgbClr val="000000"/>
                     </a:solidFill>
@@ -11594,7 +11595,7 @@
               </a:ln>
               <a:extLst>
                 <a:ext uri="{91240B29-F687-4f45-9708-019B960494DF}">
-                  <a14:hiddenLine xmlns:a14="http://schemas.microsoft.com/office/drawing/2010/main" xmlns="" w="9525">
+                  <a14:hiddenLine xmlns="" xmlns:a14="http://schemas.microsoft.com/office/drawing/2010/main" w="9525">
                     <a:solidFill>
                       <a:srgbClr val="000000"/>
                     </a:solidFill>
@@ -11684,7 +11685,7 @@
               </a:ln>
               <a:extLst>
                 <a:ext uri="{91240B29-F687-4f45-9708-019B960494DF}">
-                  <a14:hiddenLine xmlns:a14="http://schemas.microsoft.com/office/drawing/2010/main" xmlns="" w="9525">
+                  <a14:hiddenLine xmlns="" xmlns:a14="http://schemas.microsoft.com/office/drawing/2010/main" w="9525">
                     <a:solidFill>
                       <a:srgbClr val="000000"/>
                     </a:solidFill>
@@ -11752,7 +11753,7 @@
               </a:ln>
               <a:extLst>
                 <a:ext uri="{91240B29-F687-4f45-9708-019B960494DF}">
-                  <a14:hiddenLine xmlns:a14="http://schemas.microsoft.com/office/drawing/2010/main" xmlns="" w="9525">
+                  <a14:hiddenLine xmlns="" xmlns:a14="http://schemas.microsoft.com/office/drawing/2010/main" w="9525">
                     <a:solidFill>
                       <a:srgbClr val="000000"/>
                     </a:solidFill>
@@ -11842,7 +11843,7 @@
               </a:ln>
               <a:extLst>
                 <a:ext uri="{91240B29-F687-4f45-9708-019B960494DF}">
-                  <a14:hiddenLine xmlns:a14="http://schemas.microsoft.com/office/drawing/2010/main" xmlns="" w="9525">
+                  <a14:hiddenLine xmlns="" xmlns:a14="http://schemas.microsoft.com/office/drawing/2010/main" w="9525">
                     <a:solidFill>
                       <a:srgbClr val="000000"/>
                     </a:solidFill>
@@ -11876,7 +11877,7 @@
               </a:ln>
               <a:extLst>
                 <a:ext uri="{91240B29-F687-4f45-9708-019B960494DF}">
-                  <a14:hiddenLine xmlns:a14="http://schemas.microsoft.com/office/drawing/2010/main" xmlns="" w="9525">
+                  <a14:hiddenLine xmlns="" xmlns:a14="http://schemas.microsoft.com/office/drawing/2010/main" w="9525">
                     <a:solidFill>
                       <a:srgbClr val="000000"/>
                     </a:solidFill>
@@ -13097,39 +13098,1288 @@
           </a:p>
         </p:txBody>
       </p:sp>
-      <p:pic>
-        <p:nvPicPr>
-          <p:cNvPr id="4" name="Content Placeholder 3"/>
-          <p:cNvPicPr>
-            <a:picLocks noGrp="1" noChangeAspect="1"/>
-          </p:cNvPicPr>
+      <p:sp>
+        <p:nvSpPr>
+          <p:cNvPr id="5" name="Rectangle 4"/>
+          <p:cNvSpPr/>
+          <p:nvPr/>
+        </p:nvSpPr>
+        <p:spPr>
+          <a:xfrm>
+            <a:off x="5642811" y="632767"/>
+            <a:ext cx="986589" cy="566617"/>
+          </a:xfrm>
+          <a:prstGeom prst="rect">
+            <a:avLst/>
+          </a:prstGeom>
+        </p:spPr>
+        <p:style>
+          <a:lnRef idx="2">
+            <a:schemeClr val="accent1">
+              <a:shade val="50000"/>
+            </a:schemeClr>
+          </a:lnRef>
+          <a:fillRef idx="1">
+            <a:schemeClr val="accent1"/>
+          </a:fillRef>
+          <a:effectRef idx="0">
+            <a:schemeClr val="accent1"/>
+          </a:effectRef>
+          <a:fontRef idx="minor">
+            <a:schemeClr val="lt1"/>
+          </a:fontRef>
+        </p:style>
+        <p:txBody>
+          <a:bodyPr rtlCol="0" anchor="ctr"/>
+          <a:lstStyle/>
+          <a:p>
+            <a:pPr algn="ctr"/>
+            <a:endParaRPr lang="en-US"/>
+          </a:p>
+        </p:txBody>
+      </p:sp>
+      <p:sp>
+        <p:nvSpPr>
+          <p:cNvPr id="8" name="TextBox 7"/>
+          <p:cNvSpPr txBox="1"/>
+          <p:nvPr/>
+        </p:nvSpPr>
+        <p:spPr>
+          <a:xfrm>
+            <a:off x="5763127" y="724408"/>
+            <a:ext cx="1046747" cy="369332"/>
+          </a:xfrm>
+          <a:prstGeom prst="rect">
+            <a:avLst/>
+          </a:prstGeom>
+          <a:noFill/>
+        </p:spPr>
+        <p:txBody>
+          <a:bodyPr wrap="square" rtlCol="0">
+            <a:spAutoFit/>
+          </a:bodyPr>
+          <a:lstStyle/>
+          <a:p>
+            <a:r>
+              <a:rPr lang="en-US" dirty="0" smtClean="0"/>
+              <a:t>CLIENT</a:t>
+            </a:r>
+            <a:endParaRPr lang="en-US" dirty="0"/>
+          </a:p>
+        </p:txBody>
+      </p:sp>
+      <p:sp>
+        <p:nvSpPr>
+          <p:cNvPr id="9" name="Can 8"/>
+          <p:cNvSpPr/>
+          <p:nvPr/>
+        </p:nvSpPr>
+        <p:spPr>
+          <a:xfrm>
+            <a:off x="5594685" y="6043864"/>
+            <a:ext cx="1371600" cy="565484"/>
+          </a:xfrm>
+          <a:prstGeom prst="can">
+            <a:avLst/>
+          </a:prstGeom>
+        </p:spPr>
+        <p:style>
+          <a:lnRef idx="2">
+            <a:schemeClr val="accent1">
+              <a:shade val="50000"/>
+            </a:schemeClr>
+          </a:lnRef>
+          <a:fillRef idx="1">
+            <a:schemeClr val="accent1"/>
+          </a:fillRef>
+          <a:effectRef idx="0">
+            <a:schemeClr val="accent1"/>
+          </a:effectRef>
+          <a:fontRef idx="minor">
+            <a:schemeClr val="lt1"/>
+          </a:fontRef>
+        </p:style>
+        <p:txBody>
+          <a:bodyPr rtlCol="0" anchor="ctr"/>
+          <a:lstStyle/>
+          <a:p>
+            <a:pPr algn="ctr"/>
+            <a:endParaRPr lang="en-US"/>
+          </a:p>
+        </p:txBody>
+      </p:sp>
+      <p:sp>
+        <p:nvSpPr>
+          <p:cNvPr id="10" name="TextBox 9"/>
+          <p:cNvSpPr txBox="1"/>
+          <p:nvPr/>
+        </p:nvSpPr>
+        <p:spPr>
+          <a:xfrm>
+            <a:off x="5763127" y="6187644"/>
+            <a:ext cx="1287379" cy="369332"/>
+          </a:xfrm>
+          <a:prstGeom prst="rect">
+            <a:avLst/>
+          </a:prstGeom>
+          <a:noFill/>
+        </p:spPr>
+        <p:txBody>
+          <a:bodyPr wrap="square" rtlCol="0">
+            <a:spAutoFit/>
+          </a:bodyPr>
+          <a:lstStyle/>
+          <a:p>
+            <a:r>
+              <a:rPr lang="en-US" dirty="0" smtClean="0">
+                <a:solidFill>
+                  <a:schemeClr val="bg1"/>
+                </a:solidFill>
+              </a:rPr>
+              <a:t>Database</a:t>
+            </a:r>
+            <a:endParaRPr lang="en-US" dirty="0">
+              <a:solidFill>
+                <a:schemeClr val="bg1"/>
+              </a:solidFill>
+            </a:endParaRPr>
+          </a:p>
+        </p:txBody>
+      </p:sp>
+      <p:cxnSp>
+        <p:nvCxnSpPr>
+          <p:cNvPr id="12" name="Straight Arrow Connector 11"/>
+          <p:cNvCxnSpPr>
+            <a:stCxn id="6" idx="2"/>
+            <a:endCxn id="9" idx="1"/>
+          </p:cNvCxnSpPr>
+          <p:nvPr/>
+        </p:nvCxnSpPr>
+        <p:spPr>
+          <a:xfrm>
+            <a:off x="6280485" y="5390865"/>
+            <a:ext cx="0" cy="652999"/>
+          </a:xfrm>
+          <a:prstGeom prst="straightConnector1">
+            <a:avLst/>
+          </a:prstGeom>
+          <a:ln>
+            <a:headEnd type="triangle"/>
+            <a:tailEnd type="triangle"/>
+          </a:ln>
+        </p:spPr>
+        <p:style>
+          <a:lnRef idx="1">
+            <a:schemeClr val="accent1"/>
+          </a:lnRef>
+          <a:fillRef idx="0">
+            <a:schemeClr val="accent1"/>
+          </a:fillRef>
+          <a:effectRef idx="0">
+            <a:schemeClr val="accent1"/>
+          </a:effectRef>
+          <a:fontRef idx="minor">
+            <a:schemeClr val="tx1"/>
+          </a:fontRef>
+        </p:style>
+      </p:cxnSp>
+      <p:grpSp>
+        <p:nvGrpSpPr>
+          <p:cNvPr id="39" name="Group 38"/>
+          <p:cNvGrpSpPr/>
+          <p:nvPr/>
+        </p:nvGrpSpPr>
+        <p:grpSpPr>
+          <a:xfrm>
+            <a:off x="2478506" y="1564823"/>
+            <a:ext cx="7603958" cy="3853045"/>
+            <a:chOff x="2478506" y="1564823"/>
+            <a:chExt cx="7603958" cy="3853045"/>
+          </a:xfrm>
+        </p:grpSpPr>
+        <p:grpSp>
+          <p:nvGrpSpPr>
+            <p:cNvPr id="37" name="Group 36"/>
+            <p:cNvGrpSpPr/>
+            <p:nvPr/>
+          </p:nvGrpSpPr>
+          <p:grpSpPr>
+            <a:xfrm>
+              <a:off x="2478506" y="1564823"/>
+              <a:ext cx="7603958" cy="3826042"/>
+              <a:chOff x="2478505" y="1965159"/>
+              <a:chExt cx="7603958" cy="3826042"/>
+            </a:xfrm>
+          </p:grpSpPr>
+          <p:sp>
+            <p:nvSpPr>
+              <p:cNvPr id="6" name="Rectangle 5"/>
+              <p:cNvSpPr/>
+              <p:nvPr/>
+            </p:nvSpPr>
+            <p:spPr>
+              <a:xfrm>
+                <a:off x="2478505" y="1965159"/>
+                <a:ext cx="7603958" cy="3826042"/>
+              </a:xfrm>
+              <a:prstGeom prst="rect">
+                <a:avLst/>
+              </a:prstGeom>
+            </p:spPr>
+            <p:style>
+              <a:lnRef idx="2">
+                <a:schemeClr val="accent6"/>
+              </a:lnRef>
+              <a:fillRef idx="1">
+                <a:schemeClr val="lt1"/>
+              </a:fillRef>
+              <a:effectRef idx="0">
+                <a:schemeClr val="accent6"/>
+              </a:effectRef>
+              <a:fontRef idx="minor">
+                <a:schemeClr val="dk1"/>
+              </a:fontRef>
+            </p:style>
+            <p:txBody>
+              <a:bodyPr rtlCol="0" anchor="ctr"/>
+              <a:lstStyle/>
+              <a:p>
+                <a:pPr algn="ctr"/>
+                <a:endParaRPr lang="en-US"/>
+              </a:p>
+            </p:txBody>
+          </p:sp>
+          <p:sp>
+            <p:nvSpPr>
+              <p:cNvPr id="7" name="Rectangle 6"/>
+              <p:cNvSpPr/>
+              <p:nvPr/>
+            </p:nvSpPr>
+            <p:spPr>
+              <a:xfrm>
+                <a:off x="2749216" y="2247683"/>
+                <a:ext cx="7062537" cy="3215072"/>
+              </a:xfrm>
+              <a:prstGeom prst="rect">
+                <a:avLst/>
+              </a:prstGeom>
+            </p:spPr>
+            <p:style>
+              <a:lnRef idx="2">
+                <a:schemeClr val="accent1">
+                  <a:shade val="50000"/>
+                </a:schemeClr>
+              </a:lnRef>
+              <a:fillRef idx="1">
+                <a:schemeClr val="accent1"/>
+              </a:fillRef>
+              <a:effectRef idx="0">
+                <a:schemeClr val="accent1"/>
+              </a:effectRef>
+              <a:fontRef idx="minor">
+                <a:schemeClr val="lt1"/>
+              </a:fontRef>
+            </p:style>
+            <p:txBody>
+              <a:bodyPr rtlCol="0" anchor="ctr"/>
+              <a:lstStyle/>
+              <a:p>
+                <a:pPr algn="ctr"/>
+                <a:endParaRPr lang="en-US"/>
+              </a:p>
+            </p:txBody>
+          </p:sp>
+          <p:sp>
+            <p:nvSpPr>
+              <p:cNvPr id="14" name="Rectangle 13"/>
+              <p:cNvSpPr/>
+              <p:nvPr/>
+            </p:nvSpPr>
+            <p:spPr>
+              <a:xfrm>
+                <a:off x="2947737" y="2430379"/>
+                <a:ext cx="1985210" cy="2875547"/>
+              </a:xfrm>
+              <a:prstGeom prst="rect">
+                <a:avLst/>
+              </a:prstGeom>
+            </p:spPr>
+            <p:style>
+              <a:lnRef idx="1">
+                <a:schemeClr val="accent1"/>
+              </a:lnRef>
+              <a:fillRef idx="2">
+                <a:schemeClr val="accent1"/>
+              </a:fillRef>
+              <a:effectRef idx="1">
+                <a:schemeClr val="accent1"/>
+              </a:effectRef>
+              <a:fontRef idx="minor">
+                <a:schemeClr val="dk1"/>
+              </a:fontRef>
+            </p:style>
+            <p:txBody>
+              <a:bodyPr rtlCol="0" anchor="ctr"/>
+              <a:lstStyle/>
+              <a:p>
+                <a:pPr algn="ctr"/>
+                <a:endParaRPr lang="en-US"/>
+              </a:p>
+            </p:txBody>
+          </p:sp>
+          <p:sp>
+            <p:nvSpPr>
+              <p:cNvPr id="15" name="TextBox 14"/>
+              <p:cNvSpPr txBox="1"/>
+              <p:nvPr/>
+            </p:nvSpPr>
+            <p:spPr>
+              <a:xfrm>
+                <a:off x="3128210" y="2753879"/>
+                <a:ext cx="1624264" cy="2308324"/>
+              </a:xfrm>
+              <a:prstGeom prst="rect">
+                <a:avLst/>
+              </a:prstGeom>
+              <a:noFill/>
+            </p:spPr>
+            <p:txBody>
+              <a:bodyPr wrap="square" rtlCol="0">
+                <a:spAutoFit/>
+              </a:bodyPr>
+              <a:lstStyle/>
+              <a:p>
+                <a:r>
+                  <a:rPr lang="en-US" dirty="0" smtClean="0">
+                    <a:solidFill>
+                      <a:schemeClr val="bg1"/>
+                    </a:solidFill>
+                  </a:rPr>
+                  <a:t>User Interface:</a:t>
+                </a:r>
+              </a:p>
+              <a:p>
+                <a:endParaRPr lang="en-US" dirty="0">
+                  <a:solidFill>
+                    <a:schemeClr val="bg1"/>
+                  </a:solidFill>
+                </a:endParaRPr>
+              </a:p>
+              <a:p>
+                <a:r>
+                  <a:rPr lang="en-US" dirty="0" err="1" smtClean="0">
+                    <a:solidFill>
+                      <a:schemeClr val="bg1"/>
+                    </a:solidFill>
+                  </a:rPr>
+                  <a:t>Thymeleaf</a:t>
+                </a:r>
+                <a:endParaRPr lang="en-US" dirty="0" smtClean="0">
+                  <a:solidFill>
+                    <a:schemeClr val="bg1"/>
+                  </a:solidFill>
+                </a:endParaRPr>
+              </a:p>
+              <a:p>
+                <a:r>
+                  <a:rPr lang="en-US" dirty="0" smtClean="0">
+                    <a:solidFill>
+                      <a:schemeClr val="bg1"/>
+                    </a:solidFill>
+                  </a:rPr>
+                  <a:t>Bootstrap</a:t>
+                </a:r>
+              </a:p>
+              <a:p>
+                <a:r>
+                  <a:rPr lang="en-US" dirty="0" smtClean="0">
+                    <a:solidFill>
+                      <a:schemeClr val="bg1"/>
+                    </a:solidFill>
+                  </a:rPr>
+                  <a:t>HTML</a:t>
+                </a:r>
+              </a:p>
+              <a:p>
+                <a:r>
+                  <a:rPr lang="en-US" dirty="0" smtClean="0">
+                    <a:solidFill>
+                      <a:schemeClr val="bg1"/>
+                    </a:solidFill>
+                  </a:rPr>
+                  <a:t>CSS</a:t>
+                </a:r>
+              </a:p>
+              <a:p>
+                <a:r>
+                  <a:rPr lang="en-US" dirty="0" smtClean="0">
+                    <a:solidFill>
+                      <a:schemeClr val="bg1"/>
+                    </a:solidFill>
+                  </a:rPr>
+                  <a:t>Images</a:t>
+                </a:r>
+              </a:p>
+              <a:p>
+                <a:r>
+                  <a:rPr lang="en-US" dirty="0" smtClean="0">
+                    <a:solidFill>
+                      <a:schemeClr val="bg1"/>
+                    </a:solidFill>
+                  </a:rPr>
+                  <a:t>Scripts</a:t>
+                </a:r>
+              </a:p>
+            </p:txBody>
+          </p:sp>
+          <p:sp>
+            <p:nvSpPr>
+              <p:cNvPr id="16" name="Rectangle 15"/>
+              <p:cNvSpPr/>
+              <p:nvPr/>
+            </p:nvSpPr>
+            <p:spPr>
+              <a:xfrm>
+                <a:off x="5065296" y="2430378"/>
+                <a:ext cx="4547936" cy="2875547"/>
+              </a:xfrm>
+              <a:prstGeom prst="rect">
+                <a:avLst/>
+              </a:prstGeom>
+            </p:spPr>
+            <p:style>
+              <a:lnRef idx="1">
+                <a:schemeClr val="accent1"/>
+              </a:lnRef>
+              <a:fillRef idx="2">
+                <a:schemeClr val="accent1"/>
+              </a:fillRef>
+              <a:effectRef idx="1">
+                <a:schemeClr val="accent1"/>
+              </a:effectRef>
+              <a:fontRef idx="minor">
+                <a:schemeClr val="dk1"/>
+              </a:fontRef>
+            </p:style>
+            <p:txBody>
+              <a:bodyPr rtlCol="0" anchor="ctr"/>
+              <a:lstStyle/>
+              <a:p>
+                <a:pPr algn="ctr"/>
+                <a:endParaRPr lang="en-US"/>
+              </a:p>
+            </p:txBody>
+          </p:sp>
+          <p:grpSp>
+            <p:nvGrpSpPr>
+              <p:cNvPr id="26" name="Group 25"/>
+              <p:cNvGrpSpPr/>
+              <p:nvPr/>
+            </p:nvGrpSpPr>
+            <p:grpSpPr>
+              <a:xfrm>
+                <a:off x="7369342" y="2840134"/>
+                <a:ext cx="1840831" cy="389441"/>
+                <a:chOff x="6637213" y="2932465"/>
+                <a:chExt cx="1840831" cy="389441"/>
+              </a:xfrm>
+            </p:grpSpPr>
+            <p:sp>
+              <p:nvSpPr>
+                <p:cNvPr id="19" name="Rectangle 18"/>
+                <p:cNvSpPr/>
+                <p:nvPr/>
+              </p:nvSpPr>
+              <p:spPr>
+                <a:xfrm>
+                  <a:off x="6637213" y="2932465"/>
+                  <a:ext cx="1469063" cy="389441"/>
+                </a:xfrm>
+                <a:prstGeom prst="rect">
+                  <a:avLst/>
+                </a:prstGeom>
+              </p:spPr>
+              <p:style>
+                <a:lnRef idx="2">
+                  <a:schemeClr val="accent1">
+                    <a:shade val="50000"/>
+                  </a:schemeClr>
+                </a:lnRef>
+                <a:fillRef idx="1">
+                  <a:schemeClr val="accent1"/>
+                </a:fillRef>
+                <a:effectRef idx="0">
+                  <a:schemeClr val="accent1"/>
+                </a:effectRef>
+                <a:fontRef idx="minor">
+                  <a:schemeClr val="lt1"/>
+                </a:fontRef>
+              </p:style>
+              <p:txBody>
+                <a:bodyPr rtlCol="0" anchor="ctr"/>
+                <a:lstStyle/>
+                <a:p>
+                  <a:pPr algn="ctr"/>
+                  <a:endParaRPr lang="en-US"/>
+                </a:p>
+              </p:txBody>
+            </p:sp>
+            <p:sp>
+              <p:nvSpPr>
+                <p:cNvPr id="20" name="TextBox 19"/>
+                <p:cNvSpPr txBox="1"/>
+                <p:nvPr/>
+              </p:nvSpPr>
+              <p:spPr>
+                <a:xfrm>
+                  <a:off x="6757529" y="2952574"/>
+                  <a:ext cx="1720515" cy="369332"/>
+                </a:xfrm>
+                <a:prstGeom prst="rect">
+                  <a:avLst/>
+                </a:prstGeom>
+                <a:noFill/>
+              </p:spPr>
+              <p:txBody>
+                <a:bodyPr wrap="square" rtlCol="0">
+                  <a:spAutoFit/>
+                </a:bodyPr>
+                <a:lstStyle/>
+                <a:p>
+                  <a:r>
+                    <a:rPr lang="en-US" dirty="0" smtClean="0"/>
+                    <a:t>Spring MVC</a:t>
+                  </a:r>
+                  <a:endParaRPr lang="en-US" dirty="0"/>
+                </a:p>
+              </p:txBody>
+            </p:sp>
+          </p:grpSp>
+          <p:grpSp>
+            <p:nvGrpSpPr>
+              <p:cNvPr id="25" name="Group 24"/>
+              <p:cNvGrpSpPr/>
+              <p:nvPr/>
+            </p:nvGrpSpPr>
+            <p:grpSpPr>
+              <a:xfrm>
+                <a:off x="7369342" y="3459775"/>
+                <a:ext cx="1469063" cy="389441"/>
+                <a:chOff x="6637213" y="3728101"/>
+                <a:chExt cx="1469063" cy="389441"/>
+              </a:xfrm>
+            </p:grpSpPr>
+            <p:sp>
+              <p:nvSpPr>
+                <p:cNvPr id="21" name="Rectangle 20"/>
+                <p:cNvSpPr/>
+                <p:nvPr/>
+              </p:nvSpPr>
+              <p:spPr>
+                <a:xfrm>
+                  <a:off x="6637213" y="3728101"/>
+                  <a:ext cx="1469063" cy="389441"/>
+                </a:xfrm>
+                <a:prstGeom prst="rect">
+                  <a:avLst/>
+                </a:prstGeom>
+              </p:spPr>
+              <p:style>
+                <a:lnRef idx="2">
+                  <a:schemeClr val="accent1">
+                    <a:shade val="50000"/>
+                  </a:schemeClr>
+                </a:lnRef>
+                <a:fillRef idx="1">
+                  <a:schemeClr val="accent1"/>
+                </a:fillRef>
+                <a:effectRef idx="0">
+                  <a:schemeClr val="accent1"/>
+                </a:effectRef>
+                <a:fontRef idx="minor">
+                  <a:schemeClr val="lt1"/>
+                </a:fontRef>
+              </p:style>
+              <p:txBody>
+                <a:bodyPr rtlCol="0" anchor="ctr"/>
+                <a:lstStyle/>
+                <a:p>
+                  <a:pPr algn="ctr"/>
+                  <a:endParaRPr lang="en-US"/>
+                </a:p>
+              </p:txBody>
+            </p:sp>
+            <p:sp>
+              <p:nvSpPr>
+                <p:cNvPr id="22" name="TextBox 21"/>
+                <p:cNvSpPr txBox="1"/>
+                <p:nvPr/>
+              </p:nvSpPr>
+              <p:spPr>
+                <a:xfrm>
+                  <a:off x="7044491" y="3748210"/>
+                  <a:ext cx="762208" cy="369332"/>
+                </a:xfrm>
+                <a:prstGeom prst="rect">
+                  <a:avLst/>
+                </a:prstGeom>
+                <a:noFill/>
+              </p:spPr>
+              <p:txBody>
+                <a:bodyPr wrap="square" rtlCol="0">
+                  <a:spAutoFit/>
+                </a:bodyPr>
+                <a:lstStyle/>
+                <a:p>
+                  <a:r>
+                    <a:rPr lang="en-US" dirty="0" smtClean="0"/>
+                    <a:t>POJO</a:t>
+                  </a:r>
+                  <a:endParaRPr lang="en-US" dirty="0"/>
+                </a:p>
+              </p:txBody>
+            </p:sp>
+          </p:grpSp>
+          <p:grpSp>
+            <p:nvGrpSpPr>
+              <p:cNvPr id="27" name="Group 26"/>
+              <p:cNvGrpSpPr/>
+              <p:nvPr/>
+            </p:nvGrpSpPr>
+            <p:grpSpPr>
+              <a:xfrm>
+                <a:off x="7361529" y="4130855"/>
+                <a:ext cx="1469063" cy="389441"/>
+                <a:chOff x="6637214" y="4392187"/>
+                <a:chExt cx="1469063" cy="389441"/>
+              </a:xfrm>
+            </p:grpSpPr>
+            <p:sp>
+              <p:nvSpPr>
+                <p:cNvPr id="23" name="Rectangle 22"/>
+                <p:cNvSpPr/>
+                <p:nvPr/>
+              </p:nvSpPr>
+              <p:spPr>
+                <a:xfrm>
+                  <a:off x="6637214" y="4392187"/>
+                  <a:ext cx="1469063" cy="389441"/>
+                </a:xfrm>
+                <a:prstGeom prst="rect">
+                  <a:avLst/>
+                </a:prstGeom>
+              </p:spPr>
+              <p:style>
+                <a:lnRef idx="2">
+                  <a:schemeClr val="accent1">
+                    <a:shade val="50000"/>
+                  </a:schemeClr>
+                </a:lnRef>
+                <a:fillRef idx="1">
+                  <a:schemeClr val="accent1"/>
+                </a:fillRef>
+                <a:effectRef idx="0">
+                  <a:schemeClr val="accent1"/>
+                </a:effectRef>
+                <a:fontRef idx="minor">
+                  <a:schemeClr val="lt1"/>
+                </a:fontRef>
+              </p:style>
+              <p:txBody>
+                <a:bodyPr rtlCol="0" anchor="ctr"/>
+                <a:lstStyle/>
+                <a:p>
+                  <a:pPr algn="ctr"/>
+                  <a:endParaRPr lang="en-US"/>
+                </a:p>
+              </p:txBody>
+            </p:sp>
+            <p:sp>
+              <p:nvSpPr>
+                <p:cNvPr id="24" name="TextBox 23"/>
+                <p:cNvSpPr txBox="1"/>
+                <p:nvPr/>
+              </p:nvSpPr>
+              <p:spPr>
+                <a:xfrm>
+                  <a:off x="7044492" y="4412296"/>
+                  <a:ext cx="762208" cy="369332"/>
+                </a:xfrm>
+                <a:prstGeom prst="rect">
+                  <a:avLst/>
+                </a:prstGeom>
+                <a:noFill/>
+              </p:spPr>
+              <p:txBody>
+                <a:bodyPr wrap="square" rtlCol="0">
+                  <a:spAutoFit/>
+                </a:bodyPr>
+                <a:lstStyle/>
+                <a:p>
+                  <a:r>
+                    <a:rPr lang="en-US" dirty="0" smtClean="0"/>
+                    <a:t>DAO</a:t>
+                  </a:r>
+                  <a:endParaRPr lang="en-US" dirty="0"/>
+                </a:p>
+              </p:txBody>
+            </p:sp>
+          </p:grpSp>
+          <p:sp>
+            <p:nvSpPr>
+              <p:cNvPr id="28" name="TextBox 27"/>
+              <p:cNvSpPr txBox="1"/>
+              <p:nvPr/>
+            </p:nvSpPr>
+            <p:spPr>
+              <a:xfrm>
+                <a:off x="6629400" y="4892747"/>
+                <a:ext cx="1723523" cy="369332"/>
+              </a:xfrm>
+              <a:prstGeom prst="rect">
+                <a:avLst/>
+              </a:prstGeom>
+              <a:noFill/>
+            </p:spPr>
+            <p:txBody>
+              <a:bodyPr wrap="square" rtlCol="0">
+                <a:spAutoFit/>
+              </a:bodyPr>
+              <a:lstStyle/>
+              <a:p>
+                <a:r>
+                  <a:rPr lang="en-US" dirty="0" smtClean="0">
+                    <a:solidFill>
+                      <a:schemeClr val="bg1"/>
+                    </a:solidFill>
+                  </a:rPr>
+                  <a:t>Web Container</a:t>
+                </a:r>
+                <a:endParaRPr lang="en-US" dirty="0">
+                  <a:solidFill>
+                    <a:schemeClr val="bg1"/>
+                  </a:solidFill>
+                </a:endParaRPr>
+              </a:p>
+            </p:txBody>
+          </p:sp>
+          <p:grpSp>
+            <p:nvGrpSpPr>
+              <p:cNvPr id="29" name="Group 28"/>
+              <p:cNvGrpSpPr/>
+              <p:nvPr/>
+            </p:nvGrpSpPr>
+            <p:grpSpPr>
+              <a:xfrm>
+                <a:off x="5282865" y="3169118"/>
+                <a:ext cx="1840831" cy="389441"/>
+                <a:chOff x="6637213" y="2932465"/>
+                <a:chExt cx="1840831" cy="389441"/>
+              </a:xfrm>
+            </p:grpSpPr>
+            <p:sp>
+              <p:nvSpPr>
+                <p:cNvPr id="30" name="Rectangle 29"/>
+                <p:cNvSpPr/>
+                <p:nvPr/>
+              </p:nvSpPr>
+              <p:spPr>
+                <a:xfrm>
+                  <a:off x="6637213" y="2932465"/>
+                  <a:ext cx="1469063" cy="389441"/>
+                </a:xfrm>
+                <a:prstGeom prst="rect">
+                  <a:avLst/>
+                </a:prstGeom>
+              </p:spPr>
+              <p:style>
+                <a:lnRef idx="2">
+                  <a:schemeClr val="accent1">
+                    <a:shade val="50000"/>
+                  </a:schemeClr>
+                </a:lnRef>
+                <a:fillRef idx="1">
+                  <a:schemeClr val="accent1"/>
+                </a:fillRef>
+                <a:effectRef idx="0">
+                  <a:schemeClr val="accent1"/>
+                </a:effectRef>
+                <a:fontRef idx="minor">
+                  <a:schemeClr val="lt1"/>
+                </a:fontRef>
+              </p:style>
+              <p:txBody>
+                <a:bodyPr rtlCol="0" anchor="ctr"/>
+                <a:lstStyle/>
+                <a:p>
+                  <a:pPr algn="ctr"/>
+                  <a:endParaRPr lang="en-US"/>
+                </a:p>
+              </p:txBody>
+            </p:sp>
+            <p:sp>
+              <p:nvSpPr>
+                <p:cNvPr id="31" name="TextBox 30"/>
+                <p:cNvSpPr txBox="1"/>
+                <p:nvPr/>
+              </p:nvSpPr>
+              <p:spPr>
+                <a:xfrm>
+                  <a:off x="6757529" y="2952574"/>
+                  <a:ext cx="1720515" cy="369332"/>
+                </a:xfrm>
+                <a:prstGeom prst="rect">
+                  <a:avLst/>
+                </a:prstGeom>
+                <a:noFill/>
+              </p:spPr>
+              <p:txBody>
+                <a:bodyPr wrap="square" rtlCol="0">
+                  <a:spAutoFit/>
+                </a:bodyPr>
+                <a:lstStyle/>
+                <a:p>
+                  <a:r>
+                    <a:rPr lang="en-US" dirty="0" smtClean="0"/>
+                    <a:t>Web Service</a:t>
+                  </a:r>
+                  <a:endParaRPr lang="en-US" dirty="0"/>
+                </a:p>
+              </p:txBody>
+            </p:sp>
+          </p:grpSp>
+          <p:grpSp>
+            <p:nvGrpSpPr>
+              <p:cNvPr id="32" name="Group 31"/>
+              <p:cNvGrpSpPr/>
+              <p:nvPr/>
+            </p:nvGrpSpPr>
+            <p:grpSpPr>
+              <a:xfrm>
+                <a:off x="5277058" y="3848080"/>
+                <a:ext cx="1469063" cy="389441"/>
+                <a:chOff x="6637213" y="2932465"/>
+                <a:chExt cx="1469063" cy="389441"/>
+              </a:xfrm>
+            </p:grpSpPr>
+            <p:sp>
+              <p:nvSpPr>
+                <p:cNvPr id="33" name="Rectangle 32"/>
+                <p:cNvSpPr/>
+                <p:nvPr/>
+              </p:nvSpPr>
+              <p:spPr>
+                <a:xfrm>
+                  <a:off x="6637213" y="2932465"/>
+                  <a:ext cx="1469063" cy="389441"/>
+                </a:xfrm>
+                <a:prstGeom prst="rect">
+                  <a:avLst/>
+                </a:prstGeom>
+              </p:spPr>
+              <p:style>
+                <a:lnRef idx="2">
+                  <a:schemeClr val="accent1">
+                    <a:shade val="50000"/>
+                  </a:schemeClr>
+                </a:lnRef>
+                <a:fillRef idx="1">
+                  <a:schemeClr val="accent1"/>
+                </a:fillRef>
+                <a:effectRef idx="0">
+                  <a:schemeClr val="accent1"/>
+                </a:effectRef>
+                <a:fontRef idx="minor">
+                  <a:schemeClr val="lt1"/>
+                </a:fontRef>
+              </p:style>
+              <p:txBody>
+                <a:bodyPr rtlCol="0" anchor="ctr"/>
+                <a:lstStyle/>
+                <a:p>
+                  <a:pPr algn="ctr"/>
+                  <a:endParaRPr lang="en-US"/>
+                </a:p>
+              </p:txBody>
+            </p:sp>
+            <p:sp>
+              <p:nvSpPr>
+                <p:cNvPr id="34" name="TextBox 33"/>
+                <p:cNvSpPr txBox="1"/>
+                <p:nvPr/>
+              </p:nvSpPr>
+              <p:spPr>
+                <a:xfrm>
+                  <a:off x="7044489" y="2952574"/>
+                  <a:ext cx="654510" cy="369332"/>
+                </a:xfrm>
+                <a:prstGeom prst="rect">
+                  <a:avLst/>
+                </a:prstGeom>
+                <a:noFill/>
+              </p:spPr>
+              <p:txBody>
+                <a:bodyPr wrap="square" rtlCol="0">
+                  <a:spAutoFit/>
+                </a:bodyPr>
+                <a:lstStyle/>
+                <a:p>
+                  <a:r>
+                    <a:rPr lang="en-US" dirty="0" smtClean="0"/>
+                    <a:t>ORM</a:t>
+                  </a:r>
+                  <a:endParaRPr lang="en-US" dirty="0"/>
+                </a:p>
+              </p:txBody>
+            </p:sp>
+          </p:grpSp>
+        </p:grpSp>
+        <p:sp>
+          <p:nvSpPr>
+            <p:cNvPr id="13" name="TextBox 12"/>
+            <p:cNvSpPr txBox="1"/>
+            <p:nvPr/>
+          </p:nvSpPr>
+          <p:spPr>
+            <a:xfrm>
+              <a:off x="5564607" y="5048536"/>
+              <a:ext cx="1925052" cy="369332"/>
+            </a:xfrm>
+            <a:prstGeom prst="rect">
+              <a:avLst/>
+            </a:prstGeom>
+            <a:noFill/>
+          </p:spPr>
+          <p:txBody>
+            <a:bodyPr wrap="square" rtlCol="0">
+              <a:spAutoFit/>
+            </a:bodyPr>
+            <a:lstStyle/>
+            <a:p>
+              <a:r>
+                <a:rPr lang="en-US" dirty="0" smtClean="0">
+                  <a:solidFill>
+                    <a:schemeClr val="bg1"/>
+                  </a:solidFill>
+                </a:rPr>
+                <a:t>Application</a:t>
+              </a:r>
+              <a:r>
+                <a:rPr lang="en-US" dirty="0" smtClean="0"/>
+                <a:t> </a:t>
+              </a:r>
+              <a:r>
+                <a:rPr lang="en-US" dirty="0" smtClean="0">
+                  <a:solidFill>
+                    <a:schemeClr val="bg1"/>
+                  </a:solidFill>
+                </a:rPr>
+                <a:t>Server</a:t>
+              </a:r>
+              <a:endParaRPr lang="en-US" dirty="0">
+                <a:solidFill>
+                  <a:schemeClr val="bg1"/>
+                </a:solidFill>
+              </a:endParaRPr>
+            </a:p>
+          </p:txBody>
+        </p:sp>
+      </p:grpSp>
+      <p:cxnSp>
+        <p:nvCxnSpPr>
+          <p:cNvPr id="35" name="Straight Arrow Connector 34"/>
+          <p:cNvCxnSpPr/>
+          <p:nvPr/>
+        </p:nvCxnSpPr>
+        <p:spPr>
+          <a:xfrm>
+            <a:off x="6132095" y="1199384"/>
+            <a:ext cx="4010" cy="319517"/>
+          </a:xfrm>
+          <a:prstGeom prst="straightConnector1">
+            <a:avLst/>
+          </a:prstGeom>
+          <a:ln>
+            <a:headEnd type="triangle"/>
+            <a:tailEnd type="triangle"/>
+          </a:ln>
+        </p:spPr>
+        <p:style>
+          <a:lnRef idx="1">
+            <a:schemeClr val="accent1"/>
+          </a:lnRef>
+          <a:fillRef idx="0">
+            <a:schemeClr val="accent1"/>
+          </a:fillRef>
+          <a:effectRef idx="0">
+            <a:schemeClr val="accent1"/>
+          </a:effectRef>
+          <a:fontRef idx="minor">
+            <a:schemeClr val="tx1"/>
+          </a:fontRef>
+        </p:style>
+      </p:cxnSp>
+      <p:cxnSp>
+        <p:nvCxnSpPr>
+          <p:cNvPr id="42" name="Straight Arrow Connector 41"/>
+          <p:cNvCxnSpPr/>
+          <p:nvPr/>
+        </p:nvCxnSpPr>
+        <p:spPr>
+          <a:xfrm>
+            <a:off x="1961147" y="950495"/>
+            <a:ext cx="3603460" cy="0"/>
+          </a:xfrm>
+          <a:prstGeom prst="straightConnector1">
+            <a:avLst/>
+          </a:prstGeom>
+          <a:ln>
+            <a:tailEnd type="triangle"/>
+          </a:ln>
+        </p:spPr>
+        <p:style>
+          <a:lnRef idx="1">
+            <a:schemeClr val="accent2"/>
+          </a:lnRef>
+          <a:fillRef idx="0">
+            <a:schemeClr val="accent2"/>
+          </a:fillRef>
+          <a:effectRef idx="0">
+            <a:schemeClr val="accent2"/>
+          </a:effectRef>
+          <a:fontRef idx="minor">
+            <a:schemeClr val="tx1"/>
+          </a:fontRef>
+        </p:style>
+      </p:cxnSp>
+      <p:sp>
+        <p:nvSpPr>
+          <p:cNvPr id="44" name="TextBox 43"/>
+          <p:cNvSpPr txBox="1"/>
+          <p:nvPr/>
+        </p:nvSpPr>
+        <p:spPr>
+          <a:xfrm>
+            <a:off x="685800" y="724408"/>
+            <a:ext cx="1636295" cy="369332"/>
+          </a:xfrm>
+          <a:prstGeom prst="rect">
+            <a:avLst/>
+          </a:prstGeom>
+          <a:noFill/>
+        </p:spPr>
+        <p:txBody>
+          <a:bodyPr wrap="square" rtlCol="0">
+            <a:spAutoFit/>
+          </a:bodyPr>
+          <a:lstStyle/>
+          <a:p>
+            <a:r>
+              <a:rPr lang="en-US" dirty="0" smtClean="0"/>
+              <a:t>Client Tier</a:t>
+            </a:r>
+            <a:endParaRPr lang="en-US" dirty="0"/>
+          </a:p>
+        </p:txBody>
+      </p:sp>
+      <p:cxnSp>
+        <p:nvCxnSpPr>
+          <p:cNvPr id="45" name="Straight Arrow Connector 44"/>
+          <p:cNvCxnSpPr/>
+          <p:nvPr/>
+        </p:nvCxnSpPr>
+        <p:spPr>
+          <a:xfrm>
+            <a:off x="1882941" y="3158223"/>
+            <a:ext cx="566699" cy="0"/>
+          </a:xfrm>
+          <a:prstGeom prst="straightConnector1">
+            <a:avLst/>
+          </a:prstGeom>
+          <a:ln>
+            <a:tailEnd type="triangle"/>
+          </a:ln>
+        </p:spPr>
+        <p:style>
+          <a:lnRef idx="1">
+            <a:schemeClr val="accent2"/>
+          </a:lnRef>
+          <a:fillRef idx="0">
+            <a:schemeClr val="accent2"/>
+          </a:fillRef>
+          <a:effectRef idx="0">
+            <a:schemeClr val="accent2"/>
+          </a:effectRef>
+          <a:fontRef idx="minor">
+            <a:schemeClr val="tx1"/>
+          </a:fontRef>
+        </p:style>
+      </p:cxnSp>
+      <p:sp>
+        <p:nvSpPr>
+          <p:cNvPr id="46" name="TextBox 45"/>
+          <p:cNvSpPr txBox="1"/>
+          <p:nvPr/>
+        </p:nvSpPr>
+        <p:spPr>
+          <a:xfrm>
+            <a:off x="607594" y="2932136"/>
+            <a:ext cx="1636295" cy="369332"/>
+          </a:xfrm>
+          <a:prstGeom prst="rect">
+            <a:avLst/>
+          </a:prstGeom>
+          <a:noFill/>
+        </p:spPr>
+        <p:txBody>
+          <a:bodyPr wrap="square" rtlCol="0">
+            <a:spAutoFit/>
+          </a:bodyPr>
+          <a:lstStyle/>
+          <a:p>
+            <a:r>
+              <a:rPr lang="en-US" dirty="0" smtClean="0"/>
+              <a:t>Middle Tier</a:t>
+            </a:r>
+            <a:endParaRPr lang="en-US" dirty="0"/>
+          </a:p>
+        </p:txBody>
+      </p:sp>
+      <p:cxnSp>
+        <p:nvCxnSpPr>
+          <p:cNvPr id="48" name="Straight Arrow Connector 47"/>
+          <p:cNvCxnSpPr/>
+          <p:nvPr/>
+        </p:nvCxnSpPr>
+        <p:spPr>
+          <a:xfrm>
+            <a:off x="1788695" y="6269951"/>
+            <a:ext cx="3603460" cy="0"/>
+          </a:xfrm>
+          <a:prstGeom prst="straightConnector1">
+            <a:avLst/>
+          </a:prstGeom>
+          <a:ln>
+            <a:tailEnd type="triangle"/>
+          </a:ln>
+        </p:spPr>
+        <p:style>
+          <a:lnRef idx="1">
+            <a:schemeClr val="accent2"/>
+          </a:lnRef>
+          <a:fillRef idx="0">
+            <a:schemeClr val="accent2"/>
+          </a:fillRef>
+          <a:effectRef idx="0">
+            <a:schemeClr val="accent2"/>
+          </a:effectRef>
+          <a:fontRef idx="minor">
+            <a:schemeClr val="tx1"/>
+          </a:fontRef>
+        </p:style>
+      </p:cxnSp>
+      <p:sp>
+        <p:nvSpPr>
+          <p:cNvPr id="49" name="TextBox 48"/>
+          <p:cNvSpPr txBox="1"/>
+          <p:nvPr/>
+        </p:nvSpPr>
+        <p:spPr>
+          <a:xfrm>
+            <a:off x="685800" y="6043864"/>
+            <a:ext cx="1636295" cy="369332"/>
+          </a:xfrm>
+          <a:prstGeom prst="rect">
+            <a:avLst/>
+          </a:prstGeom>
+          <a:noFill/>
+        </p:spPr>
+        <p:txBody>
+          <a:bodyPr wrap="square" rtlCol="0">
+            <a:spAutoFit/>
+          </a:bodyPr>
+          <a:lstStyle/>
+          <a:p>
+            <a:r>
+              <a:rPr lang="en-US" dirty="0" smtClean="0"/>
+              <a:t>Data Tier</a:t>
+            </a:r>
+            <a:endParaRPr lang="en-US" dirty="0"/>
+          </a:p>
+        </p:txBody>
+      </p:sp>
+    </p:spTree>
+    <p:extLst>
+      <p:ext uri="{BB962C8B-B14F-4D97-AF65-F5344CB8AC3E}">
+        <p14:creationId xmlns:p14="http://schemas.microsoft.com/office/powerpoint/2010/main" val="1007430170"/>
+      </p:ext>
+    </p:extLst>
+  </p:cSld>
+  <p:clrMapOvr>
+    <a:masterClrMapping/>
+  </p:clrMapOvr>
+</p:sld>
+</file>
+
+<file path=ppt/slides/slide6.xml><?xml version="1.0" encoding="utf-8"?>
+<p:sld xmlns:a="http://schemas.openxmlformats.org/drawingml/2006/main" xmlns:r="http://schemas.openxmlformats.org/officeDocument/2006/relationships" xmlns:p="http://schemas.openxmlformats.org/presentationml/2006/main">
+  <p:cSld>
+    <p:spTree>
+      <p:nvGrpSpPr>
+        <p:cNvPr id="1" name=""/>
+        <p:cNvGrpSpPr/>
+        <p:nvPr/>
+      </p:nvGrpSpPr>
+      <p:grpSpPr>
+        <a:xfrm>
+          <a:off x="0" y="0"/>
+          <a:ext cx="0" cy="0"/>
+          <a:chOff x="0" y="0"/>
+          <a:chExt cx="0" cy="0"/>
+        </a:xfrm>
+      </p:grpSpPr>
+      <p:sp>
+        <p:nvSpPr>
+          <p:cNvPr id="2" name="Title 1"/>
+          <p:cNvSpPr>
+            <a:spLocks noGrp="1"/>
+          </p:cNvSpPr>
+          <p:nvPr>
+            <p:ph type="title"/>
+          </p:nvPr>
+        </p:nvSpPr>
+        <p:spPr/>
+        <p:txBody>
+          <a:bodyPr/>
+          <a:lstStyle/>
+          <a:p>
+            <a:endParaRPr lang="en-US"/>
+          </a:p>
+        </p:txBody>
+      </p:sp>
+      <p:sp>
+        <p:nvSpPr>
+          <p:cNvPr id="3" name="Content Placeholder 2"/>
+          <p:cNvSpPr>
+            <a:spLocks noGrp="1"/>
+          </p:cNvSpPr>
           <p:nvPr>
             <p:ph idx="1"/>
           </p:nvPr>
-        </p:nvPicPr>
-        <p:blipFill>
-          <a:blip r:embed="rId2">
-            <a:extLst>
-              <a:ext uri="{28A0092B-C50C-407E-A947-70E740481C1C}">
-                <a14:useLocalDpi xmlns:a14="http://schemas.microsoft.com/office/drawing/2010/main" val="0"/>
-              </a:ext>
-            </a:extLst>
-          </a:blip>
-          <a:stretch>
-            <a:fillRect/>
-          </a:stretch>
-        </p:blipFill>
-        <p:spPr>
-          <a:xfrm>
-            <a:off x="3717966" y="632766"/>
-            <a:ext cx="4633745" cy="5920220"/>
-          </a:xfrm>
-        </p:spPr>
-      </p:pic>
+        </p:nvSpPr>
+        <p:spPr/>
+        <p:txBody>
+          <a:bodyPr/>
+          <a:lstStyle/>
+          <a:p>
+            <a:endParaRPr lang="en-US"/>
+          </a:p>
+        </p:txBody>
+      </p:sp>
     </p:spTree>
     <p:extLst>
       <p:ext uri="{BB962C8B-B14F-4D97-AF65-F5344CB8AC3E}">
-        <p14:creationId xmlns:p14="http://schemas.microsoft.com/office/powerpoint/2010/main" val="1443751151"/>
+        <p14:creationId xmlns:p14="http://schemas.microsoft.com/office/powerpoint/2010/main" val="3672113205"/>
       </p:ext>
     </p:extLst>
   </p:cSld>

</xml_diff>

<commit_message>
updated powerpoint slide to slide 6
</commit_message>
<xml_diff>
--- a/Technical Documentation/projectpresentation.pptx
+++ b/Technical Documentation/projectpresentation.pptx
@@ -174,7 +174,7 @@
           <a:noFill/>
           <a:extLst>
             <a:ext uri="{909E8E84-426E-40dd-AFC4-6F175D3DCCD1}">
-              <a14:hiddenFill xmlns="" xmlns:a14="http://schemas.microsoft.com/office/drawing/2010/main">
+              <a14:hiddenFill xmlns:a14="http://schemas.microsoft.com/office/drawing/2010/main" xmlns="">
                 <a:solidFill>
                   <a:srgbClr val="FFFFFF"/>
                 </a:solidFill>
@@ -233,7 +233,7 @@
             </a:ln>
             <a:extLst>
               <a:ext uri="{91240B29-F687-4f45-9708-019B960494DF}">
-                <a14:hiddenLine xmlns="" xmlns:a14="http://schemas.microsoft.com/office/drawing/2010/main" w="9525">
+                <a14:hiddenLine xmlns:a14="http://schemas.microsoft.com/office/drawing/2010/main" xmlns="" w="9525">
                   <a:solidFill>
                     <a:srgbClr val="000000"/>
                   </a:solidFill>
@@ -323,7 +323,7 @@
             </a:ln>
             <a:extLst>
               <a:ext uri="{91240B29-F687-4f45-9708-019B960494DF}">
-                <a14:hiddenLine xmlns="" xmlns:a14="http://schemas.microsoft.com/office/drawing/2010/main" w="9525">
+                <a14:hiddenLine xmlns:a14="http://schemas.microsoft.com/office/drawing/2010/main" xmlns="" w="9525">
                   <a:solidFill>
                     <a:srgbClr val="000000"/>
                   </a:solidFill>
@@ -413,7 +413,7 @@
             </a:ln>
             <a:extLst>
               <a:ext uri="{91240B29-F687-4f45-9708-019B960494DF}">
-                <a14:hiddenLine xmlns="" xmlns:a14="http://schemas.microsoft.com/office/drawing/2010/main" w="9525">
+                <a14:hiddenLine xmlns:a14="http://schemas.microsoft.com/office/drawing/2010/main" xmlns="" w="9525">
                   <a:solidFill>
                     <a:srgbClr val="000000"/>
                   </a:solidFill>
@@ -447,7 +447,7 @@
             </a:ln>
             <a:extLst>
               <a:ext uri="{91240B29-F687-4f45-9708-019B960494DF}">
-                <a14:hiddenLine xmlns="" xmlns:a14="http://schemas.microsoft.com/office/drawing/2010/main" w="9525">
+                <a14:hiddenLine xmlns:a14="http://schemas.microsoft.com/office/drawing/2010/main" xmlns="" w="9525">
                   <a:solidFill>
                     <a:srgbClr val="000000"/>
                   </a:solidFill>
@@ -537,7 +537,7 @@
             </a:ln>
             <a:extLst>
               <a:ext uri="{91240B29-F687-4f45-9708-019B960494DF}">
-                <a14:hiddenLine xmlns="" xmlns:a14="http://schemas.microsoft.com/office/drawing/2010/main" w="9525">
+                <a14:hiddenLine xmlns:a14="http://schemas.microsoft.com/office/drawing/2010/main" xmlns="" w="9525">
                   <a:solidFill>
                     <a:srgbClr val="000000"/>
                   </a:solidFill>
@@ -599,7 +599,7 @@
             </a:ln>
             <a:extLst>
               <a:ext uri="{91240B29-F687-4f45-9708-019B960494DF}">
-                <a14:hiddenLine xmlns="" xmlns:a14="http://schemas.microsoft.com/office/drawing/2010/main" w="9525">
+                <a14:hiddenLine xmlns:a14="http://schemas.microsoft.com/office/drawing/2010/main" xmlns="" w="9525">
                   <a:solidFill>
                     <a:srgbClr val="000000"/>
                   </a:solidFill>
@@ -661,7 +661,7 @@
             </a:ln>
             <a:extLst>
               <a:ext uri="{91240B29-F687-4f45-9708-019B960494DF}">
-                <a14:hiddenLine xmlns="" xmlns:a14="http://schemas.microsoft.com/office/drawing/2010/main" w="9525">
+                <a14:hiddenLine xmlns:a14="http://schemas.microsoft.com/office/drawing/2010/main" xmlns="" w="9525">
                   <a:solidFill>
                     <a:srgbClr val="000000"/>
                   </a:solidFill>
@@ -751,7 +751,7 @@
             </a:ln>
             <a:extLst>
               <a:ext uri="{91240B29-F687-4f45-9708-019B960494DF}">
-                <a14:hiddenLine xmlns="" xmlns:a14="http://schemas.microsoft.com/office/drawing/2010/main" w="9525">
+                <a14:hiddenLine xmlns:a14="http://schemas.microsoft.com/office/drawing/2010/main" xmlns="" w="9525">
                   <a:solidFill>
                     <a:srgbClr val="000000"/>
                   </a:solidFill>
@@ -813,7 +813,7 @@
             </a:ln>
             <a:extLst>
               <a:ext uri="{91240B29-F687-4f45-9708-019B960494DF}">
-                <a14:hiddenLine xmlns="" xmlns:a14="http://schemas.microsoft.com/office/drawing/2010/main" w="9525">
+                <a14:hiddenLine xmlns:a14="http://schemas.microsoft.com/office/drawing/2010/main" xmlns="" w="9525">
                   <a:solidFill>
                     <a:srgbClr val="000000"/>
                   </a:solidFill>
@@ -875,7 +875,7 @@
             </a:ln>
             <a:extLst>
               <a:ext uri="{91240B29-F687-4f45-9708-019B960494DF}">
-                <a14:hiddenLine xmlns="" xmlns:a14="http://schemas.microsoft.com/office/drawing/2010/main" w="9525">
+                <a14:hiddenLine xmlns:a14="http://schemas.microsoft.com/office/drawing/2010/main" xmlns="" w="9525">
                   <a:solidFill>
                     <a:srgbClr val="000000"/>
                   </a:solidFill>
@@ -965,7 +965,7 @@
             </a:ln>
             <a:extLst>
               <a:ext uri="{91240B29-F687-4f45-9708-019B960494DF}">
-                <a14:hiddenLine xmlns="" xmlns:a14="http://schemas.microsoft.com/office/drawing/2010/main" w="9525">
+                <a14:hiddenLine xmlns:a14="http://schemas.microsoft.com/office/drawing/2010/main" xmlns="" w="9525">
                   <a:solidFill>
                     <a:srgbClr val="000000"/>
                   </a:solidFill>
@@ -1055,7 +1055,7 @@
             </a:ln>
             <a:extLst>
               <a:ext uri="{91240B29-F687-4f45-9708-019B960494DF}">
-                <a14:hiddenLine xmlns="" xmlns:a14="http://schemas.microsoft.com/office/drawing/2010/main" w="9525">
+                <a14:hiddenLine xmlns:a14="http://schemas.microsoft.com/office/drawing/2010/main" xmlns="" w="9525">
                   <a:solidFill>
                     <a:srgbClr val="000000"/>
                   </a:solidFill>
@@ -1117,7 +1117,7 @@
             </a:ln>
             <a:extLst>
               <a:ext uri="{91240B29-F687-4f45-9708-019B960494DF}">
-                <a14:hiddenLine xmlns="" xmlns:a14="http://schemas.microsoft.com/office/drawing/2010/main" w="9525">
+                <a14:hiddenLine xmlns:a14="http://schemas.microsoft.com/office/drawing/2010/main" xmlns="" w="9525">
                   <a:solidFill>
                     <a:srgbClr val="000000"/>
                   </a:solidFill>
@@ -1227,7 +1227,7 @@
             </a:ln>
             <a:extLst>
               <a:ext uri="{91240B29-F687-4f45-9708-019B960494DF}">
-                <a14:hiddenLine xmlns="" xmlns:a14="http://schemas.microsoft.com/office/drawing/2010/main" w="9525">
+                <a14:hiddenLine xmlns:a14="http://schemas.microsoft.com/office/drawing/2010/main" xmlns="" w="9525">
                   <a:solidFill>
                     <a:srgbClr val="000000"/>
                   </a:solidFill>
@@ -1289,7 +1289,7 @@
             </a:ln>
             <a:extLst>
               <a:ext uri="{91240B29-F687-4f45-9708-019B960494DF}">
-                <a14:hiddenLine xmlns="" xmlns:a14="http://schemas.microsoft.com/office/drawing/2010/main" w="9525">
+                <a14:hiddenLine xmlns:a14="http://schemas.microsoft.com/office/drawing/2010/main" xmlns="" w="9525">
                   <a:solidFill>
                     <a:srgbClr val="000000"/>
                   </a:solidFill>
@@ -1379,7 +1379,7 @@
             </a:ln>
             <a:extLst>
               <a:ext uri="{91240B29-F687-4f45-9708-019B960494DF}">
-                <a14:hiddenLine xmlns="" xmlns:a14="http://schemas.microsoft.com/office/drawing/2010/main" w="9525">
+                <a14:hiddenLine xmlns:a14="http://schemas.microsoft.com/office/drawing/2010/main" xmlns="" w="9525">
                   <a:solidFill>
                     <a:srgbClr val="000000"/>
                   </a:solidFill>
@@ -1469,7 +1469,7 @@
             </a:ln>
             <a:extLst>
               <a:ext uri="{91240B29-F687-4f45-9708-019B960494DF}">
-                <a14:hiddenLine xmlns="" xmlns:a14="http://schemas.microsoft.com/office/drawing/2010/main" w="9525">
+                <a14:hiddenLine xmlns:a14="http://schemas.microsoft.com/office/drawing/2010/main" xmlns="" w="9525">
                   <a:solidFill>
                     <a:srgbClr val="000000"/>
                   </a:solidFill>
@@ -1531,7 +1531,7 @@
             </a:ln>
             <a:extLst>
               <a:ext uri="{91240B29-F687-4f45-9708-019B960494DF}">
-                <a14:hiddenLine xmlns="" xmlns:a14="http://schemas.microsoft.com/office/drawing/2010/main" w="9525">
+                <a14:hiddenLine xmlns:a14="http://schemas.microsoft.com/office/drawing/2010/main" xmlns="" w="9525">
                   <a:solidFill>
                     <a:srgbClr val="000000"/>
                   </a:solidFill>
@@ -1621,7 +1621,7 @@
             </a:ln>
             <a:extLst>
               <a:ext uri="{91240B29-F687-4f45-9708-019B960494DF}">
-                <a14:hiddenLine xmlns="" xmlns:a14="http://schemas.microsoft.com/office/drawing/2010/main" w="9525">
+                <a14:hiddenLine xmlns:a14="http://schemas.microsoft.com/office/drawing/2010/main" xmlns="" w="9525">
                   <a:solidFill>
                     <a:srgbClr val="000000"/>
                   </a:solidFill>
@@ -1711,7 +1711,7 @@
             </a:ln>
             <a:extLst>
               <a:ext uri="{91240B29-F687-4f45-9708-019B960494DF}">
-                <a14:hiddenLine xmlns="" xmlns:a14="http://schemas.microsoft.com/office/drawing/2010/main" w="9525">
+                <a14:hiddenLine xmlns:a14="http://schemas.microsoft.com/office/drawing/2010/main" xmlns="" w="9525">
                   <a:solidFill>
                     <a:srgbClr val="000000"/>
                   </a:solidFill>
@@ -1767,7 +1767,7 @@
             </a:ln>
             <a:extLst>
               <a:ext uri="{91240B29-F687-4f45-9708-019B960494DF}">
-                <a14:hiddenLine xmlns="" xmlns:a14="http://schemas.microsoft.com/office/drawing/2010/main" w="9525">
+                <a14:hiddenLine xmlns:a14="http://schemas.microsoft.com/office/drawing/2010/main" xmlns="" w="9525">
                   <a:solidFill>
                     <a:srgbClr val="000000"/>
                   </a:solidFill>
@@ -1857,7 +1857,7 @@
             </a:ln>
             <a:extLst>
               <a:ext uri="{91240B29-F687-4f45-9708-019B960494DF}">
-                <a14:hiddenLine xmlns="" xmlns:a14="http://schemas.microsoft.com/office/drawing/2010/main" w="9525">
+                <a14:hiddenLine xmlns:a14="http://schemas.microsoft.com/office/drawing/2010/main" xmlns="" w="9525">
                   <a:solidFill>
                     <a:srgbClr val="000000"/>
                   </a:solidFill>
@@ -1913,7 +1913,7 @@
             </a:ln>
             <a:extLst>
               <a:ext uri="{91240B29-F687-4f45-9708-019B960494DF}">
-                <a14:hiddenLine xmlns="" xmlns:a14="http://schemas.microsoft.com/office/drawing/2010/main" w="9525">
+                <a14:hiddenLine xmlns:a14="http://schemas.microsoft.com/office/drawing/2010/main" xmlns="" w="9525">
                   <a:solidFill>
                     <a:srgbClr val="000000"/>
                   </a:solidFill>
@@ -2003,7 +2003,7 @@
             </a:ln>
             <a:extLst>
               <a:ext uri="{91240B29-F687-4f45-9708-019B960494DF}">
-                <a14:hiddenLine xmlns="" xmlns:a14="http://schemas.microsoft.com/office/drawing/2010/main" w="9525">
+                <a14:hiddenLine xmlns:a14="http://schemas.microsoft.com/office/drawing/2010/main" xmlns="" w="9525">
                   <a:solidFill>
                     <a:srgbClr val="000000"/>
                   </a:solidFill>
@@ -2071,7 +2071,7 @@
             </a:ln>
             <a:extLst>
               <a:ext uri="{91240B29-F687-4f45-9708-019B960494DF}">
-                <a14:hiddenLine xmlns="" xmlns:a14="http://schemas.microsoft.com/office/drawing/2010/main" w="9525">
+                <a14:hiddenLine xmlns:a14="http://schemas.microsoft.com/office/drawing/2010/main" xmlns="" w="9525">
                   <a:solidFill>
                     <a:srgbClr val="000000"/>
                   </a:solidFill>
@@ -2161,7 +2161,7 @@
             </a:ln>
             <a:extLst>
               <a:ext uri="{91240B29-F687-4f45-9708-019B960494DF}">
-                <a14:hiddenLine xmlns="" xmlns:a14="http://schemas.microsoft.com/office/drawing/2010/main" w="9525">
+                <a14:hiddenLine xmlns:a14="http://schemas.microsoft.com/office/drawing/2010/main" xmlns="" w="9525">
                   <a:solidFill>
                     <a:srgbClr val="000000"/>
                   </a:solidFill>
@@ -2229,7 +2229,7 @@
             </a:ln>
             <a:extLst>
               <a:ext uri="{91240B29-F687-4f45-9708-019B960494DF}">
-                <a14:hiddenLine xmlns="" xmlns:a14="http://schemas.microsoft.com/office/drawing/2010/main" w="9525">
+                <a14:hiddenLine xmlns:a14="http://schemas.microsoft.com/office/drawing/2010/main" xmlns="" w="9525">
                   <a:solidFill>
                     <a:srgbClr val="000000"/>
                   </a:solidFill>
@@ -2319,7 +2319,7 @@
             </a:ln>
             <a:extLst>
               <a:ext uri="{91240B29-F687-4f45-9708-019B960494DF}">
-                <a14:hiddenLine xmlns="" xmlns:a14="http://schemas.microsoft.com/office/drawing/2010/main" w="9525">
+                <a14:hiddenLine xmlns:a14="http://schemas.microsoft.com/office/drawing/2010/main" xmlns="" w="9525">
                   <a:solidFill>
                     <a:srgbClr val="000000"/>
                   </a:solidFill>
@@ -2353,7 +2353,7 @@
             </a:ln>
             <a:extLst>
               <a:ext uri="{91240B29-F687-4f45-9708-019B960494DF}">
-                <a14:hiddenLine xmlns="" xmlns:a14="http://schemas.microsoft.com/office/drawing/2010/main" w="9525">
+                <a14:hiddenLine xmlns:a14="http://schemas.microsoft.com/office/drawing/2010/main" xmlns="" w="9525">
                   <a:solidFill>
                     <a:srgbClr val="000000"/>
                   </a:solidFill>
@@ -2443,7 +2443,7 @@
             </a:ln>
             <a:extLst>
               <a:ext uri="{91240B29-F687-4f45-9708-019B960494DF}">
-                <a14:hiddenLine xmlns="" xmlns:a14="http://schemas.microsoft.com/office/drawing/2010/main" w="9525">
+                <a14:hiddenLine xmlns:a14="http://schemas.microsoft.com/office/drawing/2010/main" xmlns="" w="9525">
                   <a:solidFill>
                     <a:srgbClr val="000000"/>
                   </a:solidFill>
@@ -2505,7 +2505,7 @@
             </a:ln>
             <a:extLst>
               <a:ext uri="{91240B29-F687-4f45-9708-019B960494DF}">
-                <a14:hiddenLine xmlns="" xmlns:a14="http://schemas.microsoft.com/office/drawing/2010/main" w="9525">
+                <a14:hiddenLine xmlns:a14="http://schemas.microsoft.com/office/drawing/2010/main" xmlns="" w="9525">
                   <a:solidFill>
                     <a:srgbClr val="000000"/>
                   </a:solidFill>
@@ -2567,7 +2567,7 @@
             </a:ln>
             <a:extLst>
               <a:ext uri="{91240B29-F687-4f45-9708-019B960494DF}">
-                <a14:hiddenLine xmlns="" xmlns:a14="http://schemas.microsoft.com/office/drawing/2010/main" w="9525">
+                <a14:hiddenLine xmlns:a14="http://schemas.microsoft.com/office/drawing/2010/main" xmlns="" w="9525">
                   <a:solidFill>
                     <a:srgbClr val="000000"/>
                   </a:solidFill>
@@ -2657,7 +2657,7 @@
             </a:ln>
             <a:extLst>
               <a:ext uri="{91240B29-F687-4f45-9708-019B960494DF}">
-                <a14:hiddenLine xmlns="" xmlns:a14="http://schemas.microsoft.com/office/drawing/2010/main" w="9525">
+                <a14:hiddenLine xmlns:a14="http://schemas.microsoft.com/office/drawing/2010/main" xmlns="" w="9525">
                   <a:solidFill>
                     <a:srgbClr val="000000"/>
                   </a:solidFill>
@@ -2725,7 +2725,7 @@
             </a:ln>
             <a:extLst>
               <a:ext uri="{91240B29-F687-4f45-9708-019B960494DF}">
-                <a14:hiddenLine xmlns="" xmlns:a14="http://schemas.microsoft.com/office/drawing/2010/main" w="9525">
+                <a14:hiddenLine xmlns:a14="http://schemas.microsoft.com/office/drawing/2010/main" xmlns="" w="9525">
                   <a:solidFill>
                     <a:srgbClr val="000000"/>
                   </a:solidFill>
@@ -2787,7 +2787,7 @@
             </a:ln>
             <a:extLst>
               <a:ext uri="{91240B29-F687-4f45-9708-019B960494DF}">
-                <a14:hiddenLine xmlns="" xmlns:a14="http://schemas.microsoft.com/office/drawing/2010/main" w="9525">
+                <a14:hiddenLine xmlns:a14="http://schemas.microsoft.com/office/drawing/2010/main" xmlns="" w="9525">
                   <a:solidFill>
                     <a:srgbClr val="000000"/>
                   </a:solidFill>
@@ -2877,7 +2877,7 @@
             </a:ln>
             <a:extLst>
               <a:ext uri="{91240B29-F687-4f45-9708-019B960494DF}">
-                <a14:hiddenLine xmlns="" xmlns:a14="http://schemas.microsoft.com/office/drawing/2010/main" w="9525">
+                <a14:hiddenLine xmlns:a14="http://schemas.microsoft.com/office/drawing/2010/main" xmlns="" w="9525">
                   <a:solidFill>
                     <a:srgbClr val="000000"/>
                   </a:solidFill>
@@ -2939,7 +2939,7 @@
             </a:ln>
             <a:extLst>
               <a:ext uri="{91240B29-F687-4f45-9708-019B960494DF}">
-                <a14:hiddenLine xmlns="" xmlns:a14="http://schemas.microsoft.com/office/drawing/2010/main" w="9525">
+                <a14:hiddenLine xmlns:a14="http://schemas.microsoft.com/office/drawing/2010/main" xmlns="" w="9525">
                   <a:solidFill>
                     <a:srgbClr val="000000"/>
                   </a:solidFill>
@@ -3029,7 +3029,7 @@
             </a:ln>
             <a:extLst>
               <a:ext uri="{91240B29-F687-4f45-9708-019B960494DF}">
-                <a14:hiddenLine xmlns="" xmlns:a14="http://schemas.microsoft.com/office/drawing/2010/main" w="9525">
+                <a14:hiddenLine xmlns:a14="http://schemas.microsoft.com/office/drawing/2010/main" xmlns="" w="9525">
                   <a:solidFill>
                     <a:srgbClr val="000000"/>
                   </a:solidFill>
@@ -3091,7 +3091,7 @@
             </a:ln>
             <a:extLst>
               <a:ext uri="{91240B29-F687-4f45-9708-019B960494DF}">
-                <a14:hiddenLine xmlns="" xmlns:a14="http://schemas.microsoft.com/office/drawing/2010/main" w="9525">
+                <a14:hiddenLine xmlns:a14="http://schemas.microsoft.com/office/drawing/2010/main" xmlns="" w="9525">
                   <a:solidFill>
                     <a:srgbClr val="000000"/>
                   </a:solidFill>
@@ -3181,7 +3181,7 @@
             </a:ln>
             <a:extLst>
               <a:ext uri="{91240B29-F687-4f45-9708-019B960494DF}">
-                <a14:hiddenLine xmlns="" xmlns:a14="http://schemas.microsoft.com/office/drawing/2010/main" w="9525">
+                <a14:hiddenLine xmlns:a14="http://schemas.microsoft.com/office/drawing/2010/main" xmlns="" w="9525">
                   <a:solidFill>
                     <a:srgbClr val="000000"/>
                   </a:solidFill>
@@ -3215,7 +3215,7 @@
             </a:ln>
             <a:extLst>
               <a:ext uri="{91240B29-F687-4f45-9708-019B960494DF}">
-                <a14:hiddenLine xmlns="" xmlns:a14="http://schemas.microsoft.com/office/drawing/2010/main" w="9525">
+                <a14:hiddenLine xmlns:a14="http://schemas.microsoft.com/office/drawing/2010/main" xmlns="" w="9525">
                   <a:solidFill>
                     <a:srgbClr val="000000"/>
                   </a:solidFill>
@@ -3280,7 +3280,7 @@
             </a:ln>
             <a:extLst>
               <a:ext uri="{91240B29-F687-4f45-9708-019B960494DF}">
-                <a14:hiddenLine xmlns="" xmlns:a14="http://schemas.microsoft.com/office/drawing/2010/main" w="9525">
+                <a14:hiddenLine xmlns:a14="http://schemas.microsoft.com/office/drawing/2010/main" xmlns="" w="9525">
                   <a:solidFill>
                     <a:srgbClr val="000000"/>
                   </a:solidFill>
@@ -3370,7 +3370,7 @@
             </a:ln>
             <a:extLst>
               <a:ext uri="{91240B29-F687-4f45-9708-019B960494DF}">
-                <a14:hiddenLine xmlns="" xmlns:a14="http://schemas.microsoft.com/office/drawing/2010/main" w="9525">
+                <a14:hiddenLine xmlns:a14="http://schemas.microsoft.com/office/drawing/2010/main" xmlns="" w="9525">
                   <a:solidFill>
                     <a:srgbClr val="000000"/>
                   </a:solidFill>
@@ -3432,7 +3432,7 @@
             </a:ln>
             <a:extLst>
               <a:ext uri="{91240B29-F687-4f45-9708-019B960494DF}">
-                <a14:hiddenLine xmlns="" xmlns:a14="http://schemas.microsoft.com/office/drawing/2010/main" w="9525">
+                <a14:hiddenLine xmlns:a14="http://schemas.microsoft.com/office/drawing/2010/main" xmlns="" w="9525">
                   <a:solidFill>
                     <a:srgbClr val="000000"/>
                   </a:solidFill>
@@ -3522,7 +3522,7 @@
             </a:ln>
             <a:extLst>
               <a:ext uri="{91240B29-F687-4f45-9708-019B960494DF}">
-                <a14:hiddenLine xmlns="" xmlns:a14="http://schemas.microsoft.com/office/drawing/2010/main" w="9525">
+                <a14:hiddenLine xmlns:a14="http://schemas.microsoft.com/office/drawing/2010/main" xmlns="" w="9525">
                   <a:solidFill>
                     <a:srgbClr val="000000"/>
                   </a:solidFill>
@@ -3612,7 +3612,7 @@
             </a:ln>
             <a:extLst>
               <a:ext uri="{91240B29-F687-4f45-9708-019B960494DF}">
-                <a14:hiddenLine xmlns="" xmlns:a14="http://schemas.microsoft.com/office/drawing/2010/main" w="9525">
+                <a14:hiddenLine xmlns:a14="http://schemas.microsoft.com/office/drawing/2010/main" xmlns="" w="9525">
                   <a:solidFill>
                     <a:srgbClr val="000000"/>
                   </a:solidFill>
@@ -3677,7 +3677,7 @@
             </a:ln>
             <a:extLst>
               <a:ext uri="{91240B29-F687-4f45-9708-019B960494DF}">
-                <a14:hiddenLine xmlns="" xmlns:a14="http://schemas.microsoft.com/office/drawing/2010/main" w="9525">
+                <a14:hiddenLine xmlns:a14="http://schemas.microsoft.com/office/drawing/2010/main" xmlns="" w="9525">
                   <a:solidFill>
                     <a:srgbClr val="000000"/>
                   </a:solidFill>
@@ -3739,7 +3739,7 @@
             </a:ln>
             <a:extLst>
               <a:ext uri="{91240B29-F687-4f45-9708-019B960494DF}">
-                <a14:hiddenLine xmlns="" xmlns:a14="http://schemas.microsoft.com/office/drawing/2010/main" w="9525">
+                <a14:hiddenLine xmlns:a14="http://schemas.microsoft.com/office/drawing/2010/main" xmlns="" w="9525">
                   <a:solidFill>
                     <a:srgbClr val="000000"/>
                   </a:solidFill>
@@ -3829,7 +3829,7 @@
             </a:ln>
             <a:extLst>
               <a:ext uri="{91240B29-F687-4f45-9708-019B960494DF}">
-                <a14:hiddenLine xmlns="" xmlns:a14="http://schemas.microsoft.com/office/drawing/2010/main" w="9525">
+                <a14:hiddenLine xmlns:a14="http://schemas.microsoft.com/office/drawing/2010/main" xmlns="" w="9525">
                   <a:solidFill>
                     <a:srgbClr val="000000"/>
                   </a:solidFill>
@@ -3919,7 +3919,7 @@
             </a:ln>
             <a:extLst>
               <a:ext uri="{91240B29-F687-4f45-9708-019B960494DF}">
-                <a14:hiddenLine xmlns="" xmlns:a14="http://schemas.microsoft.com/office/drawing/2010/main" w="9525">
+                <a14:hiddenLine xmlns:a14="http://schemas.microsoft.com/office/drawing/2010/main" xmlns="" w="9525">
                   <a:solidFill>
                     <a:srgbClr val="000000"/>
                   </a:solidFill>
@@ -3981,7 +3981,7 @@
             </a:ln>
             <a:extLst>
               <a:ext uri="{91240B29-F687-4f45-9708-019B960494DF}">
-                <a14:hiddenLine xmlns="" xmlns:a14="http://schemas.microsoft.com/office/drawing/2010/main" w="9525">
+                <a14:hiddenLine xmlns:a14="http://schemas.microsoft.com/office/drawing/2010/main" xmlns="" w="9525">
                   <a:solidFill>
                     <a:srgbClr val="000000"/>
                   </a:solidFill>
@@ -4101,7 +4101,7 @@
             </a:ln>
             <a:extLst>
               <a:ext uri="{91240B29-F687-4f45-9708-019B960494DF}">
-                <a14:hiddenLine xmlns="" xmlns:a14="http://schemas.microsoft.com/office/drawing/2010/main" w="9525">
+                <a14:hiddenLine xmlns:a14="http://schemas.microsoft.com/office/drawing/2010/main" xmlns="" w="9525">
                   <a:solidFill>
                     <a:srgbClr val="000000"/>
                   </a:solidFill>
@@ -4169,7 +4169,7 @@
             </a:ln>
             <a:extLst>
               <a:ext uri="{91240B29-F687-4f45-9708-019B960494DF}">
-                <a14:hiddenLine xmlns="" xmlns:a14="http://schemas.microsoft.com/office/drawing/2010/main" w="9525">
+                <a14:hiddenLine xmlns:a14="http://schemas.microsoft.com/office/drawing/2010/main" xmlns="" w="9525">
                   <a:solidFill>
                     <a:srgbClr val="000000"/>
                   </a:solidFill>
@@ -4259,7 +4259,7 @@
             </a:ln>
             <a:extLst>
               <a:ext uri="{91240B29-F687-4f45-9708-019B960494DF}">
-                <a14:hiddenLine xmlns="" xmlns:a14="http://schemas.microsoft.com/office/drawing/2010/main" w="9525">
+                <a14:hiddenLine xmlns:a14="http://schemas.microsoft.com/office/drawing/2010/main" xmlns="" w="9525">
                   <a:solidFill>
                     <a:srgbClr val="000000"/>
                   </a:solidFill>
@@ -9073,7 +9073,7 @@
           <a:noFill/>
           <a:extLst>
             <a:ext uri="{909E8E84-426E-40dd-AFC4-6F175D3DCCD1}">
-              <a14:hiddenFill xmlns="" xmlns:a14="http://schemas.microsoft.com/office/drawing/2010/main">
+              <a14:hiddenFill xmlns:a14="http://schemas.microsoft.com/office/drawing/2010/main" xmlns="">
                 <a:solidFill>
                   <a:srgbClr val="FFFFFF"/>
                 </a:solidFill>
@@ -9147,7 +9147,7 @@
               </a:ln>
               <a:extLst>
                 <a:ext uri="{91240B29-F687-4f45-9708-019B960494DF}">
-                  <a14:hiddenLine xmlns="" xmlns:a14="http://schemas.microsoft.com/office/drawing/2010/main" w="9525">
+                  <a14:hiddenLine xmlns:a14="http://schemas.microsoft.com/office/drawing/2010/main" xmlns="" w="9525">
                     <a:solidFill>
                       <a:srgbClr val="000000"/>
                     </a:solidFill>
@@ -9237,7 +9237,7 @@
               </a:ln>
               <a:extLst>
                 <a:ext uri="{91240B29-F687-4f45-9708-019B960494DF}">
-                  <a14:hiddenLine xmlns="" xmlns:a14="http://schemas.microsoft.com/office/drawing/2010/main" w="9525">
+                  <a14:hiddenLine xmlns:a14="http://schemas.microsoft.com/office/drawing/2010/main" xmlns="" w="9525">
                     <a:solidFill>
                       <a:srgbClr val="000000"/>
                     </a:solidFill>
@@ -9327,7 +9327,7 @@
               </a:ln>
               <a:extLst>
                 <a:ext uri="{91240B29-F687-4f45-9708-019B960494DF}">
-                  <a14:hiddenLine xmlns="" xmlns:a14="http://schemas.microsoft.com/office/drawing/2010/main" w="9525">
+                  <a14:hiddenLine xmlns:a14="http://schemas.microsoft.com/office/drawing/2010/main" xmlns="" w="9525">
                     <a:solidFill>
                       <a:srgbClr val="000000"/>
                     </a:solidFill>
@@ -9389,7 +9389,7 @@
               </a:ln>
               <a:extLst>
                 <a:ext uri="{91240B29-F687-4f45-9708-019B960494DF}">
-                  <a14:hiddenLine xmlns="" xmlns:a14="http://schemas.microsoft.com/office/drawing/2010/main" w="9525">
+                  <a14:hiddenLine xmlns:a14="http://schemas.microsoft.com/office/drawing/2010/main" xmlns="" w="9525">
                     <a:solidFill>
                       <a:srgbClr val="000000"/>
                     </a:solidFill>
@@ -9479,7 +9479,7 @@
               </a:ln>
               <a:extLst>
                 <a:ext uri="{91240B29-F687-4f45-9708-019B960494DF}">
-                  <a14:hiddenLine xmlns="" xmlns:a14="http://schemas.microsoft.com/office/drawing/2010/main" w="9525">
+                  <a14:hiddenLine xmlns:a14="http://schemas.microsoft.com/office/drawing/2010/main" xmlns="" w="9525">
                     <a:solidFill>
                       <a:srgbClr val="000000"/>
                     </a:solidFill>
@@ -9541,7 +9541,7 @@
               </a:ln>
               <a:extLst>
                 <a:ext uri="{91240B29-F687-4f45-9708-019B960494DF}">
-                  <a14:hiddenLine xmlns="" xmlns:a14="http://schemas.microsoft.com/office/drawing/2010/main" w="9525">
+                  <a14:hiddenLine xmlns:a14="http://schemas.microsoft.com/office/drawing/2010/main" xmlns="" w="9525">
                     <a:solidFill>
                       <a:srgbClr val="000000"/>
                     </a:solidFill>
@@ -9603,7 +9603,7 @@
               </a:ln>
               <a:extLst>
                 <a:ext uri="{91240B29-F687-4f45-9708-019B960494DF}">
-                  <a14:hiddenLine xmlns="" xmlns:a14="http://schemas.microsoft.com/office/drawing/2010/main" w="9525">
+                  <a14:hiddenLine xmlns:a14="http://schemas.microsoft.com/office/drawing/2010/main" xmlns="" w="9525">
                     <a:solidFill>
                       <a:srgbClr val="000000"/>
                     </a:solidFill>
@@ -9693,7 +9693,7 @@
               </a:ln>
               <a:extLst>
                 <a:ext uri="{91240B29-F687-4f45-9708-019B960494DF}">
-                  <a14:hiddenLine xmlns="" xmlns:a14="http://schemas.microsoft.com/office/drawing/2010/main" w="9525">
+                  <a14:hiddenLine xmlns:a14="http://schemas.microsoft.com/office/drawing/2010/main" xmlns="" w="9525">
                     <a:solidFill>
                       <a:srgbClr val="000000"/>
                     </a:solidFill>
@@ -9783,7 +9783,7 @@
               </a:ln>
               <a:extLst>
                 <a:ext uri="{91240B29-F687-4f45-9708-019B960494DF}">
-                  <a14:hiddenLine xmlns="" xmlns:a14="http://schemas.microsoft.com/office/drawing/2010/main" w="9525">
+                  <a14:hiddenLine xmlns:a14="http://schemas.microsoft.com/office/drawing/2010/main" xmlns="" w="9525">
                     <a:solidFill>
                       <a:srgbClr val="000000"/>
                     </a:solidFill>
@@ -9845,7 +9845,7 @@
               </a:ln>
               <a:extLst>
                 <a:ext uri="{91240B29-F687-4f45-9708-019B960494DF}">
-                  <a14:hiddenLine xmlns="" xmlns:a14="http://schemas.microsoft.com/office/drawing/2010/main" w="9525">
+                  <a14:hiddenLine xmlns:a14="http://schemas.microsoft.com/office/drawing/2010/main" xmlns="" w="9525">
                     <a:solidFill>
                       <a:srgbClr val="000000"/>
                     </a:solidFill>
@@ -9955,7 +9955,7 @@
               </a:ln>
               <a:extLst>
                 <a:ext uri="{91240B29-F687-4f45-9708-019B960494DF}">
-                  <a14:hiddenLine xmlns="" xmlns:a14="http://schemas.microsoft.com/office/drawing/2010/main" w="9525">
+                  <a14:hiddenLine xmlns:a14="http://schemas.microsoft.com/office/drawing/2010/main" xmlns="" w="9525">
                     <a:solidFill>
                       <a:srgbClr val="000000"/>
                     </a:solidFill>
@@ -10039,7 +10039,7 @@
               </a:ln>
               <a:extLst>
                 <a:ext uri="{91240B29-F687-4f45-9708-019B960494DF}">
-                  <a14:hiddenLine xmlns="" xmlns:a14="http://schemas.microsoft.com/office/drawing/2010/main" w="9525">
+                  <a14:hiddenLine xmlns:a14="http://schemas.microsoft.com/office/drawing/2010/main" xmlns="" w="9525">
                     <a:solidFill>
                       <a:srgbClr val="000000"/>
                     </a:solidFill>
@@ -10101,7 +10101,7 @@
               </a:ln>
               <a:extLst>
                 <a:ext uri="{91240B29-F687-4f45-9708-019B960494DF}">
-                  <a14:hiddenLine xmlns="" xmlns:a14="http://schemas.microsoft.com/office/drawing/2010/main" w="9525">
+                  <a14:hiddenLine xmlns:a14="http://schemas.microsoft.com/office/drawing/2010/main" xmlns="" w="9525">
                     <a:solidFill>
                       <a:srgbClr val="000000"/>
                     </a:solidFill>
@@ -10163,7 +10163,7 @@
               </a:ln>
               <a:extLst>
                 <a:ext uri="{91240B29-F687-4f45-9708-019B960494DF}">
-                  <a14:hiddenLine xmlns="" xmlns:a14="http://schemas.microsoft.com/office/drawing/2010/main" w="9525">
+                  <a14:hiddenLine xmlns:a14="http://schemas.microsoft.com/office/drawing/2010/main" xmlns="" w="9525">
                     <a:solidFill>
                       <a:srgbClr val="000000"/>
                     </a:solidFill>
@@ -10253,7 +10253,7 @@
               </a:ln>
               <a:extLst>
                 <a:ext uri="{91240B29-F687-4f45-9708-019B960494DF}">
-                  <a14:hiddenLine xmlns="" xmlns:a14="http://schemas.microsoft.com/office/drawing/2010/main" w="9525">
+                  <a14:hiddenLine xmlns:a14="http://schemas.microsoft.com/office/drawing/2010/main" xmlns="" w="9525">
                     <a:solidFill>
                       <a:srgbClr val="000000"/>
                     </a:solidFill>
@@ -10287,7 +10287,7 @@
               </a:ln>
               <a:extLst>
                 <a:ext uri="{91240B29-F687-4f45-9708-019B960494DF}">
-                  <a14:hiddenLine xmlns="" xmlns:a14="http://schemas.microsoft.com/office/drawing/2010/main" w="9525">
+                  <a14:hiddenLine xmlns:a14="http://schemas.microsoft.com/office/drawing/2010/main" xmlns="" w="9525">
                     <a:solidFill>
                       <a:srgbClr val="000000"/>
                     </a:solidFill>
@@ -10352,7 +10352,7 @@
               </a:ln>
               <a:extLst>
                 <a:ext uri="{91240B29-F687-4f45-9708-019B960494DF}">
-                  <a14:hiddenLine xmlns="" xmlns:a14="http://schemas.microsoft.com/office/drawing/2010/main" w="9525">
+                  <a14:hiddenLine xmlns:a14="http://schemas.microsoft.com/office/drawing/2010/main" xmlns="" w="9525">
                     <a:solidFill>
                       <a:srgbClr val="000000"/>
                     </a:solidFill>
@@ -10442,7 +10442,7 @@
               </a:ln>
               <a:extLst>
                 <a:ext uri="{91240B29-F687-4f45-9708-019B960494DF}">
-                  <a14:hiddenLine xmlns="" xmlns:a14="http://schemas.microsoft.com/office/drawing/2010/main" w="9525">
+                  <a14:hiddenLine xmlns:a14="http://schemas.microsoft.com/office/drawing/2010/main" xmlns="" w="9525">
                     <a:solidFill>
                       <a:srgbClr val="000000"/>
                     </a:solidFill>
@@ -10504,7 +10504,7 @@
               </a:ln>
               <a:extLst>
                 <a:ext uri="{91240B29-F687-4f45-9708-019B960494DF}">
-                  <a14:hiddenLine xmlns="" xmlns:a14="http://schemas.microsoft.com/office/drawing/2010/main" w="9525">
+                  <a14:hiddenLine xmlns:a14="http://schemas.microsoft.com/office/drawing/2010/main" xmlns="" w="9525">
                     <a:solidFill>
                       <a:srgbClr val="000000"/>
                     </a:solidFill>
@@ -10594,7 +10594,7 @@
               </a:ln>
               <a:extLst>
                 <a:ext uri="{91240B29-F687-4f45-9708-019B960494DF}">
-                  <a14:hiddenLine xmlns="" xmlns:a14="http://schemas.microsoft.com/office/drawing/2010/main" w="9525">
+                  <a14:hiddenLine xmlns:a14="http://schemas.microsoft.com/office/drawing/2010/main" xmlns="" w="9525">
                     <a:solidFill>
                       <a:srgbClr val="000000"/>
                     </a:solidFill>
@@ -10659,7 +10659,7 @@
               </a:ln>
               <a:extLst>
                 <a:ext uri="{91240B29-F687-4f45-9708-019B960494DF}">
-                  <a14:hiddenLine xmlns="" xmlns:a14="http://schemas.microsoft.com/office/drawing/2010/main" w="9525">
+                  <a14:hiddenLine xmlns:a14="http://schemas.microsoft.com/office/drawing/2010/main" xmlns="" w="9525">
                     <a:solidFill>
                       <a:srgbClr val="000000"/>
                     </a:solidFill>
@@ -10721,7 +10721,7 @@
               </a:ln>
               <a:extLst>
                 <a:ext uri="{91240B29-F687-4f45-9708-019B960494DF}">
-                  <a14:hiddenLine xmlns="" xmlns:a14="http://schemas.microsoft.com/office/drawing/2010/main" w="9525">
+                  <a14:hiddenLine xmlns:a14="http://schemas.microsoft.com/office/drawing/2010/main" xmlns="" w="9525">
                     <a:solidFill>
                       <a:srgbClr val="000000"/>
                     </a:solidFill>
@@ -10811,7 +10811,7 @@
               </a:ln>
               <a:extLst>
                 <a:ext uri="{91240B29-F687-4f45-9708-019B960494DF}">
-                  <a14:hiddenLine xmlns="" xmlns:a14="http://schemas.microsoft.com/office/drawing/2010/main" w="9525">
+                  <a14:hiddenLine xmlns:a14="http://schemas.microsoft.com/office/drawing/2010/main" xmlns="" w="9525">
                     <a:solidFill>
                       <a:srgbClr val="000000"/>
                     </a:solidFill>
@@ -10901,7 +10901,7 @@
               </a:ln>
               <a:extLst>
                 <a:ext uri="{91240B29-F687-4f45-9708-019B960494DF}">
-                  <a14:hiddenLine xmlns="" xmlns:a14="http://schemas.microsoft.com/office/drawing/2010/main" w="9525">
+                  <a14:hiddenLine xmlns:a14="http://schemas.microsoft.com/office/drawing/2010/main" xmlns="" w="9525">
                     <a:solidFill>
                       <a:srgbClr val="000000"/>
                     </a:solidFill>
@@ -10966,7 +10966,7 @@
               </a:ln>
               <a:extLst>
                 <a:ext uri="{91240B29-F687-4f45-9708-019B960494DF}">
-                  <a14:hiddenLine xmlns="" xmlns:a14="http://schemas.microsoft.com/office/drawing/2010/main" w="9525">
+                  <a14:hiddenLine xmlns:a14="http://schemas.microsoft.com/office/drawing/2010/main" xmlns="" w="9525">
                     <a:solidFill>
                       <a:srgbClr val="000000"/>
                     </a:solidFill>
@@ -11086,7 +11086,7 @@
               </a:ln>
               <a:extLst>
                 <a:ext uri="{91240B29-F687-4f45-9708-019B960494DF}">
-                  <a14:hiddenLine xmlns="" xmlns:a14="http://schemas.microsoft.com/office/drawing/2010/main" w="9525">
+                  <a14:hiddenLine xmlns:a14="http://schemas.microsoft.com/office/drawing/2010/main" xmlns="" w="9525">
                     <a:solidFill>
                       <a:srgbClr val="000000"/>
                     </a:solidFill>
@@ -11167,7 +11167,7 @@
               </a:ln>
               <a:extLst>
                 <a:ext uri="{91240B29-F687-4f45-9708-019B960494DF}">
-                  <a14:hiddenLine xmlns="" xmlns:a14="http://schemas.microsoft.com/office/drawing/2010/main" w="9525">
+                  <a14:hiddenLine xmlns:a14="http://schemas.microsoft.com/office/drawing/2010/main" xmlns="" w="9525">
                     <a:solidFill>
                       <a:srgbClr val="000000"/>
                     </a:solidFill>
@@ -11282,7 +11282,7 @@
               </a:ln>
               <a:extLst>
                 <a:ext uri="{91240B29-F687-4f45-9708-019B960494DF}">
-                  <a14:hiddenLine xmlns="" xmlns:a14="http://schemas.microsoft.com/office/drawing/2010/main" w="9525">
+                  <a14:hiddenLine xmlns:a14="http://schemas.microsoft.com/office/drawing/2010/main" xmlns="" w="9525">
                     <a:solidFill>
                       <a:srgbClr val="000000"/>
                     </a:solidFill>
@@ -11372,7 +11372,7 @@
               </a:ln>
               <a:extLst>
                 <a:ext uri="{91240B29-F687-4f45-9708-019B960494DF}">
-                  <a14:hiddenLine xmlns="" xmlns:a14="http://schemas.microsoft.com/office/drawing/2010/main" w="9525">
+                  <a14:hiddenLine xmlns:a14="http://schemas.microsoft.com/office/drawing/2010/main" xmlns="" w="9525">
                     <a:solidFill>
                       <a:srgbClr val="000000"/>
                     </a:solidFill>
@@ -11437,7 +11437,7 @@
               </a:ln>
               <a:extLst>
                 <a:ext uri="{91240B29-F687-4f45-9708-019B960494DF}">
-                  <a14:hiddenLine xmlns="" xmlns:a14="http://schemas.microsoft.com/office/drawing/2010/main" w="9525">
+                  <a14:hiddenLine xmlns:a14="http://schemas.microsoft.com/office/drawing/2010/main" xmlns="" w="9525">
                     <a:solidFill>
                       <a:srgbClr val="000000"/>
                     </a:solidFill>
@@ -11527,7 +11527,7 @@
               </a:ln>
               <a:extLst>
                 <a:ext uri="{91240B29-F687-4f45-9708-019B960494DF}">
-                  <a14:hiddenLine xmlns="" xmlns:a14="http://schemas.microsoft.com/office/drawing/2010/main" w="9525">
+                  <a14:hiddenLine xmlns:a14="http://schemas.microsoft.com/office/drawing/2010/main" xmlns="" w="9525">
                     <a:solidFill>
                       <a:srgbClr val="000000"/>
                     </a:solidFill>
@@ -11595,7 +11595,7 @@
               </a:ln>
               <a:extLst>
                 <a:ext uri="{91240B29-F687-4f45-9708-019B960494DF}">
-                  <a14:hiddenLine xmlns="" xmlns:a14="http://schemas.microsoft.com/office/drawing/2010/main" w="9525">
+                  <a14:hiddenLine xmlns:a14="http://schemas.microsoft.com/office/drawing/2010/main" xmlns="" w="9525">
                     <a:solidFill>
                       <a:srgbClr val="000000"/>
                     </a:solidFill>
@@ -11685,7 +11685,7 @@
               </a:ln>
               <a:extLst>
                 <a:ext uri="{91240B29-F687-4f45-9708-019B960494DF}">
-                  <a14:hiddenLine xmlns="" xmlns:a14="http://schemas.microsoft.com/office/drawing/2010/main" w="9525">
+                  <a14:hiddenLine xmlns:a14="http://schemas.microsoft.com/office/drawing/2010/main" xmlns="" w="9525">
                     <a:solidFill>
                       <a:srgbClr val="000000"/>
                     </a:solidFill>
@@ -11753,7 +11753,7 @@
               </a:ln>
               <a:extLst>
                 <a:ext uri="{91240B29-F687-4f45-9708-019B960494DF}">
-                  <a14:hiddenLine xmlns="" xmlns:a14="http://schemas.microsoft.com/office/drawing/2010/main" w="9525">
+                  <a14:hiddenLine xmlns:a14="http://schemas.microsoft.com/office/drawing/2010/main" xmlns="" w="9525">
                     <a:solidFill>
                       <a:srgbClr val="000000"/>
                     </a:solidFill>
@@ -11843,7 +11843,7 @@
               </a:ln>
               <a:extLst>
                 <a:ext uri="{91240B29-F687-4f45-9708-019B960494DF}">
-                  <a14:hiddenLine xmlns="" xmlns:a14="http://schemas.microsoft.com/office/drawing/2010/main" w="9525">
+                  <a14:hiddenLine xmlns:a14="http://schemas.microsoft.com/office/drawing/2010/main" xmlns="" w="9525">
                     <a:solidFill>
                       <a:srgbClr val="000000"/>
                     </a:solidFill>
@@ -11877,7 +11877,7 @@
               </a:ln>
               <a:extLst>
                 <a:ext uri="{91240B29-F687-4f45-9708-019B960494DF}">
-                  <a14:hiddenLine xmlns="" xmlns:a14="http://schemas.microsoft.com/office/drawing/2010/main" w="9525">
+                  <a14:hiddenLine xmlns:a14="http://schemas.microsoft.com/office/drawing/2010/main" xmlns="" w="9525">
                     <a:solidFill>
                       <a:srgbClr val="000000"/>
                     </a:solidFill>
@@ -12670,15 +12670,7 @@
           <a:p>
             <a:r>
               <a:rPr lang="en-US" dirty="0" smtClean="0"/>
-              <a:t>What is </a:t>
-            </a:r>
-            <a:r>
-              <a:rPr lang="en-US" dirty="0" err="1" smtClean="0"/>
-              <a:t>salmans</a:t>
-            </a:r>
-            <a:r>
-              <a:rPr lang="en-US" dirty="0" smtClean="0"/>
-              <a:t>?</a:t>
+              <a:t>What is salmans?</a:t>
             </a:r>
             <a:endParaRPr lang="en-US" dirty="0"/>
           </a:p>
@@ -12857,7 +12849,7 @@
         <p:spPr>
           <a:xfrm>
             <a:off x="1714613" y="770021"/>
-            <a:ext cx="8807115" cy="5643700"/>
+            <a:ext cx="8807114" cy="5643700"/>
           </a:xfrm>
         </p:spPr>
       </p:pic>

</xml_diff>

<commit_message>
Completed the powerpoint slide
</commit_message>
<xml_diff>
--- a/Technical Documentation/projectpresentation.pptx
+++ b/Technical Documentation/projectpresentation.pptx
@@ -4399,7 +4399,7 @@
           <a:p>
             <a:fld id="{48A87A34-81AB-432B-8DAE-1953F412C126}" type="datetimeFigureOut">
               <a:rPr lang="en-US" smtClean="0"/>
-              <a:t>26-Jul-19</a:t>
+              <a:t>27-Jul-19</a:t>
             </a:fld>
             <a:endParaRPr lang="en-US" dirty="0"/>
           </a:p>
@@ -4666,7 +4666,7 @@
           <a:p>
             <a:fld id="{48A87A34-81AB-432B-8DAE-1953F412C126}" type="datetimeFigureOut">
               <a:rPr lang="en-US" smtClean="0"/>
-              <a:t>26-Jul-19</a:t>
+              <a:t>27-Jul-19</a:t>
             </a:fld>
             <a:endParaRPr lang="en-US" dirty="0"/>
           </a:p>
@@ -4862,7 +4862,7 @@
           <a:p>
             <a:fld id="{48A87A34-81AB-432B-8DAE-1953F412C126}" type="datetimeFigureOut">
               <a:rPr lang="en-US" smtClean="0"/>
-              <a:t>26-Jul-19</a:t>
+              <a:t>27-Jul-19</a:t>
             </a:fld>
             <a:endParaRPr lang="en-US" dirty="0"/>
           </a:p>
@@ -5125,7 +5125,7 @@
           <a:p>
             <a:fld id="{48A87A34-81AB-432B-8DAE-1953F412C126}" type="datetimeFigureOut">
               <a:rPr lang="en-US" smtClean="0"/>
-              <a:t>26-Jul-19</a:t>
+              <a:t>27-Jul-19</a:t>
             </a:fld>
             <a:endParaRPr lang="en-US" dirty="0"/>
           </a:p>
@@ -5559,7 +5559,7 @@
           <a:p>
             <a:fld id="{48A87A34-81AB-432B-8DAE-1953F412C126}" type="datetimeFigureOut">
               <a:rPr lang="en-US" smtClean="0"/>
-              <a:t>26-Jul-19</a:t>
+              <a:t>27-Jul-19</a:t>
             </a:fld>
             <a:endParaRPr lang="en-US" dirty="0"/>
           </a:p>
@@ -6105,7 +6105,7 @@
           <a:p>
             <a:fld id="{48A87A34-81AB-432B-8DAE-1953F412C126}" type="datetimeFigureOut">
               <a:rPr lang="en-US" smtClean="0"/>
-              <a:t>26-Jul-19</a:t>
+              <a:t>27-Jul-19</a:t>
             </a:fld>
             <a:endParaRPr lang="en-US" dirty="0"/>
           </a:p>
@@ -6825,7 +6825,7 @@
           <a:p>
             <a:fld id="{48A87A34-81AB-432B-8DAE-1953F412C126}" type="datetimeFigureOut">
               <a:rPr lang="en-US" smtClean="0"/>
-              <a:t>26-Jul-19</a:t>
+              <a:t>27-Jul-19</a:t>
             </a:fld>
             <a:endParaRPr lang="en-US" dirty="0"/>
           </a:p>
@@ -6995,7 +6995,7 @@
           <a:p>
             <a:fld id="{48A87A34-81AB-432B-8DAE-1953F412C126}" type="datetimeFigureOut">
               <a:rPr lang="en-US" smtClean="0"/>
-              <a:t>26-Jul-19</a:t>
+              <a:t>27-Jul-19</a:t>
             </a:fld>
             <a:endParaRPr lang="en-US" dirty="0"/>
           </a:p>
@@ -7175,7 +7175,7 @@
           <a:p>
             <a:fld id="{48A87A34-81AB-432B-8DAE-1953F412C126}" type="datetimeFigureOut">
               <a:rPr lang="en-US" smtClean="0"/>
-              <a:t>26-Jul-19</a:t>
+              <a:t>27-Jul-19</a:t>
             </a:fld>
             <a:endParaRPr lang="en-US" dirty="0"/>
           </a:p>
@@ -7345,7 +7345,7 @@
           <a:p>
             <a:fld id="{48A87A34-81AB-432B-8DAE-1953F412C126}" type="datetimeFigureOut">
               <a:rPr lang="en-US" smtClean="0"/>
-              <a:t>26-Jul-19</a:t>
+              <a:t>27-Jul-19</a:t>
             </a:fld>
             <a:endParaRPr lang="en-US" dirty="0"/>
           </a:p>
@@ -7595,7 +7595,7 @@
           <a:p>
             <a:fld id="{48A87A34-81AB-432B-8DAE-1953F412C126}" type="datetimeFigureOut">
               <a:rPr lang="en-US" smtClean="0"/>
-              <a:t>26-Jul-19</a:t>
+              <a:t>27-Jul-19</a:t>
             </a:fld>
             <a:endParaRPr lang="en-US" dirty="0"/>
           </a:p>
@@ -7827,7 +7827,7 @@
           <a:p>
             <a:fld id="{48A87A34-81AB-432B-8DAE-1953F412C126}" type="datetimeFigureOut">
               <a:rPr lang="en-US" smtClean="0"/>
-              <a:t>26-Jul-19</a:t>
+              <a:t>27-Jul-19</a:t>
             </a:fld>
             <a:endParaRPr lang="en-US" dirty="0"/>
           </a:p>
@@ -8208,7 +8208,7 @@
           <a:p>
             <a:fld id="{48A87A34-81AB-432B-8DAE-1953F412C126}" type="datetimeFigureOut">
               <a:rPr lang="en-US" smtClean="0"/>
-              <a:t>26-Jul-19</a:t>
+              <a:t>27-Jul-19</a:t>
             </a:fld>
             <a:endParaRPr lang="en-US" dirty="0"/>
           </a:p>
@@ -8326,7 +8326,7 @@
           <a:p>
             <a:fld id="{48A87A34-81AB-432B-8DAE-1953F412C126}" type="datetimeFigureOut">
               <a:rPr lang="en-US" smtClean="0"/>
-              <a:t>26-Jul-19</a:t>
+              <a:t>27-Jul-19</a:t>
             </a:fld>
             <a:endParaRPr lang="en-US" dirty="0"/>
           </a:p>
@@ -8421,7 +8421,7 @@
           <a:p>
             <a:fld id="{48A87A34-81AB-432B-8DAE-1953F412C126}" type="datetimeFigureOut">
               <a:rPr lang="en-US" smtClean="0"/>
-              <a:t>26-Jul-19</a:t>
+              <a:t>27-Jul-19</a:t>
             </a:fld>
             <a:endParaRPr lang="en-US" dirty="0"/>
           </a:p>
@@ -8670,7 +8670,7 @@
           <a:p>
             <a:fld id="{48A87A34-81AB-432B-8DAE-1953F412C126}" type="datetimeFigureOut">
               <a:rPr lang="en-US" smtClean="0"/>
-              <a:t>26-Jul-19</a:t>
+              <a:t>27-Jul-19</a:t>
             </a:fld>
             <a:endParaRPr lang="en-US" dirty="0"/>
           </a:p>
@@ -8950,7 +8950,7 @@
           <a:p>
             <a:fld id="{48A87A34-81AB-432B-8DAE-1953F412C126}" type="datetimeFigureOut">
               <a:rPr lang="en-US" smtClean="0"/>
-              <a:t>26-Jul-19</a:t>
+              <a:t>27-Jul-19</a:t>
             </a:fld>
             <a:endParaRPr lang="en-US" dirty="0"/>
           </a:p>
@@ -12018,7 +12018,7 @@
             <a:fld id="{48A87A34-81AB-432B-8DAE-1953F412C126}" type="datetimeFigureOut">
               <a:rPr lang="en-US" smtClean="0"/>
               <a:pPr/>
-              <a:t>26-Jul-19</a:t>
+              <a:t>27-Jul-19</a:t>
             </a:fld>
             <a:endParaRPr lang="en-US" dirty="0"/>
           </a:p>
@@ -13740,9 +13740,9 @@
             </p:nvGrpSpPr>
             <p:grpSpPr>
               <a:xfrm>
-                <a:off x="7361529" y="4130855"/>
+                <a:off x="7361529" y="4010613"/>
                 <a:ext cx="1469063" cy="389441"/>
-                <a:chOff x="6637214" y="4392187"/>
+                <a:chOff x="6637214" y="4271945"/>
                 <a:chExt cx="1469063" cy="389441"/>
               </a:xfrm>
             </p:grpSpPr>
@@ -13754,7 +13754,7 @@
               </p:nvSpPr>
               <p:spPr>
                 <a:xfrm>
-                  <a:off x="6637214" y="4392187"/>
+                  <a:off x="6637214" y="4271945"/>
                   <a:ext cx="1469063" cy="389441"/>
                 </a:xfrm>
                 <a:prstGeom prst="rect">
@@ -13794,7 +13794,7 @@
               </p:nvSpPr>
               <p:spPr>
                 <a:xfrm>
-                  <a:off x="7044492" y="4412296"/>
+                  <a:off x="7044492" y="4292054"/>
                   <a:ext cx="762208" cy="369332"/>
                 </a:xfrm>
                 <a:prstGeom prst="rect">
@@ -13948,10 +13948,10 @@
             </p:nvGrpSpPr>
             <p:grpSpPr>
               <a:xfrm>
-                <a:off x="5277058" y="3848080"/>
-                <a:ext cx="1469063" cy="389441"/>
-                <a:chOff x="6637213" y="2932465"/>
-                <a:chExt cx="1469063" cy="389441"/>
+                <a:off x="8144170" y="4400054"/>
+                <a:ext cx="686422" cy="401346"/>
+                <a:chOff x="9504325" y="3484439"/>
+                <a:chExt cx="686422" cy="401346"/>
               </a:xfrm>
             </p:grpSpPr>
             <p:sp>
@@ -13962,8 +13962,8 @@
               </p:nvSpPr>
               <p:spPr>
                 <a:xfrm>
-                  <a:off x="6637213" y="2932465"/>
-                  <a:ext cx="1469063" cy="389441"/>
+                  <a:off x="9504325" y="3484439"/>
+                  <a:ext cx="686422" cy="389441"/>
                 </a:xfrm>
                 <a:prstGeom prst="rect">
                   <a:avLst/>
@@ -14002,7 +14002,7 @@
               </p:nvSpPr>
               <p:spPr>
                 <a:xfrm>
-                  <a:off x="7044489" y="2952574"/>
+                  <a:off x="9511568" y="3516453"/>
                   <a:ext cx="654510" cy="369332"/>
                 </a:xfrm>
                 <a:prstGeom prst="rect">
@@ -14332,39 +14332,66 @@
       </p:grpSpPr>
       <p:sp>
         <p:nvSpPr>
-          <p:cNvPr id="2" name="Title 1"/>
-          <p:cNvSpPr>
-            <a:spLocks noGrp="1"/>
-          </p:cNvSpPr>
-          <p:nvPr>
-            <p:ph type="title"/>
-          </p:nvPr>
+          <p:cNvPr id="4" name="Rectangle 3"/>
+          <p:cNvSpPr/>
+          <p:nvPr/>
         </p:nvSpPr>
-        <p:spPr/>
+        <p:spPr>
+          <a:xfrm>
+            <a:off x="2767263" y="2695075"/>
+            <a:ext cx="6364705" cy="1323439"/>
+          </a:xfrm>
+          <a:prstGeom prst="rect">
+            <a:avLst/>
+          </a:prstGeom>
+          <a:noFill/>
+        </p:spPr>
         <p:txBody>
-          <a:bodyPr/>
+          <a:bodyPr wrap="square" lIns="91440" tIns="45720" rIns="91440" bIns="45720">
+            <a:spAutoFit/>
+          </a:bodyPr>
           <a:lstStyle/>
           <a:p>
-            <a:endParaRPr lang="en-US"/>
-          </a:p>
-        </p:txBody>
-      </p:sp>
-      <p:sp>
-        <p:nvSpPr>
-          <p:cNvPr id="3" name="Content Placeholder 2"/>
-          <p:cNvSpPr>
-            <a:spLocks noGrp="1"/>
-          </p:cNvSpPr>
-          <p:nvPr>
-            <p:ph idx="1"/>
-          </p:nvPr>
-        </p:nvSpPr>
-        <p:spPr/>
-        <p:txBody>
-          <a:bodyPr/>
-          <a:lstStyle/>
-          <a:p>
-            <a:endParaRPr lang="en-US"/>
+            <a:pPr algn="ctr"/>
+            <a:r>
+              <a:rPr lang="en-US" sz="8000" b="1" dirty="0" smtClean="0">
+                <a:ln w="10160">
+                  <a:solidFill>
+                    <a:schemeClr val="accent5"/>
+                  </a:solidFill>
+                  <a:prstDash val="solid"/>
+                </a:ln>
+                <a:solidFill>
+                  <a:srgbClr val="FFFFFF"/>
+                </a:solidFill>
+                <a:effectLst>
+                  <a:outerShdw blurRad="38100" dist="22860" dir="5400000" algn="tl" rotWithShape="0">
+                    <a:srgbClr val="000000">
+                      <a:alpha val="30000"/>
+                    </a:srgbClr>
+                  </a:outerShdw>
+                </a:effectLst>
+              </a:rPr>
+              <a:t>THANK YOU</a:t>
+            </a:r>
+            <a:endParaRPr lang="en-US" sz="8000" b="1" cap="none" spc="0" dirty="0">
+              <a:ln w="10160">
+                <a:solidFill>
+                  <a:schemeClr val="accent5"/>
+                </a:solidFill>
+                <a:prstDash val="solid"/>
+              </a:ln>
+              <a:solidFill>
+                <a:srgbClr val="FFFFFF"/>
+              </a:solidFill>
+              <a:effectLst>
+                <a:outerShdw blurRad="38100" dist="22860" dir="5400000" algn="tl" rotWithShape="0">
+                  <a:srgbClr val="000000">
+                    <a:alpha val="30000"/>
+                  </a:srgbClr>
+                </a:outerShdw>
+              </a:effectLst>
+            </a:endParaRPr>
           </a:p>
         </p:txBody>
       </p:sp>

</xml_diff>

<commit_message>
Updated Slide for presentation
</commit_message>
<xml_diff>
--- a/Technical Documentation/projectpresentation.pptx
+++ b/Technical Documentation/projectpresentation.pptx
@@ -8,9 +8,10 @@
     <p:sldId id="256" r:id="rId2"/>
     <p:sldId id="257" r:id="rId3"/>
     <p:sldId id="258" r:id="rId4"/>
-    <p:sldId id="259" r:id="rId5"/>
-    <p:sldId id="263" r:id="rId6"/>
-    <p:sldId id="261" r:id="rId7"/>
+    <p:sldId id="264" r:id="rId5"/>
+    <p:sldId id="259" r:id="rId6"/>
+    <p:sldId id="263" r:id="rId7"/>
+    <p:sldId id="261" r:id="rId8"/>
   </p:sldIdLst>
   <p:sldSz cx="12192000" cy="6858000"/>
   <p:notesSz cx="6858000" cy="9144000"/>
@@ -174,7 +175,7 @@
           <a:noFill/>
           <a:extLst>
             <a:ext uri="{909E8E84-426E-40dd-AFC4-6F175D3DCCD1}">
-              <a14:hiddenFill xmlns:a14="http://schemas.microsoft.com/office/drawing/2010/main" xmlns="">
+              <a14:hiddenFill xmlns="" xmlns:a14="http://schemas.microsoft.com/office/drawing/2010/main">
                 <a:solidFill>
                   <a:srgbClr val="FFFFFF"/>
                 </a:solidFill>
@@ -233,7 +234,7 @@
             </a:ln>
             <a:extLst>
               <a:ext uri="{91240B29-F687-4f45-9708-019B960494DF}">
-                <a14:hiddenLine xmlns:a14="http://schemas.microsoft.com/office/drawing/2010/main" xmlns="" w="9525">
+                <a14:hiddenLine xmlns="" xmlns:a14="http://schemas.microsoft.com/office/drawing/2010/main" w="9525">
                   <a:solidFill>
                     <a:srgbClr val="000000"/>
                   </a:solidFill>
@@ -323,7 +324,7 @@
             </a:ln>
             <a:extLst>
               <a:ext uri="{91240B29-F687-4f45-9708-019B960494DF}">
-                <a14:hiddenLine xmlns:a14="http://schemas.microsoft.com/office/drawing/2010/main" xmlns="" w="9525">
+                <a14:hiddenLine xmlns="" xmlns:a14="http://schemas.microsoft.com/office/drawing/2010/main" w="9525">
                   <a:solidFill>
                     <a:srgbClr val="000000"/>
                   </a:solidFill>
@@ -413,7 +414,7 @@
             </a:ln>
             <a:extLst>
               <a:ext uri="{91240B29-F687-4f45-9708-019B960494DF}">
-                <a14:hiddenLine xmlns:a14="http://schemas.microsoft.com/office/drawing/2010/main" xmlns="" w="9525">
+                <a14:hiddenLine xmlns="" xmlns:a14="http://schemas.microsoft.com/office/drawing/2010/main" w="9525">
                   <a:solidFill>
                     <a:srgbClr val="000000"/>
                   </a:solidFill>
@@ -447,7 +448,7 @@
             </a:ln>
             <a:extLst>
               <a:ext uri="{91240B29-F687-4f45-9708-019B960494DF}">
-                <a14:hiddenLine xmlns:a14="http://schemas.microsoft.com/office/drawing/2010/main" xmlns="" w="9525">
+                <a14:hiddenLine xmlns="" xmlns:a14="http://schemas.microsoft.com/office/drawing/2010/main" w="9525">
                   <a:solidFill>
                     <a:srgbClr val="000000"/>
                   </a:solidFill>
@@ -537,7 +538,7 @@
             </a:ln>
             <a:extLst>
               <a:ext uri="{91240B29-F687-4f45-9708-019B960494DF}">
-                <a14:hiddenLine xmlns:a14="http://schemas.microsoft.com/office/drawing/2010/main" xmlns="" w="9525">
+                <a14:hiddenLine xmlns="" xmlns:a14="http://schemas.microsoft.com/office/drawing/2010/main" w="9525">
                   <a:solidFill>
                     <a:srgbClr val="000000"/>
                   </a:solidFill>
@@ -599,7 +600,7 @@
             </a:ln>
             <a:extLst>
               <a:ext uri="{91240B29-F687-4f45-9708-019B960494DF}">
-                <a14:hiddenLine xmlns:a14="http://schemas.microsoft.com/office/drawing/2010/main" xmlns="" w="9525">
+                <a14:hiddenLine xmlns="" xmlns:a14="http://schemas.microsoft.com/office/drawing/2010/main" w="9525">
                   <a:solidFill>
                     <a:srgbClr val="000000"/>
                   </a:solidFill>
@@ -661,7 +662,7 @@
             </a:ln>
             <a:extLst>
               <a:ext uri="{91240B29-F687-4f45-9708-019B960494DF}">
-                <a14:hiddenLine xmlns:a14="http://schemas.microsoft.com/office/drawing/2010/main" xmlns="" w="9525">
+                <a14:hiddenLine xmlns="" xmlns:a14="http://schemas.microsoft.com/office/drawing/2010/main" w="9525">
                   <a:solidFill>
                     <a:srgbClr val="000000"/>
                   </a:solidFill>
@@ -751,7 +752,7 @@
             </a:ln>
             <a:extLst>
               <a:ext uri="{91240B29-F687-4f45-9708-019B960494DF}">
-                <a14:hiddenLine xmlns:a14="http://schemas.microsoft.com/office/drawing/2010/main" xmlns="" w="9525">
+                <a14:hiddenLine xmlns="" xmlns:a14="http://schemas.microsoft.com/office/drawing/2010/main" w="9525">
                   <a:solidFill>
                     <a:srgbClr val="000000"/>
                   </a:solidFill>
@@ -813,7 +814,7 @@
             </a:ln>
             <a:extLst>
               <a:ext uri="{91240B29-F687-4f45-9708-019B960494DF}">
-                <a14:hiddenLine xmlns:a14="http://schemas.microsoft.com/office/drawing/2010/main" xmlns="" w="9525">
+                <a14:hiddenLine xmlns="" xmlns:a14="http://schemas.microsoft.com/office/drawing/2010/main" w="9525">
                   <a:solidFill>
                     <a:srgbClr val="000000"/>
                   </a:solidFill>
@@ -875,7 +876,7 @@
             </a:ln>
             <a:extLst>
               <a:ext uri="{91240B29-F687-4f45-9708-019B960494DF}">
-                <a14:hiddenLine xmlns:a14="http://schemas.microsoft.com/office/drawing/2010/main" xmlns="" w="9525">
+                <a14:hiddenLine xmlns="" xmlns:a14="http://schemas.microsoft.com/office/drawing/2010/main" w="9525">
                   <a:solidFill>
                     <a:srgbClr val="000000"/>
                   </a:solidFill>
@@ -965,7 +966,7 @@
             </a:ln>
             <a:extLst>
               <a:ext uri="{91240B29-F687-4f45-9708-019B960494DF}">
-                <a14:hiddenLine xmlns:a14="http://schemas.microsoft.com/office/drawing/2010/main" xmlns="" w="9525">
+                <a14:hiddenLine xmlns="" xmlns:a14="http://schemas.microsoft.com/office/drawing/2010/main" w="9525">
                   <a:solidFill>
                     <a:srgbClr val="000000"/>
                   </a:solidFill>
@@ -1055,7 +1056,7 @@
             </a:ln>
             <a:extLst>
               <a:ext uri="{91240B29-F687-4f45-9708-019B960494DF}">
-                <a14:hiddenLine xmlns:a14="http://schemas.microsoft.com/office/drawing/2010/main" xmlns="" w="9525">
+                <a14:hiddenLine xmlns="" xmlns:a14="http://schemas.microsoft.com/office/drawing/2010/main" w="9525">
                   <a:solidFill>
                     <a:srgbClr val="000000"/>
                   </a:solidFill>
@@ -1117,7 +1118,7 @@
             </a:ln>
             <a:extLst>
               <a:ext uri="{91240B29-F687-4f45-9708-019B960494DF}">
-                <a14:hiddenLine xmlns:a14="http://schemas.microsoft.com/office/drawing/2010/main" xmlns="" w="9525">
+                <a14:hiddenLine xmlns="" xmlns:a14="http://schemas.microsoft.com/office/drawing/2010/main" w="9525">
                   <a:solidFill>
                     <a:srgbClr val="000000"/>
                   </a:solidFill>
@@ -1227,7 +1228,7 @@
             </a:ln>
             <a:extLst>
               <a:ext uri="{91240B29-F687-4f45-9708-019B960494DF}">
-                <a14:hiddenLine xmlns:a14="http://schemas.microsoft.com/office/drawing/2010/main" xmlns="" w="9525">
+                <a14:hiddenLine xmlns="" xmlns:a14="http://schemas.microsoft.com/office/drawing/2010/main" w="9525">
                   <a:solidFill>
                     <a:srgbClr val="000000"/>
                   </a:solidFill>
@@ -1289,7 +1290,7 @@
             </a:ln>
             <a:extLst>
               <a:ext uri="{91240B29-F687-4f45-9708-019B960494DF}">
-                <a14:hiddenLine xmlns:a14="http://schemas.microsoft.com/office/drawing/2010/main" xmlns="" w="9525">
+                <a14:hiddenLine xmlns="" xmlns:a14="http://schemas.microsoft.com/office/drawing/2010/main" w="9525">
                   <a:solidFill>
                     <a:srgbClr val="000000"/>
                   </a:solidFill>
@@ -1379,7 +1380,7 @@
             </a:ln>
             <a:extLst>
               <a:ext uri="{91240B29-F687-4f45-9708-019B960494DF}">
-                <a14:hiddenLine xmlns:a14="http://schemas.microsoft.com/office/drawing/2010/main" xmlns="" w="9525">
+                <a14:hiddenLine xmlns="" xmlns:a14="http://schemas.microsoft.com/office/drawing/2010/main" w="9525">
                   <a:solidFill>
                     <a:srgbClr val="000000"/>
                   </a:solidFill>
@@ -1469,7 +1470,7 @@
             </a:ln>
             <a:extLst>
               <a:ext uri="{91240B29-F687-4f45-9708-019B960494DF}">
-                <a14:hiddenLine xmlns:a14="http://schemas.microsoft.com/office/drawing/2010/main" xmlns="" w="9525">
+                <a14:hiddenLine xmlns="" xmlns:a14="http://schemas.microsoft.com/office/drawing/2010/main" w="9525">
                   <a:solidFill>
                     <a:srgbClr val="000000"/>
                   </a:solidFill>
@@ -1531,7 +1532,7 @@
             </a:ln>
             <a:extLst>
               <a:ext uri="{91240B29-F687-4f45-9708-019B960494DF}">
-                <a14:hiddenLine xmlns:a14="http://schemas.microsoft.com/office/drawing/2010/main" xmlns="" w="9525">
+                <a14:hiddenLine xmlns="" xmlns:a14="http://schemas.microsoft.com/office/drawing/2010/main" w="9525">
                   <a:solidFill>
                     <a:srgbClr val="000000"/>
                   </a:solidFill>
@@ -1621,7 +1622,7 @@
             </a:ln>
             <a:extLst>
               <a:ext uri="{91240B29-F687-4f45-9708-019B960494DF}">
-                <a14:hiddenLine xmlns:a14="http://schemas.microsoft.com/office/drawing/2010/main" xmlns="" w="9525">
+                <a14:hiddenLine xmlns="" xmlns:a14="http://schemas.microsoft.com/office/drawing/2010/main" w="9525">
                   <a:solidFill>
                     <a:srgbClr val="000000"/>
                   </a:solidFill>
@@ -1711,7 +1712,7 @@
             </a:ln>
             <a:extLst>
               <a:ext uri="{91240B29-F687-4f45-9708-019B960494DF}">
-                <a14:hiddenLine xmlns:a14="http://schemas.microsoft.com/office/drawing/2010/main" xmlns="" w="9525">
+                <a14:hiddenLine xmlns="" xmlns:a14="http://schemas.microsoft.com/office/drawing/2010/main" w="9525">
                   <a:solidFill>
                     <a:srgbClr val="000000"/>
                   </a:solidFill>
@@ -1767,7 +1768,7 @@
             </a:ln>
             <a:extLst>
               <a:ext uri="{91240B29-F687-4f45-9708-019B960494DF}">
-                <a14:hiddenLine xmlns:a14="http://schemas.microsoft.com/office/drawing/2010/main" xmlns="" w="9525">
+                <a14:hiddenLine xmlns="" xmlns:a14="http://schemas.microsoft.com/office/drawing/2010/main" w="9525">
                   <a:solidFill>
                     <a:srgbClr val="000000"/>
                   </a:solidFill>
@@ -1857,7 +1858,7 @@
             </a:ln>
             <a:extLst>
               <a:ext uri="{91240B29-F687-4f45-9708-019B960494DF}">
-                <a14:hiddenLine xmlns:a14="http://schemas.microsoft.com/office/drawing/2010/main" xmlns="" w="9525">
+                <a14:hiddenLine xmlns="" xmlns:a14="http://schemas.microsoft.com/office/drawing/2010/main" w="9525">
                   <a:solidFill>
                     <a:srgbClr val="000000"/>
                   </a:solidFill>
@@ -1913,7 +1914,7 @@
             </a:ln>
             <a:extLst>
               <a:ext uri="{91240B29-F687-4f45-9708-019B960494DF}">
-                <a14:hiddenLine xmlns:a14="http://schemas.microsoft.com/office/drawing/2010/main" xmlns="" w="9525">
+                <a14:hiddenLine xmlns="" xmlns:a14="http://schemas.microsoft.com/office/drawing/2010/main" w="9525">
                   <a:solidFill>
                     <a:srgbClr val="000000"/>
                   </a:solidFill>
@@ -2003,7 +2004,7 @@
             </a:ln>
             <a:extLst>
               <a:ext uri="{91240B29-F687-4f45-9708-019B960494DF}">
-                <a14:hiddenLine xmlns:a14="http://schemas.microsoft.com/office/drawing/2010/main" xmlns="" w="9525">
+                <a14:hiddenLine xmlns="" xmlns:a14="http://schemas.microsoft.com/office/drawing/2010/main" w="9525">
                   <a:solidFill>
                     <a:srgbClr val="000000"/>
                   </a:solidFill>
@@ -2071,7 +2072,7 @@
             </a:ln>
             <a:extLst>
               <a:ext uri="{91240B29-F687-4f45-9708-019B960494DF}">
-                <a14:hiddenLine xmlns:a14="http://schemas.microsoft.com/office/drawing/2010/main" xmlns="" w="9525">
+                <a14:hiddenLine xmlns="" xmlns:a14="http://schemas.microsoft.com/office/drawing/2010/main" w="9525">
                   <a:solidFill>
                     <a:srgbClr val="000000"/>
                   </a:solidFill>
@@ -2161,7 +2162,7 @@
             </a:ln>
             <a:extLst>
               <a:ext uri="{91240B29-F687-4f45-9708-019B960494DF}">
-                <a14:hiddenLine xmlns:a14="http://schemas.microsoft.com/office/drawing/2010/main" xmlns="" w="9525">
+                <a14:hiddenLine xmlns="" xmlns:a14="http://schemas.microsoft.com/office/drawing/2010/main" w="9525">
                   <a:solidFill>
                     <a:srgbClr val="000000"/>
                   </a:solidFill>
@@ -2229,7 +2230,7 @@
             </a:ln>
             <a:extLst>
               <a:ext uri="{91240B29-F687-4f45-9708-019B960494DF}">
-                <a14:hiddenLine xmlns:a14="http://schemas.microsoft.com/office/drawing/2010/main" xmlns="" w="9525">
+                <a14:hiddenLine xmlns="" xmlns:a14="http://schemas.microsoft.com/office/drawing/2010/main" w="9525">
                   <a:solidFill>
                     <a:srgbClr val="000000"/>
                   </a:solidFill>
@@ -2319,7 +2320,7 @@
             </a:ln>
             <a:extLst>
               <a:ext uri="{91240B29-F687-4f45-9708-019B960494DF}">
-                <a14:hiddenLine xmlns:a14="http://schemas.microsoft.com/office/drawing/2010/main" xmlns="" w="9525">
+                <a14:hiddenLine xmlns="" xmlns:a14="http://schemas.microsoft.com/office/drawing/2010/main" w="9525">
                   <a:solidFill>
                     <a:srgbClr val="000000"/>
                   </a:solidFill>
@@ -2353,7 +2354,7 @@
             </a:ln>
             <a:extLst>
               <a:ext uri="{91240B29-F687-4f45-9708-019B960494DF}">
-                <a14:hiddenLine xmlns:a14="http://schemas.microsoft.com/office/drawing/2010/main" xmlns="" w="9525">
+                <a14:hiddenLine xmlns="" xmlns:a14="http://schemas.microsoft.com/office/drawing/2010/main" w="9525">
                   <a:solidFill>
                     <a:srgbClr val="000000"/>
                   </a:solidFill>
@@ -2443,7 +2444,7 @@
             </a:ln>
             <a:extLst>
               <a:ext uri="{91240B29-F687-4f45-9708-019B960494DF}">
-                <a14:hiddenLine xmlns:a14="http://schemas.microsoft.com/office/drawing/2010/main" xmlns="" w="9525">
+                <a14:hiddenLine xmlns="" xmlns:a14="http://schemas.microsoft.com/office/drawing/2010/main" w="9525">
                   <a:solidFill>
                     <a:srgbClr val="000000"/>
                   </a:solidFill>
@@ -2505,7 +2506,7 @@
             </a:ln>
             <a:extLst>
               <a:ext uri="{91240B29-F687-4f45-9708-019B960494DF}">
-                <a14:hiddenLine xmlns:a14="http://schemas.microsoft.com/office/drawing/2010/main" xmlns="" w="9525">
+                <a14:hiddenLine xmlns="" xmlns:a14="http://schemas.microsoft.com/office/drawing/2010/main" w="9525">
                   <a:solidFill>
                     <a:srgbClr val="000000"/>
                   </a:solidFill>
@@ -2567,7 +2568,7 @@
             </a:ln>
             <a:extLst>
               <a:ext uri="{91240B29-F687-4f45-9708-019B960494DF}">
-                <a14:hiddenLine xmlns:a14="http://schemas.microsoft.com/office/drawing/2010/main" xmlns="" w="9525">
+                <a14:hiddenLine xmlns="" xmlns:a14="http://schemas.microsoft.com/office/drawing/2010/main" w="9525">
                   <a:solidFill>
                     <a:srgbClr val="000000"/>
                   </a:solidFill>
@@ -2657,7 +2658,7 @@
             </a:ln>
             <a:extLst>
               <a:ext uri="{91240B29-F687-4f45-9708-019B960494DF}">
-                <a14:hiddenLine xmlns:a14="http://schemas.microsoft.com/office/drawing/2010/main" xmlns="" w="9525">
+                <a14:hiddenLine xmlns="" xmlns:a14="http://schemas.microsoft.com/office/drawing/2010/main" w="9525">
                   <a:solidFill>
                     <a:srgbClr val="000000"/>
                   </a:solidFill>
@@ -2725,7 +2726,7 @@
             </a:ln>
             <a:extLst>
               <a:ext uri="{91240B29-F687-4f45-9708-019B960494DF}">
-                <a14:hiddenLine xmlns:a14="http://schemas.microsoft.com/office/drawing/2010/main" xmlns="" w="9525">
+                <a14:hiddenLine xmlns="" xmlns:a14="http://schemas.microsoft.com/office/drawing/2010/main" w="9525">
                   <a:solidFill>
                     <a:srgbClr val="000000"/>
                   </a:solidFill>
@@ -2787,7 +2788,7 @@
             </a:ln>
             <a:extLst>
               <a:ext uri="{91240B29-F687-4f45-9708-019B960494DF}">
-                <a14:hiddenLine xmlns:a14="http://schemas.microsoft.com/office/drawing/2010/main" xmlns="" w="9525">
+                <a14:hiddenLine xmlns="" xmlns:a14="http://schemas.microsoft.com/office/drawing/2010/main" w="9525">
                   <a:solidFill>
                     <a:srgbClr val="000000"/>
                   </a:solidFill>
@@ -2877,7 +2878,7 @@
             </a:ln>
             <a:extLst>
               <a:ext uri="{91240B29-F687-4f45-9708-019B960494DF}">
-                <a14:hiddenLine xmlns:a14="http://schemas.microsoft.com/office/drawing/2010/main" xmlns="" w="9525">
+                <a14:hiddenLine xmlns="" xmlns:a14="http://schemas.microsoft.com/office/drawing/2010/main" w="9525">
                   <a:solidFill>
                     <a:srgbClr val="000000"/>
                   </a:solidFill>
@@ -2939,7 +2940,7 @@
             </a:ln>
             <a:extLst>
               <a:ext uri="{91240B29-F687-4f45-9708-019B960494DF}">
-                <a14:hiddenLine xmlns:a14="http://schemas.microsoft.com/office/drawing/2010/main" xmlns="" w="9525">
+                <a14:hiddenLine xmlns="" xmlns:a14="http://schemas.microsoft.com/office/drawing/2010/main" w="9525">
                   <a:solidFill>
                     <a:srgbClr val="000000"/>
                   </a:solidFill>
@@ -3029,7 +3030,7 @@
             </a:ln>
             <a:extLst>
               <a:ext uri="{91240B29-F687-4f45-9708-019B960494DF}">
-                <a14:hiddenLine xmlns:a14="http://schemas.microsoft.com/office/drawing/2010/main" xmlns="" w="9525">
+                <a14:hiddenLine xmlns="" xmlns:a14="http://schemas.microsoft.com/office/drawing/2010/main" w="9525">
                   <a:solidFill>
                     <a:srgbClr val="000000"/>
                   </a:solidFill>
@@ -3091,7 +3092,7 @@
             </a:ln>
             <a:extLst>
               <a:ext uri="{91240B29-F687-4f45-9708-019B960494DF}">
-                <a14:hiddenLine xmlns:a14="http://schemas.microsoft.com/office/drawing/2010/main" xmlns="" w="9525">
+                <a14:hiddenLine xmlns="" xmlns:a14="http://schemas.microsoft.com/office/drawing/2010/main" w="9525">
                   <a:solidFill>
                     <a:srgbClr val="000000"/>
                   </a:solidFill>
@@ -3181,7 +3182,7 @@
             </a:ln>
             <a:extLst>
               <a:ext uri="{91240B29-F687-4f45-9708-019B960494DF}">
-                <a14:hiddenLine xmlns:a14="http://schemas.microsoft.com/office/drawing/2010/main" xmlns="" w="9525">
+                <a14:hiddenLine xmlns="" xmlns:a14="http://schemas.microsoft.com/office/drawing/2010/main" w="9525">
                   <a:solidFill>
                     <a:srgbClr val="000000"/>
                   </a:solidFill>
@@ -3215,7 +3216,7 @@
             </a:ln>
             <a:extLst>
               <a:ext uri="{91240B29-F687-4f45-9708-019B960494DF}">
-                <a14:hiddenLine xmlns:a14="http://schemas.microsoft.com/office/drawing/2010/main" xmlns="" w="9525">
+                <a14:hiddenLine xmlns="" xmlns:a14="http://schemas.microsoft.com/office/drawing/2010/main" w="9525">
                   <a:solidFill>
                     <a:srgbClr val="000000"/>
                   </a:solidFill>
@@ -3280,7 +3281,7 @@
             </a:ln>
             <a:extLst>
               <a:ext uri="{91240B29-F687-4f45-9708-019B960494DF}">
-                <a14:hiddenLine xmlns:a14="http://schemas.microsoft.com/office/drawing/2010/main" xmlns="" w="9525">
+                <a14:hiddenLine xmlns="" xmlns:a14="http://schemas.microsoft.com/office/drawing/2010/main" w="9525">
                   <a:solidFill>
                     <a:srgbClr val="000000"/>
                   </a:solidFill>
@@ -3370,7 +3371,7 @@
             </a:ln>
             <a:extLst>
               <a:ext uri="{91240B29-F687-4f45-9708-019B960494DF}">
-                <a14:hiddenLine xmlns:a14="http://schemas.microsoft.com/office/drawing/2010/main" xmlns="" w="9525">
+                <a14:hiddenLine xmlns="" xmlns:a14="http://schemas.microsoft.com/office/drawing/2010/main" w="9525">
                   <a:solidFill>
                     <a:srgbClr val="000000"/>
                   </a:solidFill>
@@ -3432,7 +3433,7 @@
             </a:ln>
             <a:extLst>
               <a:ext uri="{91240B29-F687-4f45-9708-019B960494DF}">
-                <a14:hiddenLine xmlns:a14="http://schemas.microsoft.com/office/drawing/2010/main" xmlns="" w="9525">
+                <a14:hiddenLine xmlns="" xmlns:a14="http://schemas.microsoft.com/office/drawing/2010/main" w="9525">
                   <a:solidFill>
                     <a:srgbClr val="000000"/>
                   </a:solidFill>
@@ -3522,7 +3523,7 @@
             </a:ln>
             <a:extLst>
               <a:ext uri="{91240B29-F687-4f45-9708-019B960494DF}">
-                <a14:hiddenLine xmlns:a14="http://schemas.microsoft.com/office/drawing/2010/main" xmlns="" w="9525">
+                <a14:hiddenLine xmlns="" xmlns:a14="http://schemas.microsoft.com/office/drawing/2010/main" w="9525">
                   <a:solidFill>
                     <a:srgbClr val="000000"/>
                   </a:solidFill>
@@ -3612,7 +3613,7 @@
             </a:ln>
             <a:extLst>
               <a:ext uri="{91240B29-F687-4f45-9708-019B960494DF}">
-                <a14:hiddenLine xmlns:a14="http://schemas.microsoft.com/office/drawing/2010/main" xmlns="" w="9525">
+                <a14:hiddenLine xmlns="" xmlns:a14="http://schemas.microsoft.com/office/drawing/2010/main" w="9525">
                   <a:solidFill>
                     <a:srgbClr val="000000"/>
                   </a:solidFill>
@@ -3677,7 +3678,7 @@
             </a:ln>
             <a:extLst>
               <a:ext uri="{91240B29-F687-4f45-9708-019B960494DF}">
-                <a14:hiddenLine xmlns:a14="http://schemas.microsoft.com/office/drawing/2010/main" xmlns="" w="9525">
+                <a14:hiddenLine xmlns="" xmlns:a14="http://schemas.microsoft.com/office/drawing/2010/main" w="9525">
                   <a:solidFill>
                     <a:srgbClr val="000000"/>
                   </a:solidFill>
@@ -3739,7 +3740,7 @@
             </a:ln>
             <a:extLst>
               <a:ext uri="{91240B29-F687-4f45-9708-019B960494DF}">
-                <a14:hiddenLine xmlns:a14="http://schemas.microsoft.com/office/drawing/2010/main" xmlns="" w="9525">
+                <a14:hiddenLine xmlns="" xmlns:a14="http://schemas.microsoft.com/office/drawing/2010/main" w="9525">
                   <a:solidFill>
                     <a:srgbClr val="000000"/>
                   </a:solidFill>
@@ -3829,7 +3830,7 @@
             </a:ln>
             <a:extLst>
               <a:ext uri="{91240B29-F687-4f45-9708-019B960494DF}">
-                <a14:hiddenLine xmlns:a14="http://schemas.microsoft.com/office/drawing/2010/main" xmlns="" w="9525">
+                <a14:hiddenLine xmlns="" xmlns:a14="http://schemas.microsoft.com/office/drawing/2010/main" w="9525">
                   <a:solidFill>
                     <a:srgbClr val="000000"/>
                   </a:solidFill>
@@ -3919,7 +3920,7 @@
             </a:ln>
             <a:extLst>
               <a:ext uri="{91240B29-F687-4f45-9708-019B960494DF}">
-                <a14:hiddenLine xmlns:a14="http://schemas.microsoft.com/office/drawing/2010/main" xmlns="" w="9525">
+                <a14:hiddenLine xmlns="" xmlns:a14="http://schemas.microsoft.com/office/drawing/2010/main" w="9525">
                   <a:solidFill>
                     <a:srgbClr val="000000"/>
                   </a:solidFill>
@@ -3981,7 +3982,7 @@
             </a:ln>
             <a:extLst>
               <a:ext uri="{91240B29-F687-4f45-9708-019B960494DF}">
-                <a14:hiddenLine xmlns:a14="http://schemas.microsoft.com/office/drawing/2010/main" xmlns="" w="9525">
+                <a14:hiddenLine xmlns="" xmlns:a14="http://schemas.microsoft.com/office/drawing/2010/main" w="9525">
                   <a:solidFill>
                     <a:srgbClr val="000000"/>
                   </a:solidFill>
@@ -4101,7 +4102,7 @@
             </a:ln>
             <a:extLst>
               <a:ext uri="{91240B29-F687-4f45-9708-019B960494DF}">
-                <a14:hiddenLine xmlns:a14="http://schemas.microsoft.com/office/drawing/2010/main" xmlns="" w="9525">
+                <a14:hiddenLine xmlns="" xmlns:a14="http://schemas.microsoft.com/office/drawing/2010/main" w="9525">
                   <a:solidFill>
                     <a:srgbClr val="000000"/>
                   </a:solidFill>
@@ -4169,7 +4170,7 @@
             </a:ln>
             <a:extLst>
               <a:ext uri="{91240B29-F687-4f45-9708-019B960494DF}">
-                <a14:hiddenLine xmlns:a14="http://schemas.microsoft.com/office/drawing/2010/main" xmlns="" w="9525">
+                <a14:hiddenLine xmlns="" xmlns:a14="http://schemas.microsoft.com/office/drawing/2010/main" w="9525">
                   <a:solidFill>
                     <a:srgbClr val="000000"/>
                   </a:solidFill>
@@ -4259,7 +4260,7 @@
             </a:ln>
             <a:extLst>
               <a:ext uri="{91240B29-F687-4f45-9708-019B960494DF}">
-                <a14:hiddenLine xmlns:a14="http://schemas.microsoft.com/office/drawing/2010/main" xmlns="" w="9525">
+                <a14:hiddenLine xmlns="" xmlns:a14="http://schemas.microsoft.com/office/drawing/2010/main" w="9525">
                   <a:solidFill>
                     <a:srgbClr val="000000"/>
                   </a:solidFill>
@@ -9073,7 +9074,7 @@
           <a:noFill/>
           <a:extLst>
             <a:ext uri="{909E8E84-426E-40dd-AFC4-6F175D3DCCD1}">
-              <a14:hiddenFill xmlns:a14="http://schemas.microsoft.com/office/drawing/2010/main" xmlns="">
+              <a14:hiddenFill xmlns="" xmlns:a14="http://schemas.microsoft.com/office/drawing/2010/main">
                 <a:solidFill>
                   <a:srgbClr val="FFFFFF"/>
                 </a:solidFill>
@@ -9147,7 +9148,7 @@
               </a:ln>
               <a:extLst>
                 <a:ext uri="{91240B29-F687-4f45-9708-019B960494DF}">
-                  <a14:hiddenLine xmlns:a14="http://schemas.microsoft.com/office/drawing/2010/main" xmlns="" w="9525">
+                  <a14:hiddenLine xmlns="" xmlns:a14="http://schemas.microsoft.com/office/drawing/2010/main" w="9525">
                     <a:solidFill>
                       <a:srgbClr val="000000"/>
                     </a:solidFill>
@@ -9237,7 +9238,7 @@
               </a:ln>
               <a:extLst>
                 <a:ext uri="{91240B29-F687-4f45-9708-019B960494DF}">
-                  <a14:hiddenLine xmlns:a14="http://schemas.microsoft.com/office/drawing/2010/main" xmlns="" w="9525">
+                  <a14:hiddenLine xmlns="" xmlns:a14="http://schemas.microsoft.com/office/drawing/2010/main" w="9525">
                     <a:solidFill>
                       <a:srgbClr val="000000"/>
                     </a:solidFill>
@@ -9327,7 +9328,7 @@
               </a:ln>
               <a:extLst>
                 <a:ext uri="{91240B29-F687-4f45-9708-019B960494DF}">
-                  <a14:hiddenLine xmlns:a14="http://schemas.microsoft.com/office/drawing/2010/main" xmlns="" w="9525">
+                  <a14:hiddenLine xmlns="" xmlns:a14="http://schemas.microsoft.com/office/drawing/2010/main" w="9525">
                     <a:solidFill>
                       <a:srgbClr val="000000"/>
                     </a:solidFill>
@@ -9389,7 +9390,7 @@
               </a:ln>
               <a:extLst>
                 <a:ext uri="{91240B29-F687-4f45-9708-019B960494DF}">
-                  <a14:hiddenLine xmlns:a14="http://schemas.microsoft.com/office/drawing/2010/main" xmlns="" w="9525">
+                  <a14:hiddenLine xmlns="" xmlns:a14="http://schemas.microsoft.com/office/drawing/2010/main" w="9525">
                     <a:solidFill>
                       <a:srgbClr val="000000"/>
                     </a:solidFill>
@@ -9479,7 +9480,7 @@
               </a:ln>
               <a:extLst>
                 <a:ext uri="{91240B29-F687-4f45-9708-019B960494DF}">
-                  <a14:hiddenLine xmlns:a14="http://schemas.microsoft.com/office/drawing/2010/main" xmlns="" w="9525">
+                  <a14:hiddenLine xmlns="" xmlns:a14="http://schemas.microsoft.com/office/drawing/2010/main" w="9525">
                     <a:solidFill>
                       <a:srgbClr val="000000"/>
                     </a:solidFill>
@@ -9541,7 +9542,7 @@
               </a:ln>
               <a:extLst>
                 <a:ext uri="{91240B29-F687-4f45-9708-019B960494DF}">
-                  <a14:hiddenLine xmlns:a14="http://schemas.microsoft.com/office/drawing/2010/main" xmlns="" w="9525">
+                  <a14:hiddenLine xmlns="" xmlns:a14="http://schemas.microsoft.com/office/drawing/2010/main" w="9525">
                     <a:solidFill>
                       <a:srgbClr val="000000"/>
                     </a:solidFill>
@@ -9603,7 +9604,7 @@
               </a:ln>
               <a:extLst>
                 <a:ext uri="{91240B29-F687-4f45-9708-019B960494DF}">
-                  <a14:hiddenLine xmlns:a14="http://schemas.microsoft.com/office/drawing/2010/main" xmlns="" w="9525">
+                  <a14:hiddenLine xmlns="" xmlns:a14="http://schemas.microsoft.com/office/drawing/2010/main" w="9525">
                     <a:solidFill>
                       <a:srgbClr val="000000"/>
                     </a:solidFill>
@@ -9693,7 +9694,7 @@
               </a:ln>
               <a:extLst>
                 <a:ext uri="{91240B29-F687-4f45-9708-019B960494DF}">
-                  <a14:hiddenLine xmlns:a14="http://schemas.microsoft.com/office/drawing/2010/main" xmlns="" w="9525">
+                  <a14:hiddenLine xmlns="" xmlns:a14="http://schemas.microsoft.com/office/drawing/2010/main" w="9525">
                     <a:solidFill>
                       <a:srgbClr val="000000"/>
                     </a:solidFill>
@@ -9783,7 +9784,7 @@
               </a:ln>
               <a:extLst>
                 <a:ext uri="{91240B29-F687-4f45-9708-019B960494DF}">
-                  <a14:hiddenLine xmlns:a14="http://schemas.microsoft.com/office/drawing/2010/main" xmlns="" w="9525">
+                  <a14:hiddenLine xmlns="" xmlns:a14="http://schemas.microsoft.com/office/drawing/2010/main" w="9525">
                     <a:solidFill>
                       <a:srgbClr val="000000"/>
                     </a:solidFill>
@@ -9845,7 +9846,7 @@
               </a:ln>
               <a:extLst>
                 <a:ext uri="{91240B29-F687-4f45-9708-019B960494DF}">
-                  <a14:hiddenLine xmlns:a14="http://schemas.microsoft.com/office/drawing/2010/main" xmlns="" w="9525">
+                  <a14:hiddenLine xmlns="" xmlns:a14="http://schemas.microsoft.com/office/drawing/2010/main" w="9525">
                     <a:solidFill>
                       <a:srgbClr val="000000"/>
                     </a:solidFill>
@@ -9955,7 +9956,7 @@
               </a:ln>
               <a:extLst>
                 <a:ext uri="{91240B29-F687-4f45-9708-019B960494DF}">
-                  <a14:hiddenLine xmlns:a14="http://schemas.microsoft.com/office/drawing/2010/main" xmlns="" w="9525">
+                  <a14:hiddenLine xmlns="" xmlns:a14="http://schemas.microsoft.com/office/drawing/2010/main" w="9525">
                     <a:solidFill>
                       <a:srgbClr val="000000"/>
                     </a:solidFill>
@@ -10039,7 +10040,7 @@
               </a:ln>
               <a:extLst>
                 <a:ext uri="{91240B29-F687-4f45-9708-019B960494DF}">
-                  <a14:hiddenLine xmlns:a14="http://schemas.microsoft.com/office/drawing/2010/main" xmlns="" w="9525">
+                  <a14:hiddenLine xmlns="" xmlns:a14="http://schemas.microsoft.com/office/drawing/2010/main" w="9525">
                     <a:solidFill>
                       <a:srgbClr val="000000"/>
                     </a:solidFill>
@@ -10101,7 +10102,7 @@
               </a:ln>
               <a:extLst>
                 <a:ext uri="{91240B29-F687-4f45-9708-019B960494DF}">
-                  <a14:hiddenLine xmlns:a14="http://schemas.microsoft.com/office/drawing/2010/main" xmlns="" w="9525">
+                  <a14:hiddenLine xmlns="" xmlns:a14="http://schemas.microsoft.com/office/drawing/2010/main" w="9525">
                     <a:solidFill>
                       <a:srgbClr val="000000"/>
                     </a:solidFill>
@@ -10163,7 +10164,7 @@
               </a:ln>
               <a:extLst>
                 <a:ext uri="{91240B29-F687-4f45-9708-019B960494DF}">
-                  <a14:hiddenLine xmlns:a14="http://schemas.microsoft.com/office/drawing/2010/main" xmlns="" w="9525">
+                  <a14:hiddenLine xmlns="" xmlns:a14="http://schemas.microsoft.com/office/drawing/2010/main" w="9525">
                     <a:solidFill>
                       <a:srgbClr val="000000"/>
                     </a:solidFill>
@@ -10253,7 +10254,7 @@
               </a:ln>
               <a:extLst>
                 <a:ext uri="{91240B29-F687-4f45-9708-019B960494DF}">
-                  <a14:hiddenLine xmlns:a14="http://schemas.microsoft.com/office/drawing/2010/main" xmlns="" w="9525">
+                  <a14:hiddenLine xmlns="" xmlns:a14="http://schemas.microsoft.com/office/drawing/2010/main" w="9525">
                     <a:solidFill>
                       <a:srgbClr val="000000"/>
                     </a:solidFill>
@@ -10287,7 +10288,7 @@
               </a:ln>
               <a:extLst>
                 <a:ext uri="{91240B29-F687-4f45-9708-019B960494DF}">
-                  <a14:hiddenLine xmlns:a14="http://schemas.microsoft.com/office/drawing/2010/main" xmlns="" w="9525">
+                  <a14:hiddenLine xmlns="" xmlns:a14="http://schemas.microsoft.com/office/drawing/2010/main" w="9525">
                     <a:solidFill>
                       <a:srgbClr val="000000"/>
                     </a:solidFill>
@@ -10352,7 +10353,7 @@
               </a:ln>
               <a:extLst>
                 <a:ext uri="{91240B29-F687-4f45-9708-019B960494DF}">
-                  <a14:hiddenLine xmlns:a14="http://schemas.microsoft.com/office/drawing/2010/main" xmlns="" w="9525">
+                  <a14:hiddenLine xmlns="" xmlns:a14="http://schemas.microsoft.com/office/drawing/2010/main" w="9525">
                     <a:solidFill>
                       <a:srgbClr val="000000"/>
                     </a:solidFill>
@@ -10442,7 +10443,7 @@
               </a:ln>
               <a:extLst>
                 <a:ext uri="{91240B29-F687-4f45-9708-019B960494DF}">
-                  <a14:hiddenLine xmlns:a14="http://schemas.microsoft.com/office/drawing/2010/main" xmlns="" w="9525">
+                  <a14:hiddenLine xmlns="" xmlns:a14="http://schemas.microsoft.com/office/drawing/2010/main" w="9525">
                     <a:solidFill>
                       <a:srgbClr val="000000"/>
                     </a:solidFill>
@@ -10504,7 +10505,7 @@
               </a:ln>
               <a:extLst>
                 <a:ext uri="{91240B29-F687-4f45-9708-019B960494DF}">
-                  <a14:hiddenLine xmlns:a14="http://schemas.microsoft.com/office/drawing/2010/main" xmlns="" w="9525">
+                  <a14:hiddenLine xmlns="" xmlns:a14="http://schemas.microsoft.com/office/drawing/2010/main" w="9525">
                     <a:solidFill>
                       <a:srgbClr val="000000"/>
                     </a:solidFill>
@@ -10594,7 +10595,7 @@
               </a:ln>
               <a:extLst>
                 <a:ext uri="{91240B29-F687-4f45-9708-019B960494DF}">
-                  <a14:hiddenLine xmlns:a14="http://schemas.microsoft.com/office/drawing/2010/main" xmlns="" w="9525">
+                  <a14:hiddenLine xmlns="" xmlns:a14="http://schemas.microsoft.com/office/drawing/2010/main" w="9525">
                     <a:solidFill>
                       <a:srgbClr val="000000"/>
                     </a:solidFill>
@@ -10659,7 +10660,7 @@
               </a:ln>
               <a:extLst>
                 <a:ext uri="{91240B29-F687-4f45-9708-019B960494DF}">
-                  <a14:hiddenLine xmlns:a14="http://schemas.microsoft.com/office/drawing/2010/main" xmlns="" w="9525">
+                  <a14:hiddenLine xmlns="" xmlns:a14="http://schemas.microsoft.com/office/drawing/2010/main" w="9525">
                     <a:solidFill>
                       <a:srgbClr val="000000"/>
                     </a:solidFill>
@@ -10721,7 +10722,7 @@
               </a:ln>
               <a:extLst>
                 <a:ext uri="{91240B29-F687-4f45-9708-019B960494DF}">
-                  <a14:hiddenLine xmlns:a14="http://schemas.microsoft.com/office/drawing/2010/main" xmlns="" w="9525">
+                  <a14:hiddenLine xmlns="" xmlns:a14="http://schemas.microsoft.com/office/drawing/2010/main" w="9525">
                     <a:solidFill>
                       <a:srgbClr val="000000"/>
                     </a:solidFill>
@@ -10811,7 +10812,7 @@
               </a:ln>
               <a:extLst>
                 <a:ext uri="{91240B29-F687-4f45-9708-019B960494DF}">
-                  <a14:hiddenLine xmlns:a14="http://schemas.microsoft.com/office/drawing/2010/main" xmlns="" w="9525">
+                  <a14:hiddenLine xmlns="" xmlns:a14="http://schemas.microsoft.com/office/drawing/2010/main" w="9525">
                     <a:solidFill>
                       <a:srgbClr val="000000"/>
                     </a:solidFill>
@@ -10901,7 +10902,7 @@
               </a:ln>
               <a:extLst>
                 <a:ext uri="{91240B29-F687-4f45-9708-019B960494DF}">
-                  <a14:hiddenLine xmlns:a14="http://schemas.microsoft.com/office/drawing/2010/main" xmlns="" w="9525">
+                  <a14:hiddenLine xmlns="" xmlns:a14="http://schemas.microsoft.com/office/drawing/2010/main" w="9525">
                     <a:solidFill>
                       <a:srgbClr val="000000"/>
                     </a:solidFill>
@@ -10966,7 +10967,7 @@
               </a:ln>
               <a:extLst>
                 <a:ext uri="{91240B29-F687-4f45-9708-019B960494DF}">
-                  <a14:hiddenLine xmlns:a14="http://schemas.microsoft.com/office/drawing/2010/main" xmlns="" w="9525">
+                  <a14:hiddenLine xmlns="" xmlns:a14="http://schemas.microsoft.com/office/drawing/2010/main" w="9525">
                     <a:solidFill>
                       <a:srgbClr val="000000"/>
                     </a:solidFill>
@@ -11086,7 +11087,7 @@
               </a:ln>
               <a:extLst>
                 <a:ext uri="{91240B29-F687-4f45-9708-019B960494DF}">
-                  <a14:hiddenLine xmlns:a14="http://schemas.microsoft.com/office/drawing/2010/main" xmlns="" w="9525">
+                  <a14:hiddenLine xmlns="" xmlns:a14="http://schemas.microsoft.com/office/drawing/2010/main" w="9525">
                     <a:solidFill>
                       <a:srgbClr val="000000"/>
                     </a:solidFill>
@@ -11167,7 +11168,7 @@
               </a:ln>
               <a:extLst>
                 <a:ext uri="{91240B29-F687-4f45-9708-019B960494DF}">
-                  <a14:hiddenLine xmlns:a14="http://schemas.microsoft.com/office/drawing/2010/main" xmlns="" w="9525">
+                  <a14:hiddenLine xmlns="" xmlns:a14="http://schemas.microsoft.com/office/drawing/2010/main" w="9525">
                     <a:solidFill>
                       <a:srgbClr val="000000"/>
                     </a:solidFill>
@@ -11282,7 +11283,7 @@
               </a:ln>
               <a:extLst>
                 <a:ext uri="{91240B29-F687-4f45-9708-019B960494DF}">
-                  <a14:hiddenLine xmlns:a14="http://schemas.microsoft.com/office/drawing/2010/main" xmlns="" w="9525">
+                  <a14:hiddenLine xmlns="" xmlns:a14="http://schemas.microsoft.com/office/drawing/2010/main" w="9525">
                     <a:solidFill>
                       <a:srgbClr val="000000"/>
                     </a:solidFill>
@@ -11372,7 +11373,7 @@
               </a:ln>
               <a:extLst>
                 <a:ext uri="{91240B29-F687-4f45-9708-019B960494DF}">
-                  <a14:hiddenLine xmlns:a14="http://schemas.microsoft.com/office/drawing/2010/main" xmlns="" w="9525">
+                  <a14:hiddenLine xmlns="" xmlns:a14="http://schemas.microsoft.com/office/drawing/2010/main" w="9525">
                     <a:solidFill>
                       <a:srgbClr val="000000"/>
                     </a:solidFill>
@@ -11437,7 +11438,7 @@
               </a:ln>
               <a:extLst>
                 <a:ext uri="{91240B29-F687-4f45-9708-019B960494DF}">
-                  <a14:hiddenLine xmlns:a14="http://schemas.microsoft.com/office/drawing/2010/main" xmlns="" w="9525">
+                  <a14:hiddenLine xmlns="" xmlns:a14="http://schemas.microsoft.com/office/drawing/2010/main" w="9525">
                     <a:solidFill>
                       <a:srgbClr val="000000"/>
                     </a:solidFill>
@@ -11527,7 +11528,7 @@
               </a:ln>
               <a:extLst>
                 <a:ext uri="{91240B29-F687-4f45-9708-019B960494DF}">
-                  <a14:hiddenLine xmlns:a14="http://schemas.microsoft.com/office/drawing/2010/main" xmlns="" w="9525">
+                  <a14:hiddenLine xmlns="" xmlns:a14="http://schemas.microsoft.com/office/drawing/2010/main" w="9525">
                     <a:solidFill>
                       <a:srgbClr val="000000"/>
                     </a:solidFill>
@@ -11595,7 +11596,7 @@
               </a:ln>
               <a:extLst>
                 <a:ext uri="{91240B29-F687-4f45-9708-019B960494DF}">
-                  <a14:hiddenLine xmlns:a14="http://schemas.microsoft.com/office/drawing/2010/main" xmlns="" w="9525">
+                  <a14:hiddenLine xmlns="" xmlns:a14="http://schemas.microsoft.com/office/drawing/2010/main" w="9525">
                     <a:solidFill>
                       <a:srgbClr val="000000"/>
                     </a:solidFill>
@@ -11685,7 +11686,7 @@
               </a:ln>
               <a:extLst>
                 <a:ext uri="{91240B29-F687-4f45-9708-019B960494DF}">
-                  <a14:hiddenLine xmlns:a14="http://schemas.microsoft.com/office/drawing/2010/main" xmlns="" w="9525">
+                  <a14:hiddenLine xmlns="" xmlns:a14="http://schemas.microsoft.com/office/drawing/2010/main" w="9525">
                     <a:solidFill>
                       <a:srgbClr val="000000"/>
                     </a:solidFill>
@@ -11753,7 +11754,7 @@
               </a:ln>
               <a:extLst>
                 <a:ext uri="{91240B29-F687-4f45-9708-019B960494DF}">
-                  <a14:hiddenLine xmlns:a14="http://schemas.microsoft.com/office/drawing/2010/main" xmlns="" w="9525">
+                  <a14:hiddenLine xmlns="" xmlns:a14="http://schemas.microsoft.com/office/drawing/2010/main" w="9525">
                     <a:solidFill>
                       <a:srgbClr val="000000"/>
                     </a:solidFill>
@@ -11843,7 +11844,7 @@
               </a:ln>
               <a:extLst>
                 <a:ext uri="{91240B29-F687-4f45-9708-019B960494DF}">
-                  <a14:hiddenLine xmlns:a14="http://schemas.microsoft.com/office/drawing/2010/main" xmlns="" w="9525">
+                  <a14:hiddenLine xmlns="" xmlns:a14="http://schemas.microsoft.com/office/drawing/2010/main" w="9525">
                     <a:solidFill>
                       <a:srgbClr val="000000"/>
                     </a:solidFill>
@@ -11877,7 +11878,7 @@
               </a:ln>
               <a:extLst>
                 <a:ext uri="{91240B29-F687-4f45-9708-019B960494DF}">
-                  <a14:hiddenLine xmlns:a14="http://schemas.microsoft.com/office/drawing/2010/main" xmlns="" w="9525">
+                  <a14:hiddenLine xmlns="" xmlns:a14="http://schemas.microsoft.com/office/drawing/2010/main" w="9525">
                     <a:solidFill>
                       <a:srgbClr val="000000"/>
                     </a:solidFill>
@@ -12699,10 +12700,26 @@
           <a:lstStyle/>
           <a:p>
             <a:r>
+              <a:rPr lang="en-US" smtClean="0">
+                <a:effectLst/>
+              </a:rPr>
+              <a:t>A </a:t>
+            </a:r>
+            <a:r>
+              <a:rPr lang="en-US" smtClean="0"/>
+              <a:t>salon </a:t>
+            </a:r>
+            <a:r>
+              <a:rPr lang="en-US" smtClean="0">
+                <a:effectLst/>
+              </a:rPr>
+              <a:t>appointment </a:t>
+            </a:r>
+            <a:r>
               <a:rPr lang="en-US" dirty="0" smtClean="0">
                 <a:effectLst/>
               </a:rPr>
-              <a:t>A business management/appointment scheduling system</a:t>
+              <a:t>scheduling system</a:t>
             </a:r>
           </a:p>
           <a:p>
@@ -12890,6 +12907,95 @@
           <a:chExt cx="0" cy="0"/>
         </a:xfrm>
       </p:grpSpPr>
+      <p:pic>
+        <p:nvPicPr>
+          <p:cNvPr id="4" name="Content Placeholder 3"/>
+          <p:cNvPicPr>
+            <a:picLocks noGrp="1" noChangeAspect="1"/>
+          </p:cNvPicPr>
+          <p:nvPr>
+            <p:ph idx="1"/>
+          </p:nvPr>
+        </p:nvPicPr>
+        <p:blipFill>
+          <a:blip r:embed="rId2">
+            <a:extLst>
+              <a:ext uri="{28A0092B-C50C-407E-A947-70E740481C1C}">
+                <a14:useLocalDpi xmlns:a14="http://schemas.microsoft.com/office/drawing/2010/main" val="0"/>
+              </a:ext>
+            </a:extLst>
+          </a:blip>
+          <a:stretch>
+            <a:fillRect/>
+          </a:stretch>
+        </p:blipFill>
+        <p:spPr>
+          <a:xfrm>
+            <a:off x="1105318" y="966579"/>
+            <a:ext cx="9905513" cy="4038558"/>
+          </a:xfrm>
+        </p:spPr>
+      </p:pic>
+      <p:sp>
+        <p:nvSpPr>
+          <p:cNvPr id="5" name="TextBox 4"/>
+          <p:cNvSpPr txBox="1"/>
+          <p:nvPr/>
+        </p:nvSpPr>
+        <p:spPr>
+          <a:xfrm>
+            <a:off x="3206590" y="312821"/>
+            <a:ext cx="5702968" cy="461665"/>
+          </a:xfrm>
+          <a:prstGeom prst="rect">
+            <a:avLst/>
+          </a:prstGeom>
+          <a:noFill/>
+        </p:spPr>
+        <p:txBody>
+          <a:bodyPr wrap="square" rtlCol="0">
+            <a:spAutoFit/>
+          </a:bodyPr>
+          <a:lstStyle/>
+          <a:p>
+            <a:r>
+              <a:rPr lang="en-US" sz="2400" dirty="0" smtClean="0"/>
+              <a:t>Sequence Diagram For Creating A Schedule</a:t>
+            </a:r>
+            <a:endParaRPr lang="en-US" sz="2400" dirty="0"/>
+          </a:p>
+        </p:txBody>
+      </p:sp>
+    </p:spTree>
+    <p:extLst>
+      <p:ext uri="{BB962C8B-B14F-4D97-AF65-F5344CB8AC3E}">
+        <p14:creationId xmlns:p14="http://schemas.microsoft.com/office/powerpoint/2010/main" val="4203885757"/>
+      </p:ext>
+    </p:extLst>
+  </p:cSld>
+  <p:clrMapOvr>
+    <a:masterClrMapping/>
+  </p:clrMapOvr>
+</p:sld>
+</file>
+
+<file path=ppt/slides/slide5.xml><?xml version="1.0" encoding="utf-8"?>
+<p:sld xmlns:a="http://schemas.openxmlformats.org/drawingml/2006/main" xmlns:r="http://schemas.openxmlformats.org/officeDocument/2006/relationships" xmlns:p="http://schemas.openxmlformats.org/presentationml/2006/main">
+  <p:cSld>
+    <p:spTree>
+      <p:nvGrpSpPr>
+        <p:cNvPr id="1" name=""/>
+        <p:cNvGrpSpPr/>
+        <p:nvPr/>
+      </p:nvGrpSpPr>
+      <p:grpSpPr>
+        <a:xfrm>
+          <a:off x="0" y="0"/>
+          <a:ext cx="0" cy="0"/>
+          <a:chOff x="0" y="0"/>
+          <a:chExt cx="0" cy="0"/>
+        </a:xfrm>
+      </p:grpSpPr>
       <p:sp>
         <p:nvSpPr>
           <p:cNvPr id="2" name="Title 1"/>
@@ -13042,10 +13148,17 @@
   <p:clrMapOvr>
     <a:masterClrMapping/>
   </p:clrMapOvr>
+  <p:timing>
+    <p:tnLst>
+      <p:par>
+        <p:cTn id="1" dur="indefinite" restart="never" nodeType="tmRoot"/>
+      </p:par>
+    </p:tnLst>
+  </p:timing>
 </p:sld>
 </file>
 
-<file path=ppt/slides/slide5.xml><?xml version="1.0" encoding="utf-8"?>
+<file path=ppt/slides/slide6.xml><?xml version="1.0" encoding="utf-8"?>
 <p:sld xmlns:a="http://schemas.openxmlformats.org/drawingml/2006/main" xmlns:r="http://schemas.openxmlformats.org/officeDocument/2006/relationships" xmlns:p="http://schemas.openxmlformats.org/presentationml/2006/main">
   <p:cSld>
     <p:spTree>
@@ -14310,10 +14423,17 @@
   <p:clrMapOvr>
     <a:masterClrMapping/>
   </p:clrMapOvr>
+  <p:timing>
+    <p:tnLst>
+      <p:par>
+        <p:cTn id="1" dur="indefinite" restart="never" nodeType="tmRoot"/>
+      </p:par>
+    </p:tnLst>
+  </p:timing>
 </p:sld>
 </file>
 
-<file path=ppt/slides/slide6.xml><?xml version="1.0" encoding="utf-8"?>
+<file path=ppt/slides/slide7.xml><?xml version="1.0" encoding="utf-8"?>
 <p:sld xmlns:a="http://schemas.openxmlformats.org/drawingml/2006/main" xmlns:r="http://schemas.openxmlformats.org/officeDocument/2006/relationships" xmlns:p="http://schemas.openxmlformats.org/presentationml/2006/main">
   <p:cSld>
     <p:spTree>
@@ -14405,6 +14525,13 @@
   <p:clrMapOvr>
     <a:masterClrMapping/>
   </p:clrMapOvr>
+  <p:timing>
+    <p:tnLst>
+      <p:par>
+        <p:cTn id="1" dur="indefinite" restart="never" nodeType="tmRoot"/>
+      </p:par>
+    </p:tnLst>
+  </p:timing>
 </p:sld>
 </file>
 

</xml_diff>

<commit_message>
edited SRS document, Use Case Diagram, Architecture Diagram and restructured directories
</commit_message>
<xml_diff>
--- a/Technical Documentation/projectpresentation.pptx
+++ b/Technical Documentation/projectpresentation.pptx
@@ -11,7 +11,8 @@
     <p:sldId id="264" r:id="rId5"/>
     <p:sldId id="259" r:id="rId6"/>
     <p:sldId id="263" r:id="rId7"/>
-    <p:sldId id="261" r:id="rId8"/>
+    <p:sldId id="265" r:id="rId8"/>
+    <p:sldId id="261" r:id="rId9"/>
   </p:sldIdLst>
   <p:sldSz cx="12192000" cy="6858000"/>
   <p:notesSz cx="6858000" cy="9144000"/>
@@ -175,7 +176,7 @@
           <a:noFill/>
           <a:extLst>
             <a:ext uri="{909E8E84-426E-40dd-AFC4-6F175D3DCCD1}">
-              <a14:hiddenFill xmlns="" xmlns:a14="http://schemas.microsoft.com/office/drawing/2010/main">
+              <a14:hiddenFill xmlns:a14="http://schemas.microsoft.com/office/drawing/2010/main" xmlns="">
                 <a:solidFill>
                   <a:srgbClr val="FFFFFF"/>
                 </a:solidFill>
@@ -234,7 +235,7 @@
             </a:ln>
             <a:extLst>
               <a:ext uri="{91240B29-F687-4f45-9708-019B960494DF}">
-                <a14:hiddenLine xmlns="" xmlns:a14="http://schemas.microsoft.com/office/drawing/2010/main" w="9525">
+                <a14:hiddenLine xmlns:a14="http://schemas.microsoft.com/office/drawing/2010/main" xmlns="" w="9525">
                   <a:solidFill>
                     <a:srgbClr val="000000"/>
                   </a:solidFill>
@@ -324,7 +325,7 @@
             </a:ln>
             <a:extLst>
               <a:ext uri="{91240B29-F687-4f45-9708-019B960494DF}">
-                <a14:hiddenLine xmlns="" xmlns:a14="http://schemas.microsoft.com/office/drawing/2010/main" w="9525">
+                <a14:hiddenLine xmlns:a14="http://schemas.microsoft.com/office/drawing/2010/main" xmlns="" w="9525">
                   <a:solidFill>
                     <a:srgbClr val="000000"/>
                   </a:solidFill>
@@ -414,7 +415,7 @@
             </a:ln>
             <a:extLst>
               <a:ext uri="{91240B29-F687-4f45-9708-019B960494DF}">
-                <a14:hiddenLine xmlns="" xmlns:a14="http://schemas.microsoft.com/office/drawing/2010/main" w="9525">
+                <a14:hiddenLine xmlns:a14="http://schemas.microsoft.com/office/drawing/2010/main" xmlns="" w="9525">
                   <a:solidFill>
                     <a:srgbClr val="000000"/>
                   </a:solidFill>
@@ -448,7 +449,7 @@
             </a:ln>
             <a:extLst>
               <a:ext uri="{91240B29-F687-4f45-9708-019B960494DF}">
-                <a14:hiddenLine xmlns="" xmlns:a14="http://schemas.microsoft.com/office/drawing/2010/main" w="9525">
+                <a14:hiddenLine xmlns:a14="http://schemas.microsoft.com/office/drawing/2010/main" xmlns="" w="9525">
                   <a:solidFill>
                     <a:srgbClr val="000000"/>
                   </a:solidFill>
@@ -538,7 +539,7 @@
             </a:ln>
             <a:extLst>
               <a:ext uri="{91240B29-F687-4f45-9708-019B960494DF}">
-                <a14:hiddenLine xmlns="" xmlns:a14="http://schemas.microsoft.com/office/drawing/2010/main" w="9525">
+                <a14:hiddenLine xmlns:a14="http://schemas.microsoft.com/office/drawing/2010/main" xmlns="" w="9525">
                   <a:solidFill>
                     <a:srgbClr val="000000"/>
                   </a:solidFill>
@@ -600,7 +601,7 @@
             </a:ln>
             <a:extLst>
               <a:ext uri="{91240B29-F687-4f45-9708-019B960494DF}">
-                <a14:hiddenLine xmlns="" xmlns:a14="http://schemas.microsoft.com/office/drawing/2010/main" w="9525">
+                <a14:hiddenLine xmlns:a14="http://schemas.microsoft.com/office/drawing/2010/main" xmlns="" w="9525">
                   <a:solidFill>
                     <a:srgbClr val="000000"/>
                   </a:solidFill>
@@ -662,7 +663,7 @@
             </a:ln>
             <a:extLst>
               <a:ext uri="{91240B29-F687-4f45-9708-019B960494DF}">
-                <a14:hiddenLine xmlns="" xmlns:a14="http://schemas.microsoft.com/office/drawing/2010/main" w="9525">
+                <a14:hiddenLine xmlns:a14="http://schemas.microsoft.com/office/drawing/2010/main" xmlns="" w="9525">
                   <a:solidFill>
                     <a:srgbClr val="000000"/>
                   </a:solidFill>
@@ -752,7 +753,7 @@
             </a:ln>
             <a:extLst>
               <a:ext uri="{91240B29-F687-4f45-9708-019B960494DF}">
-                <a14:hiddenLine xmlns="" xmlns:a14="http://schemas.microsoft.com/office/drawing/2010/main" w="9525">
+                <a14:hiddenLine xmlns:a14="http://schemas.microsoft.com/office/drawing/2010/main" xmlns="" w="9525">
                   <a:solidFill>
                     <a:srgbClr val="000000"/>
                   </a:solidFill>
@@ -814,7 +815,7 @@
             </a:ln>
             <a:extLst>
               <a:ext uri="{91240B29-F687-4f45-9708-019B960494DF}">
-                <a14:hiddenLine xmlns="" xmlns:a14="http://schemas.microsoft.com/office/drawing/2010/main" w="9525">
+                <a14:hiddenLine xmlns:a14="http://schemas.microsoft.com/office/drawing/2010/main" xmlns="" w="9525">
                   <a:solidFill>
                     <a:srgbClr val="000000"/>
                   </a:solidFill>
@@ -876,7 +877,7 @@
             </a:ln>
             <a:extLst>
               <a:ext uri="{91240B29-F687-4f45-9708-019B960494DF}">
-                <a14:hiddenLine xmlns="" xmlns:a14="http://schemas.microsoft.com/office/drawing/2010/main" w="9525">
+                <a14:hiddenLine xmlns:a14="http://schemas.microsoft.com/office/drawing/2010/main" xmlns="" w="9525">
                   <a:solidFill>
                     <a:srgbClr val="000000"/>
                   </a:solidFill>
@@ -966,7 +967,7 @@
             </a:ln>
             <a:extLst>
               <a:ext uri="{91240B29-F687-4f45-9708-019B960494DF}">
-                <a14:hiddenLine xmlns="" xmlns:a14="http://schemas.microsoft.com/office/drawing/2010/main" w="9525">
+                <a14:hiddenLine xmlns:a14="http://schemas.microsoft.com/office/drawing/2010/main" xmlns="" w="9525">
                   <a:solidFill>
                     <a:srgbClr val="000000"/>
                   </a:solidFill>
@@ -1056,7 +1057,7 @@
             </a:ln>
             <a:extLst>
               <a:ext uri="{91240B29-F687-4f45-9708-019B960494DF}">
-                <a14:hiddenLine xmlns="" xmlns:a14="http://schemas.microsoft.com/office/drawing/2010/main" w="9525">
+                <a14:hiddenLine xmlns:a14="http://schemas.microsoft.com/office/drawing/2010/main" xmlns="" w="9525">
                   <a:solidFill>
                     <a:srgbClr val="000000"/>
                   </a:solidFill>
@@ -1118,7 +1119,7 @@
             </a:ln>
             <a:extLst>
               <a:ext uri="{91240B29-F687-4f45-9708-019B960494DF}">
-                <a14:hiddenLine xmlns="" xmlns:a14="http://schemas.microsoft.com/office/drawing/2010/main" w="9525">
+                <a14:hiddenLine xmlns:a14="http://schemas.microsoft.com/office/drawing/2010/main" xmlns="" w="9525">
                   <a:solidFill>
                     <a:srgbClr val="000000"/>
                   </a:solidFill>
@@ -1228,7 +1229,7 @@
             </a:ln>
             <a:extLst>
               <a:ext uri="{91240B29-F687-4f45-9708-019B960494DF}">
-                <a14:hiddenLine xmlns="" xmlns:a14="http://schemas.microsoft.com/office/drawing/2010/main" w="9525">
+                <a14:hiddenLine xmlns:a14="http://schemas.microsoft.com/office/drawing/2010/main" xmlns="" w="9525">
                   <a:solidFill>
                     <a:srgbClr val="000000"/>
                   </a:solidFill>
@@ -1290,7 +1291,7 @@
             </a:ln>
             <a:extLst>
               <a:ext uri="{91240B29-F687-4f45-9708-019B960494DF}">
-                <a14:hiddenLine xmlns="" xmlns:a14="http://schemas.microsoft.com/office/drawing/2010/main" w="9525">
+                <a14:hiddenLine xmlns:a14="http://schemas.microsoft.com/office/drawing/2010/main" xmlns="" w="9525">
                   <a:solidFill>
                     <a:srgbClr val="000000"/>
                   </a:solidFill>
@@ -1380,7 +1381,7 @@
             </a:ln>
             <a:extLst>
               <a:ext uri="{91240B29-F687-4f45-9708-019B960494DF}">
-                <a14:hiddenLine xmlns="" xmlns:a14="http://schemas.microsoft.com/office/drawing/2010/main" w="9525">
+                <a14:hiddenLine xmlns:a14="http://schemas.microsoft.com/office/drawing/2010/main" xmlns="" w="9525">
                   <a:solidFill>
                     <a:srgbClr val="000000"/>
                   </a:solidFill>
@@ -1470,7 +1471,7 @@
             </a:ln>
             <a:extLst>
               <a:ext uri="{91240B29-F687-4f45-9708-019B960494DF}">
-                <a14:hiddenLine xmlns="" xmlns:a14="http://schemas.microsoft.com/office/drawing/2010/main" w="9525">
+                <a14:hiddenLine xmlns:a14="http://schemas.microsoft.com/office/drawing/2010/main" xmlns="" w="9525">
                   <a:solidFill>
                     <a:srgbClr val="000000"/>
                   </a:solidFill>
@@ -1532,7 +1533,7 @@
             </a:ln>
             <a:extLst>
               <a:ext uri="{91240B29-F687-4f45-9708-019B960494DF}">
-                <a14:hiddenLine xmlns="" xmlns:a14="http://schemas.microsoft.com/office/drawing/2010/main" w="9525">
+                <a14:hiddenLine xmlns:a14="http://schemas.microsoft.com/office/drawing/2010/main" xmlns="" w="9525">
                   <a:solidFill>
                     <a:srgbClr val="000000"/>
                   </a:solidFill>
@@ -1622,7 +1623,7 @@
             </a:ln>
             <a:extLst>
               <a:ext uri="{91240B29-F687-4f45-9708-019B960494DF}">
-                <a14:hiddenLine xmlns="" xmlns:a14="http://schemas.microsoft.com/office/drawing/2010/main" w="9525">
+                <a14:hiddenLine xmlns:a14="http://schemas.microsoft.com/office/drawing/2010/main" xmlns="" w="9525">
                   <a:solidFill>
                     <a:srgbClr val="000000"/>
                   </a:solidFill>
@@ -1712,7 +1713,7 @@
             </a:ln>
             <a:extLst>
               <a:ext uri="{91240B29-F687-4f45-9708-019B960494DF}">
-                <a14:hiddenLine xmlns="" xmlns:a14="http://schemas.microsoft.com/office/drawing/2010/main" w="9525">
+                <a14:hiddenLine xmlns:a14="http://schemas.microsoft.com/office/drawing/2010/main" xmlns="" w="9525">
                   <a:solidFill>
                     <a:srgbClr val="000000"/>
                   </a:solidFill>
@@ -1768,7 +1769,7 @@
             </a:ln>
             <a:extLst>
               <a:ext uri="{91240B29-F687-4f45-9708-019B960494DF}">
-                <a14:hiddenLine xmlns="" xmlns:a14="http://schemas.microsoft.com/office/drawing/2010/main" w="9525">
+                <a14:hiddenLine xmlns:a14="http://schemas.microsoft.com/office/drawing/2010/main" xmlns="" w="9525">
                   <a:solidFill>
                     <a:srgbClr val="000000"/>
                   </a:solidFill>
@@ -1858,7 +1859,7 @@
             </a:ln>
             <a:extLst>
               <a:ext uri="{91240B29-F687-4f45-9708-019B960494DF}">
-                <a14:hiddenLine xmlns="" xmlns:a14="http://schemas.microsoft.com/office/drawing/2010/main" w="9525">
+                <a14:hiddenLine xmlns:a14="http://schemas.microsoft.com/office/drawing/2010/main" xmlns="" w="9525">
                   <a:solidFill>
                     <a:srgbClr val="000000"/>
                   </a:solidFill>
@@ -1914,7 +1915,7 @@
             </a:ln>
             <a:extLst>
               <a:ext uri="{91240B29-F687-4f45-9708-019B960494DF}">
-                <a14:hiddenLine xmlns="" xmlns:a14="http://schemas.microsoft.com/office/drawing/2010/main" w="9525">
+                <a14:hiddenLine xmlns:a14="http://schemas.microsoft.com/office/drawing/2010/main" xmlns="" w="9525">
                   <a:solidFill>
                     <a:srgbClr val="000000"/>
                   </a:solidFill>
@@ -2004,7 +2005,7 @@
             </a:ln>
             <a:extLst>
               <a:ext uri="{91240B29-F687-4f45-9708-019B960494DF}">
-                <a14:hiddenLine xmlns="" xmlns:a14="http://schemas.microsoft.com/office/drawing/2010/main" w="9525">
+                <a14:hiddenLine xmlns:a14="http://schemas.microsoft.com/office/drawing/2010/main" xmlns="" w="9525">
                   <a:solidFill>
                     <a:srgbClr val="000000"/>
                   </a:solidFill>
@@ -2072,7 +2073,7 @@
             </a:ln>
             <a:extLst>
               <a:ext uri="{91240B29-F687-4f45-9708-019B960494DF}">
-                <a14:hiddenLine xmlns="" xmlns:a14="http://schemas.microsoft.com/office/drawing/2010/main" w="9525">
+                <a14:hiddenLine xmlns:a14="http://schemas.microsoft.com/office/drawing/2010/main" xmlns="" w="9525">
                   <a:solidFill>
                     <a:srgbClr val="000000"/>
                   </a:solidFill>
@@ -2162,7 +2163,7 @@
             </a:ln>
             <a:extLst>
               <a:ext uri="{91240B29-F687-4f45-9708-019B960494DF}">
-                <a14:hiddenLine xmlns="" xmlns:a14="http://schemas.microsoft.com/office/drawing/2010/main" w="9525">
+                <a14:hiddenLine xmlns:a14="http://schemas.microsoft.com/office/drawing/2010/main" xmlns="" w="9525">
                   <a:solidFill>
                     <a:srgbClr val="000000"/>
                   </a:solidFill>
@@ -2230,7 +2231,7 @@
             </a:ln>
             <a:extLst>
               <a:ext uri="{91240B29-F687-4f45-9708-019B960494DF}">
-                <a14:hiddenLine xmlns="" xmlns:a14="http://schemas.microsoft.com/office/drawing/2010/main" w="9525">
+                <a14:hiddenLine xmlns:a14="http://schemas.microsoft.com/office/drawing/2010/main" xmlns="" w="9525">
                   <a:solidFill>
                     <a:srgbClr val="000000"/>
                   </a:solidFill>
@@ -2320,7 +2321,7 @@
             </a:ln>
             <a:extLst>
               <a:ext uri="{91240B29-F687-4f45-9708-019B960494DF}">
-                <a14:hiddenLine xmlns="" xmlns:a14="http://schemas.microsoft.com/office/drawing/2010/main" w="9525">
+                <a14:hiddenLine xmlns:a14="http://schemas.microsoft.com/office/drawing/2010/main" xmlns="" w="9525">
                   <a:solidFill>
                     <a:srgbClr val="000000"/>
                   </a:solidFill>
@@ -2354,7 +2355,7 @@
             </a:ln>
             <a:extLst>
               <a:ext uri="{91240B29-F687-4f45-9708-019B960494DF}">
-                <a14:hiddenLine xmlns="" xmlns:a14="http://schemas.microsoft.com/office/drawing/2010/main" w="9525">
+                <a14:hiddenLine xmlns:a14="http://schemas.microsoft.com/office/drawing/2010/main" xmlns="" w="9525">
                   <a:solidFill>
                     <a:srgbClr val="000000"/>
                   </a:solidFill>
@@ -2444,7 +2445,7 @@
             </a:ln>
             <a:extLst>
               <a:ext uri="{91240B29-F687-4f45-9708-019B960494DF}">
-                <a14:hiddenLine xmlns="" xmlns:a14="http://schemas.microsoft.com/office/drawing/2010/main" w="9525">
+                <a14:hiddenLine xmlns:a14="http://schemas.microsoft.com/office/drawing/2010/main" xmlns="" w="9525">
                   <a:solidFill>
                     <a:srgbClr val="000000"/>
                   </a:solidFill>
@@ -2506,7 +2507,7 @@
             </a:ln>
             <a:extLst>
               <a:ext uri="{91240B29-F687-4f45-9708-019B960494DF}">
-                <a14:hiddenLine xmlns="" xmlns:a14="http://schemas.microsoft.com/office/drawing/2010/main" w="9525">
+                <a14:hiddenLine xmlns:a14="http://schemas.microsoft.com/office/drawing/2010/main" xmlns="" w="9525">
                   <a:solidFill>
                     <a:srgbClr val="000000"/>
                   </a:solidFill>
@@ -2568,7 +2569,7 @@
             </a:ln>
             <a:extLst>
               <a:ext uri="{91240B29-F687-4f45-9708-019B960494DF}">
-                <a14:hiddenLine xmlns="" xmlns:a14="http://schemas.microsoft.com/office/drawing/2010/main" w="9525">
+                <a14:hiddenLine xmlns:a14="http://schemas.microsoft.com/office/drawing/2010/main" xmlns="" w="9525">
                   <a:solidFill>
                     <a:srgbClr val="000000"/>
                   </a:solidFill>
@@ -2658,7 +2659,7 @@
             </a:ln>
             <a:extLst>
               <a:ext uri="{91240B29-F687-4f45-9708-019B960494DF}">
-                <a14:hiddenLine xmlns="" xmlns:a14="http://schemas.microsoft.com/office/drawing/2010/main" w="9525">
+                <a14:hiddenLine xmlns:a14="http://schemas.microsoft.com/office/drawing/2010/main" xmlns="" w="9525">
                   <a:solidFill>
                     <a:srgbClr val="000000"/>
                   </a:solidFill>
@@ -2726,7 +2727,7 @@
             </a:ln>
             <a:extLst>
               <a:ext uri="{91240B29-F687-4f45-9708-019B960494DF}">
-                <a14:hiddenLine xmlns="" xmlns:a14="http://schemas.microsoft.com/office/drawing/2010/main" w="9525">
+                <a14:hiddenLine xmlns:a14="http://schemas.microsoft.com/office/drawing/2010/main" xmlns="" w="9525">
                   <a:solidFill>
                     <a:srgbClr val="000000"/>
                   </a:solidFill>
@@ -2788,7 +2789,7 @@
             </a:ln>
             <a:extLst>
               <a:ext uri="{91240B29-F687-4f45-9708-019B960494DF}">
-                <a14:hiddenLine xmlns="" xmlns:a14="http://schemas.microsoft.com/office/drawing/2010/main" w="9525">
+                <a14:hiddenLine xmlns:a14="http://schemas.microsoft.com/office/drawing/2010/main" xmlns="" w="9525">
                   <a:solidFill>
                     <a:srgbClr val="000000"/>
                   </a:solidFill>
@@ -2878,7 +2879,7 @@
             </a:ln>
             <a:extLst>
               <a:ext uri="{91240B29-F687-4f45-9708-019B960494DF}">
-                <a14:hiddenLine xmlns="" xmlns:a14="http://schemas.microsoft.com/office/drawing/2010/main" w="9525">
+                <a14:hiddenLine xmlns:a14="http://schemas.microsoft.com/office/drawing/2010/main" xmlns="" w="9525">
                   <a:solidFill>
                     <a:srgbClr val="000000"/>
                   </a:solidFill>
@@ -2940,7 +2941,7 @@
             </a:ln>
             <a:extLst>
               <a:ext uri="{91240B29-F687-4f45-9708-019B960494DF}">
-                <a14:hiddenLine xmlns="" xmlns:a14="http://schemas.microsoft.com/office/drawing/2010/main" w="9525">
+                <a14:hiddenLine xmlns:a14="http://schemas.microsoft.com/office/drawing/2010/main" xmlns="" w="9525">
                   <a:solidFill>
                     <a:srgbClr val="000000"/>
                   </a:solidFill>
@@ -3030,7 +3031,7 @@
             </a:ln>
             <a:extLst>
               <a:ext uri="{91240B29-F687-4f45-9708-019B960494DF}">
-                <a14:hiddenLine xmlns="" xmlns:a14="http://schemas.microsoft.com/office/drawing/2010/main" w="9525">
+                <a14:hiddenLine xmlns:a14="http://schemas.microsoft.com/office/drawing/2010/main" xmlns="" w="9525">
                   <a:solidFill>
                     <a:srgbClr val="000000"/>
                   </a:solidFill>
@@ -3092,7 +3093,7 @@
             </a:ln>
             <a:extLst>
               <a:ext uri="{91240B29-F687-4f45-9708-019B960494DF}">
-                <a14:hiddenLine xmlns="" xmlns:a14="http://schemas.microsoft.com/office/drawing/2010/main" w="9525">
+                <a14:hiddenLine xmlns:a14="http://schemas.microsoft.com/office/drawing/2010/main" xmlns="" w="9525">
                   <a:solidFill>
                     <a:srgbClr val="000000"/>
                   </a:solidFill>
@@ -3182,7 +3183,7 @@
             </a:ln>
             <a:extLst>
               <a:ext uri="{91240B29-F687-4f45-9708-019B960494DF}">
-                <a14:hiddenLine xmlns="" xmlns:a14="http://schemas.microsoft.com/office/drawing/2010/main" w="9525">
+                <a14:hiddenLine xmlns:a14="http://schemas.microsoft.com/office/drawing/2010/main" xmlns="" w="9525">
                   <a:solidFill>
                     <a:srgbClr val="000000"/>
                   </a:solidFill>
@@ -3216,7 +3217,7 @@
             </a:ln>
             <a:extLst>
               <a:ext uri="{91240B29-F687-4f45-9708-019B960494DF}">
-                <a14:hiddenLine xmlns="" xmlns:a14="http://schemas.microsoft.com/office/drawing/2010/main" w="9525">
+                <a14:hiddenLine xmlns:a14="http://schemas.microsoft.com/office/drawing/2010/main" xmlns="" w="9525">
                   <a:solidFill>
                     <a:srgbClr val="000000"/>
                   </a:solidFill>
@@ -3281,7 +3282,7 @@
             </a:ln>
             <a:extLst>
               <a:ext uri="{91240B29-F687-4f45-9708-019B960494DF}">
-                <a14:hiddenLine xmlns="" xmlns:a14="http://schemas.microsoft.com/office/drawing/2010/main" w="9525">
+                <a14:hiddenLine xmlns:a14="http://schemas.microsoft.com/office/drawing/2010/main" xmlns="" w="9525">
                   <a:solidFill>
                     <a:srgbClr val="000000"/>
                   </a:solidFill>
@@ -3371,7 +3372,7 @@
             </a:ln>
             <a:extLst>
               <a:ext uri="{91240B29-F687-4f45-9708-019B960494DF}">
-                <a14:hiddenLine xmlns="" xmlns:a14="http://schemas.microsoft.com/office/drawing/2010/main" w="9525">
+                <a14:hiddenLine xmlns:a14="http://schemas.microsoft.com/office/drawing/2010/main" xmlns="" w="9525">
                   <a:solidFill>
                     <a:srgbClr val="000000"/>
                   </a:solidFill>
@@ -3433,7 +3434,7 @@
             </a:ln>
             <a:extLst>
               <a:ext uri="{91240B29-F687-4f45-9708-019B960494DF}">
-                <a14:hiddenLine xmlns="" xmlns:a14="http://schemas.microsoft.com/office/drawing/2010/main" w="9525">
+                <a14:hiddenLine xmlns:a14="http://schemas.microsoft.com/office/drawing/2010/main" xmlns="" w="9525">
                   <a:solidFill>
                     <a:srgbClr val="000000"/>
                   </a:solidFill>
@@ -3523,7 +3524,7 @@
             </a:ln>
             <a:extLst>
               <a:ext uri="{91240B29-F687-4f45-9708-019B960494DF}">
-                <a14:hiddenLine xmlns="" xmlns:a14="http://schemas.microsoft.com/office/drawing/2010/main" w="9525">
+                <a14:hiddenLine xmlns:a14="http://schemas.microsoft.com/office/drawing/2010/main" xmlns="" w="9525">
                   <a:solidFill>
                     <a:srgbClr val="000000"/>
                   </a:solidFill>
@@ -3613,7 +3614,7 @@
             </a:ln>
             <a:extLst>
               <a:ext uri="{91240B29-F687-4f45-9708-019B960494DF}">
-                <a14:hiddenLine xmlns="" xmlns:a14="http://schemas.microsoft.com/office/drawing/2010/main" w="9525">
+                <a14:hiddenLine xmlns:a14="http://schemas.microsoft.com/office/drawing/2010/main" xmlns="" w="9525">
                   <a:solidFill>
                     <a:srgbClr val="000000"/>
                   </a:solidFill>
@@ -3678,7 +3679,7 @@
             </a:ln>
             <a:extLst>
               <a:ext uri="{91240B29-F687-4f45-9708-019B960494DF}">
-                <a14:hiddenLine xmlns="" xmlns:a14="http://schemas.microsoft.com/office/drawing/2010/main" w="9525">
+                <a14:hiddenLine xmlns:a14="http://schemas.microsoft.com/office/drawing/2010/main" xmlns="" w="9525">
                   <a:solidFill>
                     <a:srgbClr val="000000"/>
                   </a:solidFill>
@@ -3740,7 +3741,7 @@
             </a:ln>
             <a:extLst>
               <a:ext uri="{91240B29-F687-4f45-9708-019B960494DF}">
-                <a14:hiddenLine xmlns="" xmlns:a14="http://schemas.microsoft.com/office/drawing/2010/main" w="9525">
+                <a14:hiddenLine xmlns:a14="http://schemas.microsoft.com/office/drawing/2010/main" xmlns="" w="9525">
                   <a:solidFill>
                     <a:srgbClr val="000000"/>
                   </a:solidFill>
@@ -3830,7 +3831,7 @@
             </a:ln>
             <a:extLst>
               <a:ext uri="{91240B29-F687-4f45-9708-019B960494DF}">
-                <a14:hiddenLine xmlns="" xmlns:a14="http://schemas.microsoft.com/office/drawing/2010/main" w="9525">
+                <a14:hiddenLine xmlns:a14="http://schemas.microsoft.com/office/drawing/2010/main" xmlns="" w="9525">
                   <a:solidFill>
                     <a:srgbClr val="000000"/>
                   </a:solidFill>
@@ -3920,7 +3921,7 @@
             </a:ln>
             <a:extLst>
               <a:ext uri="{91240B29-F687-4f45-9708-019B960494DF}">
-                <a14:hiddenLine xmlns="" xmlns:a14="http://schemas.microsoft.com/office/drawing/2010/main" w="9525">
+                <a14:hiddenLine xmlns:a14="http://schemas.microsoft.com/office/drawing/2010/main" xmlns="" w="9525">
                   <a:solidFill>
                     <a:srgbClr val="000000"/>
                   </a:solidFill>
@@ -3982,7 +3983,7 @@
             </a:ln>
             <a:extLst>
               <a:ext uri="{91240B29-F687-4f45-9708-019B960494DF}">
-                <a14:hiddenLine xmlns="" xmlns:a14="http://schemas.microsoft.com/office/drawing/2010/main" w="9525">
+                <a14:hiddenLine xmlns:a14="http://schemas.microsoft.com/office/drawing/2010/main" xmlns="" w="9525">
                   <a:solidFill>
                     <a:srgbClr val="000000"/>
                   </a:solidFill>
@@ -4102,7 +4103,7 @@
             </a:ln>
             <a:extLst>
               <a:ext uri="{91240B29-F687-4f45-9708-019B960494DF}">
-                <a14:hiddenLine xmlns="" xmlns:a14="http://schemas.microsoft.com/office/drawing/2010/main" w="9525">
+                <a14:hiddenLine xmlns:a14="http://schemas.microsoft.com/office/drawing/2010/main" xmlns="" w="9525">
                   <a:solidFill>
                     <a:srgbClr val="000000"/>
                   </a:solidFill>
@@ -4170,7 +4171,7 @@
             </a:ln>
             <a:extLst>
               <a:ext uri="{91240B29-F687-4f45-9708-019B960494DF}">
-                <a14:hiddenLine xmlns="" xmlns:a14="http://schemas.microsoft.com/office/drawing/2010/main" w="9525">
+                <a14:hiddenLine xmlns:a14="http://schemas.microsoft.com/office/drawing/2010/main" xmlns="" w="9525">
                   <a:solidFill>
                     <a:srgbClr val="000000"/>
                   </a:solidFill>
@@ -4260,7 +4261,7 @@
             </a:ln>
             <a:extLst>
               <a:ext uri="{91240B29-F687-4f45-9708-019B960494DF}">
-                <a14:hiddenLine xmlns="" xmlns:a14="http://schemas.microsoft.com/office/drawing/2010/main" w="9525">
+                <a14:hiddenLine xmlns:a14="http://schemas.microsoft.com/office/drawing/2010/main" xmlns="" w="9525">
                   <a:solidFill>
                     <a:srgbClr val="000000"/>
                   </a:solidFill>
@@ -4400,7 +4401,7 @@
           <a:p>
             <a:fld id="{48A87A34-81AB-432B-8DAE-1953F412C126}" type="datetimeFigureOut">
               <a:rPr lang="en-US" smtClean="0"/>
-              <a:t>27-Jul-19</a:t>
+              <a:t>11-Aug-19</a:t>
             </a:fld>
             <a:endParaRPr lang="en-US" dirty="0"/>
           </a:p>
@@ -4667,7 +4668,7 @@
           <a:p>
             <a:fld id="{48A87A34-81AB-432B-8DAE-1953F412C126}" type="datetimeFigureOut">
               <a:rPr lang="en-US" smtClean="0"/>
-              <a:t>27-Jul-19</a:t>
+              <a:t>11-Aug-19</a:t>
             </a:fld>
             <a:endParaRPr lang="en-US" dirty="0"/>
           </a:p>
@@ -4863,7 +4864,7 @@
           <a:p>
             <a:fld id="{48A87A34-81AB-432B-8DAE-1953F412C126}" type="datetimeFigureOut">
               <a:rPr lang="en-US" smtClean="0"/>
-              <a:t>27-Jul-19</a:t>
+              <a:t>11-Aug-19</a:t>
             </a:fld>
             <a:endParaRPr lang="en-US" dirty="0"/>
           </a:p>
@@ -5126,7 +5127,7 @@
           <a:p>
             <a:fld id="{48A87A34-81AB-432B-8DAE-1953F412C126}" type="datetimeFigureOut">
               <a:rPr lang="en-US" smtClean="0"/>
-              <a:t>27-Jul-19</a:t>
+              <a:t>11-Aug-19</a:t>
             </a:fld>
             <a:endParaRPr lang="en-US" dirty="0"/>
           </a:p>
@@ -5560,7 +5561,7 @@
           <a:p>
             <a:fld id="{48A87A34-81AB-432B-8DAE-1953F412C126}" type="datetimeFigureOut">
               <a:rPr lang="en-US" smtClean="0"/>
-              <a:t>27-Jul-19</a:t>
+              <a:t>11-Aug-19</a:t>
             </a:fld>
             <a:endParaRPr lang="en-US" dirty="0"/>
           </a:p>
@@ -6106,7 +6107,7 @@
           <a:p>
             <a:fld id="{48A87A34-81AB-432B-8DAE-1953F412C126}" type="datetimeFigureOut">
               <a:rPr lang="en-US" smtClean="0"/>
-              <a:t>27-Jul-19</a:t>
+              <a:t>11-Aug-19</a:t>
             </a:fld>
             <a:endParaRPr lang="en-US" dirty="0"/>
           </a:p>
@@ -6826,7 +6827,7 @@
           <a:p>
             <a:fld id="{48A87A34-81AB-432B-8DAE-1953F412C126}" type="datetimeFigureOut">
               <a:rPr lang="en-US" smtClean="0"/>
-              <a:t>27-Jul-19</a:t>
+              <a:t>11-Aug-19</a:t>
             </a:fld>
             <a:endParaRPr lang="en-US" dirty="0"/>
           </a:p>
@@ -6996,7 +6997,7 @@
           <a:p>
             <a:fld id="{48A87A34-81AB-432B-8DAE-1953F412C126}" type="datetimeFigureOut">
               <a:rPr lang="en-US" smtClean="0"/>
-              <a:t>27-Jul-19</a:t>
+              <a:t>11-Aug-19</a:t>
             </a:fld>
             <a:endParaRPr lang="en-US" dirty="0"/>
           </a:p>
@@ -7176,7 +7177,7 @@
           <a:p>
             <a:fld id="{48A87A34-81AB-432B-8DAE-1953F412C126}" type="datetimeFigureOut">
               <a:rPr lang="en-US" smtClean="0"/>
-              <a:t>27-Jul-19</a:t>
+              <a:t>11-Aug-19</a:t>
             </a:fld>
             <a:endParaRPr lang="en-US" dirty="0"/>
           </a:p>
@@ -7346,7 +7347,7 @@
           <a:p>
             <a:fld id="{48A87A34-81AB-432B-8DAE-1953F412C126}" type="datetimeFigureOut">
               <a:rPr lang="en-US" smtClean="0"/>
-              <a:t>27-Jul-19</a:t>
+              <a:t>11-Aug-19</a:t>
             </a:fld>
             <a:endParaRPr lang="en-US" dirty="0"/>
           </a:p>
@@ -7596,7 +7597,7 @@
           <a:p>
             <a:fld id="{48A87A34-81AB-432B-8DAE-1953F412C126}" type="datetimeFigureOut">
               <a:rPr lang="en-US" smtClean="0"/>
-              <a:t>27-Jul-19</a:t>
+              <a:t>11-Aug-19</a:t>
             </a:fld>
             <a:endParaRPr lang="en-US" dirty="0"/>
           </a:p>
@@ -7828,7 +7829,7 @@
           <a:p>
             <a:fld id="{48A87A34-81AB-432B-8DAE-1953F412C126}" type="datetimeFigureOut">
               <a:rPr lang="en-US" smtClean="0"/>
-              <a:t>27-Jul-19</a:t>
+              <a:t>11-Aug-19</a:t>
             </a:fld>
             <a:endParaRPr lang="en-US" dirty="0"/>
           </a:p>
@@ -8209,7 +8210,7 @@
           <a:p>
             <a:fld id="{48A87A34-81AB-432B-8DAE-1953F412C126}" type="datetimeFigureOut">
               <a:rPr lang="en-US" smtClean="0"/>
-              <a:t>27-Jul-19</a:t>
+              <a:t>11-Aug-19</a:t>
             </a:fld>
             <a:endParaRPr lang="en-US" dirty="0"/>
           </a:p>
@@ -8327,7 +8328,7 @@
           <a:p>
             <a:fld id="{48A87A34-81AB-432B-8DAE-1953F412C126}" type="datetimeFigureOut">
               <a:rPr lang="en-US" smtClean="0"/>
-              <a:t>27-Jul-19</a:t>
+              <a:t>11-Aug-19</a:t>
             </a:fld>
             <a:endParaRPr lang="en-US" dirty="0"/>
           </a:p>
@@ -8422,7 +8423,7 @@
           <a:p>
             <a:fld id="{48A87A34-81AB-432B-8DAE-1953F412C126}" type="datetimeFigureOut">
               <a:rPr lang="en-US" smtClean="0"/>
-              <a:t>27-Jul-19</a:t>
+              <a:t>11-Aug-19</a:t>
             </a:fld>
             <a:endParaRPr lang="en-US" dirty="0"/>
           </a:p>
@@ -8671,7 +8672,7 @@
           <a:p>
             <a:fld id="{48A87A34-81AB-432B-8DAE-1953F412C126}" type="datetimeFigureOut">
               <a:rPr lang="en-US" smtClean="0"/>
-              <a:t>27-Jul-19</a:t>
+              <a:t>11-Aug-19</a:t>
             </a:fld>
             <a:endParaRPr lang="en-US" dirty="0"/>
           </a:p>
@@ -8951,7 +8952,7 @@
           <a:p>
             <a:fld id="{48A87A34-81AB-432B-8DAE-1953F412C126}" type="datetimeFigureOut">
               <a:rPr lang="en-US" smtClean="0"/>
-              <a:t>27-Jul-19</a:t>
+              <a:t>11-Aug-19</a:t>
             </a:fld>
             <a:endParaRPr lang="en-US" dirty="0"/>
           </a:p>
@@ -9074,7 +9075,7 @@
           <a:noFill/>
           <a:extLst>
             <a:ext uri="{909E8E84-426E-40dd-AFC4-6F175D3DCCD1}">
-              <a14:hiddenFill xmlns="" xmlns:a14="http://schemas.microsoft.com/office/drawing/2010/main">
+              <a14:hiddenFill xmlns:a14="http://schemas.microsoft.com/office/drawing/2010/main" xmlns="">
                 <a:solidFill>
                   <a:srgbClr val="FFFFFF"/>
                 </a:solidFill>
@@ -9148,7 +9149,7 @@
               </a:ln>
               <a:extLst>
                 <a:ext uri="{91240B29-F687-4f45-9708-019B960494DF}">
-                  <a14:hiddenLine xmlns="" xmlns:a14="http://schemas.microsoft.com/office/drawing/2010/main" w="9525">
+                  <a14:hiddenLine xmlns:a14="http://schemas.microsoft.com/office/drawing/2010/main" xmlns="" w="9525">
                     <a:solidFill>
                       <a:srgbClr val="000000"/>
                     </a:solidFill>
@@ -9238,7 +9239,7 @@
               </a:ln>
               <a:extLst>
                 <a:ext uri="{91240B29-F687-4f45-9708-019B960494DF}">
-                  <a14:hiddenLine xmlns="" xmlns:a14="http://schemas.microsoft.com/office/drawing/2010/main" w="9525">
+                  <a14:hiddenLine xmlns:a14="http://schemas.microsoft.com/office/drawing/2010/main" xmlns="" w="9525">
                     <a:solidFill>
                       <a:srgbClr val="000000"/>
                     </a:solidFill>
@@ -9328,7 +9329,7 @@
               </a:ln>
               <a:extLst>
                 <a:ext uri="{91240B29-F687-4f45-9708-019B960494DF}">
-                  <a14:hiddenLine xmlns="" xmlns:a14="http://schemas.microsoft.com/office/drawing/2010/main" w="9525">
+                  <a14:hiddenLine xmlns:a14="http://schemas.microsoft.com/office/drawing/2010/main" xmlns="" w="9525">
                     <a:solidFill>
                       <a:srgbClr val="000000"/>
                     </a:solidFill>
@@ -9390,7 +9391,7 @@
               </a:ln>
               <a:extLst>
                 <a:ext uri="{91240B29-F687-4f45-9708-019B960494DF}">
-                  <a14:hiddenLine xmlns="" xmlns:a14="http://schemas.microsoft.com/office/drawing/2010/main" w="9525">
+                  <a14:hiddenLine xmlns:a14="http://schemas.microsoft.com/office/drawing/2010/main" xmlns="" w="9525">
                     <a:solidFill>
                       <a:srgbClr val="000000"/>
                     </a:solidFill>
@@ -9480,7 +9481,7 @@
               </a:ln>
               <a:extLst>
                 <a:ext uri="{91240B29-F687-4f45-9708-019B960494DF}">
-                  <a14:hiddenLine xmlns="" xmlns:a14="http://schemas.microsoft.com/office/drawing/2010/main" w="9525">
+                  <a14:hiddenLine xmlns:a14="http://schemas.microsoft.com/office/drawing/2010/main" xmlns="" w="9525">
                     <a:solidFill>
                       <a:srgbClr val="000000"/>
                     </a:solidFill>
@@ -9542,7 +9543,7 @@
               </a:ln>
               <a:extLst>
                 <a:ext uri="{91240B29-F687-4f45-9708-019B960494DF}">
-                  <a14:hiddenLine xmlns="" xmlns:a14="http://schemas.microsoft.com/office/drawing/2010/main" w="9525">
+                  <a14:hiddenLine xmlns:a14="http://schemas.microsoft.com/office/drawing/2010/main" xmlns="" w="9525">
                     <a:solidFill>
                       <a:srgbClr val="000000"/>
                     </a:solidFill>
@@ -9604,7 +9605,7 @@
               </a:ln>
               <a:extLst>
                 <a:ext uri="{91240B29-F687-4f45-9708-019B960494DF}">
-                  <a14:hiddenLine xmlns="" xmlns:a14="http://schemas.microsoft.com/office/drawing/2010/main" w="9525">
+                  <a14:hiddenLine xmlns:a14="http://schemas.microsoft.com/office/drawing/2010/main" xmlns="" w="9525">
                     <a:solidFill>
                       <a:srgbClr val="000000"/>
                     </a:solidFill>
@@ -9694,7 +9695,7 @@
               </a:ln>
               <a:extLst>
                 <a:ext uri="{91240B29-F687-4f45-9708-019B960494DF}">
-                  <a14:hiddenLine xmlns="" xmlns:a14="http://schemas.microsoft.com/office/drawing/2010/main" w="9525">
+                  <a14:hiddenLine xmlns:a14="http://schemas.microsoft.com/office/drawing/2010/main" xmlns="" w="9525">
                     <a:solidFill>
                       <a:srgbClr val="000000"/>
                     </a:solidFill>
@@ -9784,7 +9785,7 @@
               </a:ln>
               <a:extLst>
                 <a:ext uri="{91240B29-F687-4f45-9708-019B960494DF}">
-                  <a14:hiddenLine xmlns="" xmlns:a14="http://schemas.microsoft.com/office/drawing/2010/main" w="9525">
+                  <a14:hiddenLine xmlns:a14="http://schemas.microsoft.com/office/drawing/2010/main" xmlns="" w="9525">
                     <a:solidFill>
                       <a:srgbClr val="000000"/>
                     </a:solidFill>
@@ -9846,7 +9847,7 @@
               </a:ln>
               <a:extLst>
                 <a:ext uri="{91240B29-F687-4f45-9708-019B960494DF}">
-                  <a14:hiddenLine xmlns="" xmlns:a14="http://schemas.microsoft.com/office/drawing/2010/main" w="9525">
+                  <a14:hiddenLine xmlns:a14="http://schemas.microsoft.com/office/drawing/2010/main" xmlns="" w="9525">
                     <a:solidFill>
                       <a:srgbClr val="000000"/>
                     </a:solidFill>
@@ -9956,7 +9957,7 @@
               </a:ln>
               <a:extLst>
                 <a:ext uri="{91240B29-F687-4f45-9708-019B960494DF}">
-                  <a14:hiddenLine xmlns="" xmlns:a14="http://schemas.microsoft.com/office/drawing/2010/main" w="9525">
+                  <a14:hiddenLine xmlns:a14="http://schemas.microsoft.com/office/drawing/2010/main" xmlns="" w="9525">
                     <a:solidFill>
                       <a:srgbClr val="000000"/>
                     </a:solidFill>
@@ -10040,7 +10041,7 @@
               </a:ln>
               <a:extLst>
                 <a:ext uri="{91240B29-F687-4f45-9708-019B960494DF}">
-                  <a14:hiddenLine xmlns="" xmlns:a14="http://schemas.microsoft.com/office/drawing/2010/main" w="9525">
+                  <a14:hiddenLine xmlns:a14="http://schemas.microsoft.com/office/drawing/2010/main" xmlns="" w="9525">
                     <a:solidFill>
                       <a:srgbClr val="000000"/>
                     </a:solidFill>
@@ -10102,7 +10103,7 @@
               </a:ln>
               <a:extLst>
                 <a:ext uri="{91240B29-F687-4f45-9708-019B960494DF}">
-                  <a14:hiddenLine xmlns="" xmlns:a14="http://schemas.microsoft.com/office/drawing/2010/main" w="9525">
+                  <a14:hiddenLine xmlns:a14="http://schemas.microsoft.com/office/drawing/2010/main" xmlns="" w="9525">
                     <a:solidFill>
                       <a:srgbClr val="000000"/>
                     </a:solidFill>
@@ -10164,7 +10165,7 @@
               </a:ln>
               <a:extLst>
                 <a:ext uri="{91240B29-F687-4f45-9708-019B960494DF}">
-                  <a14:hiddenLine xmlns="" xmlns:a14="http://schemas.microsoft.com/office/drawing/2010/main" w="9525">
+                  <a14:hiddenLine xmlns:a14="http://schemas.microsoft.com/office/drawing/2010/main" xmlns="" w="9525">
                     <a:solidFill>
                       <a:srgbClr val="000000"/>
                     </a:solidFill>
@@ -10254,7 +10255,7 @@
               </a:ln>
               <a:extLst>
                 <a:ext uri="{91240B29-F687-4f45-9708-019B960494DF}">
-                  <a14:hiddenLine xmlns="" xmlns:a14="http://schemas.microsoft.com/office/drawing/2010/main" w="9525">
+                  <a14:hiddenLine xmlns:a14="http://schemas.microsoft.com/office/drawing/2010/main" xmlns="" w="9525">
                     <a:solidFill>
                       <a:srgbClr val="000000"/>
                     </a:solidFill>
@@ -10288,7 +10289,7 @@
               </a:ln>
               <a:extLst>
                 <a:ext uri="{91240B29-F687-4f45-9708-019B960494DF}">
-                  <a14:hiddenLine xmlns="" xmlns:a14="http://schemas.microsoft.com/office/drawing/2010/main" w="9525">
+                  <a14:hiddenLine xmlns:a14="http://schemas.microsoft.com/office/drawing/2010/main" xmlns="" w="9525">
                     <a:solidFill>
                       <a:srgbClr val="000000"/>
                     </a:solidFill>
@@ -10353,7 +10354,7 @@
               </a:ln>
               <a:extLst>
                 <a:ext uri="{91240B29-F687-4f45-9708-019B960494DF}">
-                  <a14:hiddenLine xmlns="" xmlns:a14="http://schemas.microsoft.com/office/drawing/2010/main" w="9525">
+                  <a14:hiddenLine xmlns:a14="http://schemas.microsoft.com/office/drawing/2010/main" xmlns="" w="9525">
                     <a:solidFill>
                       <a:srgbClr val="000000"/>
                     </a:solidFill>
@@ -10443,7 +10444,7 @@
               </a:ln>
               <a:extLst>
                 <a:ext uri="{91240B29-F687-4f45-9708-019B960494DF}">
-                  <a14:hiddenLine xmlns="" xmlns:a14="http://schemas.microsoft.com/office/drawing/2010/main" w="9525">
+                  <a14:hiddenLine xmlns:a14="http://schemas.microsoft.com/office/drawing/2010/main" xmlns="" w="9525">
                     <a:solidFill>
                       <a:srgbClr val="000000"/>
                     </a:solidFill>
@@ -10505,7 +10506,7 @@
               </a:ln>
               <a:extLst>
                 <a:ext uri="{91240B29-F687-4f45-9708-019B960494DF}">
-                  <a14:hiddenLine xmlns="" xmlns:a14="http://schemas.microsoft.com/office/drawing/2010/main" w="9525">
+                  <a14:hiddenLine xmlns:a14="http://schemas.microsoft.com/office/drawing/2010/main" xmlns="" w="9525">
                     <a:solidFill>
                       <a:srgbClr val="000000"/>
                     </a:solidFill>
@@ -10595,7 +10596,7 @@
               </a:ln>
               <a:extLst>
                 <a:ext uri="{91240B29-F687-4f45-9708-019B960494DF}">
-                  <a14:hiddenLine xmlns="" xmlns:a14="http://schemas.microsoft.com/office/drawing/2010/main" w="9525">
+                  <a14:hiddenLine xmlns:a14="http://schemas.microsoft.com/office/drawing/2010/main" xmlns="" w="9525">
                     <a:solidFill>
                       <a:srgbClr val="000000"/>
                     </a:solidFill>
@@ -10660,7 +10661,7 @@
               </a:ln>
               <a:extLst>
                 <a:ext uri="{91240B29-F687-4f45-9708-019B960494DF}">
-                  <a14:hiddenLine xmlns="" xmlns:a14="http://schemas.microsoft.com/office/drawing/2010/main" w="9525">
+                  <a14:hiddenLine xmlns:a14="http://schemas.microsoft.com/office/drawing/2010/main" xmlns="" w="9525">
                     <a:solidFill>
                       <a:srgbClr val="000000"/>
                     </a:solidFill>
@@ -10722,7 +10723,7 @@
               </a:ln>
               <a:extLst>
                 <a:ext uri="{91240B29-F687-4f45-9708-019B960494DF}">
-                  <a14:hiddenLine xmlns="" xmlns:a14="http://schemas.microsoft.com/office/drawing/2010/main" w="9525">
+                  <a14:hiddenLine xmlns:a14="http://schemas.microsoft.com/office/drawing/2010/main" xmlns="" w="9525">
                     <a:solidFill>
                       <a:srgbClr val="000000"/>
                     </a:solidFill>
@@ -10812,7 +10813,7 @@
               </a:ln>
               <a:extLst>
                 <a:ext uri="{91240B29-F687-4f45-9708-019B960494DF}">
-                  <a14:hiddenLine xmlns="" xmlns:a14="http://schemas.microsoft.com/office/drawing/2010/main" w="9525">
+                  <a14:hiddenLine xmlns:a14="http://schemas.microsoft.com/office/drawing/2010/main" xmlns="" w="9525">
                     <a:solidFill>
                       <a:srgbClr val="000000"/>
                     </a:solidFill>
@@ -10902,7 +10903,7 @@
               </a:ln>
               <a:extLst>
                 <a:ext uri="{91240B29-F687-4f45-9708-019B960494DF}">
-                  <a14:hiddenLine xmlns="" xmlns:a14="http://schemas.microsoft.com/office/drawing/2010/main" w="9525">
+                  <a14:hiddenLine xmlns:a14="http://schemas.microsoft.com/office/drawing/2010/main" xmlns="" w="9525">
                     <a:solidFill>
                       <a:srgbClr val="000000"/>
                     </a:solidFill>
@@ -10967,7 +10968,7 @@
               </a:ln>
               <a:extLst>
                 <a:ext uri="{91240B29-F687-4f45-9708-019B960494DF}">
-                  <a14:hiddenLine xmlns="" xmlns:a14="http://schemas.microsoft.com/office/drawing/2010/main" w="9525">
+                  <a14:hiddenLine xmlns:a14="http://schemas.microsoft.com/office/drawing/2010/main" xmlns="" w="9525">
                     <a:solidFill>
                       <a:srgbClr val="000000"/>
                     </a:solidFill>
@@ -11087,7 +11088,7 @@
               </a:ln>
               <a:extLst>
                 <a:ext uri="{91240B29-F687-4f45-9708-019B960494DF}">
-                  <a14:hiddenLine xmlns="" xmlns:a14="http://schemas.microsoft.com/office/drawing/2010/main" w="9525">
+                  <a14:hiddenLine xmlns:a14="http://schemas.microsoft.com/office/drawing/2010/main" xmlns="" w="9525">
                     <a:solidFill>
                       <a:srgbClr val="000000"/>
                     </a:solidFill>
@@ -11168,7 +11169,7 @@
               </a:ln>
               <a:extLst>
                 <a:ext uri="{91240B29-F687-4f45-9708-019B960494DF}">
-                  <a14:hiddenLine xmlns="" xmlns:a14="http://schemas.microsoft.com/office/drawing/2010/main" w="9525">
+                  <a14:hiddenLine xmlns:a14="http://schemas.microsoft.com/office/drawing/2010/main" xmlns="" w="9525">
                     <a:solidFill>
                       <a:srgbClr val="000000"/>
                     </a:solidFill>
@@ -11283,7 +11284,7 @@
               </a:ln>
               <a:extLst>
                 <a:ext uri="{91240B29-F687-4f45-9708-019B960494DF}">
-                  <a14:hiddenLine xmlns="" xmlns:a14="http://schemas.microsoft.com/office/drawing/2010/main" w="9525">
+                  <a14:hiddenLine xmlns:a14="http://schemas.microsoft.com/office/drawing/2010/main" xmlns="" w="9525">
                     <a:solidFill>
                       <a:srgbClr val="000000"/>
                     </a:solidFill>
@@ -11373,7 +11374,7 @@
               </a:ln>
               <a:extLst>
                 <a:ext uri="{91240B29-F687-4f45-9708-019B960494DF}">
-                  <a14:hiddenLine xmlns="" xmlns:a14="http://schemas.microsoft.com/office/drawing/2010/main" w="9525">
+                  <a14:hiddenLine xmlns:a14="http://schemas.microsoft.com/office/drawing/2010/main" xmlns="" w="9525">
                     <a:solidFill>
                       <a:srgbClr val="000000"/>
                     </a:solidFill>
@@ -11438,7 +11439,7 @@
               </a:ln>
               <a:extLst>
                 <a:ext uri="{91240B29-F687-4f45-9708-019B960494DF}">
-                  <a14:hiddenLine xmlns="" xmlns:a14="http://schemas.microsoft.com/office/drawing/2010/main" w="9525">
+                  <a14:hiddenLine xmlns:a14="http://schemas.microsoft.com/office/drawing/2010/main" xmlns="" w="9525">
                     <a:solidFill>
                       <a:srgbClr val="000000"/>
                     </a:solidFill>
@@ -11528,7 +11529,7 @@
               </a:ln>
               <a:extLst>
                 <a:ext uri="{91240B29-F687-4f45-9708-019B960494DF}">
-                  <a14:hiddenLine xmlns="" xmlns:a14="http://schemas.microsoft.com/office/drawing/2010/main" w="9525">
+                  <a14:hiddenLine xmlns:a14="http://schemas.microsoft.com/office/drawing/2010/main" xmlns="" w="9525">
                     <a:solidFill>
                       <a:srgbClr val="000000"/>
                     </a:solidFill>
@@ -11596,7 +11597,7 @@
               </a:ln>
               <a:extLst>
                 <a:ext uri="{91240B29-F687-4f45-9708-019B960494DF}">
-                  <a14:hiddenLine xmlns="" xmlns:a14="http://schemas.microsoft.com/office/drawing/2010/main" w="9525">
+                  <a14:hiddenLine xmlns:a14="http://schemas.microsoft.com/office/drawing/2010/main" xmlns="" w="9525">
                     <a:solidFill>
                       <a:srgbClr val="000000"/>
                     </a:solidFill>
@@ -11686,7 +11687,7 @@
               </a:ln>
               <a:extLst>
                 <a:ext uri="{91240B29-F687-4f45-9708-019B960494DF}">
-                  <a14:hiddenLine xmlns="" xmlns:a14="http://schemas.microsoft.com/office/drawing/2010/main" w="9525">
+                  <a14:hiddenLine xmlns:a14="http://schemas.microsoft.com/office/drawing/2010/main" xmlns="" w="9525">
                     <a:solidFill>
                       <a:srgbClr val="000000"/>
                     </a:solidFill>
@@ -11754,7 +11755,7 @@
               </a:ln>
               <a:extLst>
                 <a:ext uri="{91240B29-F687-4f45-9708-019B960494DF}">
-                  <a14:hiddenLine xmlns="" xmlns:a14="http://schemas.microsoft.com/office/drawing/2010/main" w="9525">
+                  <a14:hiddenLine xmlns:a14="http://schemas.microsoft.com/office/drawing/2010/main" xmlns="" w="9525">
                     <a:solidFill>
                       <a:srgbClr val="000000"/>
                     </a:solidFill>
@@ -11844,7 +11845,7 @@
               </a:ln>
               <a:extLst>
                 <a:ext uri="{91240B29-F687-4f45-9708-019B960494DF}">
-                  <a14:hiddenLine xmlns="" xmlns:a14="http://schemas.microsoft.com/office/drawing/2010/main" w="9525">
+                  <a14:hiddenLine xmlns:a14="http://schemas.microsoft.com/office/drawing/2010/main" xmlns="" w="9525">
                     <a:solidFill>
                       <a:srgbClr val="000000"/>
                     </a:solidFill>
@@ -11878,7 +11879,7 @@
               </a:ln>
               <a:extLst>
                 <a:ext uri="{91240B29-F687-4f45-9708-019B960494DF}">
-                  <a14:hiddenLine xmlns="" xmlns:a14="http://schemas.microsoft.com/office/drawing/2010/main" w="9525">
+                  <a14:hiddenLine xmlns:a14="http://schemas.microsoft.com/office/drawing/2010/main" xmlns="" w="9525">
                     <a:solidFill>
                       <a:srgbClr val="000000"/>
                     </a:solidFill>
@@ -12019,7 +12020,7 @@
             <a:fld id="{48A87A34-81AB-432B-8DAE-1953F412C126}" type="datetimeFigureOut">
               <a:rPr lang="en-US" smtClean="0"/>
               <a:pPr/>
-              <a:t>27-Jul-19</a:t>
+              <a:t>11-Aug-19</a:t>
             </a:fld>
             <a:endParaRPr lang="en-US" dirty="0"/>
           </a:p>
@@ -13159,6 +13160,1247 @@
 </file>
 
 <file path=ppt/slides/slide6.xml><?xml version="1.0" encoding="utf-8"?>
+<p:sld xmlns:a="http://schemas.openxmlformats.org/drawingml/2006/main" xmlns:r="http://schemas.openxmlformats.org/officeDocument/2006/relationships" xmlns:p="http://schemas.openxmlformats.org/presentationml/2006/main">
+  <p:cSld>
+    <p:spTree>
+      <p:nvGrpSpPr>
+        <p:cNvPr id="1" name=""/>
+        <p:cNvGrpSpPr/>
+        <p:nvPr/>
+      </p:nvGrpSpPr>
+      <p:grpSpPr>
+        <a:xfrm>
+          <a:off x="0" y="0"/>
+          <a:ext cx="0" cy="0"/>
+          <a:chOff x="0" y="0"/>
+          <a:chExt cx="0" cy="0"/>
+        </a:xfrm>
+      </p:grpSpPr>
+      <p:sp>
+        <p:nvSpPr>
+          <p:cNvPr id="2" name="Title 1"/>
+          <p:cNvSpPr>
+            <a:spLocks noGrp="1"/>
+          </p:cNvSpPr>
+          <p:nvPr>
+            <p:ph type="title"/>
+          </p:nvPr>
+        </p:nvSpPr>
+        <p:spPr>
+          <a:xfrm>
+            <a:off x="4312527" y="67516"/>
+            <a:ext cx="5636691" cy="632766"/>
+          </a:xfrm>
+        </p:spPr>
+        <p:txBody>
+          <a:bodyPr>
+            <a:normAutofit fontScale="90000"/>
+          </a:bodyPr>
+          <a:lstStyle/>
+          <a:p>
+            <a:r>
+              <a:rPr lang="en-US" dirty="0" smtClean="0"/>
+              <a:t>System </a:t>
+            </a:r>
+            <a:r>
+              <a:rPr lang="en-US" dirty="0" smtClean="0"/>
+              <a:t>architecture (temp)</a:t>
+            </a:r>
+            <a:endParaRPr lang="en-US" dirty="0"/>
+          </a:p>
+        </p:txBody>
+      </p:sp>
+      <p:sp>
+        <p:nvSpPr>
+          <p:cNvPr id="5" name="Rectangle 4"/>
+          <p:cNvSpPr/>
+          <p:nvPr/>
+        </p:nvSpPr>
+        <p:spPr>
+          <a:xfrm>
+            <a:off x="5642811" y="632767"/>
+            <a:ext cx="986589" cy="566617"/>
+          </a:xfrm>
+          <a:prstGeom prst="rect">
+            <a:avLst/>
+          </a:prstGeom>
+        </p:spPr>
+        <p:style>
+          <a:lnRef idx="2">
+            <a:schemeClr val="accent1">
+              <a:shade val="50000"/>
+            </a:schemeClr>
+          </a:lnRef>
+          <a:fillRef idx="1">
+            <a:schemeClr val="accent1"/>
+          </a:fillRef>
+          <a:effectRef idx="0">
+            <a:schemeClr val="accent1"/>
+          </a:effectRef>
+          <a:fontRef idx="minor">
+            <a:schemeClr val="lt1"/>
+          </a:fontRef>
+        </p:style>
+        <p:txBody>
+          <a:bodyPr rtlCol="0" anchor="ctr"/>
+          <a:lstStyle/>
+          <a:p>
+            <a:pPr algn="ctr"/>
+            <a:endParaRPr lang="en-US"/>
+          </a:p>
+        </p:txBody>
+      </p:sp>
+      <p:sp>
+        <p:nvSpPr>
+          <p:cNvPr id="8" name="TextBox 7"/>
+          <p:cNvSpPr txBox="1"/>
+          <p:nvPr/>
+        </p:nvSpPr>
+        <p:spPr>
+          <a:xfrm>
+            <a:off x="5763127" y="724408"/>
+            <a:ext cx="1046747" cy="369332"/>
+          </a:xfrm>
+          <a:prstGeom prst="rect">
+            <a:avLst/>
+          </a:prstGeom>
+          <a:noFill/>
+        </p:spPr>
+        <p:txBody>
+          <a:bodyPr wrap="square" rtlCol="0">
+            <a:spAutoFit/>
+          </a:bodyPr>
+          <a:lstStyle/>
+          <a:p>
+            <a:r>
+              <a:rPr lang="en-US" dirty="0" smtClean="0"/>
+              <a:t>CLIENT</a:t>
+            </a:r>
+            <a:endParaRPr lang="en-US" dirty="0"/>
+          </a:p>
+        </p:txBody>
+      </p:sp>
+      <p:sp>
+        <p:nvSpPr>
+          <p:cNvPr id="9" name="Can 8"/>
+          <p:cNvSpPr/>
+          <p:nvPr/>
+        </p:nvSpPr>
+        <p:spPr>
+          <a:xfrm>
+            <a:off x="5594685" y="6043864"/>
+            <a:ext cx="1371600" cy="565484"/>
+          </a:xfrm>
+          <a:prstGeom prst="can">
+            <a:avLst/>
+          </a:prstGeom>
+        </p:spPr>
+        <p:style>
+          <a:lnRef idx="2">
+            <a:schemeClr val="accent1">
+              <a:shade val="50000"/>
+            </a:schemeClr>
+          </a:lnRef>
+          <a:fillRef idx="1">
+            <a:schemeClr val="accent1"/>
+          </a:fillRef>
+          <a:effectRef idx="0">
+            <a:schemeClr val="accent1"/>
+          </a:effectRef>
+          <a:fontRef idx="minor">
+            <a:schemeClr val="lt1"/>
+          </a:fontRef>
+        </p:style>
+        <p:txBody>
+          <a:bodyPr rtlCol="0" anchor="ctr"/>
+          <a:lstStyle/>
+          <a:p>
+            <a:pPr algn="ctr"/>
+            <a:endParaRPr lang="en-US"/>
+          </a:p>
+        </p:txBody>
+      </p:sp>
+      <p:sp>
+        <p:nvSpPr>
+          <p:cNvPr id="10" name="TextBox 9"/>
+          <p:cNvSpPr txBox="1"/>
+          <p:nvPr/>
+        </p:nvSpPr>
+        <p:spPr>
+          <a:xfrm>
+            <a:off x="5763127" y="6187644"/>
+            <a:ext cx="1287379" cy="369332"/>
+          </a:xfrm>
+          <a:prstGeom prst="rect">
+            <a:avLst/>
+          </a:prstGeom>
+          <a:noFill/>
+        </p:spPr>
+        <p:txBody>
+          <a:bodyPr wrap="square" rtlCol="0">
+            <a:spAutoFit/>
+          </a:bodyPr>
+          <a:lstStyle/>
+          <a:p>
+            <a:r>
+              <a:rPr lang="en-US" dirty="0" smtClean="0">
+                <a:solidFill>
+                  <a:schemeClr val="bg1"/>
+                </a:solidFill>
+              </a:rPr>
+              <a:t>Database</a:t>
+            </a:r>
+            <a:endParaRPr lang="en-US" dirty="0">
+              <a:solidFill>
+                <a:schemeClr val="bg1"/>
+              </a:solidFill>
+            </a:endParaRPr>
+          </a:p>
+        </p:txBody>
+      </p:sp>
+      <p:cxnSp>
+        <p:nvCxnSpPr>
+          <p:cNvPr id="12" name="Straight Arrow Connector 11"/>
+          <p:cNvCxnSpPr>
+            <a:stCxn id="6" idx="2"/>
+            <a:endCxn id="9" idx="1"/>
+          </p:cNvCxnSpPr>
+          <p:nvPr/>
+        </p:nvCxnSpPr>
+        <p:spPr>
+          <a:xfrm>
+            <a:off x="6280485" y="5390865"/>
+            <a:ext cx="0" cy="652999"/>
+          </a:xfrm>
+          <a:prstGeom prst="straightConnector1">
+            <a:avLst/>
+          </a:prstGeom>
+          <a:ln>
+            <a:headEnd type="triangle"/>
+            <a:tailEnd type="triangle"/>
+          </a:ln>
+        </p:spPr>
+        <p:style>
+          <a:lnRef idx="1">
+            <a:schemeClr val="accent1"/>
+          </a:lnRef>
+          <a:fillRef idx="0">
+            <a:schemeClr val="accent1"/>
+          </a:fillRef>
+          <a:effectRef idx="0">
+            <a:schemeClr val="accent1"/>
+          </a:effectRef>
+          <a:fontRef idx="minor">
+            <a:schemeClr val="tx1"/>
+          </a:fontRef>
+        </p:style>
+      </p:cxnSp>
+      <p:grpSp>
+        <p:nvGrpSpPr>
+          <p:cNvPr id="39" name="Group 38"/>
+          <p:cNvGrpSpPr/>
+          <p:nvPr/>
+        </p:nvGrpSpPr>
+        <p:grpSpPr>
+          <a:xfrm>
+            <a:off x="2478506" y="1564823"/>
+            <a:ext cx="7603958" cy="3853045"/>
+            <a:chOff x="2478506" y="1564823"/>
+            <a:chExt cx="7603958" cy="3853045"/>
+          </a:xfrm>
+        </p:grpSpPr>
+        <p:grpSp>
+          <p:nvGrpSpPr>
+            <p:cNvPr id="37" name="Group 36"/>
+            <p:cNvGrpSpPr/>
+            <p:nvPr/>
+          </p:nvGrpSpPr>
+          <p:grpSpPr>
+            <a:xfrm>
+              <a:off x="2478506" y="1564823"/>
+              <a:ext cx="7603958" cy="3826042"/>
+              <a:chOff x="2478505" y="1965159"/>
+              <a:chExt cx="7603958" cy="3826042"/>
+            </a:xfrm>
+          </p:grpSpPr>
+          <p:sp>
+            <p:nvSpPr>
+              <p:cNvPr id="6" name="Rectangle 5"/>
+              <p:cNvSpPr/>
+              <p:nvPr/>
+            </p:nvSpPr>
+            <p:spPr>
+              <a:xfrm>
+                <a:off x="2478505" y="1965159"/>
+                <a:ext cx="7603958" cy="3826042"/>
+              </a:xfrm>
+              <a:prstGeom prst="rect">
+                <a:avLst/>
+              </a:prstGeom>
+            </p:spPr>
+            <p:style>
+              <a:lnRef idx="2">
+                <a:schemeClr val="accent6"/>
+              </a:lnRef>
+              <a:fillRef idx="1">
+                <a:schemeClr val="lt1"/>
+              </a:fillRef>
+              <a:effectRef idx="0">
+                <a:schemeClr val="accent6"/>
+              </a:effectRef>
+              <a:fontRef idx="minor">
+                <a:schemeClr val="dk1"/>
+              </a:fontRef>
+            </p:style>
+            <p:txBody>
+              <a:bodyPr rtlCol="0" anchor="ctr"/>
+              <a:lstStyle/>
+              <a:p>
+                <a:pPr algn="ctr"/>
+                <a:endParaRPr lang="en-US"/>
+              </a:p>
+            </p:txBody>
+          </p:sp>
+          <p:sp>
+            <p:nvSpPr>
+              <p:cNvPr id="7" name="Rectangle 6"/>
+              <p:cNvSpPr/>
+              <p:nvPr/>
+            </p:nvSpPr>
+            <p:spPr>
+              <a:xfrm>
+                <a:off x="2749216" y="2247683"/>
+                <a:ext cx="7062537" cy="3215072"/>
+              </a:xfrm>
+              <a:prstGeom prst="rect">
+                <a:avLst/>
+              </a:prstGeom>
+            </p:spPr>
+            <p:style>
+              <a:lnRef idx="2">
+                <a:schemeClr val="accent1">
+                  <a:shade val="50000"/>
+                </a:schemeClr>
+              </a:lnRef>
+              <a:fillRef idx="1">
+                <a:schemeClr val="accent1"/>
+              </a:fillRef>
+              <a:effectRef idx="0">
+                <a:schemeClr val="accent1"/>
+              </a:effectRef>
+              <a:fontRef idx="minor">
+                <a:schemeClr val="lt1"/>
+              </a:fontRef>
+            </p:style>
+            <p:txBody>
+              <a:bodyPr rtlCol="0" anchor="ctr"/>
+              <a:lstStyle/>
+              <a:p>
+                <a:pPr algn="ctr"/>
+                <a:endParaRPr lang="en-US"/>
+              </a:p>
+            </p:txBody>
+          </p:sp>
+          <p:sp>
+            <p:nvSpPr>
+              <p:cNvPr id="14" name="Rectangle 13"/>
+              <p:cNvSpPr/>
+              <p:nvPr/>
+            </p:nvSpPr>
+            <p:spPr>
+              <a:xfrm>
+                <a:off x="2947737" y="2430379"/>
+                <a:ext cx="1985210" cy="2875547"/>
+              </a:xfrm>
+              <a:prstGeom prst="rect">
+                <a:avLst/>
+              </a:prstGeom>
+            </p:spPr>
+            <p:style>
+              <a:lnRef idx="1">
+                <a:schemeClr val="accent1"/>
+              </a:lnRef>
+              <a:fillRef idx="2">
+                <a:schemeClr val="accent1"/>
+              </a:fillRef>
+              <a:effectRef idx="1">
+                <a:schemeClr val="accent1"/>
+              </a:effectRef>
+              <a:fontRef idx="minor">
+                <a:schemeClr val="dk1"/>
+              </a:fontRef>
+            </p:style>
+            <p:txBody>
+              <a:bodyPr rtlCol="0" anchor="ctr"/>
+              <a:lstStyle/>
+              <a:p>
+                <a:pPr algn="ctr"/>
+                <a:endParaRPr lang="en-US"/>
+              </a:p>
+            </p:txBody>
+          </p:sp>
+          <p:sp>
+            <p:nvSpPr>
+              <p:cNvPr id="15" name="TextBox 14"/>
+              <p:cNvSpPr txBox="1"/>
+              <p:nvPr/>
+            </p:nvSpPr>
+            <p:spPr>
+              <a:xfrm>
+                <a:off x="3026529" y="2753879"/>
+                <a:ext cx="1913661" cy="1754326"/>
+              </a:xfrm>
+              <a:prstGeom prst="rect">
+                <a:avLst/>
+              </a:prstGeom>
+              <a:noFill/>
+            </p:spPr>
+            <p:txBody>
+              <a:bodyPr wrap="square" rtlCol="0">
+                <a:spAutoFit/>
+              </a:bodyPr>
+              <a:lstStyle/>
+              <a:p>
+                <a:r>
+                  <a:rPr lang="en-US" dirty="0" smtClean="0">
+                    <a:solidFill>
+                      <a:schemeClr val="bg1"/>
+                    </a:solidFill>
+                  </a:rPr>
+                  <a:t>User Interface:</a:t>
+                </a:r>
+              </a:p>
+              <a:p>
+                <a:endParaRPr lang="en-US" dirty="0">
+                  <a:solidFill>
+                    <a:schemeClr val="bg1"/>
+                  </a:solidFill>
+                </a:endParaRPr>
+              </a:p>
+              <a:p>
+                <a:r>
+                  <a:rPr lang="en-US" dirty="0" smtClean="0">
+                    <a:solidFill>
+                      <a:schemeClr val="bg1"/>
+                    </a:solidFill>
+                  </a:rPr>
+                  <a:t>Template Engine, UI Libraries,</a:t>
+                </a:r>
+              </a:p>
+              <a:p>
+                <a:r>
+                  <a:rPr lang="en-US" dirty="0" smtClean="0">
+                    <a:solidFill>
+                      <a:schemeClr val="bg1"/>
+                    </a:solidFill>
+                  </a:rPr>
+                  <a:t>Frameworks, Scripts</a:t>
+                </a:r>
+                <a:endParaRPr lang="en-US" dirty="0" smtClean="0">
+                  <a:solidFill>
+                    <a:schemeClr val="bg1"/>
+                  </a:solidFill>
+                </a:endParaRPr>
+              </a:p>
+            </p:txBody>
+          </p:sp>
+          <p:sp>
+            <p:nvSpPr>
+              <p:cNvPr id="16" name="Rectangle 15"/>
+              <p:cNvSpPr/>
+              <p:nvPr/>
+            </p:nvSpPr>
+            <p:spPr>
+              <a:xfrm>
+                <a:off x="5065296" y="2430378"/>
+                <a:ext cx="4547936" cy="2875547"/>
+              </a:xfrm>
+              <a:prstGeom prst="rect">
+                <a:avLst/>
+              </a:prstGeom>
+            </p:spPr>
+            <p:style>
+              <a:lnRef idx="1">
+                <a:schemeClr val="accent1"/>
+              </a:lnRef>
+              <a:fillRef idx="2">
+                <a:schemeClr val="accent1"/>
+              </a:fillRef>
+              <a:effectRef idx="1">
+                <a:schemeClr val="accent1"/>
+              </a:effectRef>
+              <a:fontRef idx="minor">
+                <a:schemeClr val="dk1"/>
+              </a:fontRef>
+            </p:style>
+            <p:txBody>
+              <a:bodyPr rtlCol="0" anchor="ctr"/>
+              <a:lstStyle/>
+              <a:p>
+                <a:pPr algn="ctr"/>
+                <a:endParaRPr lang="en-US"/>
+              </a:p>
+            </p:txBody>
+          </p:sp>
+          <p:grpSp>
+            <p:nvGrpSpPr>
+              <p:cNvPr id="26" name="Group 25"/>
+              <p:cNvGrpSpPr/>
+              <p:nvPr/>
+            </p:nvGrpSpPr>
+            <p:grpSpPr>
+              <a:xfrm>
+                <a:off x="7369342" y="2840134"/>
+                <a:ext cx="1840831" cy="389441"/>
+                <a:chOff x="6637213" y="2932465"/>
+                <a:chExt cx="1840831" cy="389441"/>
+              </a:xfrm>
+            </p:grpSpPr>
+            <p:sp>
+              <p:nvSpPr>
+                <p:cNvPr id="19" name="Rectangle 18"/>
+                <p:cNvSpPr/>
+                <p:nvPr/>
+              </p:nvSpPr>
+              <p:spPr>
+                <a:xfrm>
+                  <a:off x="6637213" y="2932465"/>
+                  <a:ext cx="1840831" cy="389441"/>
+                </a:xfrm>
+                <a:prstGeom prst="rect">
+                  <a:avLst/>
+                </a:prstGeom>
+              </p:spPr>
+              <p:style>
+                <a:lnRef idx="2">
+                  <a:schemeClr val="accent1">
+                    <a:shade val="50000"/>
+                  </a:schemeClr>
+                </a:lnRef>
+                <a:fillRef idx="1">
+                  <a:schemeClr val="accent1"/>
+                </a:fillRef>
+                <a:effectRef idx="0">
+                  <a:schemeClr val="accent1"/>
+                </a:effectRef>
+                <a:fontRef idx="minor">
+                  <a:schemeClr val="lt1"/>
+                </a:fontRef>
+              </p:style>
+              <p:txBody>
+                <a:bodyPr rtlCol="0" anchor="ctr"/>
+                <a:lstStyle/>
+                <a:p>
+                  <a:pPr algn="ctr"/>
+                  <a:endParaRPr lang="en-US"/>
+                </a:p>
+              </p:txBody>
+            </p:sp>
+            <p:sp>
+              <p:nvSpPr>
+                <p:cNvPr id="20" name="TextBox 19"/>
+                <p:cNvSpPr txBox="1"/>
+                <p:nvPr/>
+              </p:nvSpPr>
+              <p:spPr>
+                <a:xfrm>
+                  <a:off x="6757529" y="2952574"/>
+                  <a:ext cx="1720515" cy="369332"/>
+                </a:xfrm>
+                <a:prstGeom prst="rect">
+                  <a:avLst/>
+                </a:prstGeom>
+                <a:noFill/>
+              </p:spPr>
+              <p:txBody>
+                <a:bodyPr wrap="square" rtlCol="0">
+                  <a:spAutoFit/>
+                </a:bodyPr>
+                <a:lstStyle/>
+                <a:p>
+                  <a:r>
+                    <a:rPr lang="en-US" dirty="0" smtClean="0"/>
+                    <a:t>MVC Framework</a:t>
+                  </a:r>
+                  <a:endParaRPr lang="en-US" dirty="0"/>
+                </a:p>
+              </p:txBody>
+            </p:sp>
+          </p:grpSp>
+          <p:grpSp>
+            <p:nvGrpSpPr>
+              <p:cNvPr id="25" name="Group 24"/>
+              <p:cNvGrpSpPr/>
+              <p:nvPr/>
+            </p:nvGrpSpPr>
+            <p:grpSpPr>
+              <a:xfrm>
+                <a:off x="7369342" y="3459775"/>
+                <a:ext cx="1469063" cy="389441"/>
+                <a:chOff x="6637213" y="3728101"/>
+                <a:chExt cx="1469063" cy="389441"/>
+              </a:xfrm>
+            </p:grpSpPr>
+            <p:sp>
+              <p:nvSpPr>
+                <p:cNvPr id="21" name="Rectangle 20"/>
+                <p:cNvSpPr/>
+                <p:nvPr/>
+              </p:nvSpPr>
+              <p:spPr>
+                <a:xfrm>
+                  <a:off x="6637213" y="3728101"/>
+                  <a:ext cx="1469063" cy="389441"/>
+                </a:xfrm>
+                <a:prstGeom prst="rect">
+                  <a:avLst/>
+                </a:prstGeom>
+              </p:spPr>
+              <p:style>
+                <a:lnRef idx="2">
+                  <a:schemeClr val="accent1">
+                    <a:shade val="50000"/>
+                  </a:schemeClr>
+                </a:lnRef>
+                <a:fillRef idx="1">
+                  <a:schemeClr val="accent1"/>
+                </a:fillRef>
+                <a:effectRef idx="0">
+                  <a:schemeClr val="accent1"/>
+                </a:effectRef>
+                <a:fontRef idx="minor">
+                  <a:schemeClr val="lt1"/>
+                </a:fontRef>
+              </p:style>
+              <p:txBody>
+                <a:bodyPr rtlCol="0" anchor="ctr"/>
+                <a:lstStyle/>
+                <a:p>
+                  <a:pPr algn="ctr"/>
+                  <a:endParaRPr lang="en-US"/>
+                </a:p>
+              </p:txBody>
+            </p:sp>
+            <p:sp>
+              <p:nvSpPr>
+                <p:cNvPr id="22" name="TextBox 21"/>
+                <p:cNvSpPr txBox="1"/>
+                <p:nvPr/>
+              </p:nvSpPr>
+              <p:spPr>
+                <a:xfrm>
+                  <a:off x="7044491" y="3748210"/>
+                  <a:ext cx="762208" cy="369332"/>
+                </a:xfrm>
+                <a:prstGeom prst="rect">
+                  <a:avLst/>
+                </a:prstGeom>
+                <a:noFill/>
+              </p:spPr>
+              <p:txBody>
+                <a:bodyPr wrap="square" rtlCol="0">
+                  <a:spAutoFit/>
+                </a:bodyPr>
+                <a:lstStyle/>
+                <a:p>
+                  <a:r>
+                    <a:rPr lang="en-US" dirty="0" smtClean="0"/>
+                    <a:t>POJO</a:t>
+                  </a:r>
+                  <a:endParaRPr lang="en-US" dirty="0"/>
+                </a:p>
+              </p:txBody>
+            </p:sp>
+          </p:grpSp>
+          <p:grpSp>
+            <p:nvGrpSpPr>
+              <p:cNvPr id="27" name="Group 26"/>
+              <p:cNvGrpSpPr/>
+              <p:nvPr/>
+            </p:nvGrpSpPr>
+            <p:grpSpPr>
+              <a:xfrm>
+                <a:off x="7361529" y="4010613"/>
+                <a:ext cx="1469063" cy="389441"/>
+                <a:chOff x="6637214" y="4271945"/>
+                <a:chExt cx="1469063" cy="389441"/>
+              </a:xfrm>
+            </p:grpSpPr>
+            <p:sp>
+              <p:nvSpPr>
+                <p:cNvPr id="23" name="Rectangle 22"/>
+                <p:cNvSpPr/>
+                <p:nvPr/>
+              </p:nvSpPr>
+              <p:spPr>
+                <a:xfrm>
+                  <a:off x="6637214" y="4271945"/>
+                  <a:ext cx="1469063" cy="389441"/>
+                </a:xfrm>
+                <a:prstGeom prst="rect">
+                  <a:avLst/>
+                </a:prstGeom>
+              </p:spPr>
+              <p:style>
+                <a:lnRef idx="2">
+                  <a:schemeClr val="accent1">
+                    <a:shade val="50000"/>
+                  </a:schemeClr>
+                </a:lnRef>
+                <a:fillRef idx="1">
+                  <a:schemeClr val="accent1"/>
+                </a:fillRef>
+                <a:effectRef idx="0">
+                  <a:schemeClr val="accent1"/>
+                </a:effectRef>
+                <a:fontRef idx="minor">
+                  <a:schemeClr val="lt1"/>
+                </a:fontRef>
+              </p:style>
+              <p:txBody>
+                <a:bodyPr rtlCol="0" anchor="ctr"/>
+                <a:lstStyle/>
+                <a:p>
+                  <a:pPr algn="ctr"/>
+                  <a:endParaRPr lang="en-US"/>
+                </a:p>
+              </p:txBody>
+            </p:sp>
+            <p:sp>
+              <p:nvSpPr>
+                <p:cNvPr id="24" name="TextBox 23"/>
+                <p:cNvSpPr txBox="1"/>
+                <p:nvPr/>
+              </p:nvSpPr>
+              <p:spPr>
+                <a:xfrm>
+                  <a:off x="7044492" y="4292054"/>
+                  <a:ext cx="762208" cy="369332"/>
+                </a:xfrm>
+                <a:prstGeom prst="rect">
+                  <a:avLst/>
+                </a:prstGeom>
+                <a:noFill/>
+              </p:spPr>
+              <p:txBody>
+                <a:bodyPr wrap="square" rtlCol="0">
+                  <a:spAutoFit/>
+                </a:bodyPr>
+                <a:lstStyle/>
+                <a:p>
+                  <a:r>
+                    <a:rPr lang="en-US" dirty="0" smtClean="0"/>
+                    <a:t>DAO</a:t>
+                  </a:r>
+                  <a:endParaRPr lang="en-US" dirty="0"/>
+                </a:p>
+              </p:txBody>
+            </p:sp>
+          </p:grpSp>
+          <p:sp>
+            <p:nvSpPr>
+              <p:cNvPr id="28" name="TextBox 27"/>
+              <p:cNvSpPr txBox="1"/>
+              <p:nvPr/>
+            </p:nvSpPr>
+            <p:spPr>
+              <a:xfrm>
+                <a:off x="6629400" y="4892747"/>
+                <a:ext cx="1723523" cy="369332"/>
+              </a:xfrm>
+              <a:prstGeom prst="rect">
+                <a:avLst/>
+              </a:prstGeom>
+              <a:noFill/>
+            </p:spPr>
+            <p:txBody>
+              <a:bodyPr wrap="square" rtlCol="0">
+                <a:spAutoFit/>
+              </a:bodyPr>
+              <a:lstStyle/>
+              <a:p>
+                <a:r>
+                  <a:rPr lang="en-US" dirty="0" smtClean="0">
+                    <a:solidFill>
+                      <a:schemeClr val="bg1"/>
+                    </a:solidFill>
+                  </a:rPr>
+                  <a:t>Web Container</a:t>
+                </a:r>
+                <a:endParaRPr lang="en-US" dirty="0">
+                  <a:solidFill>
+                    <a:schemeClr val="bg1"/>
+                  </a:solidFill>
+                </a:endParaRPr>
+              </a:p>
+            </p:txBody>
+          </p:sp>
+          <p:grpSp>
+            <p:nvGrpSpPr>
+              <p:cNvPr id="29" name="Group 28"/>
+              <p:cNvGrpSpPr/>
+              <p:nvPr/>
+            </p:nvGrpSpPr>
+            <p:grpSpPr>
+              <a:xfrm>
+                <a:off x="5282865" y="3169118"/>
+                <a:ext cx="1840831" cy="389441"/>
+                <a:chOff x="6637213" y="2932465"/>
+                <a:chExt cx="1840831" cy="389441"/>
+              </a:xfrm>
+            </p:grpSpPr>
+            <p:sp>
+              <p:nvSpPr>
+                <p:cNvPr id="30" name="Rectangle 29"/>
+                <p:cNvSpPr/>
+                <p:nvPr/>
+              </p:nvSpPr>
+              <p:spPr>
+                <a:xfrm>
+                  <a:off x="6637213" y="2932465"/>
+                  <a:ext cx="1469063" cy="389441"/>
+                </a:xfrm>
+                <a:prstGeom prst="rect">
+                  <a:avLst/>
+                </a:prstGeom>
+              </p:spPr>
+              <p:style>
+                <a:lnRef idx="2">
+                  <a:schemeClr val="accent1">
+                    <a:shade val="50000"/>
+                  </a:schemeClr>
+                </a:lnRef>
+                <a:fillRef idx="1">
+                  <a:schemeClr val="accent1"/>
+                </a:fillRef>
+                <a:effectRef idx="0">
+                  <a:schemeClr val="accent1"/>
+                </a:effectRef>
+                <a:fontRef idx="minor">
+                  <a:schemeClr val="lt1"/>
+                </a:fontRef>
+              </p:style>
+              <p:txBody>
+                <a:bodyPr rtlCol="0" anchor="ctr"/>
+                <a:lstStyle/>
+                <a:p>
+                  <a:pPr algn="ctr"/>
+                  <a:endParaRPr lang="en-US"/>
+                </a:p>
+              </p:txBody>
+            </p:sp>
+            <p:sp>
+              <p:nvSpPr>
+                <p:cNvPr id="31" name="TextBox 30"/>
+                <p:cNvSpPr txBox="1"/>
+                <p:nvPr/>
+              </p:nvSpPr>
+              <p:spPr>
+                <a:xfrm>
+                  <a:off x="6757529" y="2952574"/>
+                  <a:ext cx="1720515" cy="369332"/>
+                </a:xfrm>
+                <a:prstGeom prst="rect">
+                  <a:avLst/>
+                </a:prstGeom>
+                <a:noFill/>
+              </p:spPr>
+              <p:txBody>
+                <a:bodyPr wrap="square" rtlCol="0">
+                  <a:spAutoFit/>
+                </a:bodyPr>
+                <a:lstStyle/>
+                <a:p>
+                  <a:r>
+                    <a:rPr lang="en-US" dirty="0" smtClean="0"/>
+                    <a:t>Web Service</a:t>
+                  </a:r>
+                  <a:endParaRPr lang="en-US" dirty="0"/>
+                </a:p>
+              </p:txBody>
+            </p:sp>
+          </p:grpSp>
+          <p:grpSp>
+            <p:nvGrpSpPr>
+              <p:cNvPr id="32" name="Group 31"/>
+              <p:cNvGrpSpPr/>
+              <p:nvPr/>
+            </p:nvGrpSpPr>
+            <p:grpSpPr>
+              <a:xfrm>
+                <a:off x="8144170" y="4400054"/>
+                <a:ext cx="686422" cy="401346"/>
+                <a:chOff x="9504325" y="3484439"/>
+                <a:chExt cx="686422" cy="401346"/>
+              </a:xfrm>
+            </p:grpSpPr>
+            <p:sp>
+              <p:nvSpPr>
+                <p:cNvPr id="33" name="Rectangle 32"/>
+                <p:cNvSpPr/>
+                <p:nvPr/>
+              </p:nvSpPr>
+              <p:spPr>
+                <a:xfrm>
+                  <a:off x="9504325" y="3484439"/>
+                  <a:ext cx="686422" cy="389441"/>
+                </a:xfrm>
+                <a:prstGeom prst="rect">
+                  <a:avLst/>
+                </a:prstGeom>
+              </p:spPr>
+              <p:style>
+                <a:lnRef idx="2">
+                  <a:schemeClr val="accent1">
+                    <a:shade val="50000"/>
+                  </a:schemeClr>
+                </a:lnRef>
+                <a:fillRef idx="1">
+                  <a:schemeClr val="accent1"/>
+                </a:fillRef>
+                <a:effectRef idx="0">
+                  <a:schemeClr val="accent1"/>
+                </a:effectRef>
+                <a:fontRef idx="minor">
+                  <a:schemeClr val="lt1"/>
+                </a:fontRef>
+              </p:style>
+              <p:txBody>
+                <a:bodyPr rtlCol="0" anchor="ctr"/>
+                <a:lstStyle/>
+                <a:p>
+                  <a:pPr algn="ctr"/>
+                  <a:endParaRPr lang="en-US"/>
+                </a:p>
+              </p:txBody>
+            </p:sp>
+            <p:sp>
+              <p:nvSpPr>
+                <p:cNvPr id="34" name="TextBox 33"/>
+                <p:cNvSpPr txBox="1"/>
+                <p:nvPr/>
+              </p:nvSpPr>
+              <p:spPr>
+                <a:xfrm>
+                  <a:off x="9511568" y="3516453"/>
+                  <a:ext cx="654510" cy="369332"/>
+                </a:xfrm>
+                <a:prstGeom prst="rect">
+                  <a:avLst/>
+                </a:prstGeom>
+                <a:noFill/>
+              </p:spPr>
+              <p:txBody>
+                <a:bodyPr wrap="square" rtlCol="0">
+                  <a:spAutoFit/>
+                </a:bodyPr>
+                <a:lstStyle/>
+                <a:p>
+                  <a:r>
+                    <a:rPr lang="en-US" dirty="0" smtClean="0"/>
+                    <a:t>ORM</a:t>
+                  </a:r>
+                  <a:endParaRPr lang="en-US" dirty="0"/>
+                </a:p>
+              </p:txBody>
+            </p:sp>
+          </p:grpSp>
+        </p:grpSp>
+        <p:sp>
+          <p:nvSpPr>
+            <p:cNvPr id="13" name="TextBox 12"/>
+            <p:cNvSpPr txBox="1"/>
+            <p:nvPr/>
+          </p:nvSpPr>
+          <p:spPr>
+            <a:xfrm>
+              <a:off x="5564607" y="5048536"/>
+              <a:ext cx="1925052" cy="369332"/>
+            </a:xfrm>
+            <a:prstGeom prst="rect">
+              <a:avLst/>
+            </a:prstGeom>
+            <a:noFill/>
+          </p:spPr>
+          <p:txBody>
+            <a:bodyPr wrap="square" rtlCol="0">
+              <a:spAutoFit/>
+            </a:bodyPr>
+            <a:lstStyle/>
+            <a:p>
+              <a:r>
+                <a:rPr lang="en-US" dirty="0" smtClean="0">
+                  <a:solidFill>
+                    <a:schemeClr val="bg1"/>
+                  </a:solidFill>
+                </a:rPr>
+                <a:t>Application</a:t>
+              </a:r>
+              <a:r>
+                <a:rPr lang="en-US" dirty="0" smtClean="0"/>
+                <a:t> </a:t>
+              </a:r>
+              <a:r>
+                <a:rPr lang="en-US" dirty="0" smtClean="0">
+                  <a:solidFill>
+                    <a:schemeClr val="bg1"/>
+                  </a:solidFill>
+                </a:rPr>
+                <a:t>Server</a:t>
+              </a:r>
+              <a:endParaRPr lang="en-US" dirty="0">
+                <a:solidFill>
+                  <a:schemeClr val="bg1"/>
+                </a:solidFill>
+              </a:endParaRPr>
+            </a:p>
+          </p:txBody>
+        </p:sp>
+      </p:grpSp>
+      <p:cxnSp>
+        <p:nvCxnSpPr>
+          <p:cNvPr id="35" name="Straight Arrow Connector 34"/>
+          <p:cNvCxnSpPr/>
+          <p:nvPr/>
+        </p:nvCxnSpPr>
+        <p:spPr>
+          <a:xfrm>
+            <a:off x="6132095" y="1199384"/>
+            <a:ext cx="4010" cy="319517"/>
+          </a:xfrm>
+          <a:prstGeom prst="straightConnector1">
+            <a:avLst/>
+          </a:prstGeom>
+          <a:ln>
+            <a:headEnd type="triangle"/>
+            <a:tailEnd type="triangle"/>
+          </a:ln>
+        </p:spPr>
+        <p:style>
+          <a:lnRef idx="1">
+            <a:schemeClr val="accent1"/>
+          </a:lnRef>
+          <a:fillRef idx="0">
+            <a:schemeClr val="accent1"/>
+          </a:fillRef>
+          <a:effectRef idx="0">
+            <a:schemeClr val="accent1"/>
+          </a:effectRef>
+          <a:fontRef idx="minor">
+            <a:schemeClr val="tx1"/>
+          </a:fontRef>
+        </p:style>
+      </p:cxnSp>
+      <p:cxnSp>
+        <p:nvCxnSpPr>
+          <p:cNvPr id="42" name="Straight Arrow Connector 41"/>
+          <p:cNvCxnSpPr/>
+          <p:nvPr/>
+        </p:nvCxnSpPr>
+        <p:spPr>
+          <a:xfrm>
+            <a:off x="1961147" y="950495"/>
+            <a:ext cx="3603460" cy="0"/>
+          </a:xfrm>
+          <a:prstGeom prst="straightConnector1">
+            <a:avLst/>
+          </a:prstGeom>
+          <a:ln>
+            <a:tailEnd type="triangle"/>
+          </a:ln>
+        </p:spPr>
+        <p:style>
+          <a:lnRef idx="1">
+            <a:schemeClr val="accent2"/>
+          </a:lnRef>
+          <a:fillRef idx="0">
+            <a:schemeClr val="accent2"/>
+          </a:fillRef>
+          <a:effectRef idx="0">
+            <a:schemeClr val="accent2"/>
+          </a:effectRef>
+          <a:fontRef idx="minor">
+            <a:schemeClr val="tx1"/>
+          </a:fontRef>
+        </p:style>
+      </p:cxnSp>
+      <p:sp>
+        <p:nvSpPr>
+          <p:cNvPr id="44" name="TextBox 43"/>
+          <p:cNvSpPr txBox="1"/>
+          <p:nvPr/>
+        </p:nvSpPr>
+        <p:spPr>
+          <a:xfrm>
+            <a:off x="685800" y="724408"/>
+            <a:ext cx="1636295" cy="369332"/>
+          </a:xfrm>
+          <a:prstGeom prst="rect">
+            <a:avLst/>
+          </a:prstGeom>
+          <a:noFill/>
+        </p:spPr>
+        <p:txBody>
+          <a:bodyPr wrap="square" rtlCol="0">
+            <a:spAutoFit/>
+          </a:bodyPr>
+          <a:lstStyle/>
+          <a:p>
+            <a:r>
+              <a:rPr lang="en-US" dirty="0" smtClean="0"/>
+              <a:t>Client Tier</a:t>
+            </a:r>
+            <a:endParaRPr lang="en-US" dirty="0"/>
+          </a:p>
+        </p:txBody>
+      </p:sp>
+      <p:cxnSp>
+        <p:nvCxnSpPr>
+          <p:cNvPr id="45" name="Straight Arrow Connector 44"/>
+          <p:cNvCxnSpPr/>
+          <p:nvPr/>
+        </p:nvCxnSpPr>
+        <p:spPr>
+          <a:xfrm>
+            <a:off x="1882941" y="3158223"/>
+            <a:ext cx="566699" cy="0"/>
+          </a:xfrm>
+          <a:prstGeom prst="straightConnector1">
+            <a:avLst/>
+          </a:prstGeom>
+          <a:ln>
+            <a:tailEnd type="triangle"/>
+          </a:ln>
+        </p:spPr>
+        <p:style>
+          <a:lnRef idx="1">
+            <a:schemeClr val="accent2"/>
+          </a:lnRef>
+          <a:fillRef idx="0">
+            <a:schemeClr val="accent2"/>
+          </a:fillRef>
+          <a:effectRef idx="0">
+            <a:schemeClr val="accent2"/>
+          </a:effectRef>
+          <a:fontRef idx="minor">
+            <a:schemeClr val="tx1"/>
+          </a:fontRef>
+        </p:style>
+      </p:cxnSp>
+      <p:sp>
+        <p:nvSpPr>
+          <p:cNvPr id="46" name="TextBox 45"/>
+          <p:cNvSpPr txBox="1"/>
+          <p:nvPr/>
+        </p:nvSpPr>
+        <p:spPr>
+          <a:xfrm>
+            <a:off x="607594" y="2932136"/>
+            <a:ext cx="1636295" cy="369332"/>
+          </a:xfrm>
+          <a:prstGeom prst="rect">
+            <a:avLst/>
+          </a:prstGeom>
+          <a:noFill/>
+        </p:spPr>
+        <p:txBody>
+          <a:bodyPr wrap="square" rtlCol="0">
+            <a:spAutoFit/>
+          </a:bodyPr>
+          <a:lstStyle/>
+          <a:p>
+            <a:r>
+              <a:rPr lang="en-US" dirty="0" smtClean="0"/>
+              <a:t>Middle Tier</a:t>
+            </a:r>
+            <a:endParaRPr lang="en-US" dirty="0"/>
+          </a:p>
+        </p:txBody>
+      </p:sp>
+      <p:cxnSp>
+        <p:nvCxnSpPr>
+          <p:cNvPr id="48" name="Straight Arrow Connector 47"/>
+          <p:cNvCxnSpPr/>
+          <p:nvPr/>
+        </p:nvCxnSpPr>
+        <p:spPr>
+          <a:xfrm>
+            <a:off x="1788695" y="6269951"/>
+            <a:ext cx="3603460" cy="0"/>
+          </a:xfrm>
+          <a:prstGeom prst="straightConnector1">
+            <a:avLst/>
+          </a:prstGeom>
+          <a:ln>
+            <a:tailEnd type="triangle"/>
+          </a:ln>
+        </p:spPr>
+        <p:style>
+          <a:lnRef idx="1">
+            <a:schemeClr val="accent2"/>
+          </a:lnRef>
+          <a:fillRef idx="0">
+            <a:schemeClr val="accent2"/>
+          </a:fillRef>
+          <a:effectRef idx="0">
+            <a:schemeClr val="accent2"/>
+          </a:effectRef>
+          <a:fontRef idx="minor">
+            <a:schemeClr val="tx1"/>
+          </a:fontRef>
+        </p:style>
+      </p:cxnSp>
+      <p:sp>
+        <p:nvSpPr>
+          <p:cNvPr id="49" name="TextBox 48"/>
+          <p:cNvSpPr txBox="1"/>
+          <p:nvPr/>
+        </p:nvSpPr>
+        <p:spPr>
+          <a:xfrm>
+            <a:off x="685800" y="6043864"/>
+            <a:ext cx="1636295" cy="369332"/>
+          </a:xfrm>
+          <a:prstGeom prst="rect">
+            <a:avLst/>
+          </a:prstGeom>
+          <a:noFill/>
+        </p:spPr>
+        <p:txBody>
+          <a:bodyPr wrap="square" rtlCol="0">
+            <a:spAutoFit/>
+          </a:bodyPr>
+          <a:lstStyle/>
+          <a:p>
+            <a:r>
+              <a:rPr lang="en-US" dirty="0" smtClean="0"/>
+              <a:t>Data Tier</a:t>
+            </a:r>
+            <a:endParaRPr lang="en-US" dirty="0"/>
+          </a:p>
+        </p:txBody>
+      </p:sp>
+    </p:spTree>
+    <p:extLst>
+      <p:ext uri="{BB962C8B-B14F-4D97-AF65-F5344CB8AC3E}">
+        <p14:creationId xmlns:p14="http://schemas.microsoft.com/office/powerpoint/2010/main" val="1007430170"/>
+      </p:ext>
+    </p:extLst>
+  </p:cSld>
+  <p:clrMapOvr>
+    <a:masterClrMapping/>
+  </p:clrMapOvr>
+  <p:timing>
+    <p:tnLst>
+      <p:par>
+        <p:cTn id="1" dur="indefinite" restart="never" nodeType="tmRoot"/>
+      </p:par>
+    </p:tnLst>
+  </p:timing>
+</p:sld>
+</file>
+
+<file path=ppt/slides/slide7.xml><?xml version="1.0" encoding="utf-8"?>
 <p:sld xmlns:a="http://schemas.openxmlformats.org/drawingml/2006/main" xmlns:r="http://schemas.openxmlformats.org/officeDocument/2006/relationships" xmlns:p="http://schemas.openxmlformats.org/presentationml/2006/main">
   <p:cSld>
     <p:spTree>
@@ -14416,7 +15658,7 @@
     </p:spTree>
     <p:extLst>
       <p:ext uri="{BB962C8B-B14F-4D97-AF65-F5344CB8AC3E}">
-        <p14:creationId xmlns:p14="http://schemas.microsoft.com/office/powerpoint/2010/main" val="1007430170"/>
+        <p14:creationId xmlns:p14="http://schemas.microsoft.com/office/powerpoint/2010/main" val="805811288"/>
       </p:ext>
     </p:extLst>
   </p:cSld>
@@ -14433,7 +15675,7 @@
 </p:sld>
 </file>
 
-<file path=ppt/slides/slide7.xml><?xml version="1.0" encoding="utf-8"?>
+<file path=ppt/slides/slide8.xml><?xml version="1.0" encoding="utf-8"?>
 <p:sld xmlns:a="http://schemas.openxmlformats.org/drawingml/2006/main" xmlns:r="http://schemas.openxmlformats.org/officeDocument/2006/relationships" xmlns:p="http://schemas.openxmlformats.org/presentationml/2006/main">
   <p:cSld>
     <p:spTree>

</xml_diff>

<commit_message>
Completed final UI touches, folder orgranisation and attached technical documentation
</commit_message>
<xml_diff>
--- a/Technical Documentation/projectpresentation.pptx
+++ b/Technical Documentation/projectpresentation.pptx
@@ -181,7 +181,7 @@
           <a:noFill/>
           <a:extLst>
             <a:ext uri="{909E8E84-426E-40dd-AFC4-6F175D3DCCD1}">
-              <a14:hiddenFill xmlns:a14="http://schemas.microsoft.com/office/drawing/2010/main" xmlns="">
+              <a14:hiddenFill xmlns="" xmlns:a14="http://schemas.microsoft.com/office/drawing/2010/main">
                 <a:solidFill>
                   <a:srgbClr val="FFFFFF"/>
                 </a:solidFill>
@@ -240,7 +240,7 @@
             </a:ln>
             <a:extLst>
               <a:ext uri="{91240B29-F687-4f45-9708-019B960494DF}">
-                <a14:hiddenLine xmlns:a14="http://schemas.microsoft.com/office/drawing/2010/main" xmlns="" w="9525">
+                <a14:hiddenLine xmlns="" xmlns:a14="http://schemas.microsoft.com/office/drawing/2010/main" w="9525">
                   <a:solidFill>
                     <a:srgbClr val="000000"/>
                   </a:solidFill>
@@ -330,7 +330,7 @@
             </a:ln>
             <a:extLst>
               <a:ext uri="{91240B29-F687-4f45-9708-019B960494DF}">
-                <a14:hiddenLine xmlns:a14="http://schemas.microsoft.com/office/drawing/2010/main" xmlns="" w="9525">
+                <a14:hiddenLine xmlns="" xmlns:a14="http://schemas.microsoft.com/office/drawing/2010/main" w="9525">
                   <a:solidFill>
                     <a:srgbClr val="000000"/>
                   </a:solidFill>
@@ -420,7 +420,7 @@
             </a:ln>
             <a:extLst>
               <a:ext uri="{91240B29-F687-4f45-9708-019B960494DF}">
-                <a14:hiddenLine xmlns:a14="http://schemas.microsoft.com/office/drawing/2010/main" xmlns="" w="9525">
+                <a14:hiddenLine xmlns="" xmlns:a14="http://schemas.microsoft.com/office/drawing/2010/main" w="9525">
                   <a:solidFill>
                     <a:srgbClr val="000000"/>
                   </a:solidFill>
@@ -454,7 +454,7 @@
             </a:ln>
             <a:extLst>
               <a:ext uri="{91240B29-F687-4f45-9708-019B960494DF}">
-                <a14:hiddenLine xmlns:a14="http://schemas.microsoft.com/office/drawing/2010/main" xmlns="" w="9525">
+                <a14:hiddenLine xmlns="" xmlns:a14="http://schemas.microsoft.com/office/drawing/2010/main" w="9525">
                   <a:solidFill>
                     <a:srgbClr val="000000"/>
                   </a:solidFill>
@@ -544,7 +544,7 @@
             </a:ln>
             <a:extLst>
               <a:ext uri="{91240B29-F687-4f45-9708-019B960494DF}">
-                <a14:hiddenLine xmlns:a14="http://schemas.microsoft.com/office/drawing/2010/main" xmlns="" w="9525">
+                <a14:hiddenLine xmlns="" xmlns:a14="http://schemas.microsoft.com/office/drawing/2010/main" w="9525">
                   <a:solidFill>
                     <a:srgbClr val="000000"/>
                   </a:solidFill>
@@ -606,7 +606,7 @@
             </a:ln>
             <a:extLst>
               <a:ext uri="{91240B29-F687-4f45-9708-019B960494DF}">
-                <a14:hiddenLine xmlns:a14="http://schemas.microsoft.com/office/drawing/2010/main" xmlns="" w="9525">
+                <a14:hiddenLine xmlns="" xmlns:a14="http://schemas.microsoft.com/office/drawing/2010/main" w="9525">
                   <a:solidFill>
                     <a:srgbClr val="000000"/>
                   </a:solidFill>
@@ -668,7 +668,7 @@
             </a:ln>
             <a:extLst>
               <a:ext uri="{91240B29-F687-4f45-9708-019B960494DF}">
-                <a14:hiddenLine xmlns:a14="http://schemas.microsoft.com/office/drawing/2010/main" xmlns="" w="9525">
+                <a14:hiddenLine xmlns="" xmlns:a14="http://schemas.microsoft.com/office/drawing/2010/main" w="9525">
                   <a:solidFill>
                     <a:srgbClr val="000000"/>
                   </a:solidFill>
@@ -758,7 +758,7 @@
             </a:ln>
             <a:extLst>
               <a:ext uri="{91240B29-F687-4f45-9708-019B960494DF}">
-                <a14:hiddenLine xmlns:a14="http://schemas.microsoft.com/office/drawing/2010/main" xmlns="" w="9525">
+                <a14:hiddenLine xmlns="" xmlns:a14="http://schemas.microsoft.com/office/drawing/2010/main" w="9525">
                   <a:solidFill>
                     <a:srgbClr val="000000"/>
                   </a:solidFill>
@@ -820,7 +820,7 @@
             </a:ln>
             <a:extLst>
               <a:ext uri="{91240B29-F687-4f45-9708-019B960494DF}">
-                <a14:hiddenLine xmlns:a14="http://schemas.microsoft.com/office/drawing/2010/main" xmlns="" w="9525">
+                <a14:hiddenLine xmlns="" xmlns:a14="http://schemas.microsoft.com/office/drawing/2010/main" w="9525">
                   <a:solidFill>
                     <a:srgbClr val="000000"/>
                   </a:solidFill>
@@ -882,7 +882,7 @@
             </a:ln>
             <a:extLst>
               <a:ext uri="{91240B29-F687-4f45-9708-019B960494DF}">
-                <a14:hiddenLine xmlns:a14="http://schemas.microsoft.com/office/drawing/2010/main" xmlns="" w="9525">
+                <a14:hiddenLine xmlns="" xmlns:a14="http://schemas.microsoft.com/office/drawing/2010/main" w="9525">
                   <a:solidFill>
                     <a:srgbClr val="000000"/>
                   </a:solidFill>
@@ -972,7 +972,7 @@
             </a:ln>
             <a:extLst>
               <a:ext uri="{91240B29-F687-4f45-9708-019B960494DF}">
-                <a14:hiddenLine xmlns:a14="http://schemas.microsoft.com/office/drawing/2010/main" xmlns="" w="9525">
+                <a14:hiddenLine xmlns="" xmlns:a14="http://schemas.microsoft.com/office/drawing/2010/main" w="9525">
                   <a:solidFill>
                     <a:srgbClr val="000000"/>
                   </a:solidFill>
@@ -1062,7 +1062,7 @@
             </a:ln>
             <a:extLst>
               <a:ext uri="{91240B29-F687-4f45-9708-019B960494DF}">
-                <a14:hiddenLine xmlns:a14="http://schemas.microsoft.com/office/drawing/2010/main" xmlns="" w="9525">
+                <a14:hiddenLine xmlns="" xmlns:a14="http://schemas.microsoft.com/office/drawing/2010/main" w="9525">
                   <a:solidFill>
                     <a:srgbClr val="000000"/>
                   </a:solidFill>
@@ -1124,7 +1124,7 @@
             </a:ln>
             <a:extLst>
               <a:ext uri="{91240B29-F687-4f45-9708-019B960494DF}">
-                <a14:hiddenLine xmlns:a14="http://schemas.microsoft.com/office/drawing/2010/main" xmlns="" w="9525">
+                <a14:hiddenLine xmlns="" xmlns:a14="http://schemas.microsoft.com/office/drawing/2010/main" w="9525">
                   <a:solidFill>
                     <a:srgbClr val="000000"/>
                   </a:solidFill>
@@ -1234,7 +1234,7 @@
             </a:ln>
             <a:extLst>
               <a:ext uri="{91240B29-F687-4f45-9708-019B960494DF}">
-                <a14:hiddenLine xmlns:a14="http://schemas.microsoft.com/office/drawing/2010/main" xmlns="" w="9525">
+                <a14:hiddenLine xmlns="" xmlns:a14="http://schemas.microsoft.com/office/drawing/2010/main" w="9525">
                   <a:solidFill>
                     <a:srgbClr val="000000"/>
                   </a:solidFill>
@@ -1296,7 +1296,7 @@
             </a:ln>
             <a:extLst>
               <a:ext uri="{91240B29-F687-4f45-9708-019B960494DF}">
-                <a14:hiddenLine xmlns:a14="http://schemas.microsoft.com/office/drawing/2010/main" xmlns="" w="9525">
+                <a14:hiddenLine xmlns="" xmlns:a14="http://schemas.microsoft.com/office/drawing/2010/main" w="9525">
                   <a:solidFill>
                     <a:srgbClr val="000000"/>
                   </a:solidFill>
@@ -1386,7 +1386,7 @@
             </a:ln>
             <a:extLst>
               <a:ext uri="{91240B29-F687-4f45-9708-019B960494DF}">
-                <a14:hiddenLine xmlns:a14="http://schemas.microsoft.com/office/drawing/2010/main" xmlns="" w="9525">
+                <a14:hiddenLine xmlns="" xmlns:a14="http://schemas.microsoft.com/office/drawing/2010/main" w="9525">
                   <a:solidFill>
                     <a:srgbClr val="000000"/>
                   </a:solidFill>
@@ -1476,7 +1476,7 @@
             </a:ln>
             <a:extLst>
               <a:ext uri="{91240B29-F687-4f45-9708-019B960494DF}">
-                <a14:hiddenLine xmlns:a14="http://schemas.microsoft.com/office/drawing/2010/main" xmlns="" w="9525">
+                <a14:hiddenLine xmlns="" xmlns:a14="http://schemas.microsoft.com/office/drawing/2010/main" w="9525">
                   <a:solidFill>
                     <a:srgbClr val="000000"/>
                   </a:solidFill>
@@ -1538,7 +1538,7 @@
             </a:ln>
             <a:extLst>
               <a:ext uri="{91240B29-F687-4f45-9708-019B960494DF}">
-                <a14:hiddenLine xmlns:a14="http://schemas.microsoft.com/office/drawing/2010/main" xmlns="" w="9525">
+                <a14:hiddenLine xmlns="" xmlns:a14="http://schemas.microsoft.com/office/drawing/2010/main" w="9525">
                   <a:solidFill>
                     <a:srgbClr val="000000"/>
                   </a:solidFill>
@@ -1628,7 +1628,7 @@
             </a:ln>
             <a:extLst>
               <a:ext uri="{91240B29-F687-4f45-9708-019B960494DF}">
-                <a14:hiddenLine xmlns:a14="http://schemas.microsoft.com/office/drawing/2010/main" xmlns="" w="9525">
+                <a14:hiddenLine xmlns="" xmlns:a14="http://schemas.microsoft.com/office/drawing/2010/main" w="9525">
                   <a:solidFill>
                     <a:srgbClr val="000000"/>
                   </a:solidFill>
@@ -1718,7 +1718,7 @@
             </a:ln>
             <a:extLst>
               <a:ext uri="{91240B29-F687-4f45-9708-019B960494DF}">
-                <a14:hiddenLine xmlns:a14="http://schemas.microsoft.com/office/drawing/2010/main" xmlns="" w="9525">
+                <a14:hiddenLine xmlns="" xmlns:a14="http://schemas.microsoft.com/office/drawing/2010/main" w="9525">
                   <a:solidFill>
                     <a:srgbClr val="000000"/>
                   </a:solidFill>
@@ -1774,7 +1774,7 @@
             </a:ln>
             <a:extLst>
               <a:ext uri="{91240B29-F687-4f45-9708-019B960494DF}">
-                <a14:hiddenLine xmlns:a14="http://schemas.microsoft.com/office/drawing/2010/main" xmlns="" w="9525">
+                <a14:hiddenLine xmlns="" xmlns:a14="http://schemas.microsoft.com/office/drawing/2010/main" w="9525">
                   <a:solidFill>
                     <a:srgbClr val="000000"/>
                   </a:solidFill>
@@ -1864,7 +1864,7 @@
             </a:ln>
             <a:extLst>
               <a:ext uri="{91240B29-F687-4f45-9708-019B960494DF}">
-                <a14:hiddenLine xmlns:a14="http://schemas.microsoft.com/office/drawing/2010/main" xmlns="" w="9525">
+                <a14:hiddenLine xmlns="" xmlns:a14="http://schemas.microsoft.com/office/drawing/2010/main" w="9525">
                   <a:solidFill>
                     <a:srgbClr val="000000"/>
                   </a:solidFill>
@@ -1920,7 +1920,7 @@
             </a:ln>
             <a:extLst>
               <a:ext uri="{91240B29-F687-4f45-9708-019B960494DF}">
-                <a14:hiddenLine xmlns:a14="http://schemas.microsoft.com/office/drawing/2010/main" xmlns="" w="9525">
+                <a14:hiddenLine xmlns="" xmlns:a14="http://schemas.microsoft.com/office/drawing/2010/main" w="9525">
                   <a:solidFill>
                     <a:srgbClr val="000000"/>
                   </a:solidFill>
@@ -2010,7 +2010,7 @@
             </a:ln>
             <a:extLst>
               <a:ext uri="{91240B29-F687-4f45-9708-019B960494DF}">
-                <a14:hiddenLine xmlns:a14="http://schemas.microsoft.com/office/drawing/2010/main" xmlns="" w="9525">
+                <a14:hiddenLine xmlns="" xmlns:a14="http://schemas.microsoft.com/office/drawing/2010/main" w="9525">
                   <a:solidFill>
                     <a:srgbClr val="000000"/>
                   </a:solidFill>
@@ -2078,7 +2078,7 @@
             </a:ln>
             <a:extLst>
               <a:ext uri="{91240B29-F687-4f45-9708-019B960494DF}">
-                <a14:hiddenLine xmlns:a14="http://schemas.microsoft.com/office/drawing/2010/main" xmlns="" w="9525">
+                <a14:hiddenLine xmlns="" xmlns:a14="http://schemas.microsoft.com/office/drawing/2010/main" w="9525">
                   <a:solidFill>
                     <a:srgbClr val="000000"/>
                   </a:solidFill>
@@ -2168,7 +2168,7 @@
             </a:ln>
             <a:extLst>
               <a:ext uri="{91240B29-F687-4f45-9708-019B960494DF}">
-                <a14:hiddenLine xmlns:a14="http://schemas.microsoft.com/office/drawing/2010/main" xmlns="" w="9525">
+                <a14:hiddenLine xmlns="" xmlns:a14="http://schemas.microsoft.com/office/drawing/2010/main" w="9525">
                   <a:solidFill>
                     <a:srgbClr val="000000"/>
                   </a:solidFill>
@@ -2236,7 +2236,7 @@
             </a:ln>
             <a:extLst>
               <a:ext uri="{91240B29-F687-4f45-9708-019B960494DF}">
-                <a14:hiddenLine xmlns:a14="http://schemas.microsoft.com/office/drawing/2010/main" xmlns="" w="9525">
+                <a14:hiddenLine xmlns="" xmlns:a14="http://schemas.microsoft.com/office/drawing/2010/main" w="9525">
                   <a:solidFill>
                     <a:srgbClr val="000000"/>
                   </a:solidFill>
@@ -2326,7 +2326,7 @@
             </a:ln>
             <a:extLst>
               <a:ext uri="{91240B29-F687-4f45-9708-019B960494DF}">
-                <a14:hiddenLine xmlns:a14="http://schemas.microsoft.com/office/drawing/2010/main" xmlns="" w="9525">
+                <a14:hiddenLine xmlns="" xmlns:a14="http://schemas.microsoft.com/office/drawing/2010/main" w="9525">
                   <a:solidFill>
                     <a:srgbClr val="000000"/>
                   </a:solidFill>
@@ -2360,7 +2360,7 @@
             </a:ln>
             <a:extLst>
               <a:ext uri="{91240B29-F687-4f45-9708-019B960494DF}">
-                <a14:hiddenLine xmlns:a14="http://schemas.microsoft.com/office/drawing/2010/main" xmlns="" w="9525">
+                <a14:hiddenLine xmlns="" xmlns:a14="http://schemas.microsoft.com/office/drawing/2010/main" w="9525">
                   <a:solidFill>
                     <a:srgbClr val="000000"/>
                   </a:solidFill>
@@ -2450,7 +2450,7 @@
             </a:ln>
             <a:extLst>
               <a:ext uri="{91240B29-F687-4f45-9708-019B960494DF}">
-                <a14:hiddenLine xmlns:a14="http://schemas.microsoft.com/office/drawing/2010/main" xmlns="" w="9525">
+                <a14:hiddenLine xmlns="" xmlns:a14="http://schemas.microsoft.com/office/drawing/2010/main" w="9525">
                   <a:solidFill>
                     <a:srgbClr val="000000"/>
                   </a:solidFill>
@@ -2512,7 +2512,7 @@
             </a:ln>
             <a:extLst>
               <a:ext uri="{91240B29-F687-4f45-9708-019B960494DF}">
-                <a14:hiddenLine xmlns:a14="http://schemas.microsoft.com/office/drawing/2010/main" xmlns="" w="9525">
+                <a14:hiddenLine xmlns="" xmlns:a14="http://schemas.microsoft.com/office/drawing/2010/main" w="9525">
                   <a:solidFill>
                     <a:srgbClr val="000000"/>
                   </a:solidFill>
@@ -2574,7 +2574,7 @@
             </a:ln>
             <a:extLst>
               <a:ext uri="{91240B29-F687-4f45-9708-019B960494DF}">
-                <a14:hiddenLine xmlns:a14="http://schemas.microsoft.com/office/drawing/2010/main" xmlns="" w="9525">
+                <a14:hiddenLine xmlns="" xmlns:a14="http://schemas.microsoft.com/office/drawing/2010/main" w="9525">
                   <a:solidFill>
                     <a:srgbClr val="000000"/>
                   </a:solidFill>
@@ -2664,7 +2664,7 @@
             </a:ln>
             <a:extLst>
               <a:ext uri="{91240B29-F687-4f45-9708-019B960494DF}">
-                <a14:hiddenLine xmlns:a14="http://schemas.microsoft.com/office/drawing/2010/main" xmlns="" w="9525">
+                <a14:hiddenLine xmlns="" xmlns:a14="http://schemas.microsoft.com/office/drawing/2010/main" w="9525">
                   <a:solidFill>
                     <a:srgbClr val="000000"/>
                   </a:solidFill>
@@ -2732,7 +2732,7 @@
             </a:ln>
             <a:extLst>
               <a:ext uri="{91240B29-F687-4f45-9708-019B960494DF}">
-                <a14:hiddenLine xmlns:a14="http://schemas.microsoft.com/office/drawing/2010/main" xmlns="" w="9525">
+                <a14:hiddenLine xmlns="" xmlns:a14="http://schemas.microsoft.com/office/drawing/2010/main" w="9525">
                   <a:solidFill>
                     <a:srgbClr val="000000"/>
                   </a:solidFill>
@@ -2794,7 +2794,7 @@
             </a:ln>
             <a:extLst>
               <a:ext uri="{91240B29-F687-4f45-9708-019B960494DF}">
-                <a14:hiddenLine xmlns:a14="http://schemas.microsoft.com/office/drawing/2010/main" xmlns="" w="9525">
+                <a14:hiddenLine xmlns="" xmlns:a14="http://schemas.microsoft.com/office/drawing/2010/main" w="9525">
                   <a:solidFill>
                     <a:srgbClr val="000000"/>
                   </a:solidFill>
@@ -2884,7 +2884,7 @@
             </a:ln>
             <a:extLst>
               <a:ext uri="{91240B29-F687-4f45-9708-019B960494DF}">
-                <a14:hiddenLine xmlns:a14="http://schemas.microsoft.com/office/drawing/2010/main" xmlns="" w="9525">
+                <a14:hiddenLine xmlns="" xmlns:a14="http://schemas.microsoft.com/office/drawing/2010/main" w="9525">
                   <a:solidFill>
                     <a:srgbClr val="000000"/>
                   </a:solidFill>
@@ -2946,7 +2946,7 @@
             </a:ln>
             <a:extLst>
               <a:ext uri="{91240B29-F687-4f45-9708-019B960494DF}">
-                <a14:hiddenLine xmlns:a14="http://schemas.microsoft.com/office/drawing/2010/main" xmlns="" w="9525">
+                <a14:hiddenLine xmlns="" xmlns:a14="http://schemas.microsoft.com/office/drawing/2010/main" w="9525">
                   <a:solidFill>
                     <a:srgbClr val="000000"/>
                   </a:solidFill>
@@ -3036,7 +3036,7 @@
             </a:ln>
             <a:extLst>
               <a:ext uri="{91240B29-F687-4f45-9708-019B960494DF}">
-                <a14:hiddenLine xmlns:a14="http://schemas.microsoft.com/office/drawing/2010/main" xmlns="" w="9525">
+                <a14:hiddenLine xmlns="" xmlns:a14="http://schemas.microsoft.com/office/drawing/2010/main" w="9525">
                   <a:solidFill>
                     <a:srgbClr val="000000"/>
                   </a:solidFill>
@@ -3098,7 +3098,7 @@
             </a:ln>
             <a:extLst>
               <a:ext uri="{91240B29-F687-4f45-9708-019B960494DF}">
-                <a14:hiddenLine xmlns:a14="http://schemas.microsoft.com/office/drawing/2010/main" xmlns="" w="9525">
+                <a14:hiddenLine xmlns="" xmlns:a14="http://schemas.microsoft.com/office/drawing/2010/main" w="9525">
                   <a:solidFill>
                     <a:srgbClr val="000000"/>
                   </a:solidFill>
@@ -3188,7 +3188,7 @@
             </a:ln>
             <a:extLst>
               <a:ext uri="{91240B29-F687-4f45-9708-019B960494DF}">
-                <a14:hiddenLine xmlns:a14="http://schemas.microsoft.com/office/drawing/2010/main" xmlns="" w="9525">
+                <a14:hiddenLine xmlns="" xmlns:a14="http://schemas.microsoft.com/office/drawing/2010/main" w="9525">
                   <a:solidFill>
                     <a:srgbClr val="000000"/>
                   </a:solidFill>
@@ -3222,7 +3222,7 @@
             </a:ln>
             <a:extLst>
               <a:ext uri="{91240B29-F687-4f45-9708-019B960494DF}">
-                <a14:hiddenLine xmlns:a14="http://schemas.microsoft.com/office/drawing/2010/main" xmlns="" w="9525">
+                <a14:hiddenLine xmlns="" xmlns:a14="http://schemas.microsoft.com/office/drawing/2010/main" w="9525">
                   <a:solidFill>
                     <a:srgbClr val="000000"/>
                   </a:solidFill>
@@ -3287,7 +3287,7 @@
             </a:ln>
             <a:extLst>
               <a:ext uri="{91240B29-F687-4f45-9708-019B960494DF}">
-                <a14:hiddenLine xmlns:a14="http://schemas.microsoft.com/office/drawing/2010/main" xmlns="" w="9525">
+                <a14:hiddenLine xmlns="" xmlns:a14="http://schemas.microsoft.com/office/drawing/2010/main" w="9525">
                   <a:solidFill>
                     <a:srgbClr val="000000"/>
                   </a:solidFill>
@@ -3377,7 +3377,7 @@
             </a:ln>
             <a:extLst>
               <a:ext uri="{91240B29-F687-4f45-9708-019B960494DF}">
-                <a14:hiddenLine xmlns:a14="http://schemas.microsoft.com/office/drawing/2010/main" xmlns="" w="9525">
+                <a14:hiddenLine xmlns="" xmlns:a14="http://schemas.microsoft.com/office/drawing/2010/main" w="9525">
                   <a:solidFill>
                     <a:srgbClr val="000000"/>
                   </a:solidFill>
@@ -3439,7 +3439,7 @@
             </a:ln>
             <a:extLst>
               <a:ext uri="{91240B29-F687-4f45-9708-019B960494DF}">
-                <a14:hiddenLine xmlns:a14="http://schemas.microsoft.com/office/drawing/2010/main" xmlns="" w="9525">
+                <a14:hiddenLine xmlns="" xmlns:a14="http://schemas.microsoft.com/office/drawing/2010/main" w="9525">
                   <a:solidFill>
                     <a:srgbClr val="000000"/>
                   </a:solidFill>
@@ -3529,7 +3529,7 @@
             </a:ln>
             <a:extLst>
               <a:ext uri="{91240B29-F687-4f45-9708-019B960494DF}">
-                <a14:hiddenLine xmlns:a14="http://schemas.microsoft.com/office/drawing/2010/main" xmlns="" w="9525">
+                <a14:hiddenLine xmlns="" xmlns:a14="http://schemas.microsoft.com/office/drawing/2010/main" w="9525">
                   <a:solidFill>
                     <a:srgbClr val="000000"/>
                   </a:solidFill>
@@ -3619,7 +3619,7 @@
             </a:ln>
             <a:extLst>
               <a:ext uri="{91240B29-F687-4f45-9708-019B960494DF}">
-                <a14:hiddenLine xmlns:a14="http://schemas.microsoft.com/office/drawing/2010/main" xmlns="" w="9525">
+                <a14:hiddenLine xmlns="" xmlns:a14="http://schemas.microsoft.com/office/drawing/2010/main" w="9525">
                   <a:solidFill>
                     <a:srgbClr val="000000"/>
                   </a:solidFill>
@@ -3684,7 +3684,7 @@
             </a:ln>
             <a:extLst>
               <a:ext uri="{91240B29-F687-4f45-9708-019B960494DF}">
-                <a14:hiddenLine xmlns:a14="http://schemas.microsoft.com/office/drawing/2010/main" xmlns="" w="9525">
+                <a14:hiddenLine xmlns="" xmlns:a14="http://schemas.microsoft.com/office/drawing/2010/main" w="9525">
                   <a:solidFill>
                     <a:srgbClr val="000000"/>
                   </a:solidFill>
@@ -3746,7 +3746,7 @@
             </a:ln>
             <a:extLst>
               <a:ext uri="{91240B29-F687-4f45-9708-019B960494DF}">
-                <a14:hiddenLine xmlns:a14="http://schemas.microsoft.com/office/drawing/2010/main" xmlns="" w="9525">
+                <a14:hiddenLine xmlns="" xmlns:a14="http://schemas.microsoft.com/office/drawing/2010/main" w="9525">
                   <a:solidFill>
                     <a:srgbClr val="000000"/>
                   </a:solidFill>
@@ -3836,7 +3836,7 @@
             </a:ln>
             <a:extLst>
               <a:ext uri="{91240B29-F687-4f45-9708-019B960494DF}">
-                <a14:hiddenLine xmlns:a14="http://schemas.microsoft.com/office/drawing/2010/main" xmlns="" w="9525">
+                <a14:hiddenLine xmlns="" xmlns:a14="http://schemas.microsoft.com/office/drawing/2010/main" w="9525">
                   <a:solidFill>
                     <a:srgbClr val="000000"/>
                   </a:solidFill>
@@ -3926,7 +3926,7 @@
             </a:ln>
             <a:extLst>
               <a:ext uri="{91240B29-F687-4f45-9708-019B960494DF}">
-                <a14:hiddenLine xmlns:a14="http://schemas.microsoft.com/office/drawing/2010/main" xmlns="" w="9525">
+                <a14:hiddenLine xmlns="" xmlns:a14="http://schemas.microsoft.com/office/drawing/2010/main" w="9525">
                   <a:solidFill>
                     <a:srgbClr val="000000"/>
                   </a:solidFill>
@@ -3988,7 +3988,7 @@
             </a:ln>
             <a:extLst>
               <a:ext uri="{91240B29-F687-4f45-9708-019B960494DF}">
-                <a14:hiddenLine xmlns:a14="http://schemas.microsoft.com/office/drawing/2010/main" xmlns="" w="9525">
+                <a14:hiddenLine xmlns="" xmlns:a14="http://schemas.microsoft.com/office/drawing/2010/main" w="9525">
                   <a:solidFill>
                     <a:srgbClr val="000000"/>
                   </a:solidFill>
@@ -4108,7 +4108,7 @@
             </a:ln>
             <a:extLst>
               <a:ext uri="{91240B29-F687-4f45-9708-019B960494DF}">
-                <a14:hiddenLine xmlns:a14="http://schemas.microsoft.com/office/drawing/2010/main" xmlns="" w="9525">
+                <a14:hiddenLine xmlns="" xmlns:a14="http://schemas.microsoft.com/office/drawing/2010/main" w="9525">
                   <a:solidFill>
                     <a:srgbClr val="000000"/>
                   </a:solidFill>
@@ -4176,7 +4176,7 @@
             </a:ln>
             <a:extLst>
               <a:ext uri="{91240B29-F687-4f45-9708-019B960494DF}">
-                <a14:hiddenLine xmlns:a14="http://schemas.microsoft.com/office/drawing/2010/main" xmlns="" w="9525">
+                <a14:hiddenLine xmlns="" xmlns:a14="http://schemas.microsoft.com/office/drawing/2010/main" w="9525">
                   <a:solidFill>
                     <a:srgbClr val="000000"/>
                   </a:solidFill>
@@ -4266,7 +4266,7 @@
             </a:ln>
             <a:extLst>
               <a:ext uri="{91240B29-F687-4f45-9708-019B960494DF}">
-                <a14:hiddenLine xmlns:a14="http://schemas.microsoft.com/office/drawing/2010/main" xmlns="" w="9525">
+                <a14:hiddenLine xmlns="" xmlns:a14="http://schemas.microsoft.com/office/drawing/2010/main" w="9525">
                   <a:solidFill>
                     <a:srgbClr val="000000"/>
                   </a:solidFill>
@@ -4406,7 +4406,7 @@
           <a:p>
             <a:fld id="{48A87A34-81AB-432B-8DAE-1953F412C126}" type="datetimeFigureOut">
               <a:rPr lang="en-US" smtClean="0"/>
-              <a:t>8/15/2019</a:t>
+              <a:t>15-Aug-19</a:t>
             </a:fld>
             <a:endParaRPr lang="en-US" dirty="0"/>
           </a:p>
@@ -4673,7 +4673,7 @@
           <a:p>
             <a:fld id="{48A87A34-81AB-432B-8DAE-1953F412C126}" type="datetimeFigureOut">
               <a:rPr lang="en-US" smtClean="0"/>
-              <a:t>8/15/2019</a:t>
+              <a:t>15-Aug-19</a:t>
             </a:fld>
             <a:endParaRPr lang="en-US" dirty="0"/>
           </a:p>
@@ -4869,7 +4869,7 @@
           <a:p>
             <a:fld id="{48A87A34-81AB-432B-8DAE-1953F412C126}" type="datetimeFigureOut">
               <a:rPr lang="en-US" smtClean="0"/>
-              <a:t>8/15/2019</a:t>
+              <a:t>15-Aug-19</a:t>
             </a:fld>
             <a:endParaRPr lang="en-US" dirty="0"/>
           </a:p>
@@ -5132,7 +5132,7 @@
           <a:p>
             <a:fld id="{48A87A34-81AB-432B-8DAE-1953F412C126}" type="datetimeFigureOut">
               <a:rPr lang="en-US" smtClean="0"/>
-              <a:t>8/15/2019</a:t>
+              <a:t>15-Aug-19</a:t>
             </a:fld>
             <a:endParaRPr lang="en-US" dirty="0"/>
           </a:p>
@@ -5566,7 +5566,7 @@
           <a:p>
             <a:fld id="{48A87A34-81AB-432B-8DAE-1953F412C126}" type="datetimeFigureOut">
               <a:rPr lang="en-US" smtClean="0"/>
-              <a:t>8/15/2019</a:t>
+              <a:t>15-Aug-19</a:t>
             </a:fld>
             <a:endParaRPr lang="en-US" dirty="0"/>
           </a:p>
@@ -6112,7 +6112,7 @@
           <a:p>
             <a:fld id="{48A87A34-81AB-432B-8DAE-1953F412C126}" type="datetimeFigureOut">
               <a:rPr lang="en-US" smtClean="0"/>
-              <a:t>8/15/2019</a:t>
+              <a:t>15-Aug-19</a:t>
             </a:fld>
             <a:endParaRPr lang="en-US" dirty="0"/>
           </a:p>
@@ -6832,7 +6832,7 @@
           <a:p>
             <a:fld id="{48A87A34-81AB-432B-8DAE-1953F412C126}" type="datetimeFigureOut">
               <a:rPr lang="en-US" smtClean="0"/>
-              <a:t>8/15/2019</a:t>
+              <a:t>15-Aug-19</a:t>
             </a:fld>
             <a:endParaRPr lang="en-US" dirty="0"/>
           </a:p>
@@ -7002,7 +7002,7 @@
           <a:p>
             <a:fld id="{48A87A34-81AB-432B-8DAE-1953F412C126}" type="datetimeFigureOut">
               <a:rPr lang="en-US" smtClean="0"/>
-              <a:t>8/15/2019</a:t>
+              <a:t>15-Aug-19</a:t>
             </a:fld>
             <a:endParaRPr lang="en-US" dirty="0"/>
           </a:p>
@@ -7182,7 +7182,7 @@
           <a:p>
             <a:fld id="{48A87A34-81AB-432B-8DAE-1953F412C126}" type="datetimeFigureOut">
               <a:rPr lang="en-US" smtClean="0"/>
-              <a:t>8/15/2019</a:t>
+              <a:t>15-Aug-19</a:t>
             </a:fld>
             <a:endParaRPr lang="en-US" dirty="0"/>
           </a:p>
@@ -7352,7 +7352,7 @@
           <a:p>
             <a:fld id="{48A87A34-81AB-432B-8DAE-1953F412C126}" type="datetimeFigureOut">
               <a:rPr lang="en-US" smtClean="0"/>
-              <a:t>8/15/2019</a:t>
+              <a:t>15-Aug-19</a:t>
             </a:fld>
             <a:endParaRPr lang="en-US" dirty="0"/>
           </a:p>
@@ -7602,7 +7602,7 @@
           <a:p>
             <a:fld id="{48A87A34-81AB-432B-8DAE-1953F412C126}" type="datetimeFigureOut">
               <a:rPr lang="en-US" smtClean="0"/>
-              <a:t>8/15/2019</a:t>
+              <a:t>15-Aug-19</a:t>
             </a:fld>
             <a:endParaRPr lang="en-US" dirty="0"/>
           </a:p>
@@ -7834,7 +7834,7 @@
           <a:p>
             <a:fld id="{48A87A34-81AB-432B-8DAE-1953F412C126}" type="datetimeFigureOut">
               <a:rPr lang="en-US" smtClean="0"/>
-              <a:t>8/15/2019</a:t>
+              <a:t>15-Aug-19</a:t>
             </a:fld>
             <a:endParaRPr lang="en-US" dirty="0"/>
           </a:p>
@@ -8215,7 +8215,7 @@
           <a:p>
             <a:fld id="{48A87A34-81AB-432B-8DAE-1953F412C126}" type="datetimeFigureOut">
               <a:rPr lang="en-US" smtClean="0"/>
-              <a:t>8/15/2019</a:t>
+              <a:t>15-Aug-19</a:t>
             </a:fld>
             <a:endParaRPr lang="en-US" dirty="0"/>
           </a:p>
@@ -8333,7 +8333,7 @@
           <a:p>
             <a:fld id="{48A87A34-81AB-432B-8DAE-1953F412C126}" type="datetimeFigureOut">
               <a:rPr lang="en-US" smtClean="0"/>
-              <a:t>8/15/2019</a:t>
+              <a:t>15-Aug-19</a:t>
             </a:fld>
             <a:endParaRPr lang="en-US" dirty="0"/>
           </a:p>
@@ -8428,7 +8428,7 @@
           <a:p>
             <a:fld id="{48A87A34-81AB-432B-8DAE-1953F412C126}" type="datetimeFigureOut">
               <a:rPr lang="en-US" smtClean="0"/>
-              <a:t>8/15/2019</a:t>
+              <a:t>15-Aug-19</a:t>
             </a:fld>
             <a:endParaRPr lang="en-US" dirty="0"/>
           </a:p>
@@ -8677,7 +8677,7 @@
           <a:p>
             <a:fld id="{48A87A34-81AB-432B-8DAE-1953F412C126}" type="datetimeFigureOut">
               <a:rPr lang="en-US" smtClean="0"/>
-              <a:t>8/15/2019</a:t>
+              <a:t>15-Aug-19</a:t>
             </a:fld>
             <a:endParaRPr lang="en-US" dirty="0"/>
           </a:p>
@@ -8957,7 +8957,7 @@
           <a:p>
             <a:fld id="{48A87A34-81AB-432B-8DAE-1953F412C126}" type="datetimeFigureOut">
               <a:rPr lang="en-US" smtClean="0"/>
-              <a:t>8/15/2019</a:t>
+              <a:t>15-Aug-19</a:t>
             </a:fld>
             <a:endParaRPr lang="en-US" dirty="0"/>
           </a:p>
@@ -9080,7 +9080,7 @@
           <a:noFill/>
           <a:extLst>
             <a:ext uri="{909E8E84-426E-40dd-AFC4-6F175D3DCCD1}">
-              <a14:hiddenFill xmlns:a14="http://schemas.microsoft.com/office/drawing/2010/main" xmlns="">
+              <a14:hiddenFill xmlns="" xmlns:a14="http://schemas.microsoft.com/office/drawing/2010/main">
                 <a:solidFill>
                   <a:srgbClr val="FFFFFF"/>
                 </a:solidFill>
@@ -9154,7 +9154,7 @@
               </a:ln>
               <a:extLst>
                 <a:ext uri="{91240B29-F687-4f45-9708-019B960494DF}">
-                  <a14:hiddenLine xmlns:a14="http://schemas.microsoft.com/office/drawing/2010/main" xmlns="" w="9525">
+                  <a14:hiddenLine xmlns="" xmlns:a14="http://schemas.microsoft.com/office/drawing/2010/main" w="9525">
                     <a:solidFill>
                       <a:srgbClr val="000000"/>
                     </a:solidFill>
@@ -9244,7 +9244,7 @@
               </a:ln>
               <a:extLst>
                 <a:ext uri="{91240B29-F687-4f45-9708-019B960494DF}">
-                  <a14:hiddenLine xmlns:a14="http://schemas.microsoft.com/office/drawing/2010/main" xmlns="" w="9525">
+                  <a14:hiddenLine xmlns="" xmlns:a14="http://schemas.microsoft.com/office/drawing/2010/main" w="9525">
                     <a:solidFill>
                       <a:srgbClr val="000000"/>
                     </a:solidFill>
@@ -9334,7 +9334,7 @@
               </a:ln>
               <a:extLst>
                 <a:ext uri="{91240B29-F687-4f45-9708-019B960494DF}">
-                  <a14:hiddenLine xmlns:a14="http://schemas.microsoft.com/office/drawing/2010/main" xmlns="" w="9525">
+                  <a14:hiddenLine xmlns="" xmlns:a14="http://schemas.microsoft.com/office/drawing/2010/main" w="9525">
                     <a:solidFill>
                       <a:srgbClr val="000000"/>
                     </a:solidFill>
@@ -9396,7 +9396,7 @@
               </a:ln>
               <a:extLst>
                 <a:ext uri="{91240B29-F687-4f45-9708-019B960494DF}">
-                  <a14:hiddenLine xmlns:a14="http://schemas.microsoft.com/office/drawing/2010/main" xmlns="" w="9525">
+                  <a14:hiddenLine xmlns="" xmlns:a14="http://schemas.microsoft.com/office/drawing/2010/main" w="9525">
                     <a:solidFill>
                       <a:srgbClr val="000000"/>
                     </a:solidFill>
@@ -9486,7 +9486,7 @@
               </a:ln>
               <a:extLst>
                 <a:ext uri="{91240B29-F687-4f45-9708-019B960494DF}">
-                  <a14:hiddenLine xmlns:a14="http://schemas.microsoft.com/office/drawing/2010/main" xmlns="" w="9525">
+                  <a14:hiddenLine xmlns="" xmlns:a14="http://schemas.microsoft.com/office/drawing/2010/main" w="9525">
                     <a:solidFill>
                       <a:srgbClr val="000000"/>
                     </a:solidFill>
@@ -9548,7 +9548,7 @@
               </a:ln>
               <a:extLst>
                 <a:ext uri="{91240B29-F687-4f45-9708-019B960494DF}">
-                  <a14:hiddenLine xmlns:a14="http://schemas.microsoft.com/office/drawing/2010/main" xmlns="" w="9525">
+                  <a14:hiddenLine xmlns="" xmlns:a14="http://schemas.microsoft.com/office/drawing/2010/main" w="9525">
                     <a:solidFill>
                       <a:srgbClr val="000000"/>
                     </a:solidFill>
@@ -9610,7 +9610,7 @@
               </a:ln>
               <a:extLst>
                 <a:ext uri="{91240B29-F687-4f45-9708-019B960494DF}">
-                  <a14:hiddenLine xmlns:a14="http://schemas.microsoft.com/office/drawing/2010/main" xmlns="" w="9525">
+                  <a14:hiddenLine xmlns="" xmlns:a14="http://schemas.microsoft.com/office/drawing/2010/main" w="9525">
                     <a:solidFill>
                       <a:srgbClr val="000000"/>
                     </a:solidFill>
@@ -9700,7 +9700,7 @@
               </a:ln>
               <a:extLst>
                 <a:ext uri="{91240B29-F687-4f45-9708-019B960494DF}">
-                  <a14:hiddenLine xmlns:a14="http://schemas.microsoft.com/office/drawing/2010/main" xmlns="" w="9525">
+                  <a14:hiddenLine xmlns="" xmlns:a14="http://schemas.microsoft.com/office/drawing/2010/main" w="9525">
                     <a:solidFill>
                       <a:srgbClr val="000000"/>
                     </a:solidFill>
@@ -9790,7 +9790,7 @@
               </a:ln>
               <a:extLst>
                 <a:ext uri="{91240B29-F687-4f45-9708-019B960494DF}">
-                  <a14:hiddenLine xmlns:a14="http://schemas.microsoft.com/office/drawing/2010/main" xmlns="" w="9525">
+                  <a14:hiddenLine xmlns="" xmlns:a14="http://schemas.microsoft.com/office/drawing/2010/main" w="9525">
                     <a:solidFill>
                       <a:srgbClr val="000000"/>
                     </a:solidFill>
@@ -9852,7 +9852,7 @@
               </a:ln>
               <a:extLst>
                 <a:ext uri="{91240B29-F687-4f45-9708-019B960494DF}">
-                  <a14:hiddenLine xmlns:a14="http://schemas.microsoft.com/office/drawing/2010/main" xmlns="" w="9525">
+                  <a14:hiddenLine xmlns="" xmlns:a14="http://schemas.microsoft.com/office/drawing/2010/main" w="9525">
                     <a:solidFill>
                       <a:srgbClr val="000000"/>
                     </a:solidFill>
@@ -9962,7 +9962,7 @@
               </a:ln>
               <a:extLst>
                 <a:ext uri="{91240B29-F687-4f45-9708-019B960494DF}">
-                  <a14:hiddenLine xmlns:a14="http://schemas.microsoft.com/office/drawing/2010/main" xmlns="" w="9525">
+                  <a14:hiddenLine xmlns="" xmlns:a14="http://schemas.microsoft.com/office/drawing/2010/main" w="9525">
                     <a:solidFill>
                       <a:srgbClr val="000000"/>
                     </a:solidFill>
@@ -10046,7 +10046,7 @@
               </a:ln>
               <a:extLst>
                 <a:ext uri="{91240B29-F687-4f45-9708-019B960494DF}">
-                  <a14:hiddenLine xmlns:a14="http://schemas.microsoft.com/office/drawing/2010/main" xmlns="" w="9525">
+                  <a14:hiddenLine xmlns="" xmlns:a14="http://schemas.microsoft.com/office/drawing/2010/main" w="9525">
                     <a:solidFill>
                       <a:srgbClr val="000000"/>
                     </a:solidFill>
@@ -10108,7 +10108,7 @@
               </a:ln>
               <a:extLst>
                 <a:ext uri="{91240B29-F687-4f45-9708-019B960494DF}">
-                  <a14:hiddenLine xmlns:a14="http://schemas.microsoft.com/office/drawing/2010/main" xmlns="" w="9525">
+                  <a14:hiddenLine xmlns="" xmlns:a14="http://schemas.microsoft.com/office/drawing/2010/main" w="9525">
                     <a:solidFill>
                       <a:srgbClr val="000000"/>
                     </a:solidFill>
@@ -10170,7 +10170,7 @@
               </a:ln>
               <a:extLst>
                 <a:ext uri="{91240B29-F687-4f45-9708-019B960494DF}">
-                  <a14:hiddenLine xmlns:a14="http://schemas.microsoft.com/office/drawing/2010/main" xmlns="" w="9525">
+                  <a14:hiddenLine xmlns="" xmlns:a14="http://schemas.microsoft.com/office/drawing/2010/main" w="9525">
                     <a:solidFill>
                       <a:srgbClr val="000000"/>
                     </a:solidFill>
@@ -10260,7 +10260,7 @@
               </a:ln>
               <a:extLst>
                 <a:ext uri="{91240B29-F687-4f45-9708-019B960494DF}">
-                  <a14:hiddenLine xmlns:a14="http://schemas.microsoft.com/office/drawing/2010/main" xmlns="" w="9525">
+                  <a14:hiddenLine xmlns="" xmlns:a14="http://schemas.microsoft.com/office/drawing/2010/main" w="9525">
                     <a:solidFill>
                       <a:srgbClr val="000000"/>
                     </a:solidFill>
@@ -10294,7 +10294,7 @@
               </a:ln>
               <a:extLst>
                 <a:ext uri="{91240B29-F687-4f45-9708-019B960494DF}">
-                  <a14:hiddenLine xmlns:a14="http://schemas.microsoft.com/office/drawing/2010/main" xmlns="" w="9525">
+                  <a14:hiddenLine xmlns="" xmlns:a14="http://schemas.microsoft.com/office/drawing/2010/main" w="9525">
                     <a:solidFill>
                       <a:srgbClr val="000000"/>
                     </a:solidFill>
@@ -10359,7 +10359,7 @@
               </a:ln>
               <a:extLst>
                 <a:ext uri="{91240B29-F687-4f45-9708-019B960494DF}">
-                  <a14:hiddenLine xmlns:a14="http://schemas.microsoft.com/office/drawing/2010/main" xmlns="" w="9525">
+                  <a14:hiddenLine xmlns="" xmlns:a14="http://schemas.microsoft.com/office/drawing/2010/main" w="9525">
                     <a:solidFill>
                       <a:srgbClr val="000000"/>
                     </a:solidFill>
@@ -10449,7 +10449,7 @@
               </a:ln>
               <a:extLst>
                 <a:ext uri="{91240B29-F687-4f45-9708-019B960494DF}">
-                  <a14:hiddenLine xmlns:a14="http://schemas.microsoft.com/office/drawing/2010/main" xmlns="" w="9525">
+                  <a14:hiddenLine xmlns="" xmlns:a14="http://schemas.microsoft.com/office/drawing/2010/main" w="9525">
                     <a:solidFill>
                       <a:srgbClr val="000000"/>
                     </a:solidFill>
@@ -10511,7 +10511,7 @@
               </a:ln>
               <a:extLst>
                 <a:ext uri="{91240B29-F687-4f45-9708-019B960494DF}">
-                  <a14:hiddenLine xmlns:a14="http://schemas.microsoft.com/office/drawing/2010/main" xmlns="" w="9525">
+                  <a14:hiddenLine xmlns="" xmlns:a14="http://schemas.microsoft.com/office/drawing/2010/main" w="9525">
                     <a:solidFill>
                       <a:srgbClr val="000000"/>
                     </a:solidFill>
@@ -10601,7 +10601,7 @@
               </a:ln>
               <a:extLst>
                 <a:ext uri="{91240B29-F687-4f45-9708-019B960494DF}">
-                  <a14:hiddenLine xmlns:a14="http://schemas.microsoft.com/office/drawing/2010/main" xmlns="" w="9525">
+                  <a14:hiddenLine xmlns="" xmlns:a14="http://schemas.microsoft.com/office/drawing/2010/main" w="9525">
                     <a:solidFill>
                       <a:srgbClr val="000000"/>
                     </a:solidFill>
@@ -10666,7 +10666,7 @@
               </a:ln>
               <a:extLst>
                 <a:ext uri="{91240B29-F687-4f45-9708-019B960494DF}">
-                  <a14:hiddenLine xmlns:a14="http://schemas.microsoft.com/office/drawing/2010/main" xmlns="" w="9525">
+                  <a14:hiddenLine xmlns="" xmlns:a14="http://schemas.microsoft.com/office/drawing/2010/main" w="9525">
                     <a:solidFill>
                       <a:srgbClr val="000000"/>
                     </a:solidFill>
@@ -10728,7 +10728,7 @@
               </a:ln>
               <a:extLst>
                 <a:ext uri="{91240B29-F687-4f45-9708-019B960494DF}">
-                  <a14:hiddenLine xmlns:a14="http://schemas.microsoft.com/office/drawing/2010/main" xmlns="" w="9525">
+                  <a14:hiddenLine xmlns="" xmlns:a14="http://schemas.microsoft.com/office/drawing/2010/main" w="9525">
                     <a:solidFill>
                       <a:srgbClr val="000000"/>
                     </a:solidFill>
@@ -10818,7 +10818,7 @@
               </a:ln>
               <a:extLst>
                 <a:ext uri="{91240B29-F687-4f45-9708-019B960494DF}">
-                  <a14:hiddenLine xmlns:a14="http://schemas.microsoft.com/office/drawing/2010/main" xmlns="" w="9525">
+                  <a14:hiddenLine xmlns="" xmlns:a14="http://schemas.microsoft.com/office/drawing/2010/main" w="9525">
                     <a:solidFill>
                       <a:srgbClr val="000000"/>
                     </a:solidFill>
@@ -10908,7 +10908,7 @@
               </a:ln>
               <a:extLst>
                 <a:ext uri="{91240B29-F687-4f45-9708-019B960494DF}">
-                  <a14:hiddenLine xmlns:a14="http://schemas.microsoft.com/office/drawing/2010/main" xmlns="" w="9525">
+                  <a14:hiddenLine xmlns="" xmlns:a14="http://schemas.microsoft.com/office/drawing/2010/main" w="9525">
                     <a:solidFill>
                       <a:srgbClr val="000000"/>
                     </a:solidFill>
@@ -10973,7 +10973,7 @@
               </a:ln>
               <a:extLst>
                 <a:ext uri="{91240B29-F687-4f45-9708-019B960494DF}">
-                  <a14:hiddenLine xmlns:a14="http://schemas.microsoft.com/office/drawing/2010/main" xmlns="" w="9525">
+                  <a14:hiddenLine xmlns="" xmlns:a14="http://schemas.microsoft.com/office/drawing/2010/main" w="9525">
                     <a:solidFill>
                       <a:srgbClr val="000000"/>
                     </a:solidFill>
@@ -11093,7 +11093,7 @@
               </a:ln>
               <a:extLst>
                 <a:ext uri="{91240B29-F687-4f45-9708-019B960494DF}">
-                  <a14:hiddenLine xmlns:a14="http://schemas.microsoft.com/office/drawing/2010/main" xmlns="" w="9525">
+                  <a14:hiddenLine xmlns="" xmlns:a14="http://schemas.microsoft.com/office/drawing/2010/main" w="9525">
                     <a:solidFill>
                       <a:srgbClr val="000000"/>
                     </a:solidFill>
@@ -11174,7 +11174,7 @@
               </a:ln>
               <a:extLst>
                 <a:ext uri="{91240B29-F687-4f45-9708-019B960494DF}">
-                  <a14:hiddenLine xmlns:a14="http://schemas.microsoft.com/office/drawing/2010/main" xmlns="" w="9525">
+                  <a14:hiddenLine xmlns="" xmlns:a14="http://schemas.microsoft.com/office/drawing/2010/main" w="9525">
                     <a:solidFill>
                       <a:srgbClr val="000000"/>
                     </a:solidFill>
@@ -11289,7 +11289,7 @@
               </a:ln>
               <a:extLst>
                 <a:ext uri="{91240B29-F687-4f45-9708-019B960494DF}">
-                  <a14:hiddenLine xmlns:a14="http://schemas.microsoft.com/office/drawing/2010/main" xmlns="" w="9525">
+                  <a14:hiddenLine xmlns="" xmlns:a14="http://schemas.microsoft.com/office/drawing/2010/main" w="9525">
                     <a:solidFill>
                       <a:srgbClr val="000000"/>
                     </a:solidFill>
@@ -11379,7 +11379,7 @@
               </a:ln>
               <a:extLst>
                 <a:ext uri="{91240B29-F687-4f45-9708-019B960494DF}">
-                  <a14:hiddenLine xmlns:a14="http://schemas.microsoft.com/office/drawing/2010/main" xmlns="" w="9525">
+                  <a14:hiddenLine xmlns="" xmlns:a14="http://schemas.microsoft.com/office/drawing/2010/main" w="9525">
                     <a:solidFill>
                       <a:srgbClr val="000000"/>
                     </a:solidFill>
@@ -11444,7 +11444,7 @@
               </a:ln>
               <a:extLst>
                 <a:ext uri="{91240B29-F687-4f45-9708-019B960494DF}">
-                  <a14:hiddenLine xmlns:a14="http://schemas.microsoft.com/office/drawing/2010/main" xmlns="" w="9525">
+                  <a14:hiddenLine xmlns="" xmlns:a14="http://schemas.microsoft.com/office/drawing/2010/main" w="9525">
                     <a:solidFill>
                       <a:srgbClr val="000000"/>
                     </a:solidFill>
@@ -11534,7 +11534,7 @@
               </a:ln>
               <a:extLst>
                 <a:ext uri="{91240B29-F687-4f45-9708-019B960494DF}">
-                  <a14:hiddenLine xmlns:a14="http://schemas.microsoft.com/office/drawing/2010/main" xmlns="" w="9525">
+                  <a14:hiddenLine xmlns="" xmlns:a14="http://schemas.microsoft.com/office/drawing/2010/main" w="9525">
                     <a:solidFill>
                       <a:srgbClr val="000000"/>
                     </a:solidFill>
@@ -11602,7 +11602,7 @@
               </a:ln>
               <a:extLst>
                 <a:ext uri="{91240B29-F687-4f45-9708-019B960494DF}">
-                  <a14:hiddenLine xmlns:a14="http://schemas.microsoft.com/office/drawing/2010/main" xmlns="" w="9525">
+                  <a14:hiddenLine xmlns="" xmlns:a14="http://schemas.microsoft.com/office/drawing/2010/main" w="9525">
                     <a:solidFill>
                       <a:srgbClr val="000000"/>
                     </a:solidFill>
@@ -11692,7 +11692,7 @@
               </a:ln>
               <a:extLst>
                 <a:ext uri="{91240B29-F687-4f45-9708-019B960494DF}">
-                  <a14:hiddenLine xmlns:a14="http://schemas.microsoft.com/office/drawing/2010/main" xmlns="" w="9525">
+                  <a14:hiddenLine xmlns="" xmlns:a14="http://schemas.microsoft.com/office/drawing/2010/main" w="9525">
                     <a:solidFill>
                       <a:srgbClr val="000000"/>
                     </a:solidFill>
@@ -11760,7 +11760,7 @@
               </a:ln>
               <a:extLst>
                 <a:ext uri="{91240B29-F687-4f45-9708-019B960494DF}">
-                  <a14:hiddenLine xmlns:a14="http://schemas.microsoft.com/office/drawing/2010/main" xmlns="" w="9525">
+                  <a14:hiddenLine xmlns="" xmlns:a14="http://schemas.microsoft.com/office/drawing/2010/main" w="9525">
                     <a:solidFill>
                       <a:srgbClr val="000000"/>
                     </a:solidFill>
@@ -11850,7 +11850,7 @@
               </a:ln>
               <a:extLst>
                 <a:ext uri="{91240B29-F687-4f45-9708-019B960494DF}">
-                  <a14:hiddenLine xmlns:a14="http://schemas.microsoft.com/office/drawing/2010/main" xmlns="" w="9525">
+                  <a14:hiddenLine xmlns="" xmlns:a14="http://schemas.microsoft.com/office/drawing/2010/main" w="9525">
                     <a:solidFill>
                       <a:srgbClr val="000000"/>
                     </a:solidFill>
@@ -11884,7 +11884,7 @@
               </a:ln>
               <a:extLst>
                 <a:ext uri="{91240B29-F687-4f45-9708-019B960494DF}">
-                  <a14:hiddenLine xmlns:a14="http://schemas.microsoft.com/office/drawing/2010/main" xmlns="" w="9525">
+                  <a14:hiddenLine xmlns="" xmlns:a14="http://schemas.microsoft.com/office/drawing/2010/main" w="9525">
                     <a:solidFill>
                       <a:srgbClr val="000000"/>
                     </a:solidFill>
@@ -12025,7 +12025,7 @@
             <a:fld id="{48A87A34-81AB-432B-8DAE-1953F412C126}" type="datetimeFigureOut">
               <a:rPr lang="en-US" smtClean="0"/>
               <a:pPr/>
-              <a:t>8/15/2019</a:t>
+              <a:t>15-Aug-19</a:t>
             </a:fld>
             <a:endParaRPr lang="en-US" dirty="0"/>
           </a:p>
@@ -12656,7 +12656,7 @@
           <p:cNvPr id="2" name="Title 1">
             <a:extLst>
               <a:ext uri="{FF2B5EF4-FFF2-40B4-BE49-F238E27FC236}">
-                <a16:creationId xmlns:a16="http://schemas.microsoft.com/office/drawing/2014/main" id="{6608D0EB-CBA2-4A41-839E-FF3D59051039}"/>
+                <a16:creationId xmlns:a16="http://schemas.microsoft.com/office/drawing/2014/main" xmlns="" id="{6608D0EB-CBA2-4A41-839E-FF3D59051039}"/>
               </a:ext>
             </a:extLst>
           </p:cNvPr>
@@ -12694,7 +12694,7 @@
           <p:cNvPr id="5" name="Content Placeholder 4">
             <a:extLst>
               <a:ext uri="{FF2B5EF4-FFF2-40B4-BE49-F238E27FC236}">
-                <a16:creationId xmlns:a16="http://schemas.microsoft.com/office/drawing/2014/main" id="{49D2A54B-EE45-4457-ADB2-909C6C041E41}"/>
+                <a16:creationId xmlns:a16="http://schemas.microsoft.com/office/drawing/2014/main" xmlns="" id="{49D2A54B-EE45-4457-ADB2-909C6C041E41}"/>
               </a:ext>
             </a:extLst>
           </p:cNvPr>
@@ -12753,7 +12753,7 @@
           <p:cNvPr id="2" name="Title 1">
             <a:extLst>
               <a:ext uri="{FF2B5EF4-FFF2-40B4-BE49-F238E27FC236}">
-                <a16:creationId xmlns:a16="http://schemas.microsoft.com/office/drawing/2014/main" id="{6C09DCA7-A827-4A58-B938-2DCDF821D6BC}"/>
+                <a16:creationId xmlns:a16="http://schemas.microsoft.com/office/drawing/2014/main" xmlns="" id="{6C09DCA7-A827-4A58-B938-2DCDF821D6BC}"/>
               </a:ext>
             </a:extLst>
           </p:cNvPr>
@@ -12781,7 +12781,7 @@
           <p:cNvPr id="3" name="Content Placeholder 2">
             <a:extLst>
               <a:ext uri="{FF2B5EF4-FFF2-40B4-BE49-F238E27FC236}">
-                <a16:creationId xmlns:a16="http://schemas.microsoft.com/office/drawing/2014/main" id="{609EE5E4-3BE6-4CC2-9EBE-D93F582D2141}"/>
+                <a16:creationId xmlns:a16="http://schemas.microsoft.com/office/drawing/2014/main" xmlns="" id="{609EE5E4-3BE6-4CC2-9EBE-D93F582D2141}"/>
               </a:ext>
             </a:extLst>
           </p:cNvPr>
@@ -12881,7 +12881,7 @@
           <p:cNvPr id="2" name="Title 1">
             <a:extLst>
               <a:ext uri="{FF2B5EF4-FFF2-40B4-BE49-F238E27FC236}">
-                <a16:creationId xmlns:a16="http://schemas.microsoft.com/office/drawing/2014/main" id="{FA3175C2-36A6-4FAB-827D-F868B23E8C10}"/>
+                <a16:creationId xmlns:a16="http://schemas.microsoft.com/office/drawing/2014/main" xmlns="" id="{FA3175C2-36A6-4FAB-827D-F868B23E8C10}"/>
               </a:ext>
             </a:extLst>
           </p:cNvPr>
@@ -12917,7 +12917,7 @@
           <p:cNvPr id="3" name="Content Placeholder 2">
             <a:extLst>
               <a:ext uri="{FF2B5EF4-FFF2-40B4-BE49-F238E27FC236}">
-                <a16:creationId xmlns:a16="http://schemas.microsoft.com/office/drawing/2014/main" id="{14CA4AB1-6450-425B-90B2-52C5AE6FE7DD}"/>
+                <a16:creationId xmlns:a16="http://schemas.microsoft.com/office/drawing/2014/main" xmlns="" id="{14CA4AB1-6450-425B-90B2-52C5AE6FE7DD}"/>
               </a:ext>
             </a:extLst>
           </p:cNvPr>
@@ -13218,7 +13218,7 @@
           <p:cNvPr id="2" name="Title 1">
             <a:extLst>
               <a:ext uri="{FF2B5EF4-FFF2-40B4-BE49-F238E27FC236}">
-                <a16:creationId xmlns:a16="http://schemas.microsoft.com/office/drawing/2014/main" id="{CE66507E-487A-4BFE-8777-8C92FD07F57A}"/>
+                <a16:creationId xmlns:a16="http://schemas.microsoft.com/office/drawing/2014/main" xmlns="" id="{CE66507E-487A-4BFE-8777-8C92FD07F57A}"/>
               </a:ext>
             </a:extLst>
           </p:cNvPr>
@@ -13251,7 +13251,7 @@
           <p:cNvPr id="5" name="Content Placeholder 4">
             <a:extLst>
               <a:ext uri="{FF2B5EF4-FFF2-40B4-BE49-F238E27FC236}">
-                <a16:creationId xmlns:a16="http://schemas.microsoft.com/office/drawing/2014/main" id="{5C026316-C547-48A4-A004-5DF27B0012D3}"/>
+                <a16:creationId xmlns:a16="http://schemas.microsoft.com/office/drawing/2014/main" xmlns="" id="{5C026316-C547-48A4-A004-5DF27B0012D3}"/>
               </a:ext>
             </a:extLst>
           </p:cNvPr>
@@ -13338,7 +13338,7 @@
           <p:cNvPr id="11" name="Content Placeholder 10">
             <a:extLst>
               <a:ext uri="{FF2B5EF4-FFF2-40B4-BE49-F238E27FC236}">
-                <a16:creationId xmlns:a16="http://schemas.microsoft.com/office/drawing/2014/main" id="{0574BAE4-3042-47D1-B8A2-17C8059B9AE5}"/>
+                <a16:creationId xmlns:a16="http://schemas.microsoft.com/office/drawing/2014/main" xmlns="" id="{0574BAE4-3042-47D1-B8A2-17C8059B9AE5}"/>
               </a:ext>
             </a:extLst>
           </p:cNvPr>
@@ -14262,10 +14262,10 @@
             </p:nvGrpSpPr>
             <p:grpSpPr>
               <a:xfrm>
-                <a:off x="7249027" y="4400054"/>
-                <a:ext cx="1720515" cy="401346"/>
-                <a:chOff x="8609182" y="3484439"/>
-                <a:chExt cx="1720515" cy="401346"/>
+                <a:off x="7339264" y="4400054"/>
+                <a:ext cx="1720515" cy="391479"/>
+                <a:chOff x="8699419" y="3484439"/>
+                <a:chExt cx="1720515" cy="391479"/>
               </a:xfrm>
             </p:grpSpPr>
             <p:sp>
@@ -14276,8 +14276,8 @@
               </p:nvSpPr>
               <p:spPr>
                 <a:xfrm>
-                  <a:off x="9504325" y="3484439"/>
-                  <a:ext cx="686422" cy="389441"/>
+                  <a:off x="8729497" y="3484439"/>
+                  <a:ext cx="1461250" cy="389441"/>
                 </a:xfrm>
                 <a:prstGeom prst="rect">
                   <a:avLst/>
@@ -14316,7 +14316,7 @@
               </p:nvSpPr>
               <p:spPr>
                 <a:xfrm>
-                  <a:off x="8609182" y="3516453"/>
+                  <a:off x="8699419" y="3506586"/>
                   <a:ext cx="1720515" cy="369332"/>
                 </a:xfrm>
                 <a:prstGeom prst="rect">
@@ -14670,7 +14670,7 @@
           <p:cNvPr id="7" name="Content Placeholder 6">
             <a:extLst>
               <a:ext uri="{FF2B5EF4-FFF2-40B4-BE49-F238E27FC236}">
-                <a16:creationId xmlns:a16="http://schemas.microsoft.com/office/drawing/2014/main" id="{BF811C63-F57A-44D1-B131-44C324305D0C}"/>
+                <a16:creationId xmlns:a16="http://schemas.microsoft.com/office/drawing/2014/main" xmlns="" id="{BF811C63-F57A-44D1-B131-44C324305D0C}"/>
               </a:ext>
             </a:extLst>
           </p:cNvPr>
@@ -14758,7 +14758,7 @@
           <p:cNvPr id="5" name="Content Placeholder 4">
             <a:extLst>
               <a:ext uri="{FF2B5EF4-FFF2-40B4-BE49-F238E27FC236}">
-                <a16:creationId xmlns:a16="http://schemas.microsoft.com/office/drawing/2014/main" id="{AA02C908-CFD4-4D87-8B1A-6B19EDE1B1E5}"/>
+                <a16:creationId xmlns:a16="http://schemas.microsoft.com/office/drawing/2014/main" xmlns="" id="{AA02C908-CFD4-4D87-8B1A-6B19EDE1B1E5}"/>
               </a:ext>
             </a:extLst>
           </p:cNvPr>
@@ -14846,7 +14846,7 @@
           <p:cNvPr id="4" name="Picture 3">
             <a:extLst>
               <a:ext uri="{FF2B5EF4-FFF2-40B4-BE49-F238E27FC236}">
-                <a16:creationId xmlns:a16="http://schemas.microsoft.com/office/drawing/2014/main" id="{3515BF9A-468E-4738-B634-E09722C047E7}"/>
+                <a16:creationId xmlns:a16="http://schemas.microsoft.com/office/drawing/2014/main" xmlns="" id="{3515BF9A-468E-4738-B634-E09722C047E7}"/>
               </a:ext>
             </a:extLst>
           </p:cNvPr>
@@ -14906,7 +14906,7 @@
           <p:cNvPr id="2" name="Title 1">
             <a:extLst>
               <a:ext uri="{FF2B5EF4-FFF2-40B4-BE49-F238E27FC236}">
-                <a16:creationId xmlns:a16="http://schemas.microsoft.com/office/drawing/2014/main" id="{53940D4F-98C7-4455-AB48-56CAE4404408}"/>
+                <a16:creationId xmlns:a16="http://schemas.microsoft.com/office/drawing/2014/main" xmlns="" id="{53940D4F-98C7-4455-AB48-56CAE4404408}"/>
               </a:ext>
             </a:extLst>
           </p:cNvPr>
@@ -14939,7 +14939,7 @@
           <p:cNvPr id="4" name="Content Placeholder 4">
             <a:extLst>
               <a:ext uri="{FF2B5EF4-FFF2-40B4-BE49-F238E27FC236}">
-                <a16:creationId xmlns:a16="http://schemas.microsoft.com/office/drawing/2014/main" id="{0E44CE0E-F8F3-4774-9547-34F394B1E504}"/>
+                <a16:creationId xmlns:a16="http://schemas.microsoft.com/office/drawing/2014/main" xmlns="" id="{0E44CE0E-F8F3-4774-9547-34F394B1E504}"/>
               </a:ext>
             </a:extLst>
           </p:cNvPr>

</xml_diff>